<commit_message>
changes made to ppt
</commit_message>
<xml_diff>
--- a/ppt/SATELLITE LIFE EXPECTANCY.pptx
+++ b/ppt/SATELLITE LIFE EXPECTANCY.pptx
@@ -9,15 +9,15 @@
   </p:notesMasterIdLst>
   <p:sldIdLst>
     <p:sldId id="530" r:id="rId5"/>
-    <p:sldId id="531" r:id="rId6"/>
-    <p:sldId id="533" r:id="rId7"/>
-    <p:sldId id="534" r:id="rId8"/>
-    <p:sldId id="535" r:id="rId9"/>
-    <p:sldId id="536" r:id="rId10"/>
-    <p:sldId id="537" r:id="rId11"/>
-    <p:sldId id="546" r:id="rId12"/>
-    <p:sldId id="545" r:id="rId13"/>
-    <p:sldId id="538" r:id="rId14"/>
+    <p:sldId id="534" r:id="rId6"/>
+    <p:sldId id="531" r:id="rId7"/>
+    <p:sldId id="538" r:id="rId8"/>
+    <p:sldId id="533" r:id="rId9"/>
+    <p:sldId id="537" r:id="rId10"/>
+    <p:sldId id="535" r:id="rId11"/>
+    <p:sldId id="536" r:id="rId12"/>
+    <p:sldId id="546" r:id="rId13"/>
+    <p:sldId id="545" r:id="rId14"/>
     <p:sldId id="539" r:id="rId15"/>
     <p:sldId id="540" r:id="rId16"/>
     <p:sldId id="541" r:id="rId17"/>
@@ -1454,7 +1454,7 @@
           <a:p>
             <a:fld id="{3F00BCFC-AFFD-334C-A183-6116BAFDF92B}" type="datetimeFigureOut">
               <a:rPr lang="en-US" smtClean="0"/>
-              <a:t>8/4/2023</a:t>
+              <a:t>8/7/2023</a:t>
             </a:fld>
             <a:endParaRPr lang="en-US" dirty="0"/>
           </a:p>
@@ -1719,6 +1719,690 @@
     </a:lvl9pPr>
   </p:notesStyle>
 </p:notesMaster>
+</file>
+
+<file path=ppt/notesSlides/notesSlide1.xml><?xml version="1.0" encoding="utf-8"?>
+<p:notes xmlns:a="http://schemas.openxmlformats.org/drawingml/2006/main" xmlns:r="http://schemas.openxmlformats.org/officeDocument/2006/relationships" xmlns:p="http://schemas.openxmlformats.org/presentationml/2006/main">
+  <p:cSld>
+    <p:spTree>
+      <p:nvGrpSpPr>
+        <p:cNvPr id="1" name=""/>
+        <p:cNvGrpSpPr/>
+        <p:nvPr/>
+      </p:nvGrpSpPr>
+      <p:grpSpPr>
+        <a:xfrm>
+          <a:off x="0" y="0"/>
+          <a:ext cx="0" cy="0"/>
+          <a:chOff x="0" y="0"/>
+          <a:chExt cx="0" cy="0"/>
+        </a:xfrm>
+      </p:grpSpPr>
+      <p:sp>
+        <p:nvSpPr>
+          <p:cNvPr id="2" name="Slide Image Placeholder 1"/>
+          <p:cNvSpPr>
+            <a:spLocks noGrp="1" noRot="1" noChangeAspect="1"/>
+          </p:cNvSpPr>
+          <p:nvPr>
+            <p:ph type="sldImg"/>
+          </p:nvPr>
+        </p:nvSpPr>
+        <p:spPr/>
+      </p:sp>
+      <p:sp>
+        <p:nvSpPr>
+          <p:cNvPr id="3" name="Notes Placeholder 2"/>
+          <p:cNvSpPr>
+            <a:spLocks noGrp="1"/>
+          </p:cNvSpPr>
+          <p:nvPr>
+            <p:ph type="body" idx="1"/>
+          </p:nvPr>
+        </p:nvSpPr>
+        <p:spPr/>
+        <p:txBody>
+          <a:bodyPr/>
+          <a:lstStyle/>
+          <a:p>
+            <a:r>
+              <a:rPr lang="en-US" dirty="0"/>
+              <a:t>Good afternoon, my name is Joshlyn Jamerson and today I’m going to tell you all about satellite life expectancy.  </a:t>
+            </a:r>
+          </a:p>
+        </p:txBody>
+      </p:sp>
+      <p:sp>
+        <p:nvSpPr>
+          <p:cNvPr id="4" name="Slide Number Placeholder 3"/>
+          <p:cNvSpPr>
+            <a:spLocks noGrp="1"/>
+          </p:cNvSpPr>
+          <p:nvPr>
+            <p:ph type="sldNum" sz="quarter" idx="5"/>
+          </p:nvPr>
+        </p:nvSpPr>
+        <p:spPr/>
+        <p:txBody>
+          <a:bodyPr/>
+          <a:lstStyle/>
+          <a:p>
+            <a:fld id="{23C058E0-0852-DB43-83D6-BD76659FF1D8}" type="slidenum">
+              <a:rPr lang="en-US" smtClean="0"/>
+              <a:t>1</a:t>
+            </a:fld>
+            <a:endParaRPr lang="en-US" dirty="0"/>
+          </a:p>
+        </p:txBody>
+      </p:sp>
+    </p:spTree>
+    <p:extLst>
+      <p:ext uri="{BB962C8B-B14F-4D97-AF65-F5344CB8AC3E}">
+        <p14:creationId xmlns:p14="http://schemas.microsoft.com/office/powerpoint/2010/main" val="1456062740"/>
+      </p:ext>
+    </p:extLst>
+  </p:cSld>
+  <p:clrMapOvr>
+    <a:masterClrMapping/>
+  </p:clrMapOvr>
+</p:notes>
+</file>
+
+<file path=ppt/notesSlides/notesSlide2.xml><?xml version="1.0" encoding="utf-8"?>
+<p:notes xmlns:a="http://schemas.openxmlformats.org/drawingml/2006/main" xmlns:r="http://schemas.openxmlformats.org/officeDocument/2006/relationships" xmlns:p="http://schemas.openxmlformats.org/presentationml/2006/main">
+  <p:cSld>
+    <p:spTree>
+      <p:nvGrpSpPr>
+        <p:cNvPr id="1" name=""/>
+        <p:cNvGrpSpPr/>
+        <p:nvPr/>
+      </p:nvGrpSpPr>
+      <p:grpSpPr>
+        <a:xfrm>
+          <a:off x="0" y="0"/>
+          <a:ext cx="0" cy="0"/>
+          <a:chOff x="0" y="0"/>
+          <a:chExt cx="0" cy="0"/>
+        </a:xfrm>
+      </p:grpSpPr>
+      <p:sp>
+        <p:nvSpPr>
+          <p:cNvPr id="2" name="Slide Image Placeholder 1"/>
+          <p:cNvSpPr>
+            <a:spLocks noGrp="1" noRot="1" noChangeAspect="1"/>
+          </p:cNvSpPr>
+          <p:nvPr>
+            <p:ph type="sldImg"/>
+          </p:nvPr>
+        </p:nvSpPr>
+        <p:spPr/>
+      </p:sp>
+      <p:sp>
+        <p:nvSpPr>
+          <p:cNvPr id="3" name="Notes Placeholder 2"/>
+          <p:cNvSpPr>
+            <a:spLocks noGrp="1"/>
+          </p:cNvSpPr>
+          <p:nvPr>
+            <p:ph type="body" idx="1"/>
+          </p:nvPr>
+        </p:nvSpPr>
+        <p:spPr/>
+        <p:txBody>
+          <a:bodyPr/>
+          <a:lstStyle/>
+          <a:p>
+            <a:r>
+              <a:rPr lang="en-US" b="0" i="0" dirty="0">
+                <a:solidFill>
+                  <a:srgbClr val="BDB7AF"/>
+                </a:solidFill>
+                <a:effectLst/>
+                <a:latin typeface="Söhne"/>
+              </a:rPr>
+              <a:t>So why does knowing about satellite life expectancy benefit military stakeholders?</a:t>
+            </a:r>
+          </a:p>
+          <a:p>
+            <a:endParaRPr lang="en-US" b="0" i="0" dirty="0">
+              <a:solidFill>
+                <a:srgbClr val="BDB7AF"/>
+              </a:solidFill>
+              <a:effectLst/>
+              <a:latin typeface="Söhne"/>
+            </a:endParaRPr>
+          </a:p>
+          <a:p>
+            <a:r>
+              <a:rPr lang="en-US" b="0" i="0" dirty="0">
+                <a:solidFill>
+                  <a:srgbClr val="BDB7AF"/>
+                </a:solidFill>
+                <a:effectLst/>
+                <a:latin typeface="Söhne"/>
+              </a:rPr>
+              <a:t>Knowing about what affects the life of a satellite allows for better mission planning, including scheduling replacements or adjustments to ensure continuous and reliable satellite coverage.</a:t>
+            </a:r>
+          </a:p>
+          <a:p>
+            <a:r>
+              <a:rPr lang="en-US" b="0" i="0" dirty="0">
+                <a:solidFill>
+                  <a:srgbClr val="BDB7AF"/>
+                </a:solidFill>
+                <a:effectLst/>
+                <a:latin typeface="Söhne"/>
+              </a:rPr>
+              <a:t>Understanding the factors that affect satellite lifetimes, such as orbit type, can help the military allocate resources effectively by choosing the most suitable orbits for different types of missions. </a:t>
+            </a:r>
+          </a:p>
+          <a:p>
+            <a:r>
+              <a:rPr lang="en-US" b="0" i="0" dirty="0">
+                <a:solidFill>
+                  <a:srgbClr val="BDB7AF"/>
+                </a:solidFill>
+                <a:effectLst/>
+                <a:latin typeface="Söhne"/>
+              </a:rPr>
+              <a:t>Satellites play a crucial role in maintaining situational awareness, command and control, and communication during various operations. Knowing which orbits provide longer lifetimes can contribute to more reliable and sustained operations.</a:t>
+            </a:r>
+          </a:p>
+          <a:p>
+            <a:r>
+              <a:rPr lang="en-US" b="0" i="0" dirty="0">
+                <a:solidFill>
+                  <a:srgbClr val="BDB7AF"/>
+                </a:solidFill>
+                <a:effectLst/>
+                <a:latin typeface="Söhne"/>
+              </a:rPr>
+              <a:t>Satellite development, launch, and maintenance are extremely costly. By understanding factors that influence satellite longevity, the military can make informed decisions about investment in satellite technology, design, and orbits to optimize the cost-effectiveness of their satellite programs.</a:t>
+            </a:r>
+          </a:p>
+          <a:p>
+            <a:r>
+              <a:rPr lang="en-US" b="0" i="0" dirty="0">
+                <a:solidFill>
+                  <a:srgbClr val="BDB7AF"/>
+                </a:solidFill>
+                <a:effectLst/>
+                <a:latin typeface="Söhne"/>
+              </a:rPr>
+              <a:t>Space situational awareness, which involves monitoring and tracking objects in space, helps to prevent collisions and protect satellites from potential threats. Knowledge of satellite lifetimes can aid in predicting end-of-life scenarios and potential debris creation.</a:t>
+            </a:r>
+            <a:endParaRPr lang="en-US" dirty="0"/>
+          </a:p>
+        </p:txBody>
+      </p:sp>
+      <p:sp>
+        <p:nvSpPr>
+          <p:cNvPr id="4" name="Slide Number Placeholder 3"/>
+          <p:cNvSpPr>
+            <a:spLocks noGrp="1"/>
+          </p:cNvSpPr>
+          <p:nvPr>
+            <p:ph type="sldNum" sz="quarter" idx="5"/>
+          </p:nvPr>
+        </p:nvSpPr>
+        <p:spPr/>
+        <p:txBody>
+          <a:bodyPr/>
+          <a:lstStyle/>
+          <a:p>
+            <a:fld id="{23C058E0-0852-DB43-83D6-BD76659FF1D8}" type="slidenum">
+              <a:rPr lang="en-US" smtClean="0"/>
+              <a:t>2</a:t>
+            </a:fld>
+            <a:endParaRPr lang="en-US" dirty="0"/>
+          </a:p>
+        </p:txBody>
+      </p:sp>
+    </p:spTree>
+    <p:extLst>
+      <p:ext uri="{BB962C8B-B14F-4D97-AF65-F5344CB8AC3E}">
+        <p14:creationId xmlns:p14="http://schemas.microsoft.com/office/powerpoint/2010/main" val="4155778470"/>
+      </p:ext>
+    </p:extLst>
+  </p:cSld>
+  <p:clrMapOvr>
+    <a:masterClrMapping/>
+  </p:clrMapOvr>
+</p:notes>
+</file>
+
+<file path=ppt/notesSlides/notesSlide3.xml><?xml version="1.0" encoding="utf-8"?>
+<p:notes xmlns:a="http://schemas.openxmlformats.org/drawingml/2006/main" xmlns:r="http://schemas.openxmlformats.org/officeDocument/2006/relationships" xmlns:p="http://schemas.openxmlformats.org/presentationml/2006/main">
+  <p:cSld>
+    <p:spTree>
+      <p:nvGrpSpPr>
+        <p:cNvPr id="1" name=""/>
+        <p:cNvGrpSpPr/>
+        <p:nvPr/>
+      </p:nvGrpSpPr>
+      <p:grpSpPr>
+        <a:xfrm>
+          <a:off x="0" y="0"/>
+          <a:ext cx="0" cy="0"/>
+          <a:chOff x="0" y="0"/>
+          <a:chExt cx="0" cy="0"/>
+        </a:xfrm>
+      </p:grpSpPr>
+      <p:sp>
+        <p:nvSpPr>
+          <p:cNvPr id="2" name="Slide Image Placeholder 1"/>
+          <p:cNvSpPr>
+            <a:spLocks noGrp="1" noRot="1" noChangeAspect="1"/>
+          </p:cNvSpPr>
+          <p:nvPr>
+            <p:ph type="sldImg"/>
+          </p:nvPr>
+        </p:nvSpPr>
+        <p:spPr/>
+      </p:sp>
+      <p:sp>
+        <p:nvSpPr>
+          <p:cNvPr id="3" name="Notes Placeholder 2"/>
+          <p:cNvSpPr>
+            <a:spLocks noGrp="1"/>
+          </p:cNvSpPr>
+          <p:nvPr>
+            <p:ph type="body" idx="1"/>
+          </p:nvPr>
+        </p:nvSpPr>
+        <p:spPr/>
+        <p:txBody>
+          <a:bodyPr/>
+          <a:lstStyle/>
+          <a:p>
+            <a:r>
+              <a:rPr lang="en-US" dirty="0"/>
+              <a:t>Here’s an overview of the topics I’m going to cover. </a:t>
+            </a:r>
+          </a:p>
+          <a:p>
+            <a:r>
+              <a:rPr lang="en-US" dirty="0"/>
+              <a:t>I’ll start with giving information about the database, discuss my hypothesis, go over my regression model, and the results of my research. </a:t>
+            </a:r>
+          </a:p>
+        </p:txBody>
+      </p:sp>
+      <p:sp>
+        <p:nvSpPr>
+          <p:cNvPr id="4" name="Slide Number Placeholder 3"/>
+          <p:cNvSpPr>
+            <a:spLocks noGrp="1"/>
+          </p:cNvSpPr>
+          <p:nvPr>
+            <p:ph type="sldNum" sz="quarter" idx="5"/>
+          </p:nvPr>
+        </p:nvSpPr>
+        <p:spPr/>
+        <p:txBody>
+          <a:bodyPr/>
+          <a:lstStyle/>
+          <a:p>
+            <a:fld id="{23C058E0-0852-DB43-83D6-BD76659FF1D8}" type="slidenum">
+              <a:rPr lang="en-US" smtClean="0"/>
+              <a:t>3</a:t>
+            </a:fld>
+            <a:endParaRPr lang="en-US" dirty="0"/>
+          </a:p>
+        </p:txBody>
+      </p:sp>
+    </p:spTree>
+    <p:extLst>
+      <p:ext uri="{BB962C8B-B14F-4D97-AF65-F5344CB8AC3E}">
+        <p14:creationId xmlns:p14="http://schemas.microsoft.com/office/powerpoint/2010/main" val="110960748"/>
+      </p:ext>
+    </p:extLst>
+  </p:cSld>
+  <p:clrMapOvr>
+    <a:masterClrMapping/>
+  </p:clrMapOvr>
+</p:notes>
+</file>
+
+<file path=ppt/notesSlides/notesSlide4.xml><?xml version="1.0" encoding="utf-8"?>
+<p:notes xmlns:a="http://schemas.openxmlformats.org/drawingml/2006/main" xmlns:r="http://schemas.openxmlformats.org/officeDocument/2006/relationships" xmlns:p="http://schemas.openxmlformats.org/presentationml/2006/main">
+  <p:cSld>
+    <p:spTree>
+      <p:nvGrpSpPr>
+        <p:cNvPr id="1" name=""/>
+        <p:cNvGrpSpPr/>
+        <p:nvPr/>
+      </p:nvGrpSpPr>
+      <p:grpSpPr>
+        <a:xfrm>
+          <a:off x="0" y="0"/>
+          <a:ext cx="0" cy="0"/>
+          <a:chOff x="0" y="0"/>
+          <a:chExt cx="0" cy="0"/>
+        </a:xfrm>
+      </p:grpSpPr>
+      <p:sp>
+        <p:nvSpPr>
+          <p:cNvPr id="2" name="Slide Image Placeholder 1"/>
+          <p:cNvSpPr>
+            <a:spLocks noGrp="1" noRot="1" noChangeAspect="1"/>
+          </p:cNvSpPr>
+          <p:nvPr>
+            <p:ph type="sldImg"/>
+          </p:nvPr>
+        </p:nvSpPr>
+        <p:spPr/>
+      </p:sp>
+      <p:sp>
+        <p:nvSpPr>
+          <p:cNvPr id="3" name="Notes Placeholder 2"/>
+          <p:cNvSpPr>
+            <a:spLocks noGrp="1"/>
+          </p:cNvSpPr>
+          <p:nvPr>
+            <p:ph type="body" idx="1"/>
+          </p:nvPr>
+        </p:nvSpPr>
+        <p:spPr/>
+        <p:txBody>
+          <a:bodyPr/>
+          <a:lstStyle/>
+          <a:p>
+            <a:r>
+              <a:rPr lang="en-US" dirty="0"/>
+              <a:t>The columns I was interested in include:</a:t>
+            </a:r>
+          </a:p>
+          <a:p>
+            <a:r>
+              <a:rPr lang="en-US" dirty="0"/>
+              <a:t>Expected Lifetime, Launch Mass, Inclination, Perigee, Apogee, and Class of Orbit</a:t>
+            </a:r>
+          </a:p>
+        </p:txBody>
+      </p:sp>
+      <p:sp>
+        <p:nvSpPr>
+          <p:cNvPr id="4" name="Slide Number Placeholder 3"/>
+          <p:cNvSpPr>
+            <a:spLocks noGrp="1"/>
+          </p:cNvSpPr>
+          <p:nvPr>
+            <p:ph type="sldNum" sz="quarter" idx="5"/>
+          </p:nvPr>
+        </p:nvSpPr>
+        <p:spPr/>
+        <p:txBody>
+          <a:bodyPr/>
+          <a:lstStyle/>
+          <a:p>
+            <a:fld id="{23C058E0-0852-DB43-83D6-BD76659FF1D8}" type="slidenum">
+              <a:rPr lang="en-US" smtClean="0"/>
+              <a:t>4</a:t>
+            </a:fld>
+            <a:endParaRPr lang="en-US" dirty="0"/>
+          </a:p>
+        </p:txBody>
+      </p:sp>
+    </p:spTree>
+    <p:extLst>
+      <p:ext uri="{BB962C8B-B14F-4D97-AF65-F5344CB8AC3E}">
+        <p14:creationId xmlns:p14="http://schemas.microsoft.com/office/powerpoint/2010/main" val="2116373465"/>
+      </p:ext>
+    </p:extLst>
+  </p:cSld>
+  <p:clrMapOvr>
+    <a:masterClrMapping/>
+  </p:clrMapOvr>
+</p:notes>
+</file>
+
+<file path=ppt/notesSlides/notesSlide5.xml><?xml version="1.0" encoding="utf-8"?>
+<p:notes xmlns:a="http://schemas.openxmlformats.org/drawingml/2006/main" xmlns:r="http://schemas.openxmlformats.org/officeDocument/2006/relationships" xmlns:p="http://schemas.openxmlformats.org/presentationml/2006/main">
+  <p:cSld>
+    <p:spTree>
+      <p:nvGrpSpPr>
+        <p:cNvPr id="1" name=""/>
+        <p:cNvGrpSpPr/>
+        <p:nvPr/>
+      </p:nvGrpSpPr>
+      <p:grpSpPr>
+        <a:xfrm>
+          <a:off x="0" y="0"/>
+          <a:ext cx="0" cy="0"/>
+          <a:chOff x="0" y="0"/>
+          <a:chExt cx="0" cy="0"/>
+        </a:xfrm>
+      </p:grpSpPr>
+      <p:sp>
+        <p:nvSpPr>
+          <p:cNvPr id="2" name="Slide Image Placeholder 1"/>
+          <p:cNvSpPr>
+            <a:spLocks noGrp="1" noRot="1" noChangeAspect="1"/>
+          </p:cNvSpPr>
+          <p:nvPr>
+            <p:ph type="sldImg"/>
+          </p:nvPr>
+        </p:nvSpPr>
+        <p:spPr/>
+      </p:sp>
+      <p:sp>
+        <p:nvSpPr>
+          <p:cNvPr id="3" name="Notes Placeholder 2"/>
+          <p:cNvSpPr>
+            <a:spLocks noGrp="1"/>
+          </p:cNvSpPr>
+          <p:nvPr>
+            <p:ph type="body" idx="1"/>
+          </p:nvPr>
+        </p:nvSpPr>
+        <p:spPr/>
+        <p:txBody>
+          <a:bodyPr/>
+          <a:lstStyle/>
+          <a:p>
+            <a:r>
+              <a:rPr lang="en-US" dirty="0"/>
+              <a:t>This is how I had to clean up the data to make it usable. </a:t>
+            </a:r>
+          </a:p>
+          <a:p>
+            <a:r>
+              <a:rPr lang="en-US" dirty="0"/>
+              <a:t>The majority of the issues were in the expected lifetime column. Some of the data was in ranges while others were just a specific number. To tackle this issue, I replaced the range with the mean. </a:t>
+            </a:r>
+          </a:p>
+          <a:p>
+            <a:r>
+              <a:rPr lang="en-US" dirty="0"/>
+              <a:t>I also had to create dummy variables for class of orbit as it was one categorical column. Creating the dummy variables allowed me to make comparisons between how the different orbits behaved. </a:t>
+            </a:r>
+          </a:p>
+          <a:p>
+            <a:r>
+              <a:rPr lang="en-US" dirty="0"/>
+              <a:t>There were null values in both the expected lifetime column and in the launch mass column, so I deleted the null rows to avoid any complications with the data. </a:t>
+            </a:r>
+          </a:p>
+          <a:p>
+            <a:endParaRPr lang="en-US" dirty="0"/>
+          </a:p>
+        </p:txBody>
+      </p:sp>
+      <p:sp>
+        <p:nvSpPr>
+          <p:cNvPr id="4" name="Slide Number Placeholder 3"/>
+          <p:cNvSpPr>
+            <a:spLocks noGrp="1"/>
+          </p:cNvSpPr>
+          <p:nvPr>
+            <p:ph type="sldNum" sz="quarter" idx="5"/>
+          </p:nvPr>
+        </p:nvSpPr>
+        <p:spPr/>
+        <p:txBody>
+          <a:bodyPr/>
+          <a:lstStyle/>
+          <a:p>
+            <a:fld id="{23C058E0-0852-DB43-83D6-BD76659FF1D8}" type="slidenum">
+              <a:rPr lang="en-US" smtClean="0"/>
+              <a:t>5</a:t>
+            </a:fld>
+            <a:endParaRPr lang="en-US" dirty="0"/>
+          </a:p>
+        </p:txBody>
+      </p:sp>
+    </p:spTree>
+    <p:extLst>
+      <p:ext uri="{BB962C8B-B14F-4D97-AF65-F5344CB8AC3E}">
+        <p14:creationId xmlns:p14="http://schemas.microsoft.com/office/powerpoint/2010/main" val="3958185235"/>
+      </p:ext>
+    </p:extLst>
+  </p:cSld>
+  <p:clrMapOvr>
+    <a:masterClrMapping/>
+  </p:clrMapOvr>
+</p:notes>
+</file>
+
+<file path=ppt/notesSlides/notesSlide6.xml><?xml version="1.0" encoding="utf-8"?>
+<p:notes xmlns:a="http://schemas.openxmlformats.org/drawingml/2006/main" xmlns:r="http://schemas.openxmlformats.org/officeDocument/2006/relationships" xmlns:p="http://schemas.openxmlformats.org/presentationml/2006/main">
+  <p:cSld>
+    <p:spTree>
+      <p:nvGrpSpPr>
+        <p:cNvPr id="1" name=""/>
+        <p:cNvGrpSpPr/>
+        <p:nvPr/>
+      </p:nvGrpSpPr>
+      <p:grpSpPr>
+        <a:xfrm>
+          <a:off x="0" y="0"/>
+          <a:ext cx="0" cy="0"/>
+          <a:chOff x="0" y="0"/>
+          <a:chExt cx="0" cy="0"/>
+        </a:xfrm>
+      </p:grpSpPr>
+      <p:sp>
+        <p:nvSpPr>
+          <p:cNvPr id="2" name="Slide Image Placeholder 1"/>
+          <p:cNvSpPr>
+            <a:spLocks noGrp="1" noRot="1" noChangeAspect="1"/>
+          </p:cNvSpPr>
+          <p:nvPr>
+            <p:ph type="sldImg"/>
+          </p:nvPr>
+        </p:nvSpPr>
+        <p:spPr/>
+      </p:sp>
+      <p:sp>
+        <p:nvSpPr>
+          <p:cNvPr id="3" name="Notes Placeholder 2"/>
+          <p:cNvSpPr>
+            <a:spLocks noGrp="1"/>
+          </p:cNvSpPr>
+          <p:nvPr>
+            <p:ph type="body" idx="1"/>
+          </p:nvPr>
+        </p:nvSpPr>
+        <p:spPr/>
+        <p:txBody>
+          <a:bodyPr/>
+          <a:lstStyle/>
+          <a:p>
+            <a:pPr algn="l"/>
+            <a:r>
+              <a:rPr lang="en-US" dirty="0"/>
+              <a:t>My null hypothesis is that </a:t>
+            </a:r>
+            <a:r>
+              <a:rPr lang="en-US" sz="1200" dirty="0">
+                <a:solidFill>
+                  <a:schemeClr val="accent2">
+                    <a:lumMod val="60000"/>
+                    <a:lumOff val="40000"/>
+                  </a:schemeClr>
+                </a:solidFill>
+                <a:latin typeface="Biome Light" panose="020B0303030204020804" pitchFamily="34" charset="0"/>
+                <a:cs typeface="Biome Light" panose="020B0303030204020804" pitchFamily="34" charset="0"/>
+              </a:rPr>
+              <a:t>Satellites in GEO will have a similar life expectancy compared to those in other orbits</a:t>
+            </a:r>
+          </a:p>
+          <a:p>
+            <a:pPr marL="0" marR="0" lvl="0" indent="0" algn="l" defTabSz="914400" rtl="0" eaLnBrk="1" fontAlgn="auto" latinLnBrk="0" hangingPunct="1">
+              <a:lnSpc>
+                <a:spcPct val="100000"/>
+              </a:lnSpc>
+              <a:spcBef>
+                <a:spcPts val="0"/>
+              </a:spcBef>
+              <a:spcAft>
+                <a:spcPts val="0"/>
+              </a:spcAft>
+              <a:buClrTx/>
+              <a:buSzTx/>
+              <a:buFontTx/>
+              <a:buNone/>
+              <a:tabLst/>
+              <a:defRPr/>
+            </a:pPr>
+            <a:r>
+              <a:rPr lang="en-US" dirty="0"/>
+              <a:t>My Alternative hypothesis is that </a:t>
+            </a:r>
+            <a:r>
+              <a:rPr lang="en-US" sz="1200" dirty="0">
+                <a:solidFill>
+                  <a:schemeClr val="accent2">
+                    <a:lumMod val="60000"/>
+                    <a:lumOff val="40000"/>
+                  </a:schemeClr>
+                </a:solidFill>
+                <a:latin typeface="Biome Light" panose="020B0303030204020804" pitchFamily="34" charset="0"/>
+                <a:cs typeface="Biome Light" panose="020B0303030204020804" pitchFamily="34" charset="0"/>
+              </a:rPr>
+              <a:t>Satellites in GEO will have a longer life expectancy compared to those in other orbits</a:t>
+            </a:r>
+          </a:p>
+          <a:p>
+            <a:endParaRPr lang="en-US" dirty="0"/>
+          </a:p>
+        </p:txBody>
+      </p:sp>
+      <p:sp>
+        <p:nvSpPr>
+          <p:cNvPr id="4" name="Slide Number Placeholder 3"/>
+          <p:cNvSpPr>
+            <a:spLocks noGrp="1"/>
+          </p:cNvSpPr>
+          <p:nvPr>
+            <p:ph type="sldNum" sz="quarter" idx="5"/>
+          </p:nvPr>
+        </p:nvSpPr>
+        <p:spPr/>
+        <p:txBody>
+          <a:bodyPr/>
+          <a:lstStyle/>
+          <a:p>
+            <a:fld id="{23C058E0-0852-DB43-83D6-BD76659FF1D8}" type="slidenum">
+              <a:rPr lang="en-US" smtClean="0"/>
+              <a:t>6</a:t>
+            </a:fld>
+            <a:endParaRPr lang="en-US" dirty="0"/>
+          </a:p>
+        </p:txBody>
+      </p:sp>
+    </p:spTree>
+    <p:extLst>
+      <p:ext uri="{BB962C8B-B14F-4D97-AF65-F5344CB8AC3E}">
+        <p14:creationId xmlns:p14="http://schemas.microsoft.com/office/powerpoint/2010/main" val="213021678"/>
+      </p:ext>
+    </p:extLst>
+  </p:cSld>
+  <p:clrMapOvr>
+    <a:masterClrMapping/>
+  </p:clrMapOvr>
+</p:notes>
 </file>
 
 <file path=ppt/slideLayouts/slideLayout1.xml><?xml version="1.0" encoding="utf-8"?>
@@ -18436,10 +19120,10 @@
       </p:grpSpPr>
       <p:sp>
         <p:nvSpPr>
-          <p:cNvPr id="2" name="Title 1">
-            <a:extLst>
-              <a:ext uri="{FF2B5EF4-FFF2-40B4-BE49-F238E27FC236}">
-                <a16:creationId xmlns:a16="http://schemas.microsoft.com/office/drawing/2014/main" id="{D249E45E-D6A7-9780-F652-BAF86DFBCC00}"/>
+          <p:cNvPr id="106" name="Title 105">
+            <a:extLst>
+              <a:ext uri="{FF2B5EF4-FFF2-40B4-BE49-F238E27FC236}">
+                <a16:creationId xmlns:a16="http://schemas.microsoft.com/office/drawing/2014/main" id="{734F8B63-0C1D-770B-CA9D-EE7ACF817C1F}"/>
               </a:ext>
             </a:extLst>
           </p:cNvPr>
@@ -18457,17 +19141,17 @@
           <a:p>
             <a:r>
               <a:rPr lang="en-US" dirty="0"/>
-              <a:t>AREAS OF FOCUS</a:t>
-            </a:r>
-          </a:p>
-        </p:txBody>
-      </p:sp>
-      <p:sp>
-        <p:nvSpPr>
-          <p:cNvPr id="8" name="Slide Number Placeholder 7">
-            <a:extLst>
-              <a:ext uri="{FF2B5EF4-FFF2-40B4-BE49-F238E27FC236}">
-                <a16:creationId xmlns:a16="http://schemas.microsoft.com/office/drawing/2014/main" id="{85577A64-4E94-69E1-3180-1E014BD06B3C}"/>
+              <a:t>PORTFOLIO BUILDUP</a:t>
+            </a:r>
+          </a:p>
+        </p:txBody>
+      </p:sp>
+      <p:sp>
+        <p:nvSpPr>
+          <p:cNvPr id="139" name="Slide Number Placeholder 138">
+            <a:extLst>
+              <a:ext uri="{FF2B5EF4-FFF2-40B4-BE49-F238E27FC236}">
+                <a16:creationId xmlns:a16="http://schemas.microsoft.com/office/drawing/2014/main" id="{0C6CCCC3-BCC9-AE9B-C2AE-4D9986B5F8AE}"/>
               </a:ext>
             </a:extLst>
           </p:cNvPr>
@@ -18475,7 +19159,7 @@
             <a:spLocks noGrp="1"/>
           </p:cNvSpPr>
           <p:nvPr>
-            <p:ph type="sldNum" sz="quarter" idx="12"/>
+            <p:ph type="sldNum" sz="quarter" idx="11"/>
           </p:nvPr>
         </p:nvSpPr>
         <p:spPr/>
@@ -18485,18 +19169,139 @@
           <a:p>
             <a:fld id="{294A09A9-5501-47C1-A89A-A340965A2BE2}" type="slidenum">
               <a:rPr lang="en-US" smtClean="0"/>
+              <a:pPr/>
               <a:t>10</a:t>
             </a:fld>
             <a:endParaRPr lang="en-US" dirty="0"/>
           </a:p>
         </p:txBody>
       </p:sp>
+      <p:pic>
+        <p:nvPicPr>
+          <p:cNvPr id="85" name="Picture Placeholder 84" descr="Continuous Improvement outline">
+            <a:extLst>
+              <a:ext uri="{FF2B5EF4-FFF2-40B4-BE49-F238E27FC236}">
+                <a16:creationId xmlns:a16="http://schemas.microsoft.com/office/drawing/2014/main" id="{D65F5CE9-1D9A-9BF0-5ADD-C4E2693DA4CB}"/>
+              </a:ext>
+            </a:extLst>
+          </p:cNvPr>
+          <p:cNvPicPr>
+            <a:picLocks noGrp="1" noChangeAspect="1"/>
+          </p:cNvPicPr>
+          <p:nvPr>
+            <p:ph type="pic" sz="quarter" idx="22"/>
+          </p:nvPr>
+        </p:nvPicPr>
+        <p:blipFill rotWithShape="1">
+          <a:blip r:embed="rId2"/>
+          <a:srcRect t="517" b="517"/>
+          <a:stretch/>
+        </p:blipFill>
+        <p:spPr>
+          <a:xfrm>
+            <a:off x="1583555" y="2980517"/>
+            <a:ext cx="713074" cy="713074"/>
+          </a:xfrm>
+        </p:spPr>
+      </p:pic>
+      <p:pic>
+        <p:nvPicPr>
+          <p:cNvPr id="86" name="Picture Placeholder 85" descr="Wallet outline">
+            <a:extLst>
+              <a:ext uri="{FF2B5EF4-FFF2-40B4-BE49-F238E27FC236}">
+                <a16:creationId xmlns:a16="http://schemas.microsoft.com/office/drawing/2014/main" id="{EDC60F06-D73E-F719-14FA-A6F1ECF09300}"/>
+              </a:ext>
+            </a:extLst>
+          </p:cNvPr>
+          <p:cNvPicPr>
+            <a:picLocks noGrp="1" noChangeAspect="1"/>
+          </p:cNvPicPr>
+          <p:nvPr>
+            <p:ph type="pic" sz="quarter" idx="23"/>
+          </p:nvPr>
+        </p:nvPicPr>
+        <p:blipFill rotWithShape="1">
+          <a:blip r:embed="rId3"/>
+          <a:srcRect t="128" b="128"/>
+          <a:stretch/>
+        </p:blipFill>
+        <p:spPr/>
+      </p:pic>
+      <p:pic>
+        <p:nvPicPr>
+          <p:cNvPr id="87" name="Picture Placeholder 86" descr="Piggy Bank outline">
+            <a:extLst>
+              <a:ext uri="{FF2B5EF4-FFF2-40B4-BE49-F238E27FC236}">
+                <a16:creationId xmlns:a16="http://schemas.microsoft.com/office/drawing/2014/main" id="{ED53247D-56A2-6AB9-6FF9-0313BD7DB9E8}"/>
+              </a:ext>
+            </a:extLst>
+          </p:cNvPr>
+          <p:cNvPicPr>
+            <a:picLocks noGrp="1" noChangeAspect="1"/>
+          </p:cNvPicPr>
+          <p:nvPr>
+            <p:ph type="pic" sz="quarter" idx="24"/>
+          </p:nvPr>
+        </p:nvPicPr>
+        <p:blipFill rotWithShape="1">
+          <a:blip r:embed="rId4"/>
+          <a:srcRect/>
+          <a:stretch/>
+        </p:blipFill>
+        <p:spPr/>
+      </p:pic>
+      <p:pic>
+        <p:nvPicPr>
+          <p:cNvPr id="88" name="Picture Placeholder 87" descr="Bitcoin outline">
+            <a:extLst>
+              <a:ext uri="{FF2B5EF4-FFF2-40B4-BE49-F238E27FC236}">
+                <a16:creationId xmlns:a16="http://schemas.microsoft.com/office/drawing/2014/main" id="{32BC0F61-A0C8-5BEF-A6E9-0E7ADE645FA6}"/>
+              </a:ext>
+            </a:extLst>
+          </p:cNvPr>
+          <p:cNvPicPr>
+            <a:picLocks noGrp="1" noChangeAspect="1"/>
+          </p:cNvPicPr>
+          <p:nvPr>
+            <p:ph type="pic" sz="quarter" idx="25"/>
+          </p:nvPr>
+        </p:nvPicPr>
+        <p:blipFill rotWithShape="1">
+          <a:blip r:embed="rId5"/>
+          <a:srcRect l="345" r="345"/>
+          <a:stretch/>
+        </p:blipFill>
+        <p:spPr/>
+      </p:pic>
+      <p:pic>
+        <p:nvPicPr>
+          <p:cNvPr id="90" name="Picture Placeholder 89" descr="Exponential Graph outline">
+            <a:extLst>
+              <a:ext uri="{FF2B5EF4-FFF2-40B4-BE49-F238E27FC236}">
+                <a16:creationId xmlns:a16="http://schemas.microsoft.com/office/drawing/2014/main" id="{86472D92-CAA9-AF6F-549B-2EE170C70DD7}"/>
+              </a:ext>
+            </a:extLst>
+          </p:cNvPr>
+          <p:cNvPicPr>
+            <a:picLocks noGrp="1" noChangeAspect="1"/>
+          </p:cNvPicPr>
+          <p:nvPr>
+            <p:ph type="pic" sz="quarter" idx="26"/>
+          </p:nvPr>
+        </p:nvPicPr>
+        <p:blipFill rotWithShape="1">
+          <a:blip r:embed="rId6"/>
+          <a:srcRect/>
+          <a:stretch/>
+        </p:blipFill>
+        <p:spPr/>
+      </p:pic>
       <p:sp>
         <p:nvSpPr>
           <p:cNvPr id="3" name="Text Placeholder 2">
             <a:extLst>
               <a:ext uri="{FF2B5EF4-FFF2-40B4-BE49-F238E27FC236}">
-                <a16:creationId xmlns:a16="http://schemas.microsoft.com/office/drawing/2014/main" id="{C31605EE-24B6-95D8-DE5E-BEC2F03ECECA}"/>
+                <a16:creationId xmlns:a16="http://schemas.microsoft.com/office/drawing/2014/main" id="{0CF4EECB-47E7-26A0-F3A1-ACAE7AEE5741}"/>
               </a:ext>
             </a:extLst>
           </p:cNvPr>
@@ -18504,7 +19309,7 @@
             <a:spLocks noGrp="1"/>
           </p:cNvSpPr>
           <p:nvPr>
-            <p:ph type="body" idx="1"/>
+            <p:ph type="body" sz="quarter" idx="12"/>
           </p:nvPr>
         </p:nvSpPr>
         <p:spPr/>
@@ -18514,17 +19319,17 @@
           <a:p>
             <a:r>
               <a:rPr lang="en-US" dirty="0"/>
-              <a:t>Portfolio diversification</a:t>
-            </a:r>
-          </a:p>
-        </p:txBody>
-      </p:sp>
-      <p:sp>
-        <p:nvSpPr>
-          <p:cNvPr id="4" name="Content Placeholder 3">
-            <a:extLst>
-              <a:ext uri="{FF2B5EF4-FFF2-40B4-BE49-F238E27FC236}">
-                <a16:creationId xmlns:a16="http://schemas.microsoft.com/office/drawing/2014/main" id="{BE22F651-7ABC-015D-B5C4-622708A64CB1}"/>
+              <a:t>Step 1</a:t>
+            </a:r>
+          </a:p>
+        </p:txBody>
+      </p:sp>
+      <p:sp>
+        <p:nvSpPr>
+          <p:cNvPr id="133" name="Text Placeholder 132">
+            <a:extLst>
+              <a:ext uri="{FF2B5EF4-FFF2-40B4-BE49-F238E27FC236}">
+                <a16:creationId xmlns:a16="http://schemas.microsoft.com/office/drawing/2014/main" id="{0D7DF893-CDC1-A213-86BF-C9C73F979CC5}"/>
               </a:ext>
             </a:extLst>
           </p:cNvPr>
@@ -18532,7 +19337,7 @@
             <a:spLocks noGrp="1"/>
           </p:cNvSpPr>
           <p:nvPr>
-            <p:ph sz="half" idx="2"/>
+            <p:ph type="body" sz="quarter" idx="28"/>
           </p:nvPr>
         </p:nvSpPr>
         <p:spPr/>
@@ -18540,24 +19345,6 @@
           <a:bodyPr/>
           <a:lstStyle/>
           <a:p>
-            <a:r>
-              <a:rPr lang="en-US" dirty="0"/>
-              <a:t>Develop winning combinations to stay ahead of the market</a:t>
-            </a:r>
-          </a:p>
-          <a:p>
-            <a:r>
-              <a:rPr lang="en-US" dirty="0"/>
-              <a:t>Capitalize on direct ownership of digital coins</a:t>
-            </a:r>
-          </a:p>
-          <a:p>
-            <a:r>
-              <a:rPr lang="en-US" dirty="0"/>
-              <a:t>Invest in multiple blockchains​</a:t>
-            </a:r>
-          </a:p>
-          <a:p>
             <a:endParaRPr lang="en-US" dirty="0"/>
           </a:p>
         </p:txBody>
@@ -18567,7 +19354,7 @@
           <p:cNvPr id="5" name="Text Placeholder 4">
             <a:extLst>
               <a:ext uri="{FF2B5EF4-FFF2-40B4-BE49-F238E27FC236}">
-                <a16:creationId xmlns:a16="http://schemas.microsoft.com/office/drawing/2014/main" id="{6A1E0F07-3291-4EE2-1286-04C97165BA68}"/>
+                <a16:creationId xmlns:a16="http://schemas.microsoft.com/office/drawing/2014/main" id="{AC2F0535-53EA-30FB-770D-0C92BEEF3F6D}"/>
               </a:ext>
             </a:extLst>
           </p:cNvPr>
@@ -18575,7 +19362,7 @@
             <a:spLocks noGrp="1"/>
           </p:cNvSpPr>
           <p:nvPr>
-            <p:ph type="body" sz="quarter" idx="3"/>
+            <p:ph type="body" sz="quarter" idx="14"/>
           </p:nvPr>
         </p:nvSpPr>
         <p:spPr/>
@@ -18583,19 +19370,20 @@
           <a:bodyPr/>
           <a:lstStyle/>
           <a:p>
+            <a:pPr lvl="0"/>
             <a:r>
               <a:rPr lang="en-US" dirty="0"/>
-              <a:t>Short and long-term goals</a:t>
-            </a:r>
-          </a:p>
-        </p:txBody>
-      </p:sp>
-      <p:sp>
-        <p:nvSpPr>
-          <p:cNvPr id="6" name="Content Placeholder 5">
-            <a:extLst>
-              <a:ext uri="{FF2B5EF4-FFF2-40B4-BE49-F238E27FC236}">
-                <a16:creationId xmlns:a16="http://schemas.microsoft.com/office/drawing/2014/main" id="{3DF22CC9-1295-2B21-05A9-68A44E669B8F}"/>
+              <a:t>Step 2</a:t>
+            </a:r>
+          </a:p>
+        </p:txBody>
+      </p:sp>
+      <p:sp>
+        <p:nvSpPr>
+          <p:cNvPr id="134" name="Text Placeholder 133">
+            <a:extLst>
+              <a:ext uri="{FF2B5EF4-FFF2-40B4-BE49-F238E27FC236}">
+                <a16:creationId xmlns:a16="http://schemas.microsoft.com/office/drawing/2014/main" id="{9CE100CE-4574-F901-234D-B9BEED642B9B}"/>
               </a:ext>
             </a:extLst>
           </p:cNvPr>
@@ -18603,7 +19391,7 @@
             <a:spLocks noGrp="1"/>
           </p:cNvSpPr>
           <p:nvPr>
-            <p:ph sz="quarter" idx="4"/>
+            <p:ph type="body" sz="quarter" idx="29"/>
           </p:nvPr>
         </p:nvSpPr>
         <p:spPr/>
@@ -18611,37 +19399,16 @@
           <a:bodyPr/>
           <a:lstStyle/>
           <a:p>
-            <a:r>
-              <a:rPr lang="en-US" dirty="0"/>
-              <a:t>Create an emergency fund</a:t>
-            </a:r>
-          </a:p>
-          <a:p>
-            <a:r>
-              <a:rPr lang="en-US" dirty="0"/>
-              <a:t>Add a second stream of income</a:t>
-            </a:r>
-          </a:p>
-          <a:p>
-            <a:r>
-              <a:rPr lang="en-US" dirty="0"/>
-              <a:t>Buy a house</a:t>
-            </a:r>
-          </a:p>
-          <a:p>
-            <a:r>
-              <a:rPr lang="en-US" dirty="0"/>
-              <a:t>Supplement retirement fund</a:t>
-            </a:r>
-          </a:p>
-        </p:txBody>
-      </p:sp>
-      <p:sp>
-        <p:nvSpPr>
-          <p:cNvPr id="7" name="Footer Placeholder 6">
-            <a:extLst>
-              <a:ext uri="{FF2B5EF4-FFF2-40B4-BE49-F238E27FC236}">
-                <a16:creationId xmlns:a16="http://schemas.microsoft.com/office/drawing/2014/main" id="{A9F57080-19CA-8BBA-6050-8494551D4615}"/>
+            <a:endParaRPr lang="en-US" dirty="0"/>
+          </a:p>
+        </p:txBody>
+      </p:sp>
+      <p:sp>
+        <p:nvSpPr>
+          <p:cNvPr id="7" name="Text Placeholder 6">
+            <a:extLst>
+              <a:ext uri="{FF2B5EF4-FFF2-40B4-BE49-F238E27FC236}">
+                <a16:creationId xmlns:a16="http://schemas.microsoft.com/office/drawing/2014/main" id="{31511481-29C6-275B-963E-B5AF2E87ADA2}"/>
               </a:ext>
             </a:extLst>
           </p:cNvPr>
@@ -18649,7 +19416,322 @@
             <a:spLocks noGrp="1"/>
           </p:cNvSpPr>
           <p:nvPr>
-            <p:ph type="ftr" sz="quarter" idx="11"/>
+            <p:ph type="body" sz="quarter" idx="16"/>
+          </p:nvPr>
+        </p:nvSpPr>
+        <p:spPr/>
+        <p:txBody>
+          <a:bodyPr/>
+          <a:lstStyle/>
+          <a:p>
+            <a:pPr lvl="0"/>
+            <a:r>
+              <a:rPr lang="en-US" dirty="0"/>
+              <a:t>Step 3</a:t>
+            </a:r>
+          </a:p>
+        </p:txBody>
+      </p:sp>
+      <p:sp>
+        <p:nvSpPr>
+          <p:cNvPr id="135" name="Text Placeholder 134">
+            <a:extLst>
+              <a:ext uri="{FF2B5EF4-FFF2-40B4-BE49-F238E27FC236}">
+                <a16:creationId xmlns:a16="http://schemas.microsoft.com/office/drawing/2014/main" id="{288EBDBE-0ABC-82CE-4598-09F65E315AD7}"/>
+              </a:ext>
+            </a:extLst>
+          </p:cNvPr>
+          <p:cNvSpPr>
+            <a:spLocks noGrp="1"/>
+          </p:cNvSpPr>
+          <p:nvPr>
+            <p:ph type="body" sz="quarter" idx="30"/>
+          </p:nvPr>
+        </p:nvSpPr>
+        <p:spPr/>
+        <p:txBody>
+          <a:bodyPr/>
+          <a:lstStyle/>
+          <a:p>
+            <a:endParaRPr lang="en-US" dirty="0"/>
+          </a:p>
+        </p:txBody>
+      </p:sp>
+      <p:sp>
+        <p:nvSpPr>
+          <p:cNvPr id="9" name="Text Placeholder 8">
+            <a:extLst>
+              <a:ext uri="{FF2B5EF4-FFF2-40B4-BE49-F238E27FC236}">
+                <a16:creationId xmlns:a16="http://schemas.microsoft.com/office/drawing/2014/main" id="{2F32973A-CF94-1C2B-BB12-B563173CC79A}"/>
+              </a:ext>
+            </a:extLst>
+          </p:cNvPr>
+          <p:cNvSpPr>
+            <a:spLocks noGrp="1"/>
+          </p:cNvSpPr>
+          <p:nvPr>
+            <p:ph type="body" sz="quarter" idx="18"/>
+          </p:nvPr>
+        </p:nvSpPr>
+        <p:spPr/>
+        <p:txBody>
+          <a:bodyPr/>
+          <a:lstStyle/>
+          <a:p>
+            <a:pPr lvl="0"/>
+            <a:r>
+              <a:rPr lang="en-US" dirty="0"/>
+              <a:t>Step 4</a:t>
+            </a:r>
+          </a:p>
+        </p:txBody>
+      </p:sp>
+      <p:sp>
+        <p:nvSpPr>
+          <p:cNvPr id="136" name="Text Placeholder 135">
+            <a:extLst>
+              <a:ext uri="{FF2B5EF4-FFF2-40B4-BE49-F238E27FC236}">
+                <a16:creationId xmlns:a16="http://schemas.microsoft.com/office/drawing/2014/main" id="{14F6CD04-2A18-A6BD-AAB9-1D30D1563399}"/>
+              </a:ext>
+            </a:extLst>
+          </p:cNvPr>
+          <p:cNvSpPr>
+            <a:spLocks noGrp="1"/>
+          </p:cNvSpPr>
+          <p:nvPr>
+            <p:ph type="body" sz="quarter" idx="31"/>
+          </p:nvPr>
+        </p:nvSpPr>
+        <p:spPr/>
+        <p:txBody>
+          <a:bodyPr/>
+          <a:lstStyle/>
+          <a:p>
+            <a:endParaRPr lang="en-US" dirty="0"/>
+          </a:p>
+        </p:txBody>
+      </p:sp>
+      <p:sp>
+        <p:nvSpPr>
+          <p:cNvPr id="11" name="Text Placeholder 10">
+            <a:extLst>
+              <a:ext uri="{FF2B5EF4-FFF2-40B4-BE49-F238E27FC236}">
+                <a16:creationId xmlns:a16="http://schemas.microsoft.com/office/drawing/2014/main" id="{CE7AA813-84F0-DB50-F6B6-A29A94662DAD}"/>
+              </a:ext>
+            </a:extLst>
+          </p:cNvPr>
+          <p:cNvSpPr>
+            <a:spLocks noGrp="1"/>
+          </p:cNvSpPr>
+          <p:nvPr>
+            <p:ph type="body" sz="quarter" idx="20"/>
+          </p:nvPr>
+        </p:nvSpPr>
+        <p:spPr/>
+        <p:txBody>
+          <a:bodyPr/>
+          <a:lstStyle/>
+          <a:p>
+            <a:pPr lvl="0"/>
+            <a:r>
+              <a:rPr lang="en-US" dirty="0"/>
+              <a:t>Step 5</a:t>
+            </a:r>
+          </a:p>
+        </p:txBody>
+      </p:sp>
+      <p:sp>
+        <p:nvSpPr>
+          <p:cNvPr id="137" name="Text Placeholder 136">
+            <a:extLst>
+              <a:ext uri="{FF2B5EF4-FFF2-40B4-BE49-F238E27FC236}">
+                <a16:creationId xmlns:a16="http://schemas.microsoft.com/office/drawing/2014/main" id="{C171CBDB-4593-F4D1-30E9-A47F4C7CADAF}"/>
+              </a:ext>
+            </a:extLst>
+          </p:cNvPr>
+          <p:cNvSpPr>
+            <a:spLocks noGrp="1"/>
+          </p:cNvSpPr>
+          <p:nvPr>
+            <p:ph type="body" sz="quarter" idx="32"/>
+          </p:nvPr>
+        </p:nvSpPr>
+        <p:spPr/>
+        <p:txBody>
+          <a:bodyPr/>
+          <a:lstStyle/>
+          <a:p>
+            <a:endParaRPr lang="en-US" dirty="0"/>
+          </a:p>
+        </p:txBody>
+      </p:sp>
+      <p:sp>
+        <p:nvSpPr>
+          <p:cNvPr id="69" name="Text Placeholder 68">
+            <a:extLst>
+              <a:ext uri="{FF2B5EF4-FFF2-40B4-BE49-F238E27FC236}">
+                <a16:creationId xmlns:a16="http://schemas.microsoft.com/office/drawing/2014/main" id="{4BBDF45D-9B32-0154-7602-2C43DAF6C0A6}"/>
+              </a:ext>
+            </a:extLst>
+          </p:cNvPr>
+          <p:cNvSpPr>
+            <a:spLocks noGrp="1"/>
+          </p:cNvSpPr>
+          <p:nvPr>
+            <p:ph type="body" sz="quarter" idx="13"/>
+          </p:nvPr>
+        </p:nvSpPr>
+        <p:spPr/>
+        <p:txBody>
+          <a:bodyPr/>
+          <a:lstStyle/>
+          <a:p>
+            <a:r>
+              <a:rPr lang="en-US" dirty="0"/>
+              <a:t>Choose a cryptocurrency exchange</a:t>
+            </a:r>
+          </a:p>
+          <a:p>
+            <a:endParaRPr lang="en-US" dirty="0"/>
+          </a:p>
+        </p:txBody>
+      </p:sp>
+      <p:sp>
+        <p:nvSpPr>
+          <p:cNvPr id="70" name="Text Placeholder 69">
+            <a:extLst>
+              <a:ext uri="{FF2B5EF4-FFF2-40B4-BE49-F238E27FC236}">
+                <a16:creationId xmlns:a16="http://schemas.microsoft.com/office/drawing/2014/main" id="{38FF6C9F-C7C5-37D5-4C61-BA14A636B732}"/>
+              </a:ext>
+            </a:extLst>
+          </p:cNvPr>
+          <p:cNvSpPr>
+            <a:spLocks noGrp="1"/>
+          </p:cNvSpPr>
+          <p:nvPr>
+            <p:ph type="body" sz="quarter" idx="15"/>
+          </p:nvPr>
+        </p:nvSpPr>
+        <p:spPr/>
+        <p:txBody>
+          <a:bodyPr/>
+          <a:lstStyle/>
+          <a:p>
+            <a:r>
+              <a:rPr lang="en-US" dirty="0"/>
+              <a:t>Purchase preferred coins &amp; create "wallet"</a:t>
+            </a:r>
+          </a:p>
+          <a:p>
+            <a:endParaRPr lang="en-US" dirty="0"/>
+          </a:p>
+        </p:txBody>
+      </p:sp>
+      <p:sp>
+        <p:nvSpPr>
+          <p:cNvPr id="71" name="Text Placeholder 70">
+            <a:extLst>
+              <a:ext uri="{FF2B5EF4-FFF2-40B4-BE49-F238E27FC236}">
+                <a16:creationId xmlns:a16="http://schemas.microsoft.com/office/drawing/2014/main" id="{5973BD56-1612-983E-EA67-F4039B062085}"/>
+              </a:ext>
+            </a:extLst>
+          </p:cNvPr>
+          <p:cNvSpPr>
+            <a:spLocks noGrp="1"/>
+          </p:cNvSpPr>
+          <p:nvPr>
+            <p:ph type="body" sz="quarter" idx="17"/>
+          </p:nvPr>
+        </p:nvSpPr>
+        <p:spPr/>
+        <p:txBody>
+          <a:bodyPr/>
+          <a:lstStyle/>
+          <a:p>
+            <a:r>
+              <a:rPr lang="en-US" dirty="0"/>
+              <a:t>Research investment and trading options</a:t>
+            </a:r>
+          </a:p>
+          <a:p>
+            <a:endParaRPr lang="en-US" dirty="0"/>
+          </a:p>
+        </p:txBody>
+      </p:sp>
+      <p:sp>
+        <p:nvSpPr>
+          <p:cNvPr id="72" name="Text Placeholder 71">
+            <a:extLst>
+              <a:ext uri="{FF2B5EF4-FFF2-40B4-BE49-F238E27FC236}">
+                <a16:creationId xmlns:a16="http://schemas.microsoft.com/office/drawing/2014/main" id="{840CFADA-CAD6-2A04-5B15-5DB4DD6A84E0}"/>
+              </a:ext>
+            </a:extLst>
+          </p:cNvPr>
+          <p:cNvSpPr>
+            <a:spLocks noGrp="1"/>
+          </p:cNvSpPr>
+          <p:nvPr>
+            <p:ph type="body" sz="quarter" idx="19"/>
+          </p:nvPr>
+        </p:nvSpPr>
+        <p:spPr/>
+        <p:txBody>
+          <a:bodyPr/>
+          <a:lstStyle/>
+          <a:p>
+            <a:r>
+              <a:rPr lang="en-US" dirty="0"/>
+              <a:t>Stake preferred coins in chosen company</a:t>
+            </a:r>
+          </a:p>
+          <a:p>
+            <a:endParaRPr lang="en-US" dirty="0"/>
+          </a:p>
+        </p:txBody>
+      </p:sp>
+      <p:sp>
+        <p:nvSpPr>
+          <p:cNvPr id="73" name="Text Placeholder 72">
+            <a:extLst>
+              <a:ext uri="{FF2B5EF4-FFF2-40B4-BE49-F238E27FC236}">
+                <a16:creationId xmlns:a16="http://schemas.microsoft.com/office/drawing/2014/main" id="{DB3347BB-2913-A230-8362-2B778394E7CE}"/>
+              </a:ext>
+            </a:extLst>
+          </p:cNvPr>
+          <p:cNvSpPr>
+            <a:spLocks noGrp="1"/>
+          </p:cNvSpPr>
+          <p:nvPr>
+            <p:ph type="body" sz="quarter" idx="21"/>
+          </p:nvPr>
+        </p:nvSpPr>
+        <p:spPr/>
+        <p:txBody>
+          <a:bodyPr/>
+          <a:lstStyle/>
+          <a:p>
+            <a:pPr lvl="0"/>
+            <a:r>
+              <a:rPr lang="en-US" dirty="0"/>
+              <a:t>Set exponential growth goals</a:t>
+            </a:r>
+          </a:p>
+        </p:txBody>
+      </p:sp>
+      <p:sp>
+        <p:nvSpPr>
+          <p:cNvPr id="138" name="Footer Placeholder 137">
+            <a:extLst>
+              <a:ext uri="{FF2B5EF4-FFF2-40B4-BE49-F238E27FC236}">
+                <a16:creationId xmlns:a16="http://schemas.microsoft.com/office/drawing/2014/main" id="{8BC11123-4B26-8100-E85C-F218651524A5}"/>
+              </a:ext>
+            </a:extLst>
+          </p:cNvPr>
+          <p:cNvSpPr>
+            <a:spLocks noGrp="1"/>
+          </p:cNvSpPr>
+          <p:nvPr>
+            <p:ph type="ftr" sz="quarter" idx="10"/>
           </p:nvPr>
         </p:nvSpPr>
         <p:spPr/>
@@ -18668,7 +19750,7 @@
     </p:spTree>
     <p:extLst>
       <p:ext uri="{BB962C8B-B14F-4D97-AF65-F5344CB8AC3E}">
-        <p14:creationId xmlns:p14="http://schemas.microsoft.com/office/powerpoint/2010/main" val="765210901"/>
+        <p14:creationId xmlns:p14="http://schemas.microsoft.com/office/powerpoint/2010/main" val="3510130985"/>
       </p:ext>
     </p:extLst>
   </p:cSld>
@@ -20463,7 +21545,7 @@
           <p:cNvPr id="2" name="Title 1">
             <a:extLst>
               <a:ext uri="{FF2B5EF4-FFF2-40B4-BE49-F238E27FC236}">
-                <a16:creationId xmlns:a16="http://schemas.microsoft.com/office/drawing/2014/main" id="{C07F7E09-6A9E-9FCC-7867-895F21ABE716}"/>
+                <a16:creationId xmlns:a16="http://schemas.microsoft.com/office/drawing/2014/main" id="{797310B5-D907-A977-7A9C-69F8BEB7BB3F}"/>
               </a:ext>
             </a:extLst>
           </p:cNvPr>
@@ -20471,50 +21553,38 @@
             <a:spLocks noGrp="1"/>
           </p:cNvSpPr>
           <p:nvPr>
-            <p:ph type="title"/>
-          </p:nvPr>
-        </p:nvSpPr>
-        <p:spPr/>
-        <p:txBody>
-          <a:bodyPr>
-            <a:normAutofit/>
-          </a:bodyPr>
+            <p:ph type="ctrTitle"/>
+          </p:nvPr>
+        </p:nvSpPr>
+        <p:spPr>
+          <a:xfrm>
+            <a:off x="962297" y="2035936"/>
+            <a:ext cx="10267406" cy="1069848"/>
+          </a:xfrm>
+        </p:spPr>
+        <p:txBody>
+          <a:bodyPr/>
           <a:lstStyle/>
           <a:p>
             <a:r>
-              <a:rPr lang="en-US" sz="4000" b="1" spc="600" dirty="0">
-                <a:ln w="28575">
-                  <a:noFill/>
-                  <a:prstDash val="solid"/>
-                </a:ln>
+              <a:rPr lang="en-US" dirty="0">
                 <a:solidFill>
-                  <a:schemeClr val="accent4">
-                    <a:lumMod val="90000"/>
-                  </a:schemeClr>
+                  <a:schemeClr val="accent4"/>
                 </a:solidFill>
                 <a:latin typeface="Biome" panose="020B0503030204020804" pitchFamily="34" charset="0"/>
                 <a:cs typeface="Biome" panose="020B0503030204020804" pitchFamily="34" charset="0"/>
               </a:rPr>
-              <a:t>CONTENTS</a:t>
-            </a:r>
-            <a:endParaRPr lang="en-US" dirty="0">
-              <a:solidFill>
-                <a:schemeClr val="accent4">
-                  <a:lumMod val="90000"/>
-                </a:schemeClr>
-              </a:solidFill>
-              <a:latin typeface="Biome" panose="020B0503030204020804" pitchFamily="34" charset="0"/>
-              <a:cs typeface="Biome" panose="020B0503030204020804" pitchFamily="34" charset="0"/>
-            </a:endParaRPr>
-          </a:p>
-        </p:txBody>
-      </p:sp>
-      <p:sp>
-        <p:nvSpPr>
-          <p:cNvPr id="5" name="Slide Number Placeholder 4">
-            <a:extLst>
-              <a:ext uri="{FF2B5EF4-FFF2-40B4-BE49-F238E27FC236}">
-                <a16:creationId xmlns:a16="http://schemas.microsoft.com/office/drawing/2014/main" id="{9157728F-9EA1-A705-8E4D-B7823E4F4C26}"/>
+              <a:t>STAKEHOLDER INTEREST</a:t>
+            </a:r>
+          </a:p>
+        </p:txBody>
+      </p:sp>
+      <p:sp>
+        <p:nvSpPr>
+          <p:cNvPr id="3" name="Subtitle 2">
+            <a:extLst>
+              <a:ext uri="{FF2B5EF4-FFF2-40B4-BE49-F238E27FC236}">
+                <a16:creationId xmlns:a16="http://schemas.microsoft.com/office/drawing/2014/main" id="{C05FF0B8-5B51-7376-0271-8D849CA3F8A8}"/>
               </a:ext>
             </a:extLst>
           </p:cNvPr>
@@ -20522,51 +21592,20 @@
             <a:spLocks noGrp="1"/>
           </p:cNvSpPr>
           <p:nvPr>
-            <p:ph type="sldNum" sz="quarter" idx="11"/>
-          </p:nvPr>
-        </p:nvSpPr>
-        <p:spPr/>
+            <p:ph type="subTitle" idx="1"/>
+          </p:nvPr>
+        </p:nvSpPr>
+        <p:spPr>
+          <a:xfrm>
+            <a:off x="1302634" y="3603650"/>
+            <a:ext cx="7837714" cy="2840736"/>
+          </a:xfrm>
+        </p:spPr>
         <p:txBody>
           <a:bodyPr/>
           <a:lstStyle/>
           <a:p>
-            <a:fld id="{294A09A9-5501-47C1-A89A-A340965A2BE2}" type="slidenum">
-              <a:rPr lang="en-US" smtClean="0"/>
-              <a:pPr/>
-              <a:t>2</a:t>
-            </a:fld>
-            <a:endParaRPr lang="en-US" dirty="0"/>
-          </a:p>
-        </p:txBody>
-      </p:sp>
-      <p:sp>
-        <p:nvSpPr>
-          <p:cNvPr id="3" name="Content Placeholder 2">
-            <a:extLst>
-              <a:ext uri="{FF2B5EF4-FFF2-40B4-BE49-F238E27FC236}">
-                <a16:creationId xmlns:a16="http://schemas.microsoft.com/office/drawing/2014/main" id="{199158D4-7B61-0A48-E33F-792278D05724}"/>
-              </a:ext>
-            </a:extLst>
-          </p:cNvPr>
-          <p:cNvSpPr>
-            <a:spLocks noGrp="1"/>
-          </p:cNvSpPr>
-          <p:nvPr>
-            <p:ph idx="1"/>
-          </p:nvPr>
-        </p:nvSpPr>
-        <p:spPr/>
-        <p:txBody>
-          <a:bodyPr/>
-          <a:lstStyle/>
-          <a:p>
             <a:pPr marL="342900" indent="-342900" algn="l">
-              <a:lnSpc>
-                <a:spcPct val="150000"/>
-              </a:lnSpc>
-              <a:buClr>
-                <a:schemeClr val="accent6"/>
-              </a:buClr>
               <a:buFont typeface="Courier New" panose="02070309020205020404" pitchFamily="49" charset="0"/>
               <a:buChar char="o"/>
             </a:pPr>
@@ -20574,24 +21613,18 @@
               <a:rPr lang="en-US" dirty="0">
                 <a:solidFill>
                   <a:schemeClr val="accent2">
-                    <a:lumMod val="40000"/>
-                    <a:lumOff val="60000"/>
+                    <a:lumMod val="20000"/>
+                    <a:lumOff val="80000"/>
                   </a:schemeClr>
                 </a:solidFill>
                 <a:latin typeface="Biome Light" panose="020B0303030204020804" pitchFamily="34" charset="0"/>
                 <a:cs typeface="Biome Light" panose="020B0303030204020804" pitchFamily="34" charset="0"/>
               </a:rPr>
-              <a:t>Database Information</a:t>
+              <a:t>Resource Allocation</a:t>
             </a:r>
           </a:p>
           <a:p>
             <a:pPr marL="342900" indent="-342900" algn="l">
-              <a:lnSpc>
-                <a:spcPct val="150000"/>
-              </a:lnSpc>
-              <a:buClr>
-                <a:schemeClr val="accent6"/>
-              </a:buClr>
               <a:buFont typeface="Courier New" panose="02070309020205020404" pitchFamily="49" charset="0"/>
               <a:buChar char="o"/>
             </a:pPr>
@@ -20599,24 +21632,18 @@
               <a:rPr lang="en-US" dirty="0">
                 <a:solidFill>
                   <a:schemeClr val="accent2">
-                    <a:lumMod val="40000"/>
-                    <a:lumOff val="60000"/>
+                    <a:lumMod val="20000"/>
+                    <a:lumOff val="80000"/>
                   </a:schemeClr>
                 </a:solidFill>
                 <a:latin typeface="Biome Light" panose="020B0303030204020804" pitchFamily="34" charset="0"/>
                 <a:cs typeface="Biome Light" panose="020B0303030204020804" pitchFamily="34" charset="0"/>
               </a:rPr>
-              <a:t>Hypothesis</a:t>
+              <a:t>Mission Planning</a:t>
             </a:r>
           </a:p>
           <a:p>
             <a:pPr marL="342900" indent="-342900" algn="l">
-              <a:lnSpc>
-                <a:spcPct val="150000"/>
-              </a:lnSpc>
-              <a:buClr>
-                <a:schemeClr val="accent6"/>
-              </a:buClr>
               <a:buFont typeface="Courier New" panose="02070309020205020404" pitchFamily="49" charset="0"/>
               <a:buChar char="o"/>
             </a:pPr>
@@ -20624,24 +21651,18 @@
               <a:rPr lang="en-US" dirty="0">
                 <a:solidFill>
                   <a:schemeClr val="accent2">
-                    <a:lumMod val="40000"/>
-                    <a:lumOff val="60000"/>
+                    <a:lumMod val="20000"/>
+                    <a:lumOff val="80000"/>
                   </a:schemeClr>
                 </a:solidFill>
                 <a:latin typeface="Biome Light" panose="020B0303030204020804" pitchFamily="34" charset="0"/>
                 <a:cs typeface="Biome Light" panose="020B0303030204020804" pitchFamily="34" charset="0"/>
               </a:rPr>
-              <a:t>Regression</a:t>
+              <a:t>Operational Continuity</a:t>
             </a:r>
           </a:p>
           <a:p>
             <a:pPr marL="342900" indent="-342900" algn="l">
-              <a:lnSpc>
-                <a:spcPct val="150000"/>
-              </a:lnSpc>
-              <a:buClr>
-                <a:schemeClr val="accent6"/>
-              </a:buClr>
               <a:buFont typeface="Courier New" panose="02070309020205020404" pitchFamily="49" charset="0"/>
               <a:buChar char="o"/>
             </a:pPr>
@@ -20649,65 +21670,48 @@
               <a:rPr lang="en-US" dirty="0">
                 <a:solidFill>
                   <a:schemeClr val="accent2">
-                    <a:lumMod val="40000"/>
-                    <a:lumOff val="60000"/>
+                    <a:lumMod val="20000"/>
+                    <a:lumOff val="80000"/>
                   </a:schemeClr>
                 </a:solidFill>
                 <a:latin typeface="Biome Light" panose="020B0303030204020804" pitchFamily="34" charset="0"/>
                 <a:cs typeface="Biome Light" panose="020B0303030204020804" pitchFamily="34" charset="0"/>
               </a:rPr>
-              <a:t>Results</a:t>
-            </a:r>
-          </a:p>
-          <a:p>
-            <a:pPr marL="0" indent="0" algn="l">
-              <a:lnSpc>
-                <a:spcPct val="150000"/>
-              </a:lnSpc>
-              <a:buClr>
-                <a:schemeClr val="accent6"/>
-              </a:buClr>
-              <a:buNone/>
-            </a:pPr>
-            <a:endParaRPr lang="en-US" dirty="0">
-              <a:solidFill>
-                <a:schemeClr val="accent2">
-                  <a:lumMod val="40000"/>
-                  <a:lumOff val="60000"/>
-                </a:schemeClr>
-              </a:solidFill>
-              <a:latin typeface="Biome Light" panose="020B0303030204020804" pitchFamily="34" charset="0"/>
-              <a:cs typeface="Biome Light" panose="020B0303030204020804" pitchFamily="34" charset="0"/>
-            </a:endParaRPr>
+              <a:t>Cost Management</a:t>
+            </a:r>
           </a:p>
           <a:p>
             <a:pPr marL="342900" indent="-342900" algn="l">
-              <a:lnSpc>
-                <a:spcPct val="150000"/>
-              </a:lnSpc>
-              <a:buClr>
-                <a:schemeClr val="accent6"/>
-              </a:buClr>
               <a:buFont typeface="Courier New" panose="02070309020205020404" pitchFamily="49" charset="0"/>
               <a:buChar char="o"/>
             </a:pPr>
-            <a:endParaRPr lang="en-US" dirty="0">
-              <a:solidFill>
-                <a:schemeClr val="accent2">
-                  <a:lumMod val="40000"/>
-                  <a:lumOff val="60000"/>
-                </a:schemeClr>
-              </a:solidFill>
-              <a:latin typeface="Biome Light" panose="020B0303030204020804" pitchFamily="34" charset="0"/>
-              <a:cs typeface="Biome Light" panose="020B0303030204020804" pitchFamily="34" charset="0"/>
-            </a:endParaRPr>
+            <a:r>
+              <a:rPr lang="en-US" dirty="0">
+                <a:solidFill>
+                  <a:schemeClr val="accent2">
+                    <a:lumMod val="20000"/>
+                    <a:lumOff val="80000"/>
+                  </a:schemeClr>
+                </a:solidFill>
+                <a:latin typeface="Biome Light" panose="020B0303030204020804" pitchFamily="34" charset="0"/>
+                <a:cs typeface="Biome Light" panose="020B0303030204020804" pitchFamily="34" charset="0"/>
+              </a:rPr>
+              <a:t>Situational Awareness in the Space Domain</a:t>
+            </a:r>
+          </a:p>
+          <a:p>
+            <a:pPr marL="342900" indent="-342900">
+              <a:buFont typeface="Arial" panose="020B0604020202020204" pitchFamily="34" charset="0"/>
+              <a:buChar char="•"/>
+            </a:pPr>
+            <a:endParaRPr lang="en-US" dirty="0"/>
           </a:p>
         </p:txBody>
       </p:sp>
     </p:spTree>
     <p:extLst>
       <p:ext uri="{BB962C8B-B14F-4D97-AF65-F5344CB8AC3E}">
-        <p14:creationId xmlns:p14="http://schemas.microsoft.com/office/powerpoint/2010/main" val="3548027083"/>
+        <p14:creationId xmlns:p14="http://schemas.microsoft.com/office/powerpoint/2010/main" val="548476299"/>
       </p:ext>
     </p:extLst>
   </p:cSld>
@@ -20739,7 +21743,7 @@
           <p:cNvPr id="2" name="Title 1">
             <a:extLst>
               <a:ext uri="{FF2B5EF4-FFF2-40B4-BE49-F238E27FC236}">
-                <a16:creationId xmlns:a16="http://schemas.microsoft.com/office/drawing/2014/main" id="{F41F0E99-07CC-9576-AFD7-C52151AD0EA3}"/>
+                <a16:creationId xmlns:a16="http://schemas.microsoft.com/office/drawing/2014/main" id="{C07F7E09-6A9E-9FCC-7867-895F21ABE716}"/>
               </a:ext>
             </a:extLst>
           </p:cNvPr>
@@ -20747,27 +21751,50 @@
             <a:spLocks noGrp="1"/>
           </p:cNvSpPr>
           <p:nvPr>
-            <p:ph type="ctrTitle"/>
+            <p:ph type="title"/>
           </p:nvPr>
         </p:nvSpPr>
         <p:spPr/>
         <p:txBody>
-          <a:bodyPr/>
+          <a:bodyPr>
+            <a:normAutofit/>
+          </a:bodyPr>
           <a:lstStyle/>
           <a:p>
             <a:r>
-              <a:rPr lang="en-US" dirty="0"/>
-              <a:t>INTRODUCTION</a:t>
-            </a:r>
-          </a:p>
-        </p:txBody>
-      </p:sp>
-      <p:sp>
-        <p:nvSpPr>
-          <p:cNvPr id="3" name="Subtitle 2">
-            <a:extLst>
-              <a:ext uri="{FF2B5EF4-FFF2-40B4-BE49-F238E27FC236}">
-                <a16:creationId xmlns:a16="http://schemas.microsoft.com/office/drawing/2014/main" id="{5A82A8B0-333F-633E-3FA7-D38DBFB10971}"/>
+              <a:rPr lang="en-US" sz="4000" b="1" spc="600" dirty="0">
+                <a:ln w="28575">
+                  <a:noFill/>
+                  <a:prstDash val="solid"/>
+                </a:ln>
+                <a:solidFill>
+                  <a:schemeClr val="accent4">
+                    <a:lumMod val="90000"/>
+                  </a:schemeClr>
+                </a:solidFill>
+                <a:latin typeface="Biome" panose="020B0503030204020804" pitchFamily="34" charset="0"/>
+                <a:cs typeface="Biome" panose="020B0503030204020804" pitchFamily="34" charset="0"/>
+              </a:rPr>
+              <a:t>AGENDA</a:t>
+            </a:r>
+            <a:endParaRPr lang="en-US" dirty="0">
+              <a:solidFill>
+                <a:schemeClr val="accent4">
+                  <a:lumMod val="90000"/>
+                </a:schemeClr>
+              </a:solidFill>
+              <a:latin typeface="Biome" panose="020B0503030204020804" pitchFamily="34" charset="0"/>
+              <a:cs typeface="Biome" panose="020B0503030204020804" pitchFamily="34" charset="0"/>
+            </a:endParaRPr>
+          </a:p>
+        </p:txBody>
+      </p:sp>
+      <p:sp>
+        <p:nvSpPr>
+          <p:cNvPr id="5" name="Slide Number Placeholder 4">
+            <a:extLst>
+              <a:ext uri="{FF2B5EF4-FFF2-40B4-BE49-F238E27FC236}">
+                <a16:creationId xmlns:a16="http://schemas.microsoft.com/office/drawing/2014/main" id="{9157728F-9EA1-A705-8E4D-B7823E4F4C26}"/>
               </a:ext>
             </a:extLst>
           </p:cNvPr>
@@ -20775,7 +21802,7 @@
             <a:spLocks noGrp="1"/>
           </p:cNvSpPr>
           <p:nvPr>
-            <p:ph type="subTitle" idx="1"/>
+            <p:ph type="sldNum" sz="quarter" idx="11"/>
           </p:nvPr>
         </p:nvSpPr>
         <p:spPr/>
@@ -20783,20 +21810,184 @@
           <a:bodyPr/>
           <a:lstStyle/>
           <a:p>
-            <a:r>
-              <a:rPr lang="en-US" dirty="0"/>
-              <a:t>At Krypto Logics, we empower investors to maximize their portfolios to help them meet their financial goals responsibly. By offering customized and sophisticated strategies, we help clients' portfolios grow organically and foster a trusted consumer-consultant relationship.</a:t>
-            </a:r>
-          </a:p>
-          <a:p>
+            <a:fld id="{294A09A9-5501-47C1-A89A-A340965A2BE2}" type="slidenum">
+              <a:rPr lang="en-US" smtClean="0"/>
+              <a:pPr/>
+              <a:t>3</a:t>
+            </a:fld>
             <a:endParaRPr lang="en-US" dirty="0"/>
+          </a:p>
+        </p:txBody>
+      </p:sp>
+      <p:sp>
+        <p:nvSpPr>
+          <p:cNvPr id="3" name="Content Placeholder 2">
+            <a:extLst>
+              <a:ext uri="{FF2B5EF4-FFF2-40B4-BE49-F238E27FC236}">
+                <a16:creationId xmlns:a16="http://schemas.microsoft.com/office/drawing/2014/main" id="{199158D4-7B61-0A48-E33F-792278D05724}"/>
+              </a:ext>
+            </a:extLst>
+          </p:cNvPr>
+          <p:cNvSpPr>
+            <a:spLocks noGrp="1"/>
+          </p:cNvSpPr>
+          <p:nvPr>
+            <p:ph idx="1"/>
+          </p:nvPr>
+        </p:nvSpPr>
+        <p:spPr/>
+        <p:txBody>
+          <a:bodyPr/>
+          <a:lstStyle/>
+          <a:p>
+            <a:pPr marL="342900" indent="-342900" algn="l">
+              <a:lnSpc>
+                <a:spcPct val="150000"/>
+              </a:lnSpc>
+              <a:buClr>
+                <a:schemeClr val="accent6"/>
+              </a:buClr>
+              <a:buFont typeface="Courier New" panose="02070309020205020404" pitchFamily="49" charset="0"/>
+              <a:buChar char="o"/>
+            </a:pPr>
+            <a:r>
+              <a:rPr lang="en-US" dirty="0">
+                <a:solidFill>
+                  <a:schemeClr val="accent2">
+                    <a:lumMod val="40000"/>
+                    <a:lumOff val="60000"/>
+                  </a:schemeClr>
+                </a:solidFill>
+                <a:latin typeface="Biome Light" panose="020B0303030204020804" pitchFamily="34" charset="0"/>
+                <a:cs typeface="Biome Light" panose="020B0303030204020804" pitchFamily="34" charset="0"/>
+              </a:rPr>
+              <a:t>Database Information</a:t>
+            </a:r>
+          </a:p>
+          <a:p>
+            <a:pPr marL="342900" indent="-342900" algn="l">
+              <a:lnSpc>
+                <a:spcPct val="150000"/>
+              </a:lnSpc>
+              <a:buClr>
+                <a:schemeClr val="accent6"/>
+              </a:buClr>
+              <a:buFont typeface="Courier New" panose="02070309020205020404" pitchFamily="49" charset="0"/>
+              <a:buChar char="o"/>
+            </a:pPr>
+            <a:r>
+              <a:rPr lang="en-US" dirty="0">
+                <a:solidFill>
+                  <a:schemeClr val="accent2">
+                    <a:lumMod val="40000"/>
+                    <a:lumOff val="60000"/>
+                  </a:schemeClr>
+                </a:solidFill>
+                <a:latin typeface="Biome Light" panose="020B0303030204020804" pitchFamily="34" charset="0"/>
+                <a:cs typeface="Biome Light" panose="020B0303030204020804" pitchFamily="34" charset="0"/>
+              </a:rPr>
+              <a:t>Hypothesis</a:t>
+            </a:r>
+          </a:p>
+          <a:p>
+            <a:pPr marL="342900" indent="-342900" algn="l">
+              <a:lnSpc>
+                <a:spcPct val="150000"/>
+              </a:lnSpc>
+              <a:buClr>
+                <a:schemeClr val="accent6"/>
+              </a:buClr>
+              <a:buFont typeface="Courier New" panose="02070309020205020404" pitchFamily="49" charset="0"/>
+              <a:buChar char="o"/>
+            </a:pPr>
+            <a:r>
+              <a:rPr lang="en-US" dirty="0">
+                <a:solidFill>
+                  <a:schemeClr val="accent2">
+                    <a:lumMod val="40000"/>
+                    <a:lumOff val="60000"/>
+                  </a:schemeClr>
+                </a:solidFill>
+                <a:latin typeface="Biome Light" panose="020B0303030204020804" pitchFamily="34" charset="0"/>
+                <a:cs typeface="Biome Light" panose="020B0303030204020804" pitchFamily="34" charset="0"/>
+              </a:rPr>
+              <a:t>Regression</a:t>
+            </a:r>
+          </a:p>
+          <a:p>
+            <a:pPr marL="342900" indent="-342900" algn="l">
+              <a:lnSpc>
+                <a:spcPct val="150000"/>
+              </a:lnSpc>
+              <a:buClr>
+                <a:schemeClr val="accent6"/>
+              </a:buClr>
+              <a:buFont typeface="Courier New" panose="02070309020205020404" pitchFamily="49" charset="0"/>
+              <a:buChar char="o"/>
+            </a:pPr>
+            <a:r>
+              <a:rPr lang="en-US" dirty="0">
+                <a:solidFill>
+                  <a:schemeClr val="accent2">
+                    <a:lumMod val="40000"/>
+                    <a:lumOff val="60000"/>
+                  </a:schemeClr>
+                </a:solidFill>
+                <a:latin typeface="Biome Light" panose="020B0303030204020804" pitchFamily="34" charset="0"/>
+                <a:cs typeface="Biome Light" panose="020B0303030204020804" pitchFamily="34" charset="0"/>
+              </a:rPr>
+              <a:t>Results</a:t>
+            </a:r>
+          </a:p>
+          <a:p>
+            <a:pPr marL="0" indent="0" algn="l">
+              <a:lnSpc>
+                <a:spcPct val="150000"/>
+              </a:lnSpc>
+              <a:buClr>
+                <a:schemeClr val="accent6"/>
+              </a:buClr>
+              <a:buNone/>
+            </a:pPr>
+            <a:endParaRPr lang="en-US" dirty="0">
+              <a:solidFill>
+                <a:schemeClr val="accent2">
+                  <a:lumMod val="40000"/>
+                  <a:lumOff val="60000"/>
+                </a:schemeClr>
+              </a:solidFill>
+              <a:latin typeface="Biome Light" panose="020B0303030204020804" pitchFamily="34" charset="0"/>
+              <a:cs typeface="Biome Light" panose="020B0303030204020804" pitchFamily="34" charset="0"/>
+            </a:endParaRPr>
+          </a:p>
+          <a:p>
+            <a:pPr marL="342900" indent="-342900" algn="l">
+              <a:lnSpc>
+                <a:spcPct val="150000"/>
+              </a:lnSpc>
+              <a:buClr>
+                <a:schemeClr val="accent6"/>
+              </a:buClr>
+              <a:buFont typeface="Courier New" panose="02070309020205020404" pitchFamily="49" charset="0"/>
+              <a:buChar char="o"/>
+            </a:pPr>
+            <a:endParaRPr lang="en-US" dirty="0">
+              <a:solidFill>
+                <a:schemeClr val="accent2">
+                  <a:lumMod val="40000"/>
+                  <a:lumOff val="60000"/>
+                </a:schemeClr>
+              </a:solidFill>
+              <a:latin typeface="Biome Light" panose="020B0303030204020804" pitchFamily="34" charset="0"/>
+              <a:cs typeface="Biome Light" panose="020B0303030204020804" pitchFamily="34" charset="0"/>
+            </a:endParaRPr>
           </a:p>
         </p:txBody>
       </p:sp>
     </p:spTree>
     <p:extLst>
       <p:ext uri="{BB962C8B-B14F-4D97-AF65-F5344CB8AC3E}">
-        <p14:creationId xmlns:p14="http://schemas.microsoft.com/office/powerpoint/2010/main" val="3380759881"/>
+        <p14:creationId xmlns:p14="http://schemas.microsoft.com/office/powerpoint/2010/main" val="3548027083"/>
       </p:ext>
     </p:extLst>
   </p:cSld>
@@ -20828,7 +22019,7 @@
           <p:cNvPr id="2" name="Title 1">
             <a:extLst>
               <a:ext uri="{FF2B5EF4-FFF2-40B4-BE49-F238E27FC236}">
-                <a16:creationId xmlns:a16="http://schemas.microsoft.com/office/drawing/2014/main" id="{797310B5-D907-A977-7A9C-69F8BEB7BB3F}"/>
+                <a16:creationId xmlns:a16="http://schemas.microsoft.com/office/drawing/2014/main" id="{D249E45E-D6A7-9780-F652-BAF86DFBCC00}"/>
               </a:ext>
             </a:extLst>
           </p:cNvPr>
@@ -20836,7 +22027,7 @@
             <a:spLocks noGrp="1"/>
           </p:cNvSpPr>
           <p:nvPr>
-            <p:ph type="ctrTitle"/>
+            <p:ph type="title"/>
           </p:nvPr>
         </p:nvSpPr>
         <p:spPr/>
@@ -20845,18 +22036,24 @@
           <a:lstStyle/>
           <a:p>
             <a:r>
-              <a:rPr lang="en-US" dirty="0"/>
-              <a:t>TRADING &amp; INVESTING</a:t>
-            </a:r>
-          </a:p>
-        </p:txBody>
-      </p:sp>
-      <p:sp>
-        <p:nvSpPr>
-          <p:cNvPr id="3" name="Subtitle 2">
-            <a:extLst>
-              <a:ext uri="{FF2B5EF4-FFF2-40B4-BE49-F238E27FC236}">
-                <a16:creationId xmlns:a16="http://schemas.microsoft.com/office/drawing/2014/main" id="{C05FF0B8-5B51-7376-0271-8D849CA3F8A8}"/>
+              <a:rPr lang="en-US" dirty="0">
+                <a:solidFill>
+                  <a:schemeClr val="accent2"/>
+                </a:solidFill>
+                <a:latin typeface="Biome" panose="020B0503030204020804" pitchFamily="34" charset="0"/>
+                <a:cs typeface="Biome" panose="020B0503030204020804" pitchFamily="34" charset="0"/>
+              </a:rPr>
+              <a:t>COLUMNS OF INTEREST</a:t>
+            </a:r>
+          </a:p>
+        </p:txBody>
+      </p:sp>
+      <p:sp>
+        <p:nvSpPr>
+          <p:cNvPr id="8" name="Slide Number Placeholder 7">
+            <a:extLst>
+              <a:ext uri="{FF2B5EF4-FFF2-40B4-BE49-F238E27FC236}">
+                <a16:creationId xmlns:a16="http://schemas.microsoft.com/office/drawing/2014/main" id="{85577A64-4E94-69E1-3180-1E014BD06B3C}"/>
               </a:ext>
             </a:extLst>
           </p:cNvPr>
@@ -20864,7 +22061,7 @@
             <a:spLocks noGrp="1"/>
           </p:cNvSpPr>
           <p:nvPr>
-            <p:ph type="subTitle" idx="1"/>
+            <p:ph type="sldNum" sz="quarter" idx="12"/>
           </p:nvPr>
         </p:nvSpPr>
         <p:spPr/>
@@ -20872,9 +22069,127 @@
           <a:bodyPr/>
           <a:lstStyle/>
           <a:p>
-            <a:r>
-              <a:rPr lang="en-US" dirty="0"/>
-              <a:t>Crypto can be complicated but getting started doesn’t have to be</a:t>
+            <a:fld id="{294A09A9-5501-47C1-A89A-A340965A2BE2}" type="slidenum">
+              <a:rPr lang="en-US" smtClean="0"/>
+              <a:t>4</a:t>
+            </a:fld>
+            <a:endParaRPr lang="en-US" dirty="0"/>
+          </a:p>
+        </p:txBody>
+      </p:sp>
+      <p:sp>
+        <p:nvSpPr>
+          <p:cNvPr id="4" name="Content Placeholder 3">
+            <a:extLst>
+              <a:ext uri="{FF2B5EF4-FFF2-40B4-BE49-F238E27FC236}">
+                <a16:creationId xmlns:a16="http://schemas.microsoft.com/office/drawing/2014/main" id="{BE22F651-7ABC-015D-B5C4-622708A64CB1}"/>
+              </a:ext>
+            </a:extLst>
+          </p:cNvPr>
+          <p:cNvSpPr>
+            <a:spLocks noGrp="1"/>
+          </p:cNvSpPr>
+          <p:nvPr>
+            <p:ph sz="half" idx="2"/>
+          </p:nvPr>
+        </p:nvSpPr>
+        <p:spPr>
+          <a:xfrm>
+            <a:off x="1545335" y="2139695"/>
+            <a:ext cx="5747741" cy="2825497"/>
+          </a:xfrm>
+        </p:spPr>
+        <p:txBody>
+          <a:bodyPr/>
+          <a:lstStyle/>
+          <a:p>
+            <a:r>
+              <a:rPr lang="en-US" sz="2400" dirty="0">
+                <a:solidFill>
+                  <a:schemeClr val="accent1">
+                    <a:lumMod val="40000"/>
+                    <a:lumOff val="60000"/>
+                  </a:schemeClr>
+                </a:solidFill>
+                <a:latin typeface="Biome Light" panose="020B0303030204020804" pitchFamily="34" charset="0"/>
+                <a:cs typeface="Biome Light" panose="020B0303030204020804" pitchFamily="34" charset="0"/>
+              </a:rPr>
+              <a:t>Expected Lifetime (Years)</a:t>
+            </a:r>
+          </a:p>
+          <a:p>
+            <a:r>
+              <a:rPr lang="en-US" sz="2400" dirty="0">
+                <a:solidFill>
+                  <a:schemeClr val="accent1">
+                    <a:lumMod val="40000"/>
+                    <a:lumOff val="60000"/>
+                  </a:schemeClr>
+                </a:solidFill>
+                <a:latin typeface="Biome Light" panose="020B0303030204020804" pitchFamily="34" charset="0"/>
+                <a:cs typeface="Biome Light" panose="020B0303030204020804" pitchFamily="34" charset="0"/>
+              </a:rPr>
+              <a:t>Launch Mass (Kilograms)</a:t>
+            </a:r>
+          </a:p>
+          <a:p>
+            <a:r>
+              <a:rPr lang="en-US" sz="2400" dirty="0">
+                <a:solidFill>
+                  <a:schemeClr val="accent1">
+                    <a:lumMod val="40000"/>
+                    <a:lumOff val="60000"/>
+                  </a:schemeClr>
+                </a:solidFill>
+                <a:latin typeface="Biome Light" panose="020B0303030204020804" pitchFamily="34" charset="0"/>
+                <a:cs typeface="Biome Light" panose="020B0303030204020804" pitchFamily="34" charset="0"/>
+              </a:rPr>
+              <a:t>Inclination (Degrees)</a:t>
+            </a:r>
+          </a:p>
+          <a:p>
+            <a:r>
+              <a:rPr lang="en-US" sz="2400" dirty="0">
+                <a:solidFill>
+                  <a:schemeClr val="accent1">
+                    <a:lumMod val="40000"/>
+                    <a:lumOff val="60000"/>
+                  </a:schemeClr>
+                </a:solidFill>
+                <a:latin typeface="Biome Light" panose="020B0303030204020804" pitchFamily="34" charset="0"/>
+                <a:cs typeface="Biome Light" panose="020B0303030204020804" pitchFamily="34" charset="0"/>
+              </a:rPr>
+              <a:t>Apogee (Kilometers)</a:t>
+            </a:r>
+          </a:p>
+          <a:p>
+            <a:r>
+              <a:rPr lang="en-US" sz="2400" dirty="0">
+                <a:solidFill>
+                  <a:schemeClr val="accent1">
+                    <a:lumMod val="40000"/>
+                    <a:lumOff val="60000"/>
+                  </a:schemeClr>
+                </a:solidFill>
+                <a:latin typeface="Biome Light" panose="020B0303030204020804" pitchFamily="34" charset="0"/>
+                <a:cs typeface="Biome Light" panose="020B0303030204020804" pitchFamily="34" charset="0"/>
+              </a:rPr>
+              <a:t>Perigee (Kilometers)</a:t>
+            </a:r>
+          </a:p>
+          <a:p>
+            <a:r>
+              <a:rPr lang="en-US" sz="2400" dirty="0">
+                <a:solidFill>
+                  <a:schemeClr val="accent1">
+                    <a:lumMod val="40000"/>
+                    <a:lumOff val="60000"/>
+                  </a:schemeClr>
+                </a:solidFill>
+                <a:latin typeface="Biome Light" panose="020B0303030204020804" pitchFamily="34" charset="0"/>
+                <a:cs typeface="Biome Light" panose="020B0303030204020804" pitchFamily="34" charset="0"/>
+              </a:rPr>
+              <a:t>Class of Orbit</a:t>
             </a:r>
           </a:p>
         </p:txBody>
@@ -20882,7 +22197,7 @@
     </p:spTree>
     <p:extLst>
       <p:ext uri="{BB962C8B-B14F-4D97-AF65-F5344CB8AC3E}">
-        <p14:creationId xmlns:p14="http://schemas.microsoft.com/office/powerpoint/2010/main" val="548476299"/>
+        <p14:creationId xmlns:p14="http://schemas.microsoft.com/office/powerpoint/2010/main" val="765210901"/>
       </p:ext>
     </p:extLst>
   </p:cSld>
@@ -20914,7 +22229,7 @@
           <p:cNvPr id="2" name="Title 1">
             <a:extLst>
               <a:ext uri="{FF2B5EF4-FFF2-40B4-BE49-F238E27FC236}">
-                <a16:creationId xmlns:a16="http://schemas.microsoft.com/office/drawing/2014/main" id="{C8152FE8-2F9C-9C12-4EB3-9742EA91D653}"/>
+                <a16:creationId xmlns:a16="http://schemas.microsoft.com/office/drawing/2014/main" id="{F41F0E99-07CC-9576-AFD7-C52151AD0EA3}"/>
               </a:ext>
             </a:extLst>
           </p:cNvPr>
@@ -20922,7 +22237,7 @@
             <a:spLocks noGrp="1"/>
           </p:cNvSpPr>
           <p:nvPr>
-            <p:ph type="title"/>
+            <p:ph type="ctrTitle"/>
           </p:nvPr>
         </p:nvSpPr>
         <p:spPr/>
@@ -20931,27 +22246,24 @@
           <a:lstStyle/>
           <a:p>
             <a:r>
-              <a:rPr lang="en-US" sz="4000" b="1" spc="600" dirty="0">
-                <a:ln w="28575">
-                  <a:noFill/>
-                  <a:prstDash val="solid"/>
-                </a:ln>
+              <a:rPr lang="en-US" dirty="0">
                 <a:solidFill>
-                  <a:schemeClr val="bg1"/>
+                  <a:srgbClr val="D6ABD7"/>
                 </a:solidFill>
-                <a:latin typeface="Tw Cen MT" panose="020B0602020104020603" pitchFamily="34" charset="77"/>
+                <a:latin typeface="Biome" panose="020B0503030204020804" pitchFamily="34" charset="0"/>
+                <a:cs typeface="Biome" panose="020B0503030204020804" pitchFamily="34" charset="0"/>
               </a:rPr>
-              <a:t>LONG-TERM VS. SHORT-TERM</a:t>
-            </a:r>
-          </a:p>
-        </p:txBody>
-      </p:sp>
-      <p:sp>
-        <p:nvSpPr>
-          <p:cNvPr id="5" name="Slide Number Placeholder 4">
-            <a:extLst>
-              <a:ext uri="{FF2B5EF4-FFF2-40B4-BE49-F238E27FC236}">
-                <a16:creationId xmlns:a16="http://schemas.microsoft.com/office/drawing/2014/main" id="{2A8E318B-D756-6C57-8657-96C836320839}"/>
+              <a:t>Data wrangling</a:t>
+            </a:r>
+          </a:p>
+        </p:txBody>
+      </p:sp>
+      <p:sp>
+        <p:nvSpPr>
+          <p:cNvPr id="3" name="Subtitle 2">
+            <a:extLst>
+              <a:ext uri="{FF2B5EF4-FFF2-40B4-BE49-F238E27FC236}">
+                <a16:creationId xmlns:a16="http://schemas.microsoft.com/office/drawing/2014/main" id="{5A82A8B0-333F-633E-3FA7-D38DBFB10971}"/>
               </a:ext>
             </a:extLst>
           </p:cNvPr>
@@ -20959,87 +22271,134 @@
             <a:spLocks noGrp="1"/>
           </p:cNvSpPr>
           <p:nvPr>
-            <p:ph type="sldNum" sz="quarter" idx="11"/>
-          </p:nvPr>
-        </p:nvSpPr>
-        <p:spPr/>
+            <p:ph type="subTitle" idx="1"/>
+          </p:nvPr>
+        </p:nvSpPr>
+        <p:spPr>
+          <a:xfrm>
+            <a:off x="2228088" y="3685032"/>
+            <a:ext cx="7735824" cy="2243820"/>
+          </a:xfrm>
+        </p:spPr>
         <p:txBody>
           <a:bodyPr/>
           <a:lstStyle/>
           <a:p>
-            <a:fld id="{294A09A9-5501-47C1-A89A-A340965A2BE2}" type="slidenum">
-              <a:rPr lang="en-US" smtClean="0"/>
-              <a:pPr/>
-              <a:t>5</a:t>
-            </a:fld>
-            <a:endParaRPr lang="en-US" dirty="0"/>
-          </a:p>
-        </p:txBody>
-      </p:sp>
-      <p:graphicFrame>
-        <p:nvGraphicFramePr>
-          <p:cNvPr id="4" name="Content Placeholder 5" descr="Bar chart">
-            <a:extLst>
-              <a:ext uri="{FF2B5EF4-FFF2-40B4-BE49-F238E27FC236}">
-                <a16:creationId xmlns:a16="http://schemas.microsoft.com/office/drawing/2014/main" id="{9F02851F-DB0A-09AB-B52A-BE347DDCBD1D}"/>
-              </a:ext>
-            </a:extLst>
-          </p:cNvPr>
-          <p:cNvGraphicFramePr>
-            <a:graphicFrameLocks noGrp="1"/>
-          </p:cNvGraphicFramePr>
-          <p:nvPr>
-            <p:ph idx="1"/>
-            <p:extLst>
-              <p:ext uri="{D42A27DB-BD31-4B8C-83A1-F6EECF244321}">
-                <p14:modId xmlns:p14="http://schemas.microsoft.com/office/powerpoint/2010/main" val="1861876390"/>
-              </p:ext>
-            </p:extLst>
-          </p:nvPr>
-        </p:nvGraphicFramePr>
-        <p:xfrm>
-          <a:off x="1014413" y="2212975"/>
-          <a:ext cx="10333037" cy="3548063"/>
-        </p:xfrm>
-        <a:graphic>
-          <a:graphicData uri="http://schemas.openxmlformats.org/drawingml/2006/chart">
-            <c:chart xmlns:c="http://schemas.openxmlformats.org/drawingml/2006/chart" xmlns:r="http://schemas.openxmlformats.org/officeDocument/2006/relationships" r:id="rId2"/>
-          </a:graphicData>
-        </a:graphic>
-      </p:graphicFrame>
-      <p:sp>
-        <p:nvSpPr>
-          <p:cNvPr id="3" name="Footer Placeholder 2">
-            <a:extLst>
-              <a:ext uri="{FF2B5EF4-FFF2-40B4-BE49-F238E27FC236}">
-                <a16:creationId xmlns:a16="http://schemas.microsoft.com/office/drawing/2014/main" id="{723252A1-51AE-36E1-CE3B-D88466BA8814}"/>
-              </a:ext>
-            </a:extLst>
-          </p:cNvPr>
-          <p:cNvSpPr>
-            <a:spLocks noGrp="1"/>
-          </p:cNvSpPr>
-          <p:nvPr>
-            <p:ph type="ftr" sz="quarter" idx="10"/>
-          </p:nvPr>
-        </p:nvSpPr>
-        <p:spPr/>
-        <p:txBody>
-          <a:bodyPr/>
-          <a:lstStyle/>
-          <a:p>
-            <a:r>
-              <a:rPr lang="en-US"/>
-              <a:t>Crypto: investing &amp; trading</a:t>
-            </a:r>
-            <a:endParaRPr lang="en-US" dirty="0"/>
+            <a:pPr marL="285750" indent="-285750" algn="l">
+              <a:buClr>
+                <a:schemeClr val="accent4"/>
+              </a:buClr>
+              <a:buFont typeface="Courier New" panose="02070309020205020404" pitchFamily="49" charset="0"/>
+              <a:buChar char="o"/>
+            </a:pPr>
+            <a:r>
+              <a:rPr lang="en-US" sz="2400" dirty="0">
+                <a:solidFill>
+                  <a:schemeClr val="accent1">
+                    <a:lumMod val="40000"/>
+                    <a:lumOff val="60000"/>
+                  </a:schemeClr>
+                </a:solidFill>
+                <a:latin typeface="Biome Light" panose="020B0303030204020804" pitchFamily="34" charset="0"/>
+                <a:cs typeface="Biome Light" panose="020B0303030204020804" pitchFamily="34" charset="0"/>
+              </a:rPr>
+              <a:t>Inconsistencies with Expected Lifetime (Years)</a:t>
+            </a:r>
+          </a:p>
+          <a:p>
+            <a:pPr marL="285750" indent="-285750" algn="l">
+              <a:buClr>
+                <a:schemeClr val="accent4"/>
+              </a:buClr>
+              <a:buFont typeface="Courier New" panose="02070309020205020404" pitchFamily="49" charset="0"/>
+              <a:buChar char="o"/>
+            </a:pPr>
+            <a:r>
+              <a:rPr lang="en-US" sz="2400" dirty="0">
+                <a:solidFill>
+                  <a:schemeClr val="accent1">
+                    <a:lumMod val="40000"/>
+                    <a:lumOff val="60000"/>
+                  </a:schemeClr>
+                </a:solidFill>
+                <a:latin typeface="Biome Light" panose="020B0303030204020804" pitchFamily="34" charset="0"/>
+                <a:cs typeface="Biome Light" panose="020B0303030204020804" pitchFamily="34" charset="0"/>
+              </a:rPr>
+              <a:t>Created Dummy Variables for Class of Orbit</a:t>
+            </a:r>
+          </a:p>
+          <a:p>
+            <a:pPr marL="285750" indent="-285750" algn="l">
+              <a:buClr>
+                <a:schemeClr val="accent4"/>
+              </a:buClr>
+              <a:buFont typeface="Courier New" panose="02070309020205020404" pitchFamily="49" charset="0"/>
+              <a:buChar char="o"/>
+            </a:pPr>
+            <a:r>
+              <a:rPr lang="en-US" sz="2400" dirty="0">
+                <a:solidFill>
+                  <a:schemeClr val="accent1">
+                    <a:lumMod val="40000"/>
+                    <a:lumOff val="60000"/>
+                  </a:schemeClr>
+                </a:solidFill>
+                <a:latin typeface="Biome Light" panose="020B0303030204020804" pitchFamily="34" charset="0"/>
+                <a:cs typeface="Biome Light" panose="020B0303030204020804" pitchFamily="34" charset="0"/>
+              </a:rPr>
+              <a:t>Deleted Null values </a:t>
+            </a:r>
+          </a:p>
+          <a:p>
+            <a:pPr marL="742950" lvl="1" indent="-285750" algn="l">
+              <a:buClr>
+                <a:schemeClr val="accent4"/>
+              </a:buClr>
+              <a:buFont typeface="Courier New" panose="02070309020205020404" pitchFamily="49" charset="0"/>
+              <a:buChar char="o"/>
+            </a:pPr>
+            <a:r>
+              <a:rPr lang="en-US" sz="2800" dirty="0">
+                <a:solidFill>
+                  <a:schemeClr val="accent1">
+                    <a:lumMod val="40000"/>
+                    <a:lumOff val="60000"/>
+                  </a:schemeClr>
+                </a:solidFill>
+                <a:latin typeface="Biome Light" panose="020B0303030204020804" pitchFamily="34" charset="0"/>
+                <a:cs typeface="Biome Light" panose="020B0303030204020804" pitchFamily="34" charset="0"/>
+              </a:rPr>
+              <a:t>Expected Lifetime (Years)</a:t>
+            </a:r>
+          </a:p>
+          <a:p>
+            <a:pPr marL="742950" lvl="1" indent="-285750" algn="l">
+              <a:buClr>
+                <a:schemeClr val="accent4"/>
+              </a:buClr>
+              <a:buFont typeface="Courier New" panose="02070309020205020404" pitchFamily="49" charset="0"/>
+              <a:buChar char="o"/>
+            </a:pPr>
+            <a:r>
+              <a:rPr lang="en-US" sz="2400" dirty="0">
+                <a:solidFill>
+                  <a:schemeClr val="accent1">
+                    <a:lumMod val="40000"/>
+                    <a:lumOff val="60000"/>
+                  </a:schemeClr>
+                </a:solidFill>
+                <a:latin typeface="Biome Light" panose="020B0303030204020804" pitchFamily="34" charset="0"/>
+                <a:cs typeface="Biome Light" panose="020B0303030204020804" pitchFamily="34" charset="0"/>
+              </a:rPr>
+              <a:t>Launch Mass (Kilograms)</a:t>
+            </a:r>
           </a:p>
         </p:txBody>
       </p:sp>
     </p:spTree>
     <p:extLst>
       <p:ext uri="{BB962C8B-B14F-4D97-AF65-F5344CB8AC3E}">
-        <p14:creationId xmlns:p14="http://schemas.microsoft.com/office/powerpoint/2010/main" val="1372651910"/>
+        <p14:creationId xmlns:p14="http://schemas.microsoft.com/office/powerpoint/2010/main" val="3380759881"/>
       </p:ext>
     </p:extLst>
   </p:cSld>
@@ -21071,6 +22430,399 @@
           <p:cNvPr id="2" name="Title 1">
             <a:extLst>
               <a:ext uri="{FF2B5EF4-FFF2-40B4-BE49-F238E27FC236}">
+                <a16:creationId xmlns:a16="http://schemas.microsoft.com/office/drawing/2014/main" id="{D04F090D-C862-CF85-1001-A82E54365597}"/>
+              </a:ext>
+            </a:extLst>
+          </p:cNvPr>
+          <p:cNvSpPr>
+            <a:spLocks noGrp="1"/>
+          </p:cNvSpPr>
+          <p:nvPr>
+            <p:ph type="ctrTitle"/>
+          </p:nvPr>
+        </p:nvSpPr>
+        <p:spPr>
+          <a:xfrm>
+            <a:off x="2214372" y="1255383"/>
+            <a:ext cx="7763256" cy="809391"/>
+          </a:xfrm>
+        </p:spPr>
+        <p:txBody>
+          <a:bodyPr/>
+          <a:lstStyle/>
+          <a:p>
+            <a:r>
+              <a:rPr lang="en-US" dirty="0">
+                <a:solidFill>
+                  <a:schemeClr val="accent3"/>
+                </a:solidFill>
+                <a:latin typeface="Biome" panose="020B0503030204020804" pitchFamily="34" charset="0"/>
+                <a:cs typeface="Biome" panose="020B0503030204020804" pitchFamily="34" charset="0"/>
+              </a:rPr>
+              <a:t>HYPOTHESIS</a:t>
+            </a:r>
+            <a:br>
+              <a:rPr lang="en-US" dirty="0"/>
+            </a:br>
+            <a:endParaRPr lang="en-US" dirty="0"/>
+          </a:p>
+        </p:txBody>
+      </p:sp>
+      <p:sp>
+        <p:nvSpPr>
+          <p:cNvPr id="3" name="Subtitle 2">
+            <a:extLst>
+              <a:ext uri="{FF2B5EF4-FFF2-40B4-BE49-F238E27FC236}">
+                <a16:creationId xmlns:a16="http://schemas.microsoft.com/office/drawing/2014/main" id="{4CE82C04-6445-9E02-B0E8-8D809278C37D}"/>
+              </a:ext>
+            </a:extLst>
+          </p:cNvPr>
+          <p:cNvSpPr>
+            <a:spLocks noGrp="1"/>
+          </p:cNvSpPr>
+          <p:nvPr>
+            <p:ph type="subTitle" idx="1"/>
+          </p:nvPr>
+        </p:nvSpPr>
+        <p:spPr>
+          <a:xfrm>
+            <a:off x="1371600" y="2354136"/>
+            <a:ext cx="9947787" cy="3567341"/>
+          </a:xfrm>
+        </p:spPr>
+        <p:txBody>
+          <a:bodyPr/>
+          <a:lstStyle/>
+          <a:p>
+            <a:pPr algn="l"/>
+            <a:endParaRPr lang="en-US" sz="2400" dirty="0">
+              <a:solidFill>
+                <a:schemeClr val="accent4"/>
+              </a:solidFill>
+              <a:latin typeface="Biome" panose="020B0503030204020804" pitchFamily="34" charset="0"/>
+              <a:cs typeface="Biome" panose="020B0503030204020804" pitchFamily="34" charset="0"/>
+            </a:endParaRPr>
+          </a:p>
+          <a:p>
+            <a:pPr algn="l"/>
+            <a:r>
+              <a:rPr lang="en-US" sz="3600" b="0" i="0" dirty="0">
+                <a:solidFill>
+                  <a:schemeClr val="accent4"/>
+                </a:solidFill>
+                <a:effectLst/>
+                <a:latin typeface="Biome" panose="020B0503030204020804" pitchFamily="34" charset="0"/>
+                <a:cs typeface="Biome" panose="020B0503030204020804" pitchFamily="34" charset="0"/>
+              </a:rPr>
+              <a:t>H</a:t>
+            </a:r>
+            <a:r>
+              <a:rPr lang="en-US" sz="3600" b="0" i="0" baseline="-25000" dirty="0">
+                <a:solidFill>
+                  <a:schemeClr val="accent4"/>
+                </a:solidFill>
+                <a:effectLst/>
+                <a:latin typeface="Biome" panose="020B0503030204020804" pitchFamily="34" charset="0"/>
+                <a:cs typeface="Biome" panose="020B0503030204020804" pitchFamily="34" charset="0"/>
+              </a:rPr>
+              <a:t>0</a:t>
+            </a:r>
+            <a:r>
+              <a:rPr lang="en-US" sz="2400" b="0" i="0" baseline="-25000" dirty="0">
+                <a:solidFill>
+                  <a:schemeClr val="accent4"/>
+                </a:solidFill>
+                <a:effectLst/>
+                <a:latin typeface="Biome" panose="020B0503030204020804" pitchFamily="34" charset="0"/>
+                <a:cs typeface="Biome" panose="020B0503030204020804" pitchFamily="34" charset="0"/>
+              </a:rPr>
+              <a:t> </a:t>
+            </a:r>
+            <a:r>
+              <a:rPr lang="en-US" sz="2400" dirty="0">
+                <a:solidFill>
+                  <a:schemeClr val="accent4"/>
+                </a:solidFill>
+                <a:latin typeface="Biome" panose="020B0503030204020804" pitchFamily="34" charset="0"/>
+                <a:cs typeface="Biome" panose="020B0503030204020804" pitchFamily="34" charset="0"/>
+              </a:rPr>
+              <a:t>: </a:t>
+            </a:r>
+            <a:r>
+              <a:rPr lang="en-US" sz="2400" dirty="0">
+                <a:solidFill>
+                  <a:schemeClr val="accent2">
+                    <a:lumMod val="60000"/>
+                    <a:lumOff val="40000"/>
+                  </a:schemeClr>
+                </a:solidFill>
+                <a:latin typeface="Biome Light" panose="020B0303030204020804" pitchFamily="34" charset="0"/>
+                <a:cs typeface="Biome Light" panose="020B0303030204020804" pitchFamily="34" charset="0"/>
+              </a:rPr>
+              <a:t>Satellites in GEO will have a similar life expectancy 	compared to those in other orbits</a:t>
+            </a:r>
+          </a:p>
+          <a:p>
+            <a:pPr algn="l"/>
+            <a:endParaRPr lang="en-US" sz="2400" dirty="0">
+              <a:solidFill>
+                <a:schemeClr val="accent4"/>
+              </a:solidFill>
+              <a:latin typeface="Biome Light" panose="020B0303030204020804" pitchFamily="34" charset="0"/>
+              <a:cs typeface="Biome Light" panose="020B0303030204020804" pitchFamily="34" charset="0"/>
+            </a:endParaRPr>
+          </a:p>
+          <a:p>
+            <a:pPr algn="l"/>
+            <a:r>
+              <a:rPr lang="en-US" sz="3600" b="0" i="0" dirty="0">
+                <a:solidFill>
+                  <a:schemeClr val="accent4"/>
+                </a:solidFill>
+                <a:effectLst/>
+                <a:latin typeface="Biome" panose="020B0503030204020804" pitchFamily="34" charset="0"/>
+                <a:cs typeface="Biome" panose="020B0503030204020804" pitchFamily="34" charset="0"/>
+              </a:rPr>
+              <a:t>H</a:t>
+            </a:r>
+            <a:r>
+              <a:rPr lang="en-US" sz="3600" baseline="-25000" dirty="0">
+                <a:solidFill>
+                  <a:schemeClr val="accent4"/>
+                </a:solidFill>
+                <a:latin typeface="Biome" panose="020B0503030204020804" pitchFamily="34" charset="0"/>
+                <a:cs typeface="Biome" panose="020B0503030204020804" pitchFamily="34" charset="0"/>
+              </a:rPr>
+              <a:t>1 </a:t>
+            </a:r>
+            <a:r>
+              <a:rPr lang="en-US" sz="2400" dirty="0">
+                <a:solidFill>
+                  <a:schemeClr val="accent4"/>
+                </a:solidFill>
+                <a:latin typeface="Biome" panose="020B0503030204020804" pitchFamily="34" charset="0"/>
+                <a:cs typeface="Biome" panose="020B0503030204020804" pitchFamily="34" charset="0"/>
+              </a:rPr>
+              <a:t>: </a:t>
+            </a:r>
+            <a:r>
+              <a:rPr lang="en-US" sz="2400" dirty="0">
+                <a:solidFill>
+                  <a:schemeClr val="accent2">
+                    <a:lumMod val="60000"/>
+                    <a:lumOff val="40000"/>
+                  </a:schemeClr>
+                </a:solidFill>
+                <a:latin typeface="Biome Light" panose="020B0303030204020804" pitchFamily="34" charset="0"/>
+                <a:cs typeface="Biome Light" panose="020B0303030204020804" pitchFamily="34" charset="0"/>
+              </a:rPr>
+              <a:t>Satellites in GEO will have a longer life expectancy 	compared to those in other orbits</a:t>
+            </a:r>
+          </a:p>
+          <a:p>
+            <a:pPr algn="l"/>
+            <a:endParaRPr lang="en-US" sz="2400" dirty="0">
+              <a:solidFill>
+                <a:schemeClr val="accent4"/>
+              </a:solidFill>
+              <a:latin typeface="Biome" panose="020B0503030204020804" pitchFamily="34" charset="0"/>
+              <a:cs typeface="Biome" panose="020B0503030204020804" pitchFamily="34" charset="0"/>
+            </a:endParaRPr>
+          </a:p>
+        </p:txBody>
+      </p:sp>
+    </p:spTree>
+    <p:extLst>
+      <p:ext uri="{BB962C8B-B14F-4D97-AF65-F5344CB8AC3E}">
+        <p14:creationId xmlns:p14="http://schemas.microsoft.com/office/powerpoint/2010/main" val="1213210011"/>
+      </p:ext>
+    </p:extLst>
+  </p:cSld>
+  <p:clrMapOvr>
+    <a:masterClrMapping/>
+  </p:clrMapOvr>
+</p:sld>
+</file>
+
+<file path=ppt/slides/slide7.xml><?xml version="1.0" encoding="utf-8"?>
+<p:sld xmlns:a="http://schemas.openxmlformats.org/drawingml/2006/main" xmlns:r="http://schemas.openxmlformats.org/officeDocument/2006/relationships" xmlns:p="http://schemas.openxmlformats.org/presentationml/2006/main">
+  <p:cSld>
+    <p:spTree>
+      <p:nvGrpSpPr>
+        <p:cNvPr id="1" name=""/>
+        <p:cNvGrpSpPr/>
+        <p:nvPr/>
+      </p:nvGrpSpPr>
+      <p:grpSpPr>
+        <a:xfrm>
+          <a:off x="0" y="0"/>
+          <a:ext cx="0" cy="0"/>
+          <a:chOff x="0" y="0"/>
+          <a:chExt cx="0" cy="0"/>
+        </a:xfrm>
+      </p:grpSpPr>
+      <p:sp>
+        <p:nvSpPr>
+          <p:cNvPr id="2" name="Title 1">
+            <a:extLst>
+              <a:ext uri="{FF2B5EF4-FFF2-40B4-BE49-F238E27FC236}">
+                <a16:creationId xmlns:a16="http://schemas.microsoft.com/office/drawing/2014/main" id="{C8152FE8-2F9C-9C12-4EB3-9742EA91D653}"/>
+              </a:ext>
+            </a:extLst>
+          </p:cNvPr>
+          <p:cNvSpPr>
+            <a:spLocks noGrp="1"/>
+          </p:cNvSpPr>
+          <p:nvPr>
+            <p:ph type="title"/>
+          </p:nvPr>
+        </p:nvSpPr>
+        <p:spPr/>
+        <p:txBody>
+          <a:bodyPr/>
+          <a:lstStyle/>
+          <a:p>
+            <a:r>
+              <a:rPr lang="en-US" sz="4000" b="1" spc="600" dirty="0">
+                <a:ln w="28575">
+                  <a:noFill/>
+                  <a:prstDash val="solid"/>
+                </a:ln>
+                <a:solidFill>
+                  <a:schemeClr val="bg1"/>
+                </a:solidFill>
+                <a:latin typeface="Tw Cen MT" panose="020B0602020104020603" pitchFamily="34" charset="77"/>
+              </a:rPr>
+              <a:t>LONG-TERM VS. SHORT-TERM</a:t>
+            </a:r>
+          </a:p>
+        </p:txBody>
+      </p:sp>
+      <p:sp>
+        <p:nvSpPr>
+          <p:cNvPr id="5" name="Slide Number Placeholder 4">
+            <a:extLst>
+              <a:ext uri="{FF2B5EF4-FFF2-40B4-BE49-F238E27FC236}">
+                <a16:creationId xmlns:a16="http://schemas.microsoft.com/office/drawing/2014/main" id="{2A8E318B-D756-6C57-8657-96C836320839}"/>
+              </a:ext>
+            </a:extLst>
+          </p:cNvPr>
+          <p:cNvSpPr>
+            <a:spLocks noGrp="1"/>
+          </p:cNvSpPr>
+          <p:nvPr>
+            <p:ph type="sldNum" sz="quarter" idx="11"/>
+          </p:nvPr>
+        </p:nvSpPr>
+        <p:spPr/>
+        <p:txBody>
+          <a:bodyPr/>
+          <a:lstStyle/>
+          <a:p>
+            <a:fld id="{294A09A9-5501-47C1-A89A-A340965A2BE2}" type="slidenum">
+              <a:rPr lang="en-US" smtClean="0"/>
+              <a:pPr/>
+              <a:t>7</a:t>
+            </a:fld>
+            <a:endParaRPr lang="en-US" dirty="0"/>
+          </a:p>
+        </p:txBody>
+      </p:sp>
+      <p:graphicFrame>
+        <p:nvGraphicFramePr>
+          <p:cNvPr id="4" name="Content Placeholder 5" descr="Bar chart">
+            <a:extLst>
+              <a:ext uri="{FF2B5EF4-FFF2-40B4-BE49-F238E27FC236}">
+                <a16:creationId xmlns:a16="http://schemas.microsoft.com/office/drawing/2014/main" id="{9F02851F-DB0A-09AB-B52A-BE347DDCBD1D}"/>
+              </a:ext>
+            </a:extLst>
+          </p:cNvPr>
+          <p:cNvGraphicFramePr>
+            <a:graphicFrameLocks noGrp="1"/>
+          </p:cNvGraphicFramePr>
+          <p:nvPr>
+            <p:ph idx="1"/>
+            <p:extLst>
+              <p:ext uri="{D42A27DB-BD31-4B8C-83A1-F6EECF244321}">
+                <p14:modId xmlns:p14="http://schemas.microsoft.com/office/powerpoint/2010/main" val="1861876390"/>
+              </p:ext>
+            </p:extLst>
+          </p:nvPr>
+        </p:nvGraphicFramePr>
+        <p:xfrm>
+          <a:off x="1014413" y="2212975"/>
+          <a:ext cx="10333037" cy="3548063"/>
+        </p:xfrm>
+        <a:graphic>
+          <a:graphicData uri="http://schemas.openxmlformats.org/drawingml/2006/chart">
+            <c:chart xmlns:c="http://schemas.openxmlformats.org/drawingml/2006/chart" xmlns:r="http://schemas.openxmlformats.org/officeDocument/2006/relationships" r:id="rId2"/>
+          </a:graphicData>
+        </a:graphic>
+      </p:graphicFrame>
+      <p:sp>
+        <p:nvSpPr>
+          <p:cNvPr id="3" name="Footer Placeholder 2">
+            <a:extLst>
+              <a:ext uri="{FF2B5EF4-FFF2-40B4-BE49-F238E27FC236}">
+                <a16:creationId xmlns:a16="http://schemas.microsoft.com/office/drawing/2014/main" id="{723252A1-51AE-36E1-CE3B-D88466BA8814}"/>
+              </a:ext>
+            </a:extLst>
+          </p:cNvPr>
+          <p:cNvSpPr>
+            <a:spLocks noGrp="1"/>
+          </p:cNvSpPr>
+          <p:nvPr>
+            <p:ph type="ftr" sz="quarter" idx="10"/>
+          </p:nvPr>
+        </p:nvSpPr>
+        <p:spPr/>
+        <p:txBody>
+          <a:bodyPr/>
+          <a:lstStyle/>
+          <a:p>
+            <a:r>
+              <a:rPr lang="en-US"/>
+              <a:t>Crypto: investing &amp; trading</a:t>
+            </a:r>
+            <a:endParaRPr lang="en-US" dirty="0"/>
+          </a:p>
+        </p:txBody>
+      </p:sp>
+    </p:spTree>
+    <p:extLst>
+      <p:ext uri="{BB962C8B-B14F-4D97-AF65-F5344CB8AC3E}">
+        <p14:creationId xmlns:p14="http://schemas.microsoft.com/office/powerpoint/2010/main" val="1372651910"/>
+      </p:ext>
+    </p:extLst>
+  </p:cSld>
+  <p:clrMapOvr>
+    <a:masterClrMapping/>
+  </p:clrMapOvr>
+</p:sld>
+</file>
+
+<file path=ppt/slides/slide8.xml><?xml version="1.0" encoding="utf-8"?>
+<p:sld xmlns:a="http://schemas.openxmlformats.org/drawingml/2006/main" xmlns:r="http://schemas.openxmlformats.org/officeDocument/2006/relationships" xmlns:p="http://schemas.openxmlformats.org/presentationml/2006/main">
+  <p:cSld>
+    <p:spTree>
+      <p:nvGrpSpPr>
+        <p:cNvPr id="1" name=""/>
+        <p:cNvGrpSpPr/>
+        <p:nvPr/>
+      </p:nvGrpSpPr>
+      <p:grpSpPr>
+        <a:xfrm>
+          <a:off x="0" y="0"/>
+          <a:ext cx="0" cy="0"/>
+          <a:chOff x="0" y="0"/>
+          <a:chExt cx="0" cy="0"/>
+        </a:xfrm>
+      </p:grpSpPr>
+      <p:sp>
+        <p:nvSpPr>
+          <p:cNvPr id="2" name="Title 1">
+            <a:extLst>
+              <a:ext uri="{FF2B5EF4-FFF2-40B4-BE49-F238E27FC236}">
                 <a16:creationId xmlns:a16="http://schemas.microsoft.com/office/drawing/2014/main" id="{EE30DEE9-2DBD-C997-C208-027230B5A3EA}"/>
               </a:ext>
             </a:extLst>
@@ -21132,7 +22884,7 @@
             <a:fld id="{294A09A9-5501-47C1-A89A-A340965A2BE2}" type="slidenum">
               <a:rPr lang="en-US" smtClean="0"/>
               <a:pPr/>
-              <a:t>6</a:t>
+              <a:t>8</a:t>
             </a:fld>
             <a:endParaRPr lang="en-US" dirty="0"/>
           </a:p>
@@ -23250,1128 +25002,6 @@
 </p:sld>
 </file>
 
-<file path=ppt/slides/slide7.xml><?xml version="1.0" encoding="utf-8"?>
-<p:sld xmlns:a="http://schemas.openxmlformats.org/drawingml/2006/main" xmlns:r="http://schemas.openxmlformats.org/officeDocument/2006/relationships" xmlns:p="http://schemas.openxmlformats.org/presentationml/2006/main">
-  <p:cSld>
-    <p:spTree>
-      <p:nvGrpSpPr>
-        <p:cNvPr id="1" name=""/>
-        <p:cNvGrpSpPr/>
-        <p:nvPr/>
-      </p:nvGrpSpPr>
-      <p:grpSpPr>
-        <a:xfrm>
-          <a:off x="0" y="0"/>
-          <a:ext cx="0" cy="0"/>
-          <a:chOff x="0" y="0"/>
-          <a:chExt cx="0" cy="0"/>
-        </a:xfrm>
-      </p:grpSpPr>
-      <p:grpSp>
-        <p:nvGrpSpPr>
-          <p:cNvPr id="4" name="Group 3">
-            <a:extLst>
-              <a:ext uri="{FF2B5EF4-FFF2-40B4-BE49-F238E27FC236}">
-                <a16:creationId xmlns:a16="http://schemas.microsoft.com/office/drawing/2014/main" id="{B4C44EC9-F730-00B6-E479-530EC276D851}"/>
-              </a:ext>
-              <a:ext uri="{C183D7F6-B498-43B3-948B-1728B52AA6E4}">
-                <adec:decorative xmlns:adec="http://schemas.microsoft.com/office/drawing/2017/decorative" val="1"/>
-              </a:ext>
-            </a:extLst>
-          </p:cNvPr>
-          <p:cNvGrpSpPr/>
-          <p:nvPr/>
-        </p:nvGrpSpPr>
-        <p:grpSpPr>
-          <a:xfrm rot="10800000">
-            <a:off x="1497321" y="2736484"/>
-            <a:ext cx="1512407" cy="938717"/>
-            <a:chOff x="4779792" y="2384561"/>
-            <a:chExt cx="3365480" cy="2088878"/>
-          </a:xfrm>
-          <a:solidFill>
-            <a:schemeClr val="accent6">
-              <a:alpha val="50231"/>
-            </a:schemeClr>
-          </a:solidFill>
-        </p:grpSpPr>
-        <p:sp>
-          <p:nvSpPr>
-            <p:cNvPr id="5" name="Freeform 4">
-              <a:extLst>
-                <a:ext uri="{FF2B5EF4-FFF2-40B4-BE49-F238E27FC236}">
-                  <a16:creationId xmlns:a16="http://schemas.microsoft.com/office/drawing/2014/main" id="{8B6D2F8E-4F98-B89F-E4FB-DD9F900821E1}"/>
-                </a:ext>
-              </a:extLst>
-            </p:cNvPr>
-            <p:cNvSpPr/>
-            <p:nvPr/>
-          </p:nvSpPr>
-          <p:spPr>
-            <a:xfrm flipH="1">
-              <a:off x="6582137" y="2384561"/>
-              <a:ext cx="1563135" cy="2088878"/>
-            </a:xfrm>
-            <a:custGeom>
-              <a:avLst/>
-              <a:gdLst>
-                <a:gd name="connsiteX0" fmla="*/ 520700 w 1041400"/>
-                <a:gd name="connsiteY0" fmla="*/ 0 h 1391663"/>
-                <a:gd name="connsiteX1" fmla="*/ 0 w 1041400"/>
-                <a:gd name="connsiteY1" fmla="*/ 520700 h 1391663"/>
-                <a:gd name="connsiteX2" fmla="*/ 601 w 1041400"/>
-                <a:gd name="connsiteY2" fmla="*/ 526665 h 1391663"/>
-                <a:gd name="connsiteX3" fmla="*/ 0 w 1041400"/>
-                <a:gd name="connsiteY3" fmla="*/ 530884 h 1391663"/>
-                <a:gd name="connsiteX4" fmla="*/ 839841 w 1041400"/>
-                <a:gd name="connsiteY4" fmla="*/ 1391663 h 1391663"/>
-                <a:gd name="connsiteX5" fmla="*/ 596988 w 1041400"/>
-                <a:gd name="connsiteY5" fmla="*/ 1070463 h 1391663"/>
-                <a:gd name="connsiteX6" fmla="*/ 595327 w 1041400"/>
-                <a:gd name="connsiteY6" fmla="*/ 1033877 h 1391663"/>
-                <a:gd name="connsiteX7" fmla="*/ 625639 w 1041400"/>
-                <a:gd name="connsiteY7" fmla="*/ 1030821 h 1391663"/>
-                <a:gd name="connsiteX8" fmla="*/ 1041400 w 1041400"/>
-                <a:gd name="connsiteY8" fmla="*/ 520700 h 1391663"/>
-                <a:gd name="connsiteX9" fmla="*/ 520700 w 1041400"/>
-                <a:gd name="connsiteY9" fmla="*/ 0 h 1391663"/>
-              </a:gdLst>
-              <a:ahLst/>
-              <a:cxnLst>
-                <a:cxn ang="0">
-                  <a:pos x="connsiteX0" y="connsiteY0"/>
-                </a:cxn>
-                <a:cxn ang="0">
-                  <a:pos x="connsiteX1" y="connsiteY1"/>
-                </a:cxn>
-                <a:cxn ang="0">
-                  <a:pos x="connsiteX2" y="connsiteY2"/>
-                </a:cxn>
-                <a:cxn ang="0">
-                  <a:pos x="connsiteX3" y="connsiteY3"/>
-                </a:cxn>
-                <a:cxn ang="0">
-                  <a:pos x="connsiteX4" y="connsiteY4"/>
-                </a:cxn>
-                <a:cxn ang="0">
-                  <a:pos x="connsiteX5" y="connsiteY5"/>
-                </a:cxn>
-                <a:cxn ang="0">
-                  <a:pos x="connsiteX6" y="connsiteY6"/>
-                </a:cxn>
-                <a:cxn ang="0">
-                  <a:pos x="connsiteX7" y="connsiteY7"/>
-                </a:cxn>
-                <a:cxn ang="0">
-                  <a:pos x="connsiteX8" y="connsiteY8"/>
-                </a:cxn>
-                <a:cxn ang="0">
-                  <a:pos x="connsiteX9" y="connsiteY9"/>
-                </a:cxn>
-              </a:cxnLst>
-              <a:rect l="l" t="t" r="r" b="b"/>
-              <a:pathLst>
-                <a:path w="1041400" h="1391663">
-                  <a:moveTo>
-                    <a:pt x="520700" y="0"/>
-                  </a:moveTo>
-                  <a:cubicBezTo>
-                    <a:pt x="233125" y="0"/>
-                    <a:pt x="0" y="233125"/>
-                    <a:pt x="0" y="520700"/>
-                  </a:cubicBezTo>
-                  <a:lnTo>
-                    <a:pt x="601" y="526665"/>
-                  </a:lnTo>
-                  <a:lnTo>
-                    <a:pt x="0" y="530884"/>
-                  </a:lnTo>
-                  <a:cubicBezTo>
-                    <a:pt x="1270" y="763309"/>
-                    <a:pt x="141037" y="1339599"/>
-                    <a:pt x="839841" y="1391663"/>
-                  </a:cubicBezTo>
-                  <a:cubicBezTo>
-                    <a:pt x="756282" y="1328754"/>
-                    <a:pt x="622088" y="1243235"/>
-                    <a:pt x="596988" y="1070463"/>
-                  </a:cubicBezTo>
-                  <a:lnTo>
-                    <a:pt x="595327" y="1033877"/>
-                  </a:lnTo>
-                  <a:lnTo>
-                    <a:pt x="625639" y="1030821"/>
-                  </a:lnTo>
-                  <a:cubicBezTo>
-                    <a:pt x="862914" y="982268"/>
-                    <a:pt x="1041400" y="772328"/>
-                    <a:pt x="1041400" y="520700"/>
-                  </a:cubicBezTo>
-                  <a:cubicBezTo>
-                    <a:pt x="1041400" y="233125"/>
-                    <a:pt x="808275" y="0"/>
-                    <a:pt x="520700" y="0"/>
-                  </a:cubicBezTo>
-                  <a:close/>
-                </a:path>
-              </a:pathLst>
-            </a:custGeom>
-            <a:grpFill/>
-            <a:ln>
-              <a:noFill/>
-            </a:ln>
-          </p:spPr>
-          <p:style>
-            <a:lnRef idx="2">
-              <a:schemeClr val="accent1">
-                <a:shade val="50000"/>
-              </a:schemeClr>
-            </a:lnRef>
-            <a:fillRef idx="1">
-              <a:schemeClr val="accent1"/>
-            </a:fillRef>
-            <a:effectRef idx="0">
-              <a:schemeClr val="accent1"/>
-            </a:effectRef>
-            <a:fontRef idx="minor">
-              <a:schemeClr val="lt1"/>
-            </a:fontRef>
-          </p:style>
-          <p:txBody>
-            <a:bodyPr wrap="square" rtlCol="0" anchor="ctr">
-              <a:noAutofit/>
-            </a:bodyPr>
-            <a:lstStyle/>
-            <a:p>
-              <a:pPr algn="ctr"/>
-              <a:endParaRPr lang="en-US" dirty="0"/>
-            </a:p>
-          </p:txBody>
-        </p:sp>
-        <p:sp>
-          <p:nvSpPr>
-            <p:cNvPr id="6" name="Freeform 5">
-              <a:extLst>
-                <a:ext uri="{FF2B5EF4-FFF2-40B4-BE49-F238E27FC236}">
-                  <a16:creationId xmlns:a16="http://schemas.microsoft.com/office/drawing/2014/main" id="{99EBD7AD-ED91-CC5F-0110-3EE43A60F946}"/>
-                </a:ext>
-              </a:extLst>
-            </p:cNvPr>
-            <p:cNvSpPr/>
-            <p:nvPr/>
-          </p:nvSpPr>
-          <p:spPr>
-            <a:xfrm flipH="1">
-              <a:off x="4779792" y="2384561"/>
-              <a:ext cx="1563135" cy="2088878"/>
-            </a:xfrm>
-            <a:custGeom>
-              <a:avLst/>
-              <a:gdLst>
-                <a:gd name="connsiteX0" fmla="*/ 520700 w 1041400"/>
-                <a:gd name="connsiteY0" fmla="*/ 0 h 1391663"/>
-                <a:gd name="connsiteX1" fmla="*/ 0 w 1041400"/>
-                <a:gd name="connsiteY1" fmla="*/ 520700 h 1391663"/>
-                <a:gd name="connsiteX2" fmla="*/ 601 w 1041400"/>
-                <a:gd name="connsiteY2" fmla="*/ 526665 h 1391663"/>
-                <a:gd name="connsiteX3" fmla="*/ 0 w 1041400"/>
-                <a:gd name="connsiteY3" fmla="*/ 530884 h 1391663"/>
-                <a:gd name="connsiteX4" fmla="*/ 839841 w 1041400"/>
-                <a:gd name="connsiteY4" fmla="*/ 1391663 h 1391663"/>
-                <a:gd name="connsiteX5" fmla="*/ 596988 w 1041400"/>
-                <a:gd name="connsiteY5" fmla="*/ 1070463 h 1391663"/>
-                <a:gd name="connsiteX6" fmla="*/ 595327 w 1041400"/>
-                <a:gd name="connsiteY6" fmla="*/ 1033877 h 1391663"/>
-                <a:gd name="connsiteX7" fmla="*/ 625639 w 1041400"/>
-                <a:gd name="connsiteY7" fmla="*/ 1030821 h 1391663"/>
-                <a:gd name="connsiteX8" fmla="*/ 1041400 w 1041400"/>
-                <a:gd name="connsiteY8" fmla="*/ 520700 h 1391663"/>
-                <a:gd name="connsiteX9" fmla="*/ 520700 w 1041400"/>
-                <a:gd name="connsiteY9" fmla="*/ 0 h 1391663"/>
-              </a:gdLst>
-              <a:ahLst/>
-              <a:cxnLst>
-                <a:cxn ang="0">
-                  <a:pos x="connsiteX0" y="connsiteY0"/>
-                </a:cxn>
-                <a:cxn ang="0">
-                  <a:pos x="connsiteX1" y="connsiteY1"/>
-                </a:cxn>
-                <a:cxn ang="0">
-                  <a:pos x="connsiteX2" y="connsiteY2"/>
-                </a:cxn>
-                <a:cxn ang="0">
-                  <a:pos x="connsiteX3" y="connsiteY3"/>
-                </a:cxn>
-                <a:cxn ang="0">
-                  <a:pos x="connsiteX4" y="connsiteY4"/>
-                </a:cxn>
-                <a:cxn ang="0">
-                  <a:pos x="connsiteX5" y="connsiteY5"/>
-                </a:cxn>
-                <a:cxn ang="0">
-                  <a:pos x="connsiteX6" y="connsiteY6"/>
-                </a:cxn>
-                <a:cxn ang="0">
-                  <a:pos x="connsiteX7" y="connsiteY7"/>
-                </a:cxn>
-                <a:cxn ang="0">
-                  <a:pos x="connsiteX8" y="connsiteY8"/>
-                </a:cxn>
-                <a:cxn ang="0">
-                  <a:pos x="connsiteX9" y="connsiteY9"/>
-                </a:cxn>
-              </a:cxnLst>
-              <a:rect l="l" t="t" r="r" b="b"/>
-              <a:pathLst>
-                <a:path w="1041400" h="1391663">
-                  <a:moveTo>
-                    <a:pt x="520700" y="0"/>
-                  </a:moveTo>
-                  <a:cubicBezTo>
-                    <a:pt x="233125" y="0"/>
-                    <a:pt x="0" y="233125"/>
-                    <a:pt x="0" y="520700"/>
-                  </a:cubicBezTo>
-                  <a:lnTo>
-                    <a:pt x="601" y="526665"/>
-                  </a:lnTo>
-                  <a:lnTo>
-                    <a:pt x="0" y="530884"/>
-                  </a:lnTo>
-                  <a:cubicBezTo>
-                    <a:pt x="1270" y="763309"/>
-                    <a:pt x="141037" y="1339599"/>
-                    <a:pt x="839841" y="1391663"/>
-                  </a:cubicBezTo>
-                  <a:cubicBezTo>
-                    <a:pt x="756282" y="1328754"/>
-                    <a:pt x="622088" y="1243235"/>
-                    <a:pt x="596988" y="1070463"/>
-                  </a:cubicBezTo>
-                  <a:lnTo>
-                    <a:pt x="595327" y="1033877"/>
-                  </a:lnTo>
-                  <a:lnTo>
-                    <a:pt x="625639" y="1030821"/>
-                  </a:lnTo>
-                  <a:cubicBezTo>
-                    <a:pt x="862914" y="982268"/>
-                    <a:pt x="1041400" y="772328"/>
-                    <a:pt x="1041400" y="520700"/>
-                  </a:cubicBezTo>
-                  <a:cubicBezTo>
-                    <a:pt x="1041400" y="233125"/>
-                    <a:pt x="808275" y="0"/>
-                    <a:pt x="520700" y="0"/>
-                  </a:cubicBezTo>
-                  <a:close/>
-                </a:path>
-              </a:pathLst>
-            </a:custGeom>
-            <a:grpFill/>
-            <a:ln>
-              <a:noFill/>
-            </a:ln>
-          </p:spPr>
-          <p:style>
-            <a:lnRef idx="2">
-              <a:schemeClr val="accent1">
-                <a:shade val="50000"/>
-              </a:schemeClr>
-            </a:lnRef>
-            <a:fillRef idx="1">
-              <a:schemeClr val="accent1"/>
-            </a:fillRef>
-            <a:effectRef idx="0">
-              <a:schemeClr val="accent1"/>
-            </a:effectRef>
-            <a:fontRef idx="minor">
-              <a:schemeClr val="lt1"/>
-            </a:fontRef>
-          </p:style>
-          <p:txBody>
-            <a:bodyPr wrap="square" rtlCol="0" anchor="ctr">
-              <a:noAutofit/>
-            </a:bodyPr>
-            <a:lstStyle/>
-            <a:p>
-              <a:pPr algn="ctr"/>
-              <a:endParaRPr lang="en-US" dirty="0"/>
-            </a:p>
-          </p:txBody>
-        </p:sp>
-      </p:grpSp>
-      <p:grpSp>
-        <p:nvGrpSpPr>
-          <p:cNvPr id="7" name="Group 6">
-            <a:extLst>
-              <a:ext uri="{FF2B5EF4-FFF2-40B4-BE49-F238E27FC236}">
-                <a16:creationId xmlns:a16="http://schemas.microsoft.com/office/drawing/2014/main" id="{56B0BED4-B4D2-A8C2-9E8E-FA7D1819E15A}"/>
-              </a:ext>
-              <a:ext uri="{C183D7F6-B498-43B3-948B-1728B52AA6E4}">
-                <adec:decorative xmlns:adec="http://schemas.microsoft.com/office/drawing/2017/decorative" val="1"/>
-              </a:ext>
-            </a:extLst>
-          </p:cNvPr>
-          <p:cNvGrpSpPr/>
-          <p:nvPr/>
-        </p:nvGrpSpPr>
-        <p:grpSpPr>
-          <a:xfrm>
-            <a:off x="9199707" y="3205843"/>
-            <a:ext cx="1512408" cy="938718"/>
-            <a:chOff x="4779792" y="2384561"/>
-            <a:chExt cx="3365480" cy="2088878"/>
-          </a:xfrm>
-          <a:solidFill>
-            <a:schemeClr val="accent1">
-              <a:alpha val="48174"/>
-            </a:schemeClr>
-          </a:solidFill>
-        </p:grpSpPr>
-        <p:sp>
-          <p:nvSpPr>
-            <p:cNvPr id="8" name="Freeform 1">
-              <a:extLst>
-                <a:ext uri="{FF2B5EF4-FFF2-40B4-BE49-F238E27FC236}">
-                  <a16:creationId xmlns:a16="http://schemas.microsoft.com/office/drawing/2014/main" id="{B542C6FD-B908-03BB-DE9D-1E76EE849265}"/>
-                </a:ext>
-              </a:extLst>
-            </p:cNvPr>
-            <p:cNvSpPr/>
-            <p:nvPr/>
-          </p:nvSpPr>
-          <p:spPr>
-            <a:xfrm flipH="1">
-              <a:off x="6582137" y="2384561"/>
-              <a:ext cx="1563135" cy="2088878"/>
-            </a:xfrm>
-            <a:custGeom>
-              <a:avLst/>
-              <a:gdLst>
-                <a:gd name="connsiteX0" fmla="*/ 520700 w 1041400"/>
-                <a:gd name="connsiteY0" fmla="*/ 0 h 1391663"/>
-                <a:gd name="connsiteX1" fmla="*/ 0 w 1041400"/>
-                <a:gd name="connsiteY1" fmla="*/ 520700 h 1391663"/>
-                <a:gd name="connsiteX2" fmla="*/ 601 w 1041400"/>
-                <a:gd name="connsiteY2" fmla="*/ 526665 h 1391663"/>
-                <a:gd name="connsiteX3" fmla="*/ 0 w 1041400"/>
-                <a:gd name="connsiteY3" fmla="*/ 530884 h 1391663"/>
-                <a:gd name="connsiteX4" fmla="*/ 839841 w 1041400"/>
-                <a:gd name="connsiteY4" fmla="*/ 1391663 h 1391663"/>
-                <a:gd name="connsiteX5" fmla="*/ 596988 w 1041400"/>
-                <a:gd name="connsiteY5" fmla="*/ 1070463 h 1391663"/>
-                <a:gd name="connsiteX6" fmla="*/ 595327 w 1041400"/>
-                <a:gd name="connsiteY6" fmla="*/ 1033877 h 1391663"/>
-                <a:gd name="connsiteX7" fmla="*/ 625639 w 1041400"/>
-                <a:gd name="connsiteY7" fmla="*/ 1030821 h 1391663"/>
-                <a:gd name="connsiteX8" fmla="*/ 1041400 w 1041400"/>
-                <a:gd name="connsiteY8" fmla="*/ 520700 h 1391663"/>
-                <a:gd name="connsiteX9" fmla="*/ 520700 w 1041400"/>
-                <a:gd name="connsiteY9" fmla="*/ 0 h 1391663"/>
-              </a:gdLst>
-              <a:ahLst/>
-              <a:cxnLst>
-                <a:cxn ang="0">
-                  <a:pos x="connsiteX0" y="connsiteY0"/>
-                </a:cxn>
-                <a:cxn ang="0">
-                  <a:pos x="connsiteX1" y="connsiteY1"/>
-                </a:cxn>
-                <a:cxn ang="0">
-                  <a:pos x="connsiteX2" y="connsiteY2"/>
-                </a:cxn>
-                <a:cxn ang="0">
-                  <a:pos x="connsiteX3" y="connsiteY3"/>
-                </a:cxn>
-                <a:cxn ang="0">
-                  <a:pos x="connsiteX4" y="connsiteY4"/>
-                </a:cxn>
-                <a:cxn ang="0">
-                  <a:pos x="connsiteX5" y="connsiteY5"/>
-                </a:cxn>
-                <a:cxn ang="0">
-                  <a:pos x="connsiteX6" y="connsiteY6"/>
-                </a:cxn>
-                <a:cxn ang="0">
-                  <a:pos x="connsiteX7" y="connsiteY7"/>
-                </a:cxn>
-                <a:cxn ang="0">
-                  <a:pos x="connsiteX8" y="connsiteY8"/>
-                </a:cxn>
-                <a:cxn ang="0">
-                  <a:pos x="connsiteX9" y="connsiteY9"/>
-                </a:cxn>
-              </a:cxnLst>
-              <a:rect l="l" t="t" r="r" b="b"/>
-              <a:pathLst>
-                <a:path w="1041400" h="1391663">
-                  <a:moveTo>
-                    <a:pt x="520700" y="0"/>
-                  </a:moveTo>
-                  <a:cubicBezTo>
-                    <a:pt x="233125" y="0"/>
-                    <a:pt x="0" y="233125"/>
-                    <a:pt x="0" y="520700"/>
-                  </a:cubicBezTo>
-                  <a:lnTo>
-                    <a:pt x="601" y="526665"/>
-                  </a:lnTo>
-                  <a:lnTo>
-                    <a:pt x="0" y="530884"/>
-                  </a:lnTo>
-                  <a:cubicBezTo>
-                    <a:pt x="1270" y="763309"/>
-                    <a:pt x="141037" y="1339599"/>
-                    <a:pt x="839841" y="1391663"/>
-                  </a:cubicBezTo>
-                  <a:cubicBezTo>
-                    <a:pt x="756282" y="1328754"/>
-                    <a:pt x="622088" y="1243235"/>
-                    <a:pt x="596988" y="1070463"/>
-                  </a:cubicBezTo>
-                  <a:lnTo>
-                    <a:pt x="595327" y="1033877"/>
-                  </a:lnTo>
-                  <a:lnTo>
-                    <a:pt x="625639" y="1030821"/>
-                  </a:lnTo>
-                  <a:cubicBezTo>
-                    <a:pt x="862914" y="982268"/>
-                    <a:pt x="1041400" y="772328"/>
-                    <a:pt x="1041400" y="520700"/>
-                  </a:cubicBezTo>
-                  <a:cubicBezTo>
-                    <a:pt x="1041400" y="233125"/>
-                    <a:pt x="808275" y="0"/>
-                    <a:pt x="520700" y="0"/>
-                  </a:cubicBezTo>
-                  <a:close/>
-                </a:path>
-              </a:pathLst>
-            </a:custGeom>
-            <a:grpFill/>
-            <a:ln>
-              <a:noFill/>
-            </a:ln>
-          </p:spPr>
-          <p:style>
-            <a:lnRef idx="2">
-              <a:schemeClr val="accent1">
-                <a:shade val="50000"/>
-              </a:schemeClr>
-            </a:lnRef>
-            <a:fillRef idx="1">
-              <a:schemeClr val="accent1"/>
-            </a:fillRef>
-            <a:effectRef idx="0">
-              <a:schemeClr val="accent1"/>
-            </a:effectRef>
-            <a:fontRef idx="minor">
-              <a:schemeClr val="lt1"/>
-            </a:fontRef>
-          </p:style>
-          <p:txBody>
-            <a:bodyPr wrap="square" rtlCol="0" anchor="ctr">
-              <a:noAutofit/>
-            </a:bodyPr>
-            <a:lstStyle/>
-            <a:p>
-              <a:pPr algn="ctr"/>
-              <a:endParaRPr lang="en-US" dirty="0"/>
-            </a:p>
-          </p:txBody>
-        </p:sp>
-        <p:sp>
-          <p:nvSpPr>
-            <p:cNvPr id="9" name="Freeform 21">
-              <a:extLst>
-                <a:ext uri="{FF2B5EF4-FFF2-40B4-BE49-F238E27FC236}">
-                  <a16:creationId xmlns:a16="http://schemas.microsoft.com/office/drawing/2014/main" id="{594F7F18-2B8D-7493-904B-1BD252DFC677}"/>
-                </a:ext>
-              </a:extLst>
-            </p:cNvPr>
-            <p:cNvSpPr/>
-            <p:nvPr/>
-          </p:nvSpPr>
-          <p:spPr>
-            <a:xfrm flipH="1">
-              <a:off x="4779792" y="2384561"/>
-              <a:ext cx="1563135" cy="2088878"/>
-            </a:xfrm>
-            <a:custGeom>
-              <a:avLst/>
-              <a:gdLst>
-                <a:gd name="connsiteX0" fmla="*/ 520700 w 1041400"/>
-                <a:gd name="connsiteY0" fmla="*/ 0 h 1391663"/>
-                <a:gd name="connsiteX1" fmla="*/ 0 w 1041400"/>
-                <a:gd name="connsiteY1" fmla="*/ 520700 h 1391663"/>
-                <a:gd name="connsiteX2" fmla="*/ 601 w 1041400"/>
-                <a:gd name="connsiteY2" fmla="*/ 526665 h 1391663"/>
-                <a:gd name="connsiteX3" fmla="*/ 0 w 1041400"/>
-                <a:gd name="connsiteY3" fmla="*/ 530884 h 1391663"/>
-                <a:gd name="connsiteX4" fmla="*/ 839841 w 1041400"/>
-                <a:gd name="connsiteY4" fmla="*/ 1391663 h 1391663"/>
-                <a:gd name="connsiteX5" fmla="*/ 596988 w 1041400"/>
-                <a:gd name="connsiteY5" fmla="*/ 1070463 h 1391663"/>
-                <a:gd name="connsiteX6" fmla="*/ 595327 w 1041400"/>
-                <a:gd name="connsiteY6" fmla="*/ 1033877 h 1391663"/>
-                <a:gd name="connsiteX7" fmla="*/ 625639 w 1041400"/>
-                <a:gd name="connsiteY7" fmla="*/ 1030821 h 1391663"/>
-                <a:gd name="connsiteX8" fmla="*/ 1041400 w 1041400"/>
-                <a:gd name="connsiteY8" fmla="*/ 520700 h 1391663"/>
-                <a:gd name="connsiteX9" fmla="*/ 520700 w 1041400"/>
-                <a:gd name="connsiteY9" fmla="*/ 0 h 1391663"/>
-              </a:gdLst>
-              <a:ahLst/>
-              <a:cxnLst>
-                <a:cxn ang="0">
-                  <a:pos x="connsiteX0" y="connsiteY0"/>
-                </a:cxn>
-                <a:cxn ang="0">
-                  <a:pos x="connsiteX1" y="connsiteY1"/>
-                </a:cxn>
-                <a:cxn ang="0">
-                  <a:pos x="connsiteX2" y="connsiteY2"/>
-                </a:cxn>
-                <a:cxn ang="0">
-                  <a:pos x="connsiteX3" y="connsiteY3"/>
-                </a:cxn>
-                <a:cxn ang="0">
-                  <a:pos x="connsiteX4" y="connsiteY4"/>
-                </a:cxn>
-                <a:cxn ang="0">
-                  <a:pos x="connsiteX5" y="connsiteY5"/>
-                </a:cxn>
-                <a:cxn ang="0">
-                  <a:pos x="connsiteX6" y="connsiteY6"/>
-                </a:cxn>
-                <a:cxn ang="0">
-                  <a:pos x="connsiteX7" y="connsiteY7"/>
-                </a:cxn>
-                <a:cxn ang="0">
-                  <a:pos x="connsiteX8" y="connsiteY8"/>
-                </a:cxn>
-                <a:cxn ang="0">
-                  <a:pos x="connsiteX9" y="connsiteY9"/>
-                </a:cxn>
-              </a:cxnLst>
-              <a:rect l="l" t="t" r="r" b="b"/>
-              <a:pathLst>
-                <a:path w="1041400" h="1391663">
-                  <a:moveTo>
-                    <a:pt x="520700" y="0"/>
-                  </a:moveTo>
-                  <a:cubicBezTo>
-                    <a:pt x="233125" y="0"/>
-                    <a:pt x="0" y="233125"/>
-                    <a:pt x="0" y="520700"/>
-                  </a:cubicBezTo>
-                  <a:lnTo>
-                    <a:pt x="601" y="526665"/>
-                  </a:lnTo>
-                  <a:lnTo>
-                    <a:pt x="0" y="530884"/>
-                  </a:lnTo>
-                  <a:cubicBezTo>
-                    <a:pt x="1270" y="763309"/>
-                    <a:pt x="141037" y="1339599"/>
-                    <a:pt x="839841" y="1391663"/>
-                  </a:cubicBezTo>
-                  <a:cubicBezTo>
-                    <a:pt x="756282" y="1328754"/>
-                    <a:pt x="622088" y="1243235"/>
-                    <a:pt x="596988" y="1070463"/>
-                  </a:cubicBezTo>
-                  <a:lnTo>
-                    <a:pt x="595327" y="1033877"/>
-                  </a:lnTo>
-                  <a:lnTo>
-                    <a:pt x="625639" y="1030821"/>
-                  </a:lnTo>
-                  <a:cubicBezTo>
-                    <a:pt x="862914" y="982268"/>
-                    <a:pt x="1041400" y="772328"/>
-                    <a:pt x="1041400" y="520700"/>
-                  </a:cubicBezTo>
-                  <a:cubicBezTo>
-                    <a:pt x="1041400" y="233125"/>
-                    <a:pt x="808275" y="0"/>
-                    <a:pt x="520700" y="0"/>
-                  </a:cubicBezTo>
-                  <a:close/>
-                </a:path>
-              </a:pathLst>
-            </a:custGeom>
-            <a:grpFill/>
-            <a:ln>
-              <a:noFill/>
-            </a:ln>
-          </p:spPr>
-          <p:style>
-            <a:lnRef idx="2">
-              <a:schemeClr val="accent1">
-                <a:shade val="50000"/>
-              </a:schemeClr>
-            </a:lnRef>
-            <a:fillRef idx="1">
-              <a:schemeClr val="accent1"/>
-            </a:fillRef>
-            <a:effectRef idx="0">
-              <a:schemeClr val="accent1"/>
-            </a:effectRef>
-            <a:fontRef idx="minor">
-              <a:schemeClr val="lt1"/>
-            </a:fontRef>
-          </p:style>
-          <p:txBody>
-            <a:bodyPr wrap="square" rtlCol="0" anchor="ctr">
-              <a:noAutofit/>
-            </a:bodyPr>
-            <a:lstStyle/>
-            <a:p>
-              <a:pPr algn="ctr"/>
-              <a:endParaRPr lang="en-US" dirty="0"/>
-            </a:p>
-          </p:txBody>
-        </p:sp>
-      </p:grpSp>
-      <p:sp>
-        <p:nvSpPr>
-          <p:cNvPr id="2" name="Title 1">
-            <a:extLst>
-              <a:ext uri="{FF2B5EF4-FFF2-40B4-BE49-F238E27FC236}">
-                <a16:creationId xmlns:a16="http://schemas.microsoft.com/office/drawing/2014/main" id="{D04F090D-C862-CF85-1001-A82E54365597}"/>
-              </a:ext>
-            </a:extLst>
-          </p:cNvPr>
-          <p:cNvSpPr>
-            <a:spLocks noGrp="1"/>
-          </p:cNvSpPr>
-          <p:nvPr>
-            <p:ph type="ctrTitle"/>
-          </p:nvPr>
-        </p:nvSpPr>
-        <p:spPr/>
-        <p:txBody>
-          <a:bodyPr/>
-          <a:lstStyle/>
-          <a:p>
-            <a:r>
-              <a:rPr lang="en-US" dirty="0"/>
-              <a:t>WEALTH IS THE ABILITY TO FULLY EXPERIENCE LIFE.</a:t>
-            </a:r>
-            <a:br>
-              <a:rPr lang="en-US" dirty="0"/>
-            </a:br>
-            <a:endParaRPr lang="en-US" dirty="0"/>
-          </a:p>
-        </p:txBody>
-      </p:sp>
-      <p:sp>
-        <p:nvSpPr>
-          <p:cNvPr id="3" name="Subtitle 2">
-            <a:extLst>
-              <a:ext uri="{FF2B5EF4-FFF2-40B4-BE49-F238E27FC236}">
-                <a16:creationId xmlns:a16="http://schemas.microsoft.com/office/drawing/2014/main" id="{4CE82C04-6445-9E02-B0E8-8D809278C37D}"/>
-              </a:ext>
-            </a:extLst>
-          </p:cNvPr>
-          <p:cNvSpPr>
-            <a:spLocks noGrp="1"/>
-          </p:cNvSpPr>
-          <p:nvPr>
-            <p:ph type="subTitle" idx="1"/>
-          </p:nvPr>
-        </p:nvSpPr>
-        <p:spPr/>
-        <p:txBody>
-          <a:bodyPr/>
-          <a:lstStyle/>
-          <a:p>
-            <a:r>
-              <a:rPr lang="en-US" dirty="0"/>
-              <a:t>-Henry David Thoreau</a:t>
-            </a:r>
-          </a:p>
-        </p:txBody>
-      </p:sp>
-    </p:spTree>
-    <p:extLst>
-      <p:ext uri="{BB962C8B-B14F-4D97-AF65-F5344CB8AC3E}">
-        <p14:creationId xmlns:p14="http://schemas.microsoft.com/office/powerpoint/2010/main" val="1213210011"/>
-      </p:ext>
-    </p:extLst>
-  </p:cSld>
-  <p:clrMapOvr>
-    <a:masterClrMapping/>
-  </p:clrMapOvr>
-</p:sld>
-</file>
-
-<file path=ppt/slides/slide8.xml><?xml version="1.0" encoding="utf-8"?>
-<p:sld xmlns:a="http://schemas.openxmlformats.org/drawingml/2006/main" xmlns:r="http://schemas.openxmlformats.org/officeDocument/2006/relationships" xmlns:p="http://schemas.openxmlformats.org/presentationml/2006/main">
-  <p:cSld>
-    <p:spTree>
-      <p:nvGrpSpPr>
-        <p:cNvPr id="1" name=""/>
-        <p:cNvGrpSpPr/>
-        <p:nvPr/>
-      </p:nvGrpSpPr>
-      <p:grpSpPr>
-        <a:xfrm>
-          <a:off x="0" y="0"/>
-          <a:ext cx="0" cy="0"/>
-          <a:chOff x="0" y="0"/>
-          <a:chExt cx="0" cy="0"/>
-        </a:xfrm>
-      </p:grpSpPr>
-      <p:sp>
-        <p:nvSpPr>
-          <p:cNvPr id="69" name="Title 68">
-            <a:extLst>
-              <a:ext uri="{FF2B5EF4-FFF2-40B4-BE49-F238E27FC236}">
-                <a16:creationId xmlns:a16="http://schemas.microsoft.com/office/drawing/2014/main" id="{0B07383B-6310-56A6-B051-F4B962E11786}"/>
-              </a:ext>
-            </a:extLst>
-          </p:cNvPr>
-          <p:cNvSpPr>
-            <a:spLocks noGrp="1"/>
-          </p:cNvSpPr>
-          <p:nvPr>
-            <p:ph type="title"/>
-          </p:nvPr>
-        </p:nvSpPr>
-        <p:spPr/>
-        <p:txBody>
-          <a:bodyPr/>
-          <a:lstStyle/>
-          <a:p>
-            <a:r>
-              <a:rPr lang="en-US" dirty="0"/>
-              <a:t>TYPES OF TOKENS</a:t>
-            </a:r>
-          </a:p>
-        </p:txBody>
-      </p:sp>
-      <p:sp>
-        <p:nvSpPr>
-          <p:cNvPr id="4" name="Text Placeholder 3">
-            <a:extLst>
-              <a:ext uri="{FF2B5EF4-FFF2-40B4-BE49-F238E27FC236}">
-                <a16:creationId xmlns:a16="http://schemas.microsoft.com/office/drawing/2014/main" id="{55DA2D8B-92F5-22B2-084C-934BCBC00DFD}"/>
-              </a:ext>
-            </a:extLst>
-          </p:cNvPr>
-          <p:cNvSpPr>
-            <a:spLocks noGrp="1"/>
-          </p:cNvSpPr>
-          <p:nvPr>
-            <p:ph type="body" sz="quarter" idx="12"/>
-          </p:nvPr>
-        </p:nvSpPr>
-        <p:spPr/>
-        <p:txBody>
-          <a:bodyPr/>
-          <a:lstStyle/>
-          <a:p>
-            <a:r>
-              <a:rPr lang="en-US" dirty="0"/>
-              <a:t>Payment</a:t>
-            </a:r>
-          </a:p>
-        </p:txBody>
-      </p:sp>
-      <p:sp>
-        <p:nvSpPr>
-          <p:cNvPr id="5" name="Text Placeholder 4">
-            <a:extLst>
-              <a:ext uri="{FF2B5EF4-FFF2-40B4-BE49-F238E27FC236}">
-                <a16:creationId xmlns:a16="http://schemas.microsoft.com/office/drawing/2014/main" id="{8B004B5D-BB88-E446-FDC1-8BE748EFE8B6}"/>
-              </a:ext>
-            </a:extLst>
-          </p:cNvPr>
-          <p:cNvSpPr>
-            <a:spLocks noGrp="1"/>
-          </p:cNvSpPr>
-          <p:nvPr>
-            <p:ph type="body" sz="quarter" idx="13"/>
-          </p:nvPr>
-        </p:nvSpPr>
-        <p:spPr/>
-        <p:txBody>
-          <a:bodyPr/>
-          <a:lstStyle/>
-          <a:p>
-            <a:r>
-              <a:rPr lang="en-US" dirty="0"/>
-              <a:t>Used to complete transactions anywhere crypto is accepted</a:t>
-            </a:r>
-          </a:p>
-          <a:p>
-            <a:endParaRPr lang="en-US" dirty="0"/>
-          </a:p>
-        </p:txBody>
-      </p:sp>
-      <p:sp>
-        <p:nvSpPr>
-          <p:cNvPr id="6" name="Text Placeholder 5">
-            <a:extLst>
-              <a:ext uri="{FF2B5EF4-FFF2-40B4-BE49-F238E27FC236}">
-                <a16:creationId xmlns:a16="http://schemas.microsoft.com/office/drawing/2014/main" id="{98AC0C5B-16A7-E317-7222-BF9FA26C0DC6}"/>
-              </a:ext>
-            </a:extLst>
-          </p:cNvPr>
-          <p:cNvSpPr>
-            <a:spLocks noGrp="1"/>
-          </p:cNvSpPr>
-          <p:nvPr>
-            <p:ph type="body" sz="quarter" idx="14"/>
-          </p:nvPr>
-        </p:nvSpPr>
-        <p:spPr/>
-        <p:txBody>
-          <a:bodyPr/>
-          <a:lstStyle/>
-          <a:p>
-            <a:r>
-              <a:rPr lang="en-US" dirty="0"/>
-              <a:t>Utility</a:t>
-            </a:r>
-          </a:p>
-        </p:txBody>
-      </p:sp>
-      <p:sp>
-        <p:nvSpPr>
-          <p:cNvPr id="7" name="Text Placeholder 6">
-            <a:extLst>
-              <a:ext uri="{FF2B5EF4-FFF2-40B4-BE49-F238E27FC236}">
-                <a16:creationId xmlns:a16="http://schemas.microsoft.com/office/drawing/2014/main" id="{77D9B67F-AD02-4BA5-209B-C91070303A72}"/>
-              </a:ext>
-            </a:extLst>
-          </p:cNvPr>
-          <p:cNvSpPr>
-            <a:spLocks noGrp="1"/>
-          </p:cNvSpPr>
-          <p:nvPr>
-            <p:ph type="body" sz="quarter" idx="15"/>
-          </p:nvPr>
-        </p:nvSpPr>
-        <p:spPr/>
-        <p:txBody>
-          <a:bodyPr/>
-          <a:lstStyle/>
-          <a:p>
-            <a:r>
-              <a:rPr lang="en-US" dirty="0"/>
-              <a:t>These tokens have a specific use within a blockchain</a:t>
-            </a:r>
-          </a:p>
-          <a:p>
-            <a:endParaRPr lang="en-US" dirty="0"/>
-          </a:p>
-        </p:txBody>
-      </p:sp>
-      <p:sp>
-        <p:nvSpPr>
-          <p:cNvPr id="8" name="Text Placeholder 7">
-            <a:extLst>
-              <a:ext uri="{FF2B5EF4-FFF2-40B4-BE49-F238E27FC236}">
-                <a16:creationId xmlns:a16="http://schemas.microsoft.com/office/drawing/2014/main" id="{6269FBD2-F371-6F7E-1D42-95EFADFA10DD}"/>
-              </a:ext>
-            </a:extLst>
-          </p:cNvPr>
-          <p:cNvSpPr>
-            <a:spLocks noGrp="1"/>
-          </p:cNvSpPr>
-          <p:nvPr>
-            <p:ph type="body" sz="quarter" idx="16"/>
-          </p:nvPr>
-        </p:nvSpPr>
-        <p:spPr/>
-        <p:txBody>
-          <a:bodyPr/>
-          <a:lstStyle/>
-          <a:p>
-            <a:r>
-              <a:rPr lang="en-US" dirty="0"/>
-              <a:t>Security</a:t>
-            </a:r>
-          </a:p>
-        </p:txBody>
-      </p:sp>
-      <p:sp>
-        <p:nvSpPr>
-          <p:cNvPr id="9" name="Text Placeholder 8">
-            <a:extLst>
-              <a:ext uri="{FF2B5EF4-FFF2-40B4-BE49-F238E27FC236}">
-                <a16:creationId xmlns:a16="http://schemas.microsoft.com/office/drawing/2014/main" id="{F039B280-D4F1-D5B7-9D62-C1DA10C605C9}"/>
-              </a:ext>
-            </a:extLst>
-          </p:cNvPr>
-          <p:cNvSpPr>
-            <a:spLocks noGrp="1"/>
-          </p:cNvSpPr>
-          <p:nvPr>
-            <p:ph type="body" sz="quarter" idx="17"/>
-          </p:nvPr>
-        </p:nvSpPr>
-        <p:spPr/>
-        <p:txBody>
-          <a:bodyPr/>
-          <a:lstStyle/>
-          <a:p>
-            <a:r>
-              <a:rPr lang="en-US" dirty="0"/>
-              <a:t>Tokens backed by securities</a:t>
-            </a:r>
-          </a:p>
-          <a:p>
-            <a:endParaRPr lang="en-US" dirty="0"/>
-          </a:p>
-        </p:txBody>
-      </p:sp>
-      <p:sp>
-        <p:nvSpPr>
-          <p:cNvPr id="10" name="Text Placeholder 9">
-            <a:extLst>
-              <a:ext uri="{FF2B5EF4-FFF2-40B4-BE49-F238E27FC236}">
-                <a16:creationId xmlns:a16="http://schemas.microsoft.com/office/drawing/2014/main" id="{6A9C835B-EE7B-2801-6842-7044F690144A}"/>
-              </a:ext>
-            </a:extLst>
-          </p:cNvPr>
-          <p:cNvSpPr>
-            <a:spLocks noGrp="1"/>
-          </p:cNvSpPr>
-          <p:nvPr>
-            <p:ph type="body" sz="quarter" idx="18"/>
-          </p:nvPr>
-        </p:nvSpPr>
-        <p:spPr/>
-        <p:txBody>
-          <a:bodyPr/>
-          <a:lstStyle/>
-          <a:p>
-            <a:r>
-              <a:rPr lang="en-US" dirty="0"/>
-              <a:t>NFT</a:t>
-            </a:r>
-          </a:p>
-        </p:txBody>
-      </p:sp>
-      <p:sp>
-        <p:nvSpPr>
-          <p:cNvPr id="11" name="Text Placeholder 10">
-            <a:extLst>
-              <a:ext uri="{FF2B5EF4-FFF2-40B4-BE49-F238E27FC236}">
-                <a16:creationId xmlns:a16="http://schemas.microsoft.com/office/drawing/2014/main" id="{429544CE-BE3D-F6DD-FADE-D85F729A9BCC}"/>
-              </a:ext>
-            </a:extLst>
-          </p:cNvPr>
-          <p:cNvSpPr>
-            <a:spLocks noGrp="1"/>
-          </p:cNvSpPr>
-          <p:nvPr>
-            <p:ph type="body" sz="quarter" idx="19"/>
-          </p:nvPr>
-        </p:nvSpPr>
-        <p:spPr/>
-        <p:txBody>
-          <a:bodyPr/>
-          <a:lstStyle/>
-          <a:p>
-            <a:r>
-              <a:rPr lang="en-US" dirty="0"/>
-              <a:t>Authenticates ownership of specific assets</a:t>
-            </a:r>
-          </a:p>
-          <a:p>
-            <a:endParaRPr lang="en-US" dirty="0"/>
-          </a:p>
-        </p:txBody>
-      </p:sp>
-      <p:sp>
-        <p:nvSpPr>
-          <p:cNvPr id="81" name="Text Placeholder 80">
-            <a:extLst>
-              <a:ext uri="{FF2B5EF4-FFF2-40B4-BE49-F238E27FC236}">
-                <a16:creationId xmlns:a16="http://schemas.microsoft.com/office/drawing/2014/main" id="{2AF0BD8F-E098-8282-AE8C-8BFAB5EBBFC2}"/>
-              </a:ext>
-            </a:extLst>
-          </p:cNvPr>
-          <p:cNvSpPr>
-            <a:spLocks noGrp="1"/>
-          </p:cNvSpPr>
-          <p:nvPr>
-            <p:ph type="body" sz="quarter" idx="20"/>
-          </p:nvPr>
-        </p:nvSpPr>
-        <p:spPr/>
-        <p:txBody>
-          <a:bodyPr/>
-          <a:lstStyle/>
-          <a:p>
-            <a:r>
-              <a:rPr lang="en-US" sz="2400" b="1" dirty="0">
-                <a:solidFill>
-                  <a:schemeClr val="accent3">
-                    <a:lumMod val="25000"/>
-                  </a:schemeClr>
-                </a:solidFill>
-                <a:latin typeface="Tw Cen MT" panose="020B0602020104020603" pitchFamily="34" charset="77"/>
-                <a:ea typeface="Source Sans Pro" panose="020B0503030403020204" pitchFamily="34" charset="0"/>
-              </a:rPr>
-              <a:t>Gaming</a:t>
-            </a:r>
-            <a:endParaRPr lang="en-US" dirty="0"/>
-          </a:p>
-        </p:txBody>
-      </p:sp>
-      <p:sp>
-        <p:nvSpPr>
-          <p:cNvPr id="2" name="Text Placeholder 1">
-            <a:extLst>
-              <a:ext uri="{FF2B5EF4-FFF2-40B4-BE49-F238E27FC236}">
-                <a16:creationId xmlns:a16="http://schemas.microsoft.com/office/drawing/2014/main" id="{D733E31E-F298-485B-42BF-303CC635241F}"/>
-              </a:ext>
-            </a:extLst>
-          </p:cNvPr>
-          <p:cNvSpPr>
-            <a:spLocks noGrp="1"/>
-          </p:cNvSpPr>
-          <p:nvPr>
-            <p:ph type="body" sz="quarter" idx="21"/>
-          </p:nvPr>
-        </p:nvSpPr>
-        <p:spPr/>
-        <p:txBody>
-          <a:bodyPr/>
-          <a:lstStyle/>
-          <a:p>
-            <a:r>
-              <a:rPr lang="en-US" dirty="0"/>
-              <a:t>Used as in-game currency and traded with real world value</a:t>
-            </a:r>
-          </a:p>
-          <a:p>
-            <a:endParaRPr lang="en-US" dirty="0"/>
-          </a:p>
-        </p:txBody>
-      </p:sp>
-    </p:spTree>
-    <p:extLst>
-      <p:ext uri="{BB962C8B-B14F-4D97-AF65-F5344CB8AC3E}">
-        <p14:creationId xmlns:p14="http://schemas.microsoft.com/office/powerpoint/2010/main" val="1430138192"/>
-      </p:ext>
-    </p:extLst>
-  </p:cSld>
-  <p:clrMapOvr>
-    <a:masterClrMapping/>
-  </p:clrMapOvr>
-</p:sld>
-</file>
-
 <file path=ppt/slides/slide9.xml><?xml version="1.0" encoding="utf-8"?>
 <p:sld xmlns:a="http://schemas.openxmlformats.org/drawingml/2006/main" xmlns:r="http://schemas.openxmlformats.org/officeDocument/2006/relationships" xmlns:p="http://schemas.openxmlformats.org/presentationml/2006/main">
   <p:cSld>
@@ -24391,10 +25021,10 @@
       </p:grpSpPr>
       <p:sp>
         <p:nvSpPr>
-          <p:cNvPr id="106" name="Title 105">
-            <a:extLst>
-              <a:ext uri="{FF2B5EF4-FFF2-40B4-BE49-F238E27FC236}">
-                <a16:creationId xmlns:a16="http://schemas.microsoft.com/office/drawing/2014/main" id="{734F8B63-0C1D-770B-CA9D-EE7ACF817C1F}"/>
+          <p:cNvPr id="69" name="Title 68">
+            <a:extLst>
+              <a:ext uri="{FF2B5EF4-FFF2-40B4-BE49-F238E27FC236}">
+                <a16:creationId xmlns:a16="http://schemas.microsoft.com/office/drawing/2014/main" id="{0B07383B-6310-56A6-B051-F4B962E11786}"/>
               </a:ext>
             </a:extLst>
           </p:cNvPr>
@@ -24412,17 +25042,17 @@
           <a:p>
             <a:r>
               <a:rPr lang="en-US" dirty="0"/>
-              <a:t>PORTFOLIO BUILDUP</a:t>
-            </a:r>
-          </a:p>
-        </p:txBody>
-      </p:sp>
-      <p:sp>
-        <p:nvSpPr>
-          <p:cNvPr id="139" name="Slide Number Placeholder 138">
-            <a:extLst>
-              <a:ext uri="{FF2B5EF4-FFF2-40B4-BE49-F238E27FC236}">
-                <a16:creationId xmlns:a16="http://schemas.microsoft.com/office/drawing/2014/main" id="{0C6CCCC3-BCC9-AE9B-C2AE-4D9986B5F8AE}"/>
+              <a:t>TYPES OF TOKENS</a:t>
+            </a:r>
+          </a:p>
+        </p:txBody>
+      </p:sp>
+      <p:sp>
+        <p:nvSpPr>
+          <p:cNvPr id="4" name="Text Placeholder 3">
+            <a:extLst>
+              <a:ext uri="{FF2B5EF4-FFF2-40B4-BE49-F238E27FC236}">
+                <a16:creationId xmlns:a16="http://schemas.microsoft.com/office/drawing/2014/main" id="{55DA2D8B-92F5-22B2-084C-934BCBC00DFD}"/>
               </a:ext>
             </a:extLst>
           </p:cNvPr>
@@ -24430,7 +25060,7 @@
             <a:spLocks noGrp="1"/>
           </p:cNvSpPr>
           <p:nvPr>
-            <p:ph type="sldNum" sz="quarter" idx="11"/>
+            <p:ph type="body" sz="quarter" idx="12"/>
           </p:nvPr>
         </p:nvSpPr>
         <p:spPr/>
@@ -24438,141 +25068,19 @@
           <a:bodyPr/>
           <a:lstStyle/>
           <a:p>
-            <a:fld id="{294A09A9-5501-47C1-A89A-A340965A2BE2}" type="slidenum">
-              <a:rPr lang="en-US" smtClean="0"/>
-              <a:pPr/>
-              <a:t>9</a:t>
-            </a:fld>
-            <a:endParaRPr lang="en-US" dirty="0"/>
-          </a:p>
-        </p:txBody>
-      </p:sp>
-      <p:pic>
-        <p:nvPicPr>
-          <p:cNvPr id="85" name="Picture Placeholder 84" descr="Continuous Improvement outline">
-            <a:extLst>
-              <a:ext uri="{FF2B5EF4-FFF2-40B4-BE49-F238E27FC236}">
-                <a16:creationId xmlns:a16="http://schemas.microsoft.com/office/drawing/2014/main" id="{D65F5CE9-1D9A-9BF0-5ADD-C4E2693DA4CB}"/>
-              </a:ext>
-            </a:extLst>
-          </p:cNvPr>
-          <p:cNvPicPr>
-            <a:picLocks noGrp="1" noChangeAspect="1"/>
-          </p:cNvPicPr>
-          <p:nvPr>
-            <p:ph type="pic" sz="quarter" idx="22"/>
-          </p:nvPr>
-        </p:nvPicPr>
-        <p:blipFill rotWithShape="1">
-          <a:blip r:embed="rId2"/>
-          <a:srcRect t="517" b="517"/>
-          <a:stretch/>
-        </p:blipFill>
-        <p:spPr>
-          <a:xfrm>
-            <a:off x="1583555" y="2980517"/>
-            <a:ext cx="713074" cy="713074"/>
-          </a:xfrm>
-        </p:spPr>
-      </p:pic>
-      <p:pic>
-        <p:nvPicPr>
-          <p:cNvPr id="86" name="Picture Placeholder 85" descr="Wallet outline">
-            <a:extLst>
-              <a:ext uri="{FF2B5EF4-FFF2-40B4-BE49-F238E27FC236}">
-                <a16:creationId xmlns:a16="http://schemas.microsoft.com/office/drawing/2014/main" id="{EDC60F06-D73E-F719-14FA-A6F1ECF09300}"/>
-              </a:ext>
-            </a:extLst>
-          </p:cNvPr>
-          <p:cNvPicPr>
-            <a:picLocks noGrp="1" noChangeAspect="1"/>
-          </p:cNvPicPr>
-          <p:nvPr>
-            <p:ph type="pic" sz="quarter" idx="23"/>
-          </p:nvPr>
-        </p:nvPicPr>
-        <p:blipFill rotWithShape="1">
-          <a:blip r:embed="rId3"/>
-          <a:srcRect t="128" b="128"/>
-          <a:stretch/>
-        </p:blipFill>
-        <p:spPr/>
-      </p:pic>
-      <p:pic>
-        <p:nvPicPr>
-          <p:cNvPr id="87" name="Picture Placeholder 86" descr="Piggy Bank outline">
-            <a:extLst>
-              <a:ext uri="{FF2B5EF4-FFF2-40B4-BE49-F238E27FC236}">
-                <a16:creationId xmlns:a16="http://schemas.microsoft.com/office/drawing/2014/main" id="{ED53247D-56A2-6AB9-6FF9-0313BD7DB9E8}"/>
-              </a:ext>
-            </a:extLst>
-          </p:cNvPr>
-          <p:cNvPicPr>
-            <a:picLocks noGrp="1" noChangeAspect="1"/>
-          </p:cNvPicPr>
-          <p:nvPr>
-            <p:ph type="pic" sz="quarter" idx="24"/>
-          </p:nvPr>
-        </p:nvPicPr>
-        <p:blipFill rotWithShape="1">
-          <a:blip r:embed="rId4"/>
-          <a:srcRect/>
-          <a:stretch/>
-        </p:blipFill>
-        <p:spPr/>
-      </p:pic>
-      <p:pic>
-        <p:nvPicPr>
-          <p:cNvPr id="88" name="Picture Placeholder 87" descr="Bitcoin outline">
-            <a:extLst>
-              <a:ext uri="{FF2B5EF4-FFF2-40B4-BE49-F238E27FC236}">
-                <a16:creationId xmlns:a16="http://schemas.microsoft.com/office/drawing/2014/main" id="{32BC0F61-A0C8-5BEF-A6E9-0E7ADE645FA6}"/>
-              </a:ext>
-            </a:extLst>
-          </p:cNvPr>
-          <p:cNvPicPr>
-            <a:picLocks noGrp="1" noChangeAspect="1"/>
-          </p:cNvPicPr>
-          <p:nvPr>
-            <p:ph type="pic" sz="quarter" idx="25"/>
-          </p:nvPr>
-        </p:nvPicPr>
-        <p:blipFill rotWithShape="1">
-          <a:blip r:embed="rId5"/>
-          <a:srcRect l="345" r="345"/>
-          <a:stretch/>
-        </p:blipFill>
-        <p:spPr/>
-      </p:pic>
-      <p:pic>
-        <p:nvPicPr>
-          <p:cNvPr id="90" name="Picture Placeholder 89" descr="Exponential Graph outline">
-            <a:extLst>
-              <a:ext uri="{FF2B5EF4-FFF2-40B4-BE49-F238E27FC236}">
-                <a16:creationId xmlns:a16="http://schemas.microsoft.com/office/drawing/2014/main" id="{86472D92-CAA9-AF6F-549B-2EE170C70DD7}"/>
-              </a:ext>
-            </a:extLst>
-          </p:cNvPr>
-          <p:cNvPicPr>
-            <a:picLocks noGrp="1" noChangeAspect="1"/>
-          </p:cNvPicPr>
-          <p:nvPr>
-            <p:ph type="pic" sz="quarter" idx="26"/>
-          </p:nvPr>
-        </p:nvPicPr>
-        <p:blipFill rotWithShape="1">
-          <a:blip r:embed="rId6"/>
-          <a:srcRect/>
-          <a:stretch/>
-        </p:blipFill>
-        <p:spPr/>
-      </p:pic>
-      <p:sp>
-        <p:nvSpPr>
-          <p:cNvPr id="3" name="Text Placeholder 2">
-            <a:extLst>
-              <a:ext uri="{FF2B5EF4-FFF2-40B4-BE49-F238E27FC236}">
-                <a16:creationId xmlns:a16="http://schemas.microsoft.com/office/drawing/2014/main" id="{0CF4EECB-47E7-26A0-F3A1-ACAE7AEE5741}"/>
+            <a:r>
+              <a:rPr lang="en-US" dirty="0"/>
+              <a:t>Payment</a:t>
+            </a:r>
+          </a:p>
+        </p:txBody>
+      </p:sp>
+      <p:sp>
+        <p:nvSpPr>
+          <p:cNvPr id="5" name="Text Placeholder 4">
+            <a:extLst>
+              <a:ext uri="{FF2B5EF4-FFF2-40B4-BE49-F238E27FC236}">
+                <a16:creationId xmlns:a16="http://schemas.microsoft.com/office/drawing/2014/main" id="{8B004B5D-BB88-E446-FDC1-8BE748EFE8B6}"/>
               </a:ext>
             </a:extLst>
           </p:cNvPr>
@@ -24580,7 +25088,7 @@
             <a:spLocks noGrp="1"/>
           </p:cNvSpPr>
           <p:nvPr>
-            <p:ph type="body" sz="quarter" idx="12"/>
+            <p:ph type="body" sz="quarter" idx="13"/>
           </p:nvPr>
         </p:nvSpPr>
         <p:spPr/>
@@ -24590,17 +25098,20 @@
           <a:p>
             <a:r>
               <a:rPr lang="en-US" dirty="0"/>
-              <a:t>Step 1</a:t>
-            </a:r>
-          </a:p>
-        </p:txBody>
-      </p:sp>
-      <p:sp>
-        <p:nvSpPr>
-          <p:cNvPr id="133" name="Text Placeholder 132">
-            <a:extLst>
-              <a:ext uri="{FF2B5EF4-FFF2-40B4-BE49-F238E27FC236}">
-                <a16:creationId xmlns:a16="http://schemas.microsoft.com/office/drawing/2014/main" id="{0D7DF893-CDC1-A213-86BF-C9C73F979CC5}"/>
+              <a:t>Used to complete transactions anywhere crypto is accepted</a:t>
+            </a:r>
+          </a:p>
+          <a:p>
+            <a:endParaRPr lang="en-US" dirty="0"/>
+          </a:p>
+        </p:txBody>
+      </p:sp>
+      <p:sp>
+        <p:nvSpPr>
+          <p:cNvPr id="6" name="Text Placeholder 5">
+            <a:extLst>
+              <a:ext uri="{FF2B5EF4-FFF2-40B4-BE49-F238E27FC236}">
+                <a16:creationId xmlns:a16="http://schemas.microsoft.com/office/drawing/2014/main" id="{98AC0C5B-16A7-E317-7222-BF9FA26C0DC6}"/>
               </a:ext>
             </a:extLst>
           </p:cNvPr>
@@ -24608,7 +25119,7 @@
             <a:spLocks noGrp="1"/>
           </p:cNvSpPr>
           <p:nvPr>
-            <p:ph type="body" sz="quarter" idx="28"/>
+            <p:ph type="body" sz="quarter" idx="14"/>
           </p:nvPr>
         </p:nvSpPr>
         <p:spPr/>
@@ -24616,16 +25127,19 @@
           <a:bodyPr/>
           <a:lstStyle/>
           <a:p>
-            <a:endParaRPr lang="en-US" dirty="0"/>
-          </a:p>
-        </p:txBody>
-      </p:sp>
-      <p:sp>
-        <p:nvSpPr>
-          <p:cNvPr id="5" name="Text Placeholder 4">
-            <a:extLst>
-              <a:ext uri="{FF2B5EF4-FFF2-40B4-BE49-F238E27FC236}">
-                <a16:creationId xmlns:a16="http://schemas.microsoft.com/office/drawing/2014/main" id="{AC2F0535-53EA-30FB-770D-0C92BEEF3F6D}"/>
+            <a:r>
+              <a:rPr lang="en-US" dirty="0"/>
+              <a:t>Utility</a:t>
+            </a:r>
+          </a:p>
+        </p:txBody>
+      </p:sp>
+      <p:sp>
+        <p:nvSpPr>
+          <p:cNvPr id="7" name="Text Placeholder 6">
+            <a:extLst>
+              <a:ext uri="{FF2B5EF4-FFF2-40B4-BE49-F238E27FC236}">
+                <a16:creationId xmlns:a16="http://schemas.microsoft.com/office/drawing/2014/main" id="{77D9B67F-AD02-4BA5-209B-C91070303A72}"/>
               </a:ext>
             </a:extLst>
           </p:cNvPr>
@@ -24633,7 +25147,7 @@
             <a:spLocks noGrp="1"/>
           </p:cNvSpPr>
           <p:nvPr>
-            <p:ph type="body" sz="quarter" idx="14"/>
+            <p:ph type="body" sz="quarter" idx="15"/>
           </p:nvPr>
         </p:nvSpPr>
         <p:spPr/>
@@ -24641,20 +25155,22 @@
           <a:bodyPr/>
           <a:lstStyle/>
           <a:p>
-            <a:pPr lvl="0"/>
             <a:r>
               <a:rPr lang="en-US" dirty="0"/>
-              <a:t>Step 2</a:t>
-            </a:r>
-          </a:p>
-        </p:txBody>
-      </p:sp>
-      <p:sp>
-        <p:nvSpPr>
-          <p:cNvPr id="134" name="Text Placeholder 133">
-            <a:extLst>
-              <a:ext uri="{FF2B5EF4-FFF2-40B4-BE49-F238E27FC236}">
-                <a16:creationId xmlns:a16="http://schemas.microsoft.com/office/drawing/2014/main" id="{9CE100CE-4574-F901-234D-B9BEED642B9B}"/>
+              <a:t>These tokens have a specific use within a blockchain</a:t>
+            </a:r>
+          </a:p>
+          <a:p>
+            <a:endParaRPr lang="en-US" dirty="0"/>
+          </a:p>
+        </p:txBody>
+      </p:sp>
+      <p:sp>
+        <p:nvSpPr>
+          <p:cNvPr id="8" name="Text Placeholder 7">
+            <a:extLst>
+              <a:ext uri="{FF2B5EF4-FFF2-40B4-BE49-F238E27FC236}">
+                <a16:creationId xmlns:a16="http://schemas.microsoft.com/office/drawing/2014/main" id="{6269FBD2-F371-6F7E-1D42-95EFADFA10DD}"/>
               </a:ext>
             </a:extLst>
           </p:cNvPr>
@@ -24662,7 +25178,7 @@
             <a:spLocks noGrp="1"/>
           </p:cNvSpPr>
           <p:nvPr>
-            <p:ph type="body" sz="quarter" idx="29"/>
+            <p:ph type="body" sz="quarter" idx="16"/>
           </p:nvPr>
         </p:nvSpPr>
         <p:spPr/>
@@ -24670,16 +25186,19 @@
           <a:bodyPr/>
           <a:lstStyle/>
           <a:p>
-            <a:endParaRPr lang="en-US" dirty="0"/>
-          </a:p>
-        </p:txBody>
-      </p:sp>
-      <p:sp>
-        <p:nvSpPr>
-          <p:cNvPr id="7" name="Text Placeholder 6">
-            <a:extLst>
-              <a:ext uri="{FF2B5EF4-FFF2-40B4-BE49-F238E27FC236}">
-                <a16:creationId xmlns:a16="http://schemas.microsoft.com/office/drawing/2014/main" id="{31511481-29C6-275B-963E-B5AF2E87ADA2}"/>
+            <a:r>
+              <a:rPr lang="en-US" dirty="0"/>
+              <a:t>Security</a:t>
+            </a:r>
+          </a:p>
+        </p:txBody>
+      </p:sp>
+      <p:sp>
+        <p:nvSpPr>
+          <p:cNvPr id="9" name="Text Placeholder 8">
+            <a:extLst>
+              <a:ext uri="{FF2B5EF4-FFF2-40B4-BE49-F238E27FC236}">
+                <a16:creationId xmlns:a16="http://schemas.microsoft.com/office/drawing/2014/main" id="{F039B280-D4F1-D5B7-9D62-C1DA10C605C9}"/>
               </a:ext>
             </a:extLst>
           </p:cNvPr>
@@ -24687,7 +25206,7 @@
             <a:spLocks noGrp="1"/>
           </p:cNvSpPr>
           <p:nvPr>
-            <p:ph type="body" sz="quarter" idx="16"/>
+            <p:ph type="body" sz="quarter" idx="17"/>
           </p:nvPr>
         </p:nvSpPr>
         <p:spPr/>
@@ -24695,20 +25214,22 @@
           <a:bodyPr/>
           <a:lstStyle/>
           <a:p>
-            <a:pPr lvl="0"/>
             <a:r>
               <a:rPr lang="en-US" dirty="0"/>
-              <a:t>Step 3</a:t>
-            </a:r>
-          </a:p>
-        </p:txBody>
-      </p:sp>
-      <p:sp>
-        <p:nvSpPr>
-          <p:cNvPr id="135" name="Text Placeholder 134">
-            <a:extLst>
-              <a:ext uri="{FF2B5EF4-FFF2-40B4-BE49-F238E27FC236}">
-                <a16:creationId xmlns:a16="http://schemas.microsoft.com/office/drawing/2014/main" id="{288EBDBE-0ABC-82CE-4598-09F65E315AD7}"/>
+              <a:t>Tokens backed by securities</a:t>
+            </a:r>
+          </a:p>
+          <a:p>
+            <a:endParaRPr lang="en-US" dirty="0"/>
+          </a:p>
+        </p:txBody>
+      </p:sp>
+      <p:sp>
+        <p:nvSpPr>
+          <p:cNvPr id="10" name="Text Placeholder 9">
+            <a:extLst>
+              <a:ext uri="{FF2B5EF4-FFF2-40B4-BE49-F238E27FC236}">
+                <a16:creationId xmlns:a16="http://schemas.microsoft.com/office/drawing/2014/main" id="{6A9C835B-EE7B-2801-6842-7044F690144A}"/>
               </a:ext>
             </a:extLst>
           </p:cNvPr>
@@ -24716,7 +25237,7 @@
             <a:spLocks noGrp="1"/>
           </p:cNvSpPr>
           <p:nvPr>
-            <p:ph type="body" sz="quarter" idx="30"/>
+            <p:ph type="body" sz="quarter" idx="18"/>
           </p:nvPr>
         </p:nvSpPr>
         <p:spPr/>
@@ -24724,16 +25245,19 @@
           <a:bodyPr/>
           <a:lstStyle/>
           <a:p>
-            <a:endParaRPr lang="en-US" dirty="0"/>
-          </a:p>
-        </p:txBody>
-      </p:sp>
-      <p:sp>
-        <p:nvSpPr>
-          <p:cNvPr id="9" name="Text Placeholder 8">
-            <a:extLst>
-              <a:ext uri="{FF2B5EF4-FFF2-40B4-BE49-F238E27FC236}">
-                <a16:creationId xmlns:a16="http://schemas.microsoft.com/office/drawing/2014/main" id="{2F32973A-CF94-1C2B-BB12-B563173CC79A}"/>
+            <a:r>
+              <a:rPr lang="en-US" dirty="0"/>
+              <a:t>NFT</a:t>
+            </a:r>
+          </a:p>
+        </p:txBody>
+      </p:sp>
+      <p:sp>
+        <p:nvSpPr>
+          <p:cNvPr id="11" name="Text Placeholder 10">
+            <a:extLst>
+              <a:ext uri="{FF2B5EF4-FFF2-40B4-BE49-F238E27FC236}">
+                <a16:creationId xmlns:a16="http://schemas.microsoft.com/office/drawing/2014/main" id="{429544CE-BE3D-F6DD-FADE-D85F729A9BCC}"/>
               </a:ext>
             </a:extLst>
           </p:cNvPr>
@@ -24741,7 +25265,7 @@
             <a:spLocks noGrp="1"/>
           </p:cNvSpPr>
           <p:nvPr>
-            <p:ph type="body" sz="quarter" idx="18"/>
+            <p:ph type="body" sz="quarter" idx="19"/>
           </p:nvPr>
         </p:nvSpPr>
         <p:spPr/>
@@ -24749,20 +25273,22 @@
           <a:bodyPr/>
           <a:lstStyle/>
           <a:p>
-            <a:pPr lvl="0"/>
             <a:r>
               <a:rPr lang="en-US" dirty="0"/>
-              <a:t>Step 4</a:t>
-            </a:r>
-          </a:p>
-        </p:txBody>
-      </p:sp>
-      <p:sp>
-        <p:nvSpPr>
-          <p:cNvPr id="136" name="Text Placeholder 135">
-            <a:extLst>
-              <a:ext uri="{FF2B5EF4-FFF2-40B4-BE49-F238E27FC236}">
-                <a16:creationId xmlns:a16="http://schemas.microsoft.com/office/drawing/2014/main" id="{14F6CD04-2A18-A6BD-AAB9-1D30D1563399}"/>
+              <a:t>Authenticates ownership of specific assets</a:t>
+            </a:r>
+          </a:p>
+          <a:p>
+            <a:endParaRPr lang="en-US" dirty="0"/>
+          </a:p>
+        </p:txBody>
+      </p:sp>
+      <p:sp>
+        <p:nvSpPr>
+          <p:cNvPr id="81" name="Text Placeholder 80">
+            <a:extLst>
+              <a:ext uri="{FF2B5EF4-FFF2-40B4-BE49-F238E27FC236}">
+                <a16:creationId xmlns:a16="http://schemas.microsoft.com/office/drawing/2014/main" id="{2AF0BD8F-E098-8282-AE8C-8BFAB5EBBFC2}"/>
               </a:ext>
             </a:extLst>
           </p:cNvPr>
@@ -24770,7 +25296,7 @@
             <a:spLocks noGrp="1"/>
           </p:cNvSpPr>
           <p:nvPr>
-            <p:ph type="body" sz="quarter" idx="31"/>
+            <p:ph type="body" sz="quarter" idx="20"/>
           </p:nvPr>
         </p:nvSpPr>
         <p:spPr/>
@@ -24778,16 +25304,28 @@
           <a:bodyPr/>
           <a:lstStyle/>
           <a:p>
+            <a:r>
+              <a:rPr lang="en-US" sz="2400" b="1" dirty="0">
+                <a:solidFill>
+                  <a:schemeClr val="accent3">
+                    <a:lumMod val="25000"/>
+                  </a:schemeClr>
+                </a:solidFill>
+                <a:latin typeface="Tw Cen MT" panose="020B0602020104020603" pitchFamily="34" charset="77"/>
+                <a:ea typeface="Source Sans Pro" panose="020B0503030403020204" pitchFamily="34" charset="0"/>
+              </a:rPr>
+              <a:t>Gaming</a:t>
+            </a:r>
             <a:endParaRPr lang="en-US" dirty="0"/>
           </a:p>
         </p:txBody>
       </p:sp>
       <p:sp>
         <p:nvSpPr>
-          <p:cNvPr id="11" name="Text Placeholder 10">
-            <a:extLst>
-              <a:ext uri="{FF2B5EF4-FFF2-40B4-BE49-F238E27FC236}">
-                <a16:creationId xmlns:a16="http://schemas.microsoft.com/office/drawing/2014/main" id="{CE7AA813-84F0-DB50-F6B6-A29A94662DAD}"/>
+          <p:cNvPr id="2" name="Text Placeholder 1">
+            <a:extLst>
+              <a:ext uri="{FF2B5EF4-FFF2-40B4-BE49-F238E27FC236}">
+                <a16:creationId xmlns:a16="http://schemas.microsoft.com/office/drawing/2014/main" id="{D733E31E-F298-485B-42BF-303CC635241F}"/>
               </a:ext>
             </a:extLst>
           </p:cNvPr>
@@ -24795,7 +25333,7 @@
             <a:spLocks noGrp="1"/>
           </p:cNvSpPr>
           <p:nvPr>
-            <p:ph type="body" sz="quarter" idx="20"/>
+            <p:ph type="body" sz="quarter" idx="21"/>
           </p:nvPr>
         </p:nvSpPr>
         <p:spPr/>
@@ -24803,217 +25341,12 @@
           <a:bodyPr/>
           <a:lstStyle/>
           <a:p>
-            <a:pPr lvl="0"/>
             <a:r>
               <a:rPr lang="en-US" dirty="0"/>
-              <a:t>Step 5</a:t>
-            </a:r>
-          </a:p>
-        </p:txBody>
-      </p:sp>
-      <p:sp>
-        <p:nvSpPr>
-          <p:cNvPr id="137" name="Text Placeholder 136">
-            <a:extLst>
-              <a:ext uri="{FF2B5EF4-FFF2-40B4-BE49-F238E27FC236}">
-                <a16:creationId xmlns:a16="http://schemas.microsoft.com/office/drawing/2014/main" id="{C171CBDB-4593-F4D1-30E9-A47F4C7CADAF}"/>
-              </a:ext>
-            </a:extLst>
-          </p:cNvPr>
-          <p:cNvSpPr>
-            <a:spLocks noGrp="1"/>
-          </p:cNvSpPr>
-          <p:nvPr>
-            <p:ph type="body" sz="quarter" idx="32"/>
-          </p:nvPr>
-        </p:nvSpPr>
-        <p:spPr/>
-        <p:txBody>
-          <a:bodyPr/>
-          <a:lstStyle/>
-          <a:p>
-            <a:endParaRPr lang="en-US" dirty="0"/>
-          </a:p>
-        </p:txBody>
-      </p:sp>
-      <p:sp>
-        <p:nvSpPr>
-          <p:cNvPr id="69" name="Text Placeholder 68">
-            <a:extLst>
-              <a:ext uri="{FF2B5EF4-FFF2-40B4-BE49-F238E27FC236}">
-                <a16:creationId xmlns:a16="http://schemas.microsoft.com/office/drawing/2014/main" id="{4BBDF45D-9B32-0154-7602-2C43DAF6C0A6}"/>
-              </a:ext>
-            </a:extLst>
-          </p:cNvPr>
-          <p:cNvSpPr>
-            <a:spLocks noGrp="1"/>
-          </p:cNvSpPr>
-          <p:nvPr>
-            <p:ph type="body" sz="quarter" idx="13"/>
-          </p:nvPr>
-        </p:nvSpPr>
-        <p:spPr/>
-        <p:txBody>
-          <a:bodyPr/>
-          <a:lstStyle/>
-          <a:p>
-            <a:r>
-              <a:rPr lang="en-US" dirty="0"/>
-              <a:t>Choose a cryptocurrency exchange</a:t>
-            </a:r>
-          </a:p>
-          <a:p>
-            <a:endParaRPr lang="en-US" dirty="0"/>
-          </a:p>
-        </p:txBody>
-      </p:sp>
-      <p:sp>
-        <p:nvSpPr>
-          <p:cNvPr id="70" name="Text Placeholder 69">
-            <a:extLst>
-              <a:ext uri="{FF2B5EF4-FFF2-40B4-BE49-F238E27FC236}">
-                <a16:creationId xmlns:a16="http://schemas.microsoft.com/office/drawing/2014/main" id="{38FF6C9F-C7C5-37D5-4C61-BA14A636B732}"/>
-              </a:ext>
-            </a:extLst>
-          </p:cNvPr>
-          <p:cNvSpPr>
-            <a:spLocks noGrp="1"/>
-          </p:cNvSpPr>
-          <p:nvPr>
-            <p:ph type="body" sz="quarter" idx="15"/>
-          </p:nvPr>
-        </p:nvSpPr>
-        <p:spPr/>
-        <p:txBody>
-          <a:bodyPr/>
-          <a:lstStyle/>
-          <a:p>
-            <a:r>
-              <a:rPr lang="en-US" dirty="0"/>
-              <a:t>Purchase preferred coins &amp; create "wallet"</a:t>
-            </a:r>
-          </a:p>
-          <a:p>
-            <a:endParaRPr lang="en-US" dirty="0"/>
-          </a:p>
-        </p:txBody>
-      </p:sp>
-      <p:sp>
-        <p:nvSpPr>
-          <p:cNvPr id="71" name="Text Placeholder 70">
-            <a:extLst>
-              <a:ext uri="{FF2B5EF4-FFF2-40B4-BE49-F238E27FC236}">
-                <a16:creationId xmlns:a16="http://schemas.microsoft.com/office/drawing/2014/main" id="{5973BD56-1612-983E-EA67-F4039B062085}"/>
-              </a:ext>
-            </a:extLst>
-          </p:cNvPr>
-          <p:cNvSpPr>
-            <a:spLocks noGrp="1"/>
-          </p:cNvSpPr>
-          <p:nvPr>
-            <p:ph type="body" sz="quarter" idx="17"/>
-          </p:nvPr>
-        </p:nvSpPr>
-        <p:spPr/>
-        <p:txBody>
-          <a:bodyPr/>
-          <a:lstStyle/>
-          <a:p>
-            <a:r>
-              <a:rPr lang="en-US" dirty="0"/>
-              <a:t>Research investment and trading options</a:t>
-            </a:r>
-          </a:p>
-          <a:p>
-            <a:endParaRPr lang="en-US" dirty="0"/>
-          </a:p>
-        </p:txBody>
-      </p:sp>
-      <p:sp>
-        <p:nvSpPr>
-          <p:cNvPr id="72" name="Text Placeholder 71">
-            <a:extLst>
-              <a:ext uri="{FF2B5EF4-FFF2-40B4-BE49-F238E27FC236}">
-                <a16:creationId xmlns:a16="http://schemas.microsoft.com/office/drawing/2014/main" id="{840CFADA-CAD6-2A04-5B15-5DB4DD6A84E0}"/>
-              </a:ext>
-            </a:extLst>
-          </p:cNvPr>
-          <p:cNvSpPr>
-            <a:spLocks noGrp="1"/>
-          </p:cNvSpPr>
-          <p:nvPr>
-            <p:ph type="body" sz="quarter" idx="19"/>
-          </p:nvPr>
-        </p:nvSpPr>
-        <p:spPr/>
-        <p:txBody>
-          <a:bodyPr/>
-          <a:lstStyle/>
-          <a:p>
-            <a:r>
-              <a:rPr lang="en-US" dirty="0"/>
-              <a:t>Stake preferred coins in chosen company</a:t>
-            </a:r>
-          </a:p>
-          <a:p>
-            <a:endParaRPr lang="en-US" dirty="0"/>
-          </a:p>
-        </p:txBody>
-      </p:sp>
-      <p:sp>
-        <p:nvSpPr>
-          <p:cNvPr id="73" name="Text Placeholder 72">
-            <a:extLst>
-              <a:ext uri="{FF2B5EF4-FFF2-40B4-BE49-F238E27FC236}">
-                <a16:creationId xmlns:a16="http://schemas.microsoft.com/office/drawing/2014/main" id="{DB3347BB-2913-A230-8362-2B778394E7CE}"/>
-              </a:ext>
-            </a:extLst>
-          </p:cNvPr>
-          <p:cNvSpPr>
-            <a:spLocks noGrp="1"/>
-          </p:cNvSpPr>
-          <p:nvPr>
-            <p:ph type="body" sz="quarter" idx="21"/>
-          </p:nvPr>
-        </p:nvSpPr>
-        <p:spPr/>
-        <p:txBody>
-          <a:bodyPr/>
-          <a:lstStyle/>
-          <a:p>
-            <a:pPr lvl="0"/>
-            <a:r>
-              <a:rPr lang="en-US" dirty="0"/>
-              <a:t>Set exponential growth goals</a:t>
-            </a:r>
-          </a:p>
-        </p:txBody>
-      </p:sp>
-      <p:sp>
-        <p:nvSpPr>
-          <p:cNvPr id="138" name="Footer Placeholder 137">
-            <a:extLst>
-              <a:ext uri="{FF2B5EF4-FFF2-40B4-BE49-F238E27FC236}">
-                <a16:creationId xmlns:a16="http://schemas.microsoft.com/office/drawing/2014/main" id="{8BC11123-4B26-8100-E85C-F218651524A5}"/>
-              </a:ext>
-            </a:extLst>
-          </p:cNvPr>
-          <p:cNvSpPr>
-            <a:spLocks noGrp="1"/>
-          </p:cNvSpPr>
-          <p:nvPr>
-            <p:ph type="ftr" sz="quarter" idx="10"/>
-          </p:nvPr>
-        </p:nvSpPr>
-        <p:spPr/>
-        <p:txBody>
-          <a:bodyPr/>
-          <a:lstStyle/>
-          <a:p>
-            <a:r>
-              <a:rPr lang="en-US"/>
-              <a:t>Crypto: investing &amp; trading</a:t>
-            </a:r>
+              <a:t>Used as in-game currency and traded with real world value</a:t>
+            </a:r>
+          </a:p>
+          <a:p>
             <a:endParaRPr lang="en-US" dirty="0"/>
           </a:p>
         </p:txBody>
@@ -25021,7 +25354,7 @@
     </p:spTree>
     <p:extLst>
       <p:ext uri="{BB962C8B-B14F-4D97-AF65-F5344CB8AC3E}">
-        <p14:creationId xmlns:p14="http://schemas.microsoft.com/office/powerpoint/2010/main" val="3510130985"/>
+        <p14:creationId xmlns:p14="http://schemas.microsoft.com/office/powerpoint/2010/main" val="1430138192"/>
       </p:ext>
     </p:extLst>
   </p:cSld>
@@ -25528,6 +25861,35 @@
 </file>
 
 <file path=customXml/item1.xml><?xml version="1.0" encoding="utf-8"?>
+<?mso-contentType ?>
+<FormTemplates xmlns="http://schemas.microsoft.com/sharepoint/v3/contenttype/forms">
+  <Display>DocumentLibraryForm</Display>
+  <Edit>DocumentLibraryForm</Edit>
+  <New>DocumentLibraryForm</New>
+</FormTemplates>
+</file>
+
+<file path=customXml/item2.xml><?xml version="1.0" encoding="utf-8"?>
+<p:properties xmlns:p="http://schemas.microsoft.com/office/2006/metadata/properties" xmlns:xsi="http://www.w3.org/2001/XMLSchema-instance" xmlns:pc="http://schemas.microsoft.com/office/infopath/2007/PartnerControls">
+  <documentManagement>
+    <_ip_UnifiedCompliancePolicyUIAction xmlns="http://schemas.microsoft.com/sharepoint/v3" xsi:nil="true"/>
+    <Image xmlns="71af3243-3dd4-4a8d-8c0d-dd76da1f02a5">
+      <Url xsi:nil="true"/>
+      <Description xsi:nil="true"/>
+    </Image>
+    <Status xmlns="71af3243-3dd4-4a8d-8c0d-dd76da1f02a5">Not started</Status>
+    <Background xmlns="71af3243-3dd4-4a8d-8c0d-dd76da1f02a5">false</Background>
+    <_ip_UnifiedCompliancePolicyProperties xmlns="http://schemas.microsoft.com/sharepoint/v3" xsi:nil="true"/>
+    <ImageTagsTaxHTField xmlns="71af3243-3dd4-4a8d-8c0d-dd76da1f02a5">
+      <Terms xmlns="http://schemas.microsoft.com/office/infopath/2007/PartnerControls"/>
+    </ImageTagsTaxHTField>
+    <TaxCatchAll xmlns="230e9df3-be65-4c73-a93b-d1236ebd677e" xsi:nil="true"/>
+    <MediaServiceKeyPoints xmlns="71af3243-3dd4-4a8d-8c0d-dd76da1f02a5" xsi:nil="true"/>
+  </documentManagement>
+</p:properties>
+</file>
+
+<file path=customXml/item3.xml><?xml version="1.0" encoding="utf-8"?>
 <ct:contentTypeSchema xmlns:ct="http://schemas.microsoft.com/office/2006/metadata/contentType" xmlns:ma="http://schemas.microsoft.com/office/2006/metadata/properties/metaAttributes" ct:_="" ma:_="" ma:contentTypeName="Document" ma:contentTypeID="0x01010079F111ED35F8CC479449609E8A0923A6" ma:contentTypeVersion="25" ma:contentTypeDescription="Create a new document." ma:contentTypeScope="" ma:versionID="e02306daf00165b375dc6a58966960be">
   <xsd:schema xmlns:xsd="http://www.w3.org/2001/XMLSchema" xmlns:xs="http://www.w3.org/2001/XMLSchema" xmlns:p="http://schemas.microsoft.com/office/2006/metadata/properties" xmlns:ns1="http://schemas.microsoft.com/sharepoint/v3" xmlns:ns2="71af3243-3dd4-4a8d-8c0d-dd76da1f02a5" xmlns:ns3="16c05727-aa75-4e4a-9b5f-8a80a1165891" xmlns:ns4="230e9df3-be65-4c73-a93b-d1236ebd677e" targetNamespace="http://schemas.microsoft.com/office/2006/metadata/properties" ma:root="true" ma:fieldsID="df88fb76bf5f555224557953949c1ec9" ns1:_="" ns2:_="" ns3:_="" ns4:_="">
     <xsd:import namespace="http://schemas.microsoft.com/sharepoint/v3"/>
@@ -25821,36 +26183,27 @@
 </ct:contentTypeSchema>
 </file>
 
-<file path=customXml/item2.xml><?xml version="1.0" encoding="utf-8"?>
-<p:properties xmlns:p="http://schemas.microsoft.com/office/2006/metadata/properties" xmlns:xsi="http://www.w3.org/2001/XMLSchema-instance" xmlns:pc="http://schemas.microsoft.com/office/infopath/2007/PartnerControls">
-  <documentManagement>
-    <_ip_UnifiedCompliancePolicyUIAction xmlns="http://schemas.microsoft.com/sharepoint/v3" xsi:nil="true"/>
-    <Image xmlns="71af3243-3dd4-4a8d-8c0d-dd76da1f02a5">
-      <Url xsi:nil="true"/>
-      <Description xsi:nil="true"/>
-    </Image>
-    <Status xmlns="71af3243-3dd4-4a8d-8c0d-dd76da1f02a5">Not started</Status>
-    <Background xmlns="71af3243-3dd4-4a8d-8c0d-dd76da1f02a5">false</Background>
-    <_ip_UnifiedCompliancePolicyProperties xmlns="http://schemas.microsoft.com/sharepoint/v3" xsi:nil="true"/>
-    <ImageTagsTaxHTField xmlns="71af3243-3dd4-4a8d-8c0d-dd76da1f02a5">
-      <Terms xmlns="http://schemas.microsoft.com/office/infopath/2007/PartnerControls"/>
-    </ImageTagsTaxHTField>
-    <TaxCatchAll xmlns="230e9df3-be65-4c73-a93b-d1236ebd677e" xsi:nil="true"/>
-    <MediaServiceKeyPoints xmlns="71af3243-3dd4-4a8d-8c0d-dd76da1f02a5" xsi:nil="true"/>
-  </documentManagement>
-</p:properties>
+<file path=customXml/itemProps1.xml><?xml version="1.0" encoding="utf-8"?>
+<ds:datastoreItem xmlns:ds="http://schemas.openxmlformats.org/officeDocument/2006/customXml" ds:itemID="{4F1F1912-3146-44AF-A389-9E8B77BB3688}">
+  <ds:schemaRefs>
+    <ds:schemaRef ds:uri="http://schemas.microsoft.com/sharepoint/v3/contenttype/forms"/>
+  </ds:schemaRefs>
+</ds:datastoreItem>
 </file>
 
-<file path=customXml/item3.xml><?xml version="1.0" encoding="utf-8"?>
-<?mso-contentType ?>
-<FormTemplates xmlns="http://schemas.microsoft.com/sharepoint/v3/contenttype/forms">
-  <Display>DocumentLibraryForm</Display>
-  <Edit>DocumentLibraryForm</Edit>
-  <New>DocumentLibraryForm</New>
-</FormTemplates>
+<file path=customXml/itemProps2.xml><?xml version="1.0" encoding="utf-8"?>
+<ds:datastoreItem xmlns:ds="http://schemas.openxmlformats.org/officeDocument/2006/customXml" ds:itemID="{F8B8ECF1-2A9D-464C-AFE8-2B3295D0BF97}">
+  <ds:schemaRefs>
+    <ds:schemaRef ds:uri="http://schemas.microsoft.com/office/2006/metadata/properties"/>
+    <ds:schemaRef ds:uri="http://schemas.microsoft.com/office/infopath/2007/PartnerControls"/>
+    <ds:schemaRef ds:uri="http://schemas.microsoft.com/sharepoint/v3"/>
+    <ds:schemaRef ds:uri="71af3243-3dd4-4a8d-8c0d-dd76da1f02a5"/>
+    <ds:schemaRef ds:uri="230e9df3-be65-4c73-a93b-d1236ebd677e"/>
+  </ds:schemaRefs>
+</ds:datastoreItem>
 </file>
 
-<file path=customXml/itemProps1.xml><?xml version="1.0" encoding="utf-8"?>
+<file path=customXml/itemProps3.xml><?xml version="1.0" encoding="utf-8"?>
 <ds:datastoreItem xmlns:ds="http://schemas.openxmlformats.org/officeDocument/2006/customXml" ds:itemID="{176493A3-2B83-4E58-86AD-56A2F2A20F12}">
   <ds:schemaRefs>
     <ds:schemaRef ds:uri="http://schemas.microsoft.com/office/2006/metadata/contentType"/>
@@ -25871,26 +26224,6 @@
 </ds:datastoreItem>
 </file>
 
-<file path=customXml/itemProps2.xml><?xml version="1.0" encoding="utf-8"?>
-<ds:datastoreItem xmlns:ds="http://schemas.openxmlformats.org/officeDocument/2006/customXml" ds:itemID="{F8B8ECF1-2A9D-464C-AFE8-2B3295D0BF97}">
-  <ds:schemaRefs>
-    <ds:schemaRef ds:uri="http://schemas.microsoft.com/office/2006/metadata/properties"/>
-    <ds:schemaRef ds:uri="http://schemas.microsoft.com/office/infopath/2007/PartnerControls"/>
-    <ds:schemaRef ds:uri="http://schemas.microsoft.com/sharepoint/v3"/>
-    <ds:schemaRef ds:uri="71af3243-3dd4-4a8d-8c0d-dd76da1f02a5"/>
-    <ds:schemaRef ds:uri="230e9df3-be65-4c73-a93b-d1236ebd677e"/>
-  </ds:schemaRefs>
-</ds:datastoreItem>
-</file>
-
-<file path=customXml/itemProps3.xml><?xml version="1.0" encoding="utf-8"?>
-<ds:datastoreItem xmlns:ds="http://schemas.openxmlformats.org/officeDocument/2006/customXml" ds:itemID="{4F1F1912-3146-44AF-A389-9E8B77BB3688}">
-  <ds:schemaRefs>
-    <ds:schemaRef ds:uri="http://schemas.microsoft.com/sharepoint/v3/contenttype/forms"/>
-  </ds:schemaRefs>
-</ds:datastoreItem>
-</file>
-
 <file path=docMetadata/LabelInfo.xml><?xml version="1.0" encoding="utf-8"?>
 <clbl:labelList xmlns:clbl="http://schemas.microsoft.com/office/2020/mipLabelMetadata"/>
 </file>
</xml_diff>

<commit_message>
completed first draft of ppt
</commit_message>
<xml_diff>
--- a/ppt/SATELLITE LIFE EXPECTANCY.pptx
+++ b/ppt/SATELLITE LIFE EXPECTANCY.pptx
@@ -5,26 +5,21 @@
     <p:sldMasterId id="2147483648" r:id="rId4"/>
   </p:sldMasterIdLst>
   <p:notesMasterIdLst>
-    <p:notesMasterId r:id="rId22"/>
+    <p:notesMasterId r:id="rId17"/>
   </p:notesMasterIdLst>
   <p:sldIdLst>
     <p:sldId id="530" r:id="rId5"/>
-    <p:sldId id="534" r:id="rId6"/>
-    <p:sldId id="531" r:id="rId7"/>
+    <p:sldId id="531" r:id="rId6"/>
+    <p:sldId id="534" r:id="rId7"/>
     <p:sldId id="538" r:id="rId8"/>
     <p:sldId id="547" r:id="rId9"/>
     <p:sldId id="537" r:id="rId10"/>
     <p:sldId id="535" r:id="rId11"/>
     <p:sldId id="533" r:id="rId12"/>
-    <p:sldId id="536" r:id="rId13"/>
-    <p:sldId id="548" r:id="rId14"/>
-    <p:sldId id="546" r:id="rId15"/>
-    <p:sldId id="545" r:id="rId16"/>
-    <p:sldId id="539" r:id="rId17"/>
-    <p:sldId id="540" r:id="rId18"/>
-    <p:sldId id="541" r:id="rId19"/>
-    <p:sldId id="543" r:id="rId20"/>
-    <p:sldId id="544" r:id="rId21"/>
+    <p:sldId id="551" r:id="rId13"/>
+    <p:sldId id="549" r:id="rId14"/>
+    <p:sldId id="548" r:id="rId15"/>
+    <p:sldId id="544" r:id="rId16"/>
   </p:sldIdLst>
   <p:sldSz cx="12192000" cy="6858000"/>
   <p:notesSz cx="6858000" cy="9144000"/>
@@ -579,6 +574,310 @@
 </p:notes>
 </file>
 
+<file path=ppt/notesSlides/notesSlide10.xml><?xml version="1.0" encoding="utf-8"?>
+<p:notes xmlns:a="http://schemas.openxmlformats.org/drawingml/2006/main" xmlns:r="http://schemas.openxmlformats.org/officeDocument/2006/relationships" xmlns:p="http://schemas.openxmlformats.org/presentationml/2006/main">
+  <p:cSld>
+    <p:spTree>
+      <p:nvGrpSpPr>
+        <p:cNvPr id="1" name=""/>
+        <p:cNvGrpSpPr/>
+        <p:nvPr/>
+      </p:nvGrpSpPr>
+      <p:grpSpPr>
+        <a:xfrm>
+          <a:off x="0" y="0"/>
+          <a:ext cx="0" cy="0"/>
+          <a:chOff x="0" y="0"/>
+          <a:chExt cx="0" cy="0"/>
+        </a:xfrm>
+      </p:grpSpPr>
+      <p:sp>
+        <p:nvSpPr>
+          <p:cNvPr id="2" name="Slide Image Placeholder 1"/>
+          <p:cNvSpPr>
+            <a:spLocks noGrp="1" noRot="1" noChangeAspect="1"/>
+          </p:cNvSpPr>
+          <p:nvPr>
+            <p:ph type="sldImg"/>
+          </p:nvPr>
+        </p:nvSpPr>
+        <p:spPr/>
+      </p:sp>
+      <p:sp>
+        <p:nvSpPr>
+          <p:cNvPr id="3" name="Notes Placeholder 2"/>
+          <p:cNvSpPr>
+            <a:spLocks noGrp="1"/>
+          </p:cNvSpPr>
+          <p:nvPr>
+            <p:ph type="body" idx="1"/>
+          </p:nvPr>
+        </p:nvSpPr>
+        <p:spPr/>
+        <p:txBody>
+          <a:bodyPr/>
+          <a:lstStyle/>
+          <a:p>
+            <a:r>
+              <a:rPr lang="en-US" b="0" i="0" dirty="0">
+                <a:solidFill>
+                  <a:srgbClr val="BDB7AF"/>
+                </a:solidFill>
+                <a:effectLst/>
+                <a:latin typeface="Söhne"/>
+              </a:rPr>
+              <a:t>The regression analysis conducted on the dataset provides valuable insights into the relationship between satellite characteristics and their expected lifetimes.</a:t>
+            </a:r>
+          </a:p>
+          <a:p>
+            <a:endParaRPr lang="en-US" b="0" i="0" dirty="0">
+              <a:solidFill>
+                <a:srgbClr val="BDB7AF"/>
+              </a:solidFill>
+              <a:effectLst/>
+              <a:latin typeface="Söhne"/>
+            </a:endParaRPr>
+          </a:p>
+          <a:p>
+            <a:r>
+              <a:rPr lang="en-US" b="0" i="0" dirty="0">
+                <a:solidFill>
+                  <a:srgbClr val="BDB7AF"/>
+                </a:solidFill>
+                <a:effectLst/>
+                <a:latin typeface="Söhne"/>
+              </a:rPr>
+              <a:t>The model, based on the Ordinary Least Squares (OLS) method, demonstrates a reasonable fit to the data with an R-squared value of 0.604, indicating that approximately 60.4% of the variance in the expected lifetime of satellites is explained by the chosen predictor variables.</a:t>
+            </a:r>
+          </a:p>
+          <a:p>
+            <a:endParaRPr lang="en-US" b="0" i="0" dirty="0">
+              <a:solidFill>
+                <a:srgbClr val="BDB7AF"/>
+              </a:solidFill>
+              <a:effectLst/>
+              <a:latin typeface="Söhne"/>
+            </a:endParaRPr>
+          </a:p>
+          <a:p>
+            <a:r>
+              <a:rPr lang="en-US" b="0" i="0" dirty="0">
+                <a:solidFill>
+                  <a:srgbClr val="BDB7AF"/>
+                </a:solidFill>
+                <a:effectLst/>
+                <a:latin typeface="Söhne"/>
+              </a:rPr>
+              <a:t>The F-statistic of 361.3 and associated low probability value (p-value) affirm the overall significance of the regression, implying that the model as a whole is meaningful. </a:t>
+            </a:r>
+            <a:endParaRPr lang="en-US" dirty="0"/>
+          </a:p>
+        </p:txBody>
+      </p:sp>
+      <p:sp>
+        <p:nvSpPr>
+          <p:cNvPr id="4" name="Slide Number Placeholder 3"/>
+          <p:cNvSpPr>
+            <a:spLocks noGrp="1"/>
+          </p:cNvSpPr>
+          <p:nvPr>
+            <p:ph type="sldNum" sz="quarter" idx="5"/>
+          </p:nvPr>
+        </p:nvSpPr>
+        <p:spPr/>
+        <p:txBody>
+          <a:bodyPr/>
+          <a:lstStyle/>
+          <a:p>
+            <a:fld id="{23C058E0-0852-DB43-83D6-BD76659FF1D8}" type="slidenum">
+              <a:rPr lang="en-US" smtClean="0"/>
+              <a:t>10</a:t>
+            </a:fld>
+            <a:endParaRPr lang="en-US" dirty="0"/>
+          </a:p>
+        </p:txBody>
+      </p:sp>
+    </p:spTree>
+    <p:extLst>
+      <p:ext uri="{BB962C8B-B14F-4D97-AF65-F5344CB8AC3E}">
+        <p14:creationId xmlns:p14="http://schemas.microsoft.com/office/powerpoint/2010/main" val="2380422706"/>
+      </p:ext>
+    </p:extLst>
+  </p:cSld>
+  <p:clrMapOvr>
+    <a:masterClrMapping/>
+  </p:clrMapOvr>
+</p:notes>
+</file>
+
+<file path=ppt/notesSlides/notesSlide11.xml><?xml version="1.0" encoding="utf-8"?>
+<p:notes xmlns:a="http://schemas.openxmlformats.org/drawingml/2006/main" xmlns:r="http://schemas.openxmlformats.org/officeDocument/2006/relationships" xmlns:p="http://schemas.openxmlformats.org/presentationml/2006/main">
+  <p:cSld>
+    <p:spTree>
+      <p:nvGrpSpPr>
+        <p:cNvPr id="1" name=""/>
+        <p:cNvGrpSpPr/>
+        <p:nvPr/>
+      </p:nvGrpSpPr>
+      <p:grpSpPr>
+        <a:xfrm>
+          <a:off x="0" y="0"/>
+          <a:ext cx="0" cy="0"/>
+          <a:chOff x="0" y="0"/>
+          <a:chExt cx="0" cy="0"/>
+        </a:xfrm>
+      </p:grpSpPr>
+      <p:sp>
+        <p:nvSpPr>
+          <p:cNvPr id="2" name="Slide Image Placeholder 1"/>
+          <p:cNvSpPr>
+            <a:spLocks noGrp="1" noRot="1" noChangeAspect="1"/>
+          </p:cNvSpPr>
+          <p:nvPr>
+            <p:ph type="sldImg"/>
+          </p:nvPr>
+        </p:nvSpPr>
+        <p:spPr/>
+      </p:sp>
+      <p:sp>
+        <p:nvSpPr>
+          <p:cNvPr id="3" name="Notes Placeholder 2"/>
+          <p:cNvSpPr>
+            <a:spLocks noGrp="1"/>
+          </p:cNvSpPr>
+          <p:nvPr>
+            <p:ph type="body" idx="1"/>
+          </p:nvPr>
+        </p:nvSpPr>
+        <p:spPr/>
+        <p:txBody>
+          <a:bodyPr/>
+          <a:lstStyle/>
+          <a:p>
+            <a:endParaRPr lang="en-US" dirty="0"/>
+          </a:p>
+        </p:txBody>
+      </p:sp>
+      <p:sp>
+        <p:nvSpPr>
+          <p:cNvPr id="4" name="Slide Number Placeholder 3"/>
+          <p:cNvSpPr>
+            <a:spLocks noGrp="1"/>
+          </p:cNvSpPr>
+          <p:nvPr>
+            <p:ph type="sldNum" sz="quarter" idx="5"/>
+          </p:nvPr>
+        </p:nvSpPr>
+        <p:spPr/>
+        <p:txBody>
+          <a:bodyPr/>
+          <a:lstStyle/>
+          <a:p>
+            <a:fld id="{23C058E0-0852-DB43-83D6-BD76659FF1D8}" type="slidenum">
+              <a:rPr lang="en-US" smtClean="0"/>
+              <a:t>11</a:t>
+            </a:fld>
+            <a:endParaRPr lang="en-US" dirty="0"/>
+          </a:p>
+        </p:txBody>
+      </p:sp>
+    </p:spTree>
+    <p:extLst>
+      <p:ext uri="{BB962C8B-B14F-4D97-AF65-F5344CB8AC3E}">
+        <p14:creationId xmlns:p14="http://schemas.microsoft.com/office/powerpoint/2010/main" val="1410361982"/>
+      </p:ext>
+    </p:extLst>
+  </p:cSld>
+  <p:clrMapOvr>
+    <a:masterClrMapping/>
+  </p:clrMapOvr>
+</p:notes>
+</file>
+
+<file path=ppt/notesSlides/notesSlide12.xml><?xml version="1.0" encoding="utf-8"?>
+<p:notes xmlns:a="http://schemas.openxmlformats.org/drawingml/2006/main" xmlns:r="http://schemas.openxmlformats.org/officeDocument/2006/relationships" xmlns:p="http://schemas.openxmlformats.org/presentationml/2006/main">
+  <p:cSld>
+    <p:spTree>
+      <p:nvGrpSpPr>
+        <p:cNvPr id="1" name=""/>
+        <p:cNvGrpSpPr/>
+        <p:nvPr/>
+      </p:nvGrpSpPr>
+      <p:grpSpPr>
+        <a:xfrm>
+          <a:off x="0" y="0"/>
+          <a:ext cx="0" cy="0"/>
+          <a:chOff x="0" y="0"/>
+          <a:chExt cx="0" cy="0"/>
+        </a:xfrm>
+      </p:grpSpPr>
+      <p:sp>
+        <p:nvSpPr>
+          <p:cNvPr id="2" name="Slide Image Placeholder 1"/>
+          <p:cNvSpPr>
+            <a:spLocks noGrp="1" noRot="1" noChangeAspect="1"/>
+          </p:cNvSpPr>
+          <p:nvPr>
+            <p:ph type="sldImg"/>
+          </p:nvPr>
+        </p:nvSpPr>
+        <p:spPr/>
+      </p:sp>
+      <p:sp>
+        <p:nvSpPr>
+          <p:cNvPr id="3" name="Notes Placeholder 2"/>
+          <p:cNvSpPr>
+            <a:spLocks noGrp="1"/>
+          </p:cNvSpPr>
+          <p:nvPr>
+            <p:ph type="body" idx="1"/>
+          </p:nvPr>
+        </p:nvSpPr>
+        <p:spPr/>
+        <p:txBody>
+          <a:bodyPr/>
+          <a:lstStyle/>
+          <a:p>
+            <a:endParaRPr lang="en-US" dirty="0"/>
+          </a:p>
+        </p:txBody>
+      </p:sp>
+      <p:sp>
+        <p:nvSpPr>
+          <p:cNvPr id="4" name="Slide Number Placeholder 3"/>
+          <p:cNvSpPr>
+            <a:spLocks noGrp="1"/>
+          </p:cNvSpPr>
+          <p:nvPr>
+            <p:ph type="sldNum" sz="quarter" idx="5"/>
+          </p:nvPr>
+        </p:nvSpPr>
+        <p:spPr/>
+        <p:txBody>
+          <a:bodyPr/>
+          <a:lstStyle/>
+          <a:p>
+            <a:fld id="{23C058E0-0852-DB43-83D6-BD76659FF1D8}" type="slidenum">
+              <a:rPr lang="en-US" smtClean="0"/>
+              <a:t>12</a:t>
+            </a:fld>
+            <a:endParaRPr lang="en-US" dirty="0"/>
+          </a:p>
+        </p:txBody>
+      </p:sp>
+    </p:spTree>
+    <p:extLst>
+      <p:ext uri="{BB962C8B-B14F-4D97-AF65-F5344CB8AC3E}">
+        <p14:creationId xmlns:p14="http://schemas.microsoft.com/office/powerpoint/2010/main" val="3631132548"/>
+      </p:ext>
+    </p:extLst>
+  </p:cSld>
+  <p:clrMapOvr>
+    <a:masterClrMapping/>
+  </p:clrMapOvr>
+</p:notes>
+</file>
+
 <file path=ppt/notesSlides/notesSlide2.xml><?xml version="1.0" encoding="utf-8"?>
 <p:notes xmlns:a="http://schemas.openxmlformats.org/drawingml/2006/main" xmlns:r="http://schemas.openxmlformats.org/officeDocument/2006/relationships" xmlns:p="http://schemas.openxmlformats.org/presentationml/2006/main">
   <p:cSld>
@@ -624,85 +923,15 @@
           <a:lstStyle/>
           <a:p>
             <a:r>
-              <a:rPr lang="en-US" b="0" i="0" dirty="0">
-                <a:solidFill>
-                  <a:srgbClr val="BDB7AF"/>
-                </a:solidFill>
-                <a:effectLst/>
-                <a:latin typeface="Söhne"/>
-              </a:rPr>
-              <a:t>So why does knowing about satellite life expectancy benefit military stakeholders?</a:t>
-            </a:r>
-          </a:p>
-          <a:p>
-            <a:endParaRPr lang="en-US" b="0" i="0" dirty="0">
-              <a:solidFill>
-                <a:srgbClr val="BDB7AF"/>
-              </a:solidFill>
-              <a:effectLst/>
-              <a:latin typeface="Söhne"/>
-            </a:endParaRPr>
-          </a:p>
-          <a:p>
-            <a:r>
-              <a:rPr lang="en-US" b="0" i="0" dirty="0">
-                <a:solidFill>
-                  <a:srgbClr val="BDB7AF"/>
-                </a:solidFill>
-                <a:effectLst/>
-                <a:latin typeface="Söhne"/>
-              </a:rPr>
-              <a:t>Knowing about what affects the life of a satellite allows for better mission planning, including scheduling replacements or adjustments to ensure continuous and reliable satellite coverage.</a:t>
-            </a:r>
-          </a:p>
-          <a:p>
-            <a:r>
-              <a:rPr lang="en-US" b="0" i="0" dirty="0">
-                <a:solidFill>
-                  <a:srgbClr val="BDB7AF"/>
-                </a:solidFill>
-                <a:effectLst/>
-                <a:latin typeface="Söhne"/>
-              </a:rPr>
-              <a:t>Understanding the factors that affect satellite lifetimes, such as orbit type, can help the military allocate resources effectively by choosing the most suitable orbits for different types of missions. </a:t>
-            </a:r>
-          </a:p>
-          <a:p>
-            <a:r>
-              <a:rPr lang="en-US" b="0" i="0" dirty="0">
-                <a:solidFill>
-                  <a:srgbClr val="BDB7AF"/>
-                </a:solidFill>
-                <a:effectLst/>
-                <a:latin typeface="Söhne"/>
-              </a:rPr>
-              <a:t>Satellites play a crucial role in maintaining situational awareness, command and control, and communication during various operations. Knowing which orbits provide longer lifetimes can contribute to more reliable and sustained operations.</a:t>
-            </a:r>
-          </a:p>
-          <a:p>
-            <a:r>
-              <a:rPr lang="en-US" b="0" i="0" dirty="0">
-                <a:solidFill>
-                  <a:srgbClr val="BDB7AF"/>
-                </a:solidFill>
-                <a:effectLst/>
-                <a:latin typeface="Söhne"/>
-              </a:rPr>
-              <a:t>Satellite development, launch, and maintenance are extremely costly. By understanding factors that influence satellite longevity, the military can make informed decisions about investment in satellite technology, design, and orbits to optimize the cost-effectiveness of their satellite programs.</a:t>
-            </a:r>
-          </a:p>
-          <a:p>
-            <a:r>
-              <a:rPr lang="en-US" b="0" i="0" dirty="0">
-                <a:solidFill>
-                  <a:srgbClr val="BDB7AF"/>
-                </a:solidFill>
-                <a:effectLst/>
-                <a:latin typeface="Söhne"/>
-              </a:rPr>
-              <a:t>Space situational awareness, which involves monitoring and tracking objects in space, helps to prevent collisions and protect satellites from potential threats. Knowledge of satellite lifetimes can aid in predicting end-of-life scenarios and potential debris creation.</a:t>
-            </a:r>
-            <a:endParaRPr lang="en-US" dirty="0"/>
+              <a:rPr lang="en-US" dirty="0"/>
+              <a:t>Here’s an overview of the topics I’m going to cover. </a:t>
+            </a:r>
+          </a:p>
+          <a:p>
+            <a:r>
+              <a:rPr lang="en-US" dirty="0"/>
+              <a:t>I’ll start with giving information about the database, discuss my hypothesis, go over my regression model, and the results of my research. </a:t>
+            </a:r>
           </a:p>
         </p:txBody>
       </p:sp>
@@ -732,7 +961,7 @@
     </p:spTree>
     <p:extLst>
       <p:ext uri="{BB962C8B-B14F-4D97-AF65-F5344CB8AC3E}">
-        <p14:creationId xmlns:p14="http://schemas.microsoft.com/office/powerpoint/2010/main" val="4155778470"/>
+        <p14:creationId xmlns:p14="http://schemas.microsoft.com/office/powerpoint/2010/main" val="110960748"/>
       </p:ext>
     </p:extLst>
   </p:cSld>
@@ -787,15 +1016,85 @@
           <a:lstStyle/>
           <a:p>
             <a:r>
-              <a:rPr lang="en-US" dirty="0"/>
-              <a:t>Here’s an overview of the topics I’m going to cover. </a:t>
-            </a:r>
-          </a:p>
-          <a:p>
-            <a:r>
-              <a:rPr lang="en-US" dirty="0"/>
-              <a:t>I’ll start with giving information about the database, discuss my hypothesis, go over my regression model, and the results of my research. </a:t>
-            </a:r>
+              <a:rPr lang="en-US" b="0" i="0" dirty="0">
+                <a:solidFill>
+                  <a:srgbClr val="BDB7AF"/>
+                </a:solidFill>
+                <a:effectLst/>
+                <a:latin typeface="Söhne"/>
+              </a:rPr>
+              <a:t>So why does knowing about satellite life expectancy benefit military stakeholders?</a:t>
+            </a:r>
+          </a:p>
+          <a:p>
+            <a:endParaRPr lang="en-US" b="0" i="0" dirty="0">
+              <a:solidFill>
+                <a:srgbClr val="BDB7AF"/>
+              </a:solidFill>
+              <a:effectLst/>
+              <a:latin typeface="Söhne"/>
+            </a:endParaRPr>
+          </a:p>
+          <a:p>
+            <a:r>
+              <a:rPr lang="en-US" b="0" i="0" dirty="0">
+                <a:solidFill>
+                  <a:srgbClr val="BDB7AF"/>
+                </a:solidFill>
+                <a:effectLst/>
+                <a:latin typeface="Söhne"/>
+              </a:rPr>
+              <a:t>Knowing about what affects the life of a satellite allows for better mission planning, including scheduling replacements or adjustments to ensure continuous and reliable satellite coverage.</a:t>
+            </a:r>
+          </a:p>
+          <a:p>
+            <a:r>
+              <a:rPr lang="en-US" b="0" i="0" dirty="0">
+                <a:solidFill>
+                  <a:srgbClr val="BDB7AF"/>
+                </a:solidFill>
+                <a:effectLst/>
+                <a:latin typeface="Söhne"/>
+              </a:rPr>
+              <a:t>Understanding the factors that affect satellite lifetimes, such as orbit type, can help the military allocate resources effectively by choosing the most suitable orbits for different types of missions. </a:t>
+            </a:r>
+          </a:p>
+          <a:p>
+            <a:r>
+              <a:rPr lang="en-US" b="0" i="0" dirty="0">
+                <a:solidFill>
+                  <a:srgbClr val="BDB7AF"/>
+                </a:solidFill>
+                <a:effectLst/>
+                <a:latin typeface="Söhne"/>
+              </a:rPr>
+              <a:t>Satellites play a crucial role in maintaining situational awareness, command and control, and communication during various operations. Knowing which orbits provide longer lifetimes can contribute to more reliable and sustained operations.</a:t>
+            </a:r>
+          </a:p>
+          <a:p>
+            <a:r>
+              <a:rPr lang="en-US" b="0" i="0" dirty="0">
+                <a:solidFill>
+                  <a:srgbClr val="BDB7AF"/>
+                </a:solidFill>
+                <a:effectLst/>
+                <a:latin typeface="Söhne"/>
+              </a:rPr>
+              <a:t>Satellite development, launch, and maintenance are extremely costly. By understanding factors that influence satellite longevity, the military can make informed decisions about investment in satellite technology, design, and orbits to optimize the cost-effectiveness of their satellite programs.</a:t>
+            </a:r>
+          </a:p>
+          <a:p>
+            <a:r>
+              <a:rPr lang="en-US" b="0" i="0" dirty="0">
+                <a:solidFill>
+                  <a:srgbClr val="BDB7AF"/>
+                </a:solidFill>
+                <a:effectLst/>
+                <a:latin typeface="Söhne"/>
+              </a:rPr>
+              <a:t>Space situational awareness, which involves monitoring and tracking objects in space, helps to prevent collisions and protect satellites from potential threats. Knowledge of satellite lifetimes can aid in predicting end-of-life scenarios and potential debris creation.</a:t>
+            </a:r>
+            <a:endParaRPr lang="en-US" dirty="0"/>
           </a:p>
         </p:txBody>
       </p:sp>
@@ -825,7 +1124,7 @@
     </p:spTree>
     <p:extLst>
       <p:ext uri="{BB962C8B-B14F-4D97-AF65-F5344CB8AC3E}">
-        <p14:creationId xmlns:p14="http://schemas.microsoft.com/office/powerpoint/2010/main" val="110960748"/>
+        <p14:creationId xmlns:p14="http://schemas.microsoft.com/office/powerpoint/2010/main" val="4155778470"/>
       </p:ext>
     </p:extLst>
   </p:cSld>
@@ -1459,6 +1758,23 @@
           <a:bodyPr/>
           <a:lstStyle/>
           <a:p>
+            <a:pPr algn="l"/>
+            <a:r>
+              <a:rPr lang="en-US" dirty="0"/>
+              <a:t>In addition to the hypotheses, I wanted to see if these features had an effect on a satellite’s expected lifetime. </a:t>
+            </a:r>
+            <a:endParaRPr lang="en-US" sz="1200" dirty="0">
+              <a:solidFill>
+                <a:schemeClr val="accent2">
+                  <a:lumMod val="60000"/>
+                  <a:lumOff val="40000"/>
+                </a:schemeClr>
+              </a:solidFill>
+              <a:latin typeface="Biome Light" panose="020B0303030204020804" pitchFamily="34" charset="0"/>
+              <a:cs typeface="Biome Light" panose="020B0303030204020804" pitchFamily="34" charset="0"/>
+            </a:endParaRPr>
+          </a:p>
+          <a:p>
             <a:endParaRPr lang="en-US" dirty="0"/>
           </a:p>
         </p:txBody>
@@ -1480,7 +1796,7 @@
           <a:p>
             <a:fld id="{23C058E0-0852-DB43-83D6-BD76659FF1D8}" type="slidenum">
               <a:rPr lang="en-US" smtClean="0"/>
-              <a:t>10</a:t>
+              <a:t>9</a:t>
             </a:fld>
             <a:endParaRPr lang="en-US" dirty="0"/>
           </a:p>
@@ -1489,7 +1805,7 @@
     </p:spTree>
     <p:extLst>
       <p:ext uri="{BB962C8B-B14F-4D97-AF65-F5344CB8AC3E}">
-        <p14:creationId xmlns:p14="http://schemas.microsoft.com/office/powerpoint/2010/main" val="1410361982"/>
+        <p14:creationId xmlns:p14="http://schemas.microsoft.com/office/powerpoint/2010/main" val="2695372342"/>
       </p:ext>
     </p:extLst>
   </p:cSld>
@@ -18212,45 +18528,12 @@
           <a:chExt cx="0" cy="0"/>
         </a:xfrm>
       </p:grpSpPr>
-      <p:sp>
-        <p:nvSpPr>
-          <p:cNvPr id="2" name="Title 1">
-            <a:extLst>
-              <a:ext uri="{FF2B5EF4-FFF2-40B4-BE49-F238E27FC236}">
-                <a16:creationId xmlns:a16="http://schemas.microsoft.com/office/drawing/2014/main" id="{D04F090D-C862-CF85-1001-A82E54365597}"/>
-              </a:ext>
-            </a:extLst>
-          </p:cNvPr>
-          <p:cNvSpPr>
-            <a:spLocks noGrp="1"/>
-          </p:cNvSpPr>
-          <p:nvPr>
-            <p:ph type="ctrTitle"/>
-          </p:nvPr>
-        </p:nvSpPr>
-        <p:spPr>
-          <a:xfrm>
-            <a:off x="2214372" y="1255383"/>
-            <a:ext cx="7763256" cy="809391"/>
-          </a:xfrm>
-        </p:spPr>
-        <p:txBody>
-          <a:bodyPr/>
-          <a:lstStyle/>
-          <a:p>
-            <a:br>
-              <a:rPr lang="en-US" dirty="0"/>
-            </a:br>
-            <a:endParaRPr lang="en-US" dirty="0"/>
-          </a:p>
-        </p:txBody>
-      </p:sp>
       <p:pic>
         <p:nvPicPr>
-          <p:cNvPr id="4" name="Picture 3">
-            <a:extLst>
-              <a:ext uri="{FF2B5EF4-FFF2-40B4-BE49-F238E27FC236}">
-                <a16:creationId xmlns:a16="http://schemas.microsoft.com/office/drawing/2014/main" id="{97B61F52-ED9C-0DA8-DE9B-1B6380CEE212}"/>
+          <p:cNvPr id="25" name="Picture 24">
+            <a:extLst>
+              <a:ext uri="{FF2B5EF4-FFF2-40B4-BE49-F238E27FC236}">
+                <a16:creationId xmlns:a16="http://schemas.microsoft.com/office/drawing/2014/main" id="{40E5FF63-3503-29BB-3FA2-CC57EE9EFDBF}"/>
               </a:ext>
             </a:extLst>
           </p:cNvPr>
@@ -18267,8 +18550,8 @@
         </p:blipFill>
         <p:spPr>
           <a:xfrm>
-            <a:off x="1213394" y="120015"/>
-            <a:ext cx="9524274" cy="6617970"/>
+            <a:off x="1798935" y="205333"/>
+            <a:ext cx="8594129" cy="6447333"/>
           </a:xfrm>
           <a:prstGeom prst="rect">
             <a:avLst/>
@@ -18278,7 +18561,7 @@
     </p:spTree>
     <p:extLst>
       <p:ext uri="{BB962C8B-B14F-4D97-AF65-F5344CB8AC3E}">
-        <p14:creationId xmlns:p14="http://schemas.microsoft.com/office/powerpoint/2010/main" val="3257756880"/>
+        <p14:creationId xmlns:p14="http://schemas.microsoft.com/office/powerpoint/2010/main" val="709193299"/>
       </p:ext>
     </p:extLst>
   </p:cSld>
@@ -18307,10 +18590,10 @@
       </p:grpSpPr>
       <p:sp>
         <p:nvSpPr>
-          <p:cNvPr id="69" name="Title 68">
-            <a:extLst>
-              <a:ext uri="{FF2B5EF4-FFF2-40B4-BE49-F238E27FC236}">
-                <a16:creationId xmlns:a16="http://schemas.microsoft.com/office/drawing/2014/main" id="{0B07383B-6310-56A6-B051-F4B962E11786}"/>
+          <p:cNvPr id="2" name="Title 1">
+            <a:extLst>
+              <a:ext uri="{FF2B5EF4-FFF2-40B4-BE49-F238E27FC236}">
+                <a16:creationId xmlns:a16="http://schemas.microsoft.com/office/drawing/2014/main" id="{D04F090D-C862-CF85-1001-A82E54365597}"/>
               </a:ext>
             </a:extLst>
           </p:cNvPr>
@@ -18318,329 +18601,60 @@
             <a:spLocks noGrp="1"/>
           </p:cNvSpPr>
           <p:nvPr>
-            <p:ph type="title"/>
+            <p:ph type="ctrTitle"/>
           </p:nvPr>
         </p:nvSpPr>
-        <p:spPr/>
+        <p:spPr>
+          <a:xfrm>
+            <a:off x="2214372" y="1255383"/>
+            <a:ext cx="7763256" cy="809391"/>
+          </a:xfrm>
+        </p:spPr>
         <p:txBody>
           <a:bodyPr/>
           <a:lstStyle/>
           <a:p>
-            <a:r>
+            <a:br>
               <a:rPr lang="en-US" dirty="0"/>
-              <a:t>TYPES OF TOKENS</a:t>
-            </a:r>
-          </a:p>
-        </p:txBody>
-      </p:sp>
-      <p:sp>
-        <p:nvSpPr>
-          <p:cNvPr id="4" name="Text Placeholder 3">
-            <a:extLst>
-              <a:ext uri="{FF2B5EF4-FFF2-40B4-BE49-F238E27FC236}">
-                <a16:creationId xmlns:a16="http://schemas.microsoft.com/office/drawing/2014/main" id="{55DA2D8B-92F5-22B2-084C-934BCBC00DFD}"/>
-              </a:ext>
-            </a:extLst>
-          </p:cNvPr>
-          <p:cNvSpPr>
-            <a:spLocks noGrp="1"/>
-          </p:cNvSpPr>
-          <p:nvPr>
-            <p:ph type="body" sz="quarter" idx="12"/>
-          </p:nvPr>
-        </p:nvSpPr>
-        <p:spPr/>
-        <p:txBody>
-          <a:bodyPr/>
-          <a:lstStyle/>
-          <a:p>
-            <a:r>
-              <a:rPr lang="en-US" dirty="0"/>
-              <a:t>Payment</a:t>
-            </a:r>
-          </a:p>
-        </p:txBody>
-      </p:sp>
-      <p:sp>
-        <p:nvSpPr>
-          <p:cNvPr id="5" name="Text Placeholder 4">
-            <a:extLst>
-              <a:ext uri="{FF2B5EF4-FFF2-40B4-BE49-F238E27FC236}">
-                <a16:creationId xmlns:a16="http://schemas.microsoft.com/office/drawing/2014/main" id="{8B004B5D-BB88-E446-FDC1-8BE748EFE8B6}"/>
-              </a:ext>
-            </a:extLst>
-          </p:cNvPr>
-          <p:cNvSpPr>
-            <a:spLocks noGrp="1"/>
-          </p:cNvSpPr>
-          <p:nvPr>
-            <p:ph type="body" sz="quarter" idx="13"/>
-          </p:nvPr>
-        </p:nvSpPr>
-        <p:spPr/>
-        <p:txBody>
-          <a:bodyPr/>
-          <a:lstStyle/>
-          <a:p>
-            <a:r>
-              <a:rPr lang="en-US" dirty="0"/>
-              <a:t>Used to complete transactions anywhere crypto is accepted</a:t>
-            </a:r>
-          </a:p>
-          <a:p>
+            </a:br>
             <a:endParaRPr lang="en-US" dirty="0"/>
           </a:p>
         </p:txBody>
       </p:sp>
-      <p:sp>
-        <p:nvSpPr>
-          <p:cNvPr id="6" name="Text Placeholder 5">
-            <a:extLst>
-              <a:ext uri="{FF2B5EF4-FFF2-40B4-BE49-F238E27FC236}">
-                <a16:creationId xmlns:a16="http://schemas.microsoft.com/office/drawing/2014/main" id="{98AC0C5B-16A7-E317-7222-BF9FA26C0DC6}"/>
-              </a:ext>
-            </a:extLst>
-          </p:cNvPr>
-          <p:cNvSpPr>
-            <a:spLocks noGrp="1"/>
-          </p:cNvSpPr>
-          <p:nvPr>
-            <p:ph type="body" sz="quarter" idx="14"/>
-          </p:nvPr>
-        </p:nvSpPr>
-        <p:spPr/>
-        <p:txBody>
-          <a:bodyPr/>
-          <a:lstStyle/>
-          <a:p>
-            <a:r>
-              <a:rPr lang="en-US" dirty="0"/>
-              <a:t>Utility</a:t>
-            </a:r>
-          </a:p>
-        </p:txBody>
-      </p:sp>
-      <p:sp>
-        <p:nvSpPr>
-          <p:cNvPr id="7" name="Text Placeholder 6">
-            <a:extLst>
-              <a:ext uri="{FF2B5EF4-FFF2-40B4-BE49-F238E27FC236}">
-                <a16:creationId xmlns:a16="http://schemas.microsoft.com/office/drawing/2014/main" id="{77D9B67F-AD02-4BA5-209B-C91070303A72}"/>
-              </a:ext>
-            </a:extLst>
-          </p:cNvPr>
-          <p:cNvSpPr>
-            <a:spLocks noGrp="1"/>
-          </p:cNvSpPr>
-          <p:nvPr>
-            <p:ph type="body" sz="quarter" idx="15"/>
-          </p:nvPr>
-        </p:nvSpPr>
-        <p:spPr/>
-        <p:txBody>
-          <a:bodyPr/>
-          <a:lstStyle/>
-          <a:p>
-            <a:r>
-              <a:rPr lang="en-US" dirty="0"/>
-              <a:t>These tokens have a specific use within a blockchain</a:t>
-            </a:r>
-          </a:p>
-          <a:p>
-            <a:endParaRPr lang="en-US" dirty="0"/>
-          </a:p>
-        </p:txBody>
-      </p:sp>
-      <p:sp>
-        <p:nvSpPr>
-          <p:cNvPr id="8" name="Text Placeholder 7">
-            <a:extLst>
-              <a:ext uri="{FF2B5EF4-FFF2-40B4-BE49-F238E27FC236}">
-                <a16:creationId xmlns:a16="http://schemas.microsoft.com/office/drawing/2014/main" id="{6269FBD2-F371-6F7E-1D42-95EFADFA10DD}"/>
-              </a:ext>
-            </a:extLst>
-          </p:cNvPr>
-          <p:cNvSpPr>
-            <a:spLocks noGrp="1"/>
-          </p:cNvSpPr>
-          <p:nvPr>
-            <p:ph type="body" sz="quarter" idx="16"/>
-          </p:nvPr>
-        </p:nvSpPr>
-        <p:spPr/>
-        <p:txBody>
-          <a:bodyPr/>
-          <a:lstStyle/>
-          <a:p>
-            <a:r>
-              <a:rPr lang="en-US" dirty="0"/>
-              <a:t>Security</a:t>
-            </a:r>
-          </a:p>
-        </p:txBody>
-      </p:sp>
-      <p:sp>
-        <p:nvSpPr>
-          <p:cNvPr id="9" name="Text Placeholder 8">
-            <a:extLst>
-              <a:ext uri="{FF2B5EF4-FFF2-40B4-BE49-F238E27FC236}">
-                <a16:creationId xmlns:a16="http://schemas.microsoft.com/office/drawing/2014/main" id="{F039B280-D4F1-D5B7-9D62-C1DA10C605C9}"/>
-              </a:ext>
-            </a:extLst>
-          </p:cNvPr>
-          <p:cNvSpPr>
-            <a:spLocks noGrp="1"/>
-          </p:cNvSpPr>
-          <p:nvPr>
-            <p:ph type="body" sz="quarter" idx="17"/>
-          </p:nvPr>
-        </p:nvSpPr>
-        <p:spPr/>
-        <p:txBody>
-          <a:bodyPr/>
-          <a:lstStyle/>
-          <a:p>
-            <a:r>
-              <a:rPr lang="en-US" dirty="0"/>
-              <a:t>Tokens backed by securities</a:t>
-            </a:r>
-          </a:p>
-          <a:p>
-            <a:endParaRPr lang="en-US" dirty="0"/>
-          </a:p>
-        </p:txBody>
-      </p:sp>
-      <p:sp>
-        <p:nvSpPr>
-          <p:cNvPr id="10" name="Text Placeholder 9">
-            <a:extLst>
-              <a:ext uri="{FF2B5EF4-FFF2-40B4-BE49-F238E27FC236}">
-                <a16:creationId xmlns:a16="http://schemas.microsoft.com/office/drawing/2014/main" id="{6A9C835B-EE7B-2801-6842-7044F690144A}"/>
-              </a:ext>
-            </a:extLst>
-          </p:cNvPr>
-          <p:cNvSpPr>
-            <a:spLocks noGrp="1"/>
-          </p:cNvSpPr>
-          <p:nvPr>
-            <p:ph type="body" sz="quarter" idx="18"/>
-          </p:nvPr>
-        </p:nvSpPr>
-        <p:spPr/>
-        <p:txBody>
-          <a:bodyPr/>
-          <a:lstStyle/>
-          <a:p>
-            <a:r>
-              <a:rPr lang="en-US" dirty="0"/>
-              <a:t>NFT</a:t>
-            </a:r>
-          </a:p>
-        </p:txBody>
-      </p:sp>
-      <p:sp>
-        <p:nvSpPr>
-          <p:cNvPr id="11" name="Text Placeholder 10">
-            <a:extLst>
-              <a:ext uri="{FF2B5EF4-FFF2-40B4-BE49-F238E27FC236}">
-                <a16:creationId xmlns:a16="http://schemas.microsoft.com/office/drawing/2014/main" id="{429544CE-BE3D-F6DD-FADE-D85F729A9BCC}"/>
-              </a:ext>
-            </a:extLst>
-          </p:cNvPr>
-          <p:cNvSpPr>
-            <a:spLocks noGrp="1"/>
-          </p:cNvSpPr>
-          <p:nvPr>
-            <p:ph type="body" sz="quarter" idx="19"/>
-          </p:nvPr>
-        </p:nvSpPr>
-        <p:spPr/>
-        <p:txBody>
-          <a:bodyPr/>
-          <a:lstStyle/>
-          <a:p>
-            <a:r>
-              <a:rPr lang="en-US" dirty="0"/>
-              <a:t>Authenticates ownership of specific assets</a:t>
-            </a:r>
-          </a:p>
-          <a:p>
-            <a:endParaRPr lang="en-US" dirty="0"/>
-          </a:p>
-        </p:txBody>
-      </p:sp>
-      <p:sp>
-        <p:nvSpPr>
-          <p:cNvPr id="81" name="Text Placeholder 80">
-            <a:extLst>
-              <a:ext uri="{FF2B5EF4-FFF2-40B4-BE49-F238E27FC236}">
-                <a16:creationId xmlns:a16="http://schemas.microsoft.com/office/drawing/2014/main" id="{2AF0BD8F-E098-8282-AE8C-8BFAB5EBBFC2}"/>
-              </a:ext>
-            </a:extLst>
-          </p:cNvPr>
-          <p:cNvSpPr>
-            <a:spLocks noGrp="1"/>
-          </p:cNvSpPr>
-          <p:nvPr>
-            <p:ph type="body" sz="quarter" idx="20"/>
-          </p:nvPr>
-        </p:nvSpPr>
-        <p:spPr/>
-        <p:txBody>
-          <a:bodyPr/>
-          <a:lstStyle/>
-          <a:p>
-            <a:r>
-              <a:rPr lang="en-US" sz="2400" b="1" dirty="0">
-                <a:solidFill>
-                  <a:schemeClr val="accent3">
-                    <a:lumMod val="25000"/>
-                  </a:schemeClr>
-                </a:solidFill>
-                <a:latin typeface="Tw Cen MT" panose="020B0602020104020603" pitchFamily="34" charset="77"/>
-                <a:ea typeface="Source Sans Pro" panose="020B0503030403020204" pitchFamily="34" charset="0"/>
-              </a:rPr>
-              <a:t>Gaming</a:t>
-            </a:r>
-            <a:endParaRPr lang="en-US" dirty="0"/>
-          </a:p>
-        </p:txBody>
-      </p:sp>
-      <p:sp>
-        <p:nvSpPr>
-          <p:cNvPr id="2" name="Text Placeholder 1">
-            <a:extLst>
-              <a:ext uri="{FF2B5EF4-FFF2-40B4-BE49-F238E27FC236}">
-                <a16:creationId xmlns:a16="http://schemas.microsoft.com/office/drawing/2014/main" id="{D733E31E-F298-485B-42BF-303CC635241F}"/>
-              </a:ext>
-            </a:extLst>
-          </p:cNvPr>
-          <p:cNvSpPr>
-            <a:spLocks noGrp="1"/>
-          </p:cNvSpPr>
-          <p:nvPr>
-            <p:ph type="body" sz="quarter" idx="21"/>
-          </p:nvPr>
-        </p:nvSpPr>
-        <p:spPr/>
-        <p:txBody>
-          <a:bodyPr/>
-          <a:lstStyle/>
-          <a:p>
-            <a:r>
-              <a:rPr lang="en-US" dirty="0"/>
-              <a:t>Used as in-game currency and traded with real world value</a:t>
-            </a:r>
-          </a:p>
-          <a:p>
-            <a:endParaRPr lang="en-US" dirty="0"/>
-          </a:p>
-        </p:txBody>
-      </p:sp>
+      <p:pic>
+        <p:nvPicPr>
+          <p:cNvPr id="5" name="Picture 4">
+            <a:extLst>
+              <a:ext uri="{FF2B5EF4-FFF2-40B4-BE49-F238E27FC236}">
+                <a16:creationId xmlns:a16="http://schemas.microsoft.com/office/drawing/2014/main" id="{0F95D50F-614E-E0A2-1134-9CEE60328ED0}"/>
+              </a:ext>
+            </a:extLst>
+          </p:cNvPr>
+          <p:cNvPicPr>
+            <a:picLocks noChangeAspect="1"/>
+          </p:cNvPicPr>
+          <p:nvPr/>
+        </p:nvPicPr>
+        <p:blipFill>
+          <a:blip r:embed="rId3"/>
+          <a:stretch>
+            <a:fillRect/>
+          </a:stretch>
+        </p:blipFill>
+        <p:spPr>
+          <a:xfrm>
+            <a:off x="1175067" y="72895"/>
+            <a:ext cx="9649687" cy="6712209"/>
+          </a:xfrm>
+          <a:prstGeom prst="rect">
+            <a:avLst/>
+          </a:prstGeom>
+        </p:spPr>
+      </p:pic>
     </p:spTree>
     <p:extLst>
       <p:ext uri="{BB962C8B-B14F-4D97-AF65-F5344CB8AC3E}">
-        <p14:creationId xmlns:p14="http://schemas.microsoft.com/office/powerpoint/2010/main" val="1430138192"/>
+        <p14:creationId xmlns:p14="http://schemas.microsoft.com/office/powerpoint/2010/main" val="3257756880"/>
       </p:ext>
     </p:extLst>
   </p:cSld>
@@ -18669,10 +18683,10 @@
       </p:grpSpPr>
       <p:sp>
         <p:nvSpPr>
-          <p:cNvPr id="106" name="Title 105">
-            <a:extLst>
-              <a:ext uri="{FF2B5EF4-FFF2-40B4-BE49-F238E27FC236}">
-                <a16:creationId xmlns:a16="http://schemas.microsoft.com/office/drawing/2014/main" id="{734F8B63-0C1D-770B-CA9D-EE7ACF817C1F}"/>
+          <p:cNvPr id="2" name="Title 1">
+            <a:extLst>
+              <a:ext uri="{FF2B5EF4-FFF2-40B4-BE49-F238E27FC236}">
+                <a16:creationId xmlns:a16="http://schemas.microsoft.com/office/drawing/2014/main" id="{2C9E1892-81E6-551C-7B5A-DEA68224520B}"/>
               </a:ext>
             </a:extLst>
           </p:cNvPr>
@@ -18683,712 +18697,46 @@
             <p:ph type="title"/>
           </p:nvPr>
         </p:nvSpPr>
-        <p:spPr/>
+        <p:spPr>
+          <a:xfrm>
+            <a:off x="5129349" y="1856232"/>
+            <a:ext cx="6181779" cy="1069848"/>
+          </a:xfrm>
+        </p:spPr>
         <p:txBody>
           <a:bodyPr/>
           <a:lstStyle/>
           <a:p>
             <a:r>
-              <a:rPr lang="en-US" dirty="0"/>
-              <a:t>PORTFOLIO BUILDUP</a:t>
-            </a:r>
-          </a:p>
-        </p:txBody>
-      </p:sp>
-      <p:sp>
-        <p:nvSpPr>
-          <p:cNvPr id="139" name="Slide Number Placeholder 138">
-            <a:extLst>
-              <a:ext uri="{FF2B5EF4-FFF2-40B4-BE49-F238E27FC236}">
-                <a16:creationId xmlns:a16="http://schemas.microsoft.com/office/drawing/2014/main" id="{0C6CCCC3-BCC9-AE9B-C2AE-4D9986B5F8AE}"/>
-              </a:ext>
-            </a:extLst>
-          </p:cNvPr>
-          <p:cNvSpPr>
-            <a:spLocks noGrp="1"/>
-          </p:cNvSpPr>
-          <p:nvPr>
-            <p:ph type="sldNum" sz="quarter" idx="11"/>
-          </p:nvPr>
-        </p:nvSpPr>
-        <p:spPr/>
-        <p:txBody>
-          <a:bodyPr/>
-          <a:lstStyle/>
-          <a:p>
-            <a:fld id="{294A09A9-5501-47C1-A89A-A340965A2BE2}" type="slidenum">
-              <a:rPr lang="en-US" smtClean="0"/>
-              <a:pPr/>
-              <a:t>12</a:t>
-            </a:fld>
-            <a:endParaRPr lang="en-US" dirty="0"/>
-          </a:p>
-        </p:txBody>
-      </p:sp>
-      <p:pic>
-        <p:nvPicPr>
-          <p:cNvPr id="85" name="Picture Placeholder 84" descr="Continuous Improvement outline">
-            <a:extLst>
-              <a:ext uri="{FF2B5EF4-FFF2-40B4-BE49-F238E27FC236}">
-                <a16:creationId xmlns:a16="http://schemas.microsoft.com/office/drawing/2014/main" id="{D65F5CE9-1D9A-9BF0-5ADD-C4E2693DA4CB}"/>
-              </a:ext>
-            </a:extLst>
-          </p:cNvPr>
-          <p:cNvPicPr>
-            <a:picLocks noGrp="1" noChangeAspect="1"/>
-          </p:cNvPicPr>
-          <p:nvPr>
-            <p:ph type="pic" sz="quarter" idx="22"/>
-          </p:nvPr>
-        </p:nvPicPr>
-        <p:blipFill rotWithShape="1">
-          <a:blip r:embed="rId2"/>
-          <a:srcRect t="517" b="517"/>
-          <a:stretch/>
-        </p:blipFill>
-        <p:spPr>
-          <a:xfrm>
-            <a:off x="1583555" y="2980517"/>
-            <a:ext cx="713074" cy="713074"/>
-          </a:xfrm>
-        </p:spPr>
-      </p:pic>
-      <p:pic>
-        <p:nvPicPr>
-          <p:cNvPr id="86" name="Picture Placeholder 85" descr="Wallet outline">
-            <a:extLst>
-              <a:ext uri="{FF2B5EF4-FFF2-40B4-BE49-F238E27FC236}">
-                <a16:creationId xmlns:a16="http://schemas.microsoft.com/office/drawing/2014/main" id="{EDC60F06-D73E-F719-14FA-A6F1ECF09300}"/>
-              </a:ext>
-            </a:extLst>
-          </p:cNvPr>
-          <p:cNvPicPr>
-            <a:picLocks noGrp="1" noChangeAspect="1"/>
-          </p:cNvPicPr>
-          <p:nvPr>
-            <p:ph type="pic" sz="quarter" idx="23"/>
-          </p:nvPr>
-        </p:nvPicPr>
-        <p:blipFill rotWithShape="1">
-          <a:blip r:embed="rId3"/>
-          <a:srcRect t="128" b="128"/>
-          <a:stretch/>
-        </p:blipFill>
-        <p:spPr/>
-      </p:pic>
-      <p:pic>
-        <p:nvPicPr>
-          <p:cNvPr id="87" name="Picture Placeholder 86" descr="Piggy Bank outline">
-            <a:extLst>
-              <a:ext uri="{FF2B5EF4-FFF2-40B4-BE49-F238E27FC236}">
-                <a16:creationId xmlns:a16="http://schemas.microsoft.com/office/drawing/2014/main" id="{ED53247D-56A2-6AB9-6FF9-0313BD7DB9E8}"/>
-              </a:ext>
-            </a:extLst>
-          </p:cNvPr>
-          <p:cNvPicPr>
-            <a:picLocks noGrp="1" noChangeAspect="1"/>
-          </p:cNvPicPr>
-          <p:nvPr>
-            <p:ph type="pic" sz="quarter" idx="24"/>
-          </p:nvPr>
-        </p:nvPicPr>
-        <p:blipFill rotWithShape="1">
-          <a:blip r:embed="rId4"/>
-          <a:srcRect/>
-          <a:stretch/>
-        </p:blipFill>
-        <p:spPr/>
-      </p:pic>
-      <p:pic>
-        <p:nvPicPr>
-          <p:cNvPr id="88" name="Picture Placeholder 87" descr="Bitcoin outline">
-            <a:extLst>
-              <a:ext uri="{FF2B5EF4-FFF2-40B4-BE49-F238E27FC236}">
-                <a16:creationId xmlns:a16="http://schemas.microsoft.com/office/drawing/2014/main" id="{32BC0F61-A0C8-5BEF-A6E9-0E7ADE645FA6}"/>
-              </a:ext>
-            </a:extLst>
-          </p:cNvPr>
-          <p:cNvPicPr>
-            <a:picLocks noGrp="1" noChangeAspect="1"/>
-          </p:cNvPicPr>
-          <p:nvPr>
-            <p:ph type="pic" sz="quarter" idx="25"/>
-          </p:nvPr>
-        </p:nvPicPr>
-        <p:blipFill rotWithShape="1">
-          <a:blip r:embed="rId5"/>
-          <a:srcRect l="345" r="345"/>
-          <a:stretch/>
-        </p:blipFill>
-        <p:spPr/>
-      </p:pic>
-      <p:pic>
-        <p:nvPicPr>
-          <p:cNvPr id="90" name="Picture Placeholder 89" descr="Exponential Graph outline">
-            <a:extLst>
-              <a:ext uri="{FF2B5EF4-FFF2-40B4-BE49-F238E27FC236}">
-                <a16:creationId xmlns:a16="http://schemas.microsoft.com/office/drawing/2014/main" id="{86472D92-CAA9-AF6F-549B-2EE170C70DD7}"/>
-              </a:ext>
-            </a:extLst>
-          </p:cNvPr>
-          <p:cNvPicPr>
-            <a:picLocks noGrp="1" noChangeAspect="1"/>
-          </p:cNvPicPr>
-          <p:nvPr>
-            <p:ph type="pic" sz="quarter" idx="26"/>
-          </p:nvPr>
-        </p:nvPicPr>
-        <p:blipFill rotWithShape="1">
-          <a:blip r:embed="rId6"/>
-          <a:srcRect/>
-          <a:stretch/>
-        </p:blipFill>
-        <p:spPr/>
-      </p:pic>
+              <a:rPr lang="en-US" dirty="0">
+                <a:ln w="28575">
+                  <a:noFill/>
+                  <a:prstDash val="solid"/>
+                </a:ln>
+                <a:solidFill>
+                  <a:schemeClr val="accent4"/>
+                </a:solidFill>
+                <a:latin typeface="Biome" panose="020B0503030204020804" pitchFamily="34" charset="0"/>
+                <a:cs typeface="Biome" panose="020B0503030204020804" pitchFamily="34" charset="0"/>
+              </a:rPr>
+              <a:t>CONTACT INFO</a:t>
+            </a:r>
+            <a:endParaRPr lang="en-US" dirty="0">
+              <a:solidFill>
+                <a:schemeClr val="accent4"/>
+              </a:solidFill>
+              <a:latin typeface="Biome" panose="020B0503030204020804" pitchFamily="34" charset="0"/>
+              <a:cs typeface="Biome" panose="020B0503030204020804" pitchFamily="34" charset="0"/>
+            </a:endParaRPr>
+          </a:p>
+        </p:txBody>
+      </p:sp>
       <p:sp>
         <p:nvSpPr>
           <p:cNvPr id="3" name="Text Placeholder 2">
             <a:extLst>
               <a:ext uri="{FF2B5EF4-FFF2-40B4-BE49-F238E27FC236}">
-                <a16:creationId xmlns:a16="http://schemas.microsoft.com/office/drawing/2014/main" id="{0CF4EECB-47E7-26A0-F3A1-ACAE7AEE5741}"/>
-              </a:ext>
-            </a:extLst>
-          </p:cNvPr>
-          <p:cNvSpPr>
-            <a:spLocks noGrp="1"/>
-          </p:cNvSpPr>
-          <p:nvPr>
-            <p:ph type="body" sz="quarter" idx="12"/>
-          </p:nvPr>
-        </p:nvSpPr>
-        <p:spPr/>
-        <p:txBody>
-          <a:bodyPr/>
-          <a:lstStyle/>
-          <a:p>
-            <a:r>
-              <a:rPr lang="en-US" dirty="0"/>
-              <a:t>Step 1</a:t>
-            </a:r>
-          </a:p>
-        </p:txBody>
-      </p:sp>
-      <p:sp>
-        <p:nvSpPr>
-          <p:cNvPr id="133" name="Text Placeholder 132">
-            <a:extLst>
-              <a:ext uri="{FF2B5EF4-FFF2-40B4-BE49-F238E27FC236}">
-                <a16:creationId xmlns:a16="http://schemas.microsoft.com/office/drawing/2014/main" id="{0D7DF893-CDC1-A213-86BF-C9C73F979CC5}"/>
-              </a:ext>
-            </a:extLst>
-          </p:cNvPr>
-          <p:cNvSpPr>
-            <a:spLocks noGrp="1"/>
-          </p:cNvSpPr>
-          <p:nvPr>
-            <p:ph type="body" sz="quarter" idx="28"/>
-          </p:nvPr>
-        </p:nvSpPr>
-        <p:spPr/>
-        <p:txBody>
-          <a:bodyPr/>
-          <a:lstStyle/>
-          <a:p>
-            <a:endParaRPr lang="en-US" dirty="0"/>
-          </a:p>
-        </p:txBody>
-      </p:sp>
-      <p:sp>
-        <p:nvSpPr>
-          <p:cNvPr id="5" name="Text Placeholder 4">
-            <a:extLst>
-              <a:ext uri="{FF2B5EF4-FFF2-40B4-BE49-F238E27FC236}">
-                <a16:creationId xmlns:a16="http://schemas.microsoft.com/office/drawing/2014/main" id="{AC2F0535-53EA-30FB-770D-0C92BEEF3F6D}"/>
-              </a:ext>
-            </a:extLst>
-          </p:cNvPr>
-          <p:cNvSpPr>
-            <a:spLocks noGrp="1"/>
-          </p:cNvSpPr>
-          <p:nvPr>
-            <p:ph type="body" sz="quarter" idx="14"/>
-          </p:nvPr>
-        </p:nvSpPr>
-        <p:spPr/>
-        <p:txBody>
-          <a:bodyPr/>
-          <a:lstStyle/>
-          <a:p>
-            <a:pPr lvl="0"/>
-            <a:r>
-              <a:rPr lang="en-US" dirty="0"/>
-              <a:t>Step 2</a:t>
-            </a:r>
-          </a:p>
-        </p:txBody>
-      </p:sp>
-      <p:sp>
-        <p:nvSpPr>
-          <p:cNvPr id="134" name="Text Placeholder 133">
-            <a:extLst>
-              <a:ext uri="{FF2B5EF4-FFF2-40B4-BE49-F238E27FC236}">
-                <a16:creationId xmlns:a16="http://schemas.microsoft.com/office/drawing/2014/main" id="{9CE100CE-4574-F901-234D-B9BEED642B9B}"/>
-              </a:ext>
-            </a:extLst>
-          </p:cNvPr>
-          <p:cNvSpPr>
-            <a:spLocks noGrp="1"/>
-          </p:cNvSpPr>
-          <p:nvPr>
-            <p:ph type="body" sz="quarter" idx="29"/>
-          </p:nvPr>
-        </p:nvSpPr>
-        <p:spPr/>
-        <p:txBody>
-          <a:bodyPr/>
-          <a:lstStyle/>
-          <a:p>
-            <a:endParaRPr lang="en-US" dirty="0"/>
-          </a:p>
-        </p:txBody>
-      </p:sp>
-      <p:sp>
-        <p:nvSpPr>
-          <p:cNvPr id="7" name="Text Placeholder 6">
-            <a:extLst>
-              <a:ext uri="{FF2B5EF4-FFF2-40B4-BE49-F238E27FC236}">
-                <a16:creationId xmlns:a16="http://schemas.microsoft.com/office/drawing/2014/main" id="{31511481-29C6-275B-963E-B5AF2E87ADA2}"/>
-              </a:ext>
-            </a:extLst>
-          </p:cNvPr>
-          <p:cNvSpPr>
-            <a:spLocks noGrp="1"/>
-          </p:cNvSpPr>
-          <p:nvPr>
-            <p:ph type="body" sz="quarter" idx="16"/>
-          </p:nvPr>
-        </p:nvSpPr>
-        <p:spPr/>
-        <p:txBody>
-          <a:bodyPr/>
-          <a:lstStyle/>
-          <a:p>
-            <a:pPr lvl="0"/>
-            <a:r>
-              <a:rPr lang="en-US" dirty="0"/>
-              <a:t>Step 3</a:t>
-            </a:r>
-          </a:p>
-        </p:txBody>
-      </p:sp>
-      <p:sp>
-        <p:nvSpPr>
-          <p:cNvPr id="135" name="Text Placeholder 134">
-            <a:extLst>
-              <a:ext uri="{FF2B5EF4-FFF2-40B4-BE49-F238E27FC236}">
-                <a16:creationId xmlns:a16="http://schemas.microsoft.com/office/drawing/2014/main" id="{288EBDBE-0ABC-82CE-4598-09F65E315AD7}"/>
-              </a:ext>
-            </a:extLst>
-          </p:cNvPr>
-          <p:cNvSpPr>
-            <a:spLocks noGrp="1"/>
-          </p:cNvSpPr>
-          <p:nvPr>
-            <p:ph type="body" sz="quarter" idx="30"/>
-          </p:nvPr>
-        </p:nvSpPr>
-        <p:spPr/>
-        <p:txBody>
-          <a:bodyPr/>
-          <a:lstStyle/>
-          <a:p>
-            <a:endParaRPr lang="en-US" dirty="0"/>
-          </a:p>
-        </p:txBody>
-      </p:sp>
-      <p:sp>
-        <p:nvSpPr>
-          <p:cNvPr id="9" name="Text Placeholder 8">
-            <a:extLst>
-              <a:ext uri="{FF2B5EF4-FFF2-40B4-BE49-F238E27FC236}">
-                <a16:creationId xmlns:a16="http://schemas.microsoft.com/office/drawing/2014/main" id="{2F32973A-CF94-1C2B-BB12-B563173CC79A}"/>
-              </a:ext>
-            </a:extLst>
-          </p:cNvPr>
-          <p:cNvSpPr>
-            <a:spLocks noGrp="1"/>
-          </p:cNvSpPr>
-          <p:nvPr>
-            <p:ph type="body" sz="quarter" idx="18"/>
-          </p:nvPr>
-        </p:nvSpPr>
-        <p:spPr/>
-        <p:txBody>
-          <a:bodyPr/>
-          <a:lstStyle/>
-          <a:p>
-            <a:pPr lvl="0"/>
-            <a:r>
-              <a:rPr lang="en-US" dirty="0"/>
-              <a:t>Step 4</a:t>
-            </a:r>
-          </a:p>
-        </p:txBody>
-      </p:sp>
-      <p:sp>
-        <p:nvSpPr>
-          <p:cNvPr id="136" name="Text Placeholder 135">
-            <a:extLst>
-              <a:ext uri="{FF2B5EF4-FFF2-40B4-BE49-F238E27FC236}">
-                <a16:creationId xmlns:a16="http://schemas.microsoft.com/office/drawing/2014/main" id="{14F6CD04-2A18-A6BD-AAB9-1D30D1563399}"/>
-              </a:ext>
-            </a:extLst>
-          </p:cNvPr>
-          <p:cNvSpPr>
-            <a:spLocks noGrp="1"/>
-          </p:cNvSpPr>
-          <p:nvPr>
-            <p:ph type="body" sz="quarter" idx="31"/>
-          </p:nvPr>
-        </p:nvSpPr>
-        <p:spPr/>
-        <p:txBody>
-          <a:bodyPr/>
-          <a:lstStyle/>
-          <a:p>
-            <a:endParaRPr lang="en-US" dirty="0"/>
-          </a:p>
-        </p:txBody>
-      </p:sp>
-      <p:sp>
-        <p:nvSpPr>
-          <p:cNvPr id="11" name="Text Placeholder 10">
-            <a:extLst>
-              <a:ext uri="{FF2B5EF4-FFF2-40B4-BE49-F238E27FC236}">
-                <a16:creationId xmlns:a16="http://schemas.microsoft.com/office/drawing/2014/main" id="{CE7AA813-84F0-DB50-F6B6-A29A94662DAD}"/>
-              </a:ext>
-            </a:extLst>
-          </p:cNvPr>
-          <p:cNvSpPr>
-            <a:spLocks noGrp="1"/>
-          </p:cNvSpPr>
-          <p:nvPr>
-            <p:ph type="body" sz="quarter" idx="20"/>
-          </p:nvPr>
-        </p:nvSpPr>
-        <p:spPr/>
-        <p:txBody>
-          <a:bodyPr/>
-          <a:lstStyle/>
-          <a:p>
-            <a:pPr lvl="0"/>
-            <a:r>
-              <a:rPr lang="en-US" dirty="0"/>
-              <a:t>Step 5</a:t>
-            </a:r>
-          </a:p>
-        </p:txBody>
-      </p:sp>
-      <p:sp>
-        <p:nvSpPr>
-          <p:cNvPr id="137" name="Text Placeholder 136">
-            <a:extLst>
-              <a:ext uri="{FF2B5EF4-FFF2-40B4-BE49-F238E27FC236}">
-                <a16:creationId xmlns:a16="http://schemas.microsoft.com/office/drawing/2014/main" id="{C171CBDB-4593-F4D1-30E9-A47F4C7CADAF}"/>
-              </a:ext>
-            </a:extLst>
-          </p:cNvPr>
-          <p:cNvSpPr>
-            <a:spLocks noGrp="1"/>
-          </p:cNvSpPr>
-          <p:nvPr>
-            <p:ph type="body" sz="quarter" idx="32"/>
-          </p:nvPr>
-        </p:nvSpPr>
-        <p:spPr/>
-        <p:txBody>
-          <a:bodyPr/>
-          <a:lstStyle/>
-          <a:p>
-            <a:endParaRPr lang="en-US" dirty="0"/>
-          </a:p>
-        </p:txBody>
-      </p:sp>
-      <p:sp>
-        <p:nvSpPr>
-          <p:cNvPr id="69" name="Text Placeholder 68">
-            <a:extLst>
-              <a:ext uri="{FF2B5EF4-FFF2-40B4-BE49-F238E27FC236}">
-                <a16:creationId xmlns:a16="http://schemas.microsoft.com/office/drawing/2014/main" id="{4BBDF45D-9B32-0154-7602-2C43DAF6C0A6}"/>
-              </a:ext>
-            </a:extLst>
-          </p:cNvPr>
-          <p:cNvSpPr>
-            <a:spLocks noGrp="1"/>
-          </p:cNvSpPr>
-          <p:nvPr>
-            <p:ph type="body" sz="quarter" idx="13"/>
-          </p:nvPr>
-        </p:nvSpPr>
-        <p:spPr/>
-        <p:txBody>
-          <a:bodyPr/>
-          <a:lstStyle/>
-          <a:p>
-            <a:r>
-              <a:rPr lang="en-US" dirty="0"/>
-              <a:t>Choose a cryptocurrency exchange</a:t>
-            </a:r>
-          </a:p>
-          <a:p>
-            <a:endParaRPr lang="en-US" dirty="0"/>
-          </a:p>
-        </p:txBody>
-      </p:sp>
-      <p:sp>
-        <p:nvSpPr>
-          <p:cNvPr id="70" name="Text Placeholder 69">
-            <a:extLst>
-              <a:ext uri="{FF2B5EF4-FFF2-40B4-BE49-F238E27FC236}">
-                <a16:creationId xmlns:a16="http://schemas.microsoft.com/office/drawing/2014/main" id="{38FF6C9F-C7C5-37D5-4C61-BA14A636B732}"/>
-              </a:ext>
-            </a:extLst>
-          </p:cNvPr>
-          <p:cNvSpPr>
-            <a:spLocks noGrp="1"/>
-          </p:cNvSpPr>
-          <p:nvPr>
-            <p:ph type="body" sz="quarter" idx="15"/>
-          </p:nvPr>
-        </p:nvSpPr>
-        <p:spPr/>
-        <p:txBody>
-          <a:bodyPr/>
-          <a:lstStyle/>
-          <a:p>
-            <a:r>
-              <a:rPr lang="en-US" dirty="0"/>
-              <a:t>Purchase preferred coins &amp; create "wallet"</a:t>
-            </a:r>
-          </a:p>
-          <a:p>
-            <a:endParaRPr lang="en-US" dirty="0"/>
-          </a:p>
-        </p:txBody>
-      </p:sp>
-      <p:sp>
-        <p:nvSpPr>
-          <p:cNvPr id="71" name="Text Placeholder 70">
-            <a:extLst>
-              <a:ext uri="{FF2B5EF4-FFF2-40B4-BE49-F238E27FC236}">
-                <a16:creationId xmlns:a16="http://schemas.microsoft.com/office/drawing/2014/main" id="{5973BD56-1612-983E-EA67-F4039B062085}"/>
-              </a:ext>
-            </a:extLst>
-          </p:cNvPr>
-          <p:cNvSpPr>
-            <a:spLocks noGrp="1"/>
-          </p:cNvSpPr>
-          <p:nvPr>
-            <p:ph type="body" sz="quarter" idx="17"/>
-          </p:nvPr>
-        </p:nvSpPr>
-        <p:spPr/>
-        <p:txBody>
-          <a:bodyPr/>
-          <a:lstStyle/>
-          <a:p>
-            <a:r>
-              <a:rPr lang="en-US" dirty="0"/>
-              <a:t>Research investment and trading options</a:t>
-            </a:r>
-          </a:p>
-          <a:p>
-            <a:endParaRPr lang="en-US" dirty="0"/>
-          </a:p>
-        </p:txBody>
-      </p:sp>
-      <p:sp>
-        <p:nvSpPr>
-          <p:cNvPr id="72" name="Text Placeholder 71">
-            <a:extLst>
-              <a:ext uri="{FF2B5EF4-FFF2-40B4-BE49-F238E27FC236}">
-                <a16:creationId xmlns:a16="http://schemas.microsoft.com/office/drawing/2014/main" id="{840CFADA-CAD6-2A04-5B15-5DB4DD6A84E0}"/>
-              </a:ext>
-            </a:extLst>
-          </p:cNvPr>
-          <p:cNvSpPr>
-            <a:spLocks noGrp="1"/>
-          </p:cNvSpPr>
-          <p:nvPr>
-            <p:ph type="body" sz="quarter" idx="19"/>
-          </p:nvPr>
-        </p:nvSpPr>
-        <p:spPr/>
-        <p:txBody>
-          <a:bodyPr/>
-          <a:lstStyle/>
-          <a:p>
-            <a:r>
-              <a:rPr lang="en-US" dirty="0"/>
-              <a:t>Stake preferred coins in chosen company</a:t>
-            </a:r>
-          </a:p>
-          <a:p>
-            <a:endParaRPr lang="en-US" dirty="0"/>
-          </a:p>
-        </p:txBody>
-      </p:sp>
-      <p:sp>
-        <p:nvSpPr>
-          <p:cNvPr id="73" name="Text Placeholder 72">
-            <a:extLst>
-              <a:ext uri="{FF2B5EF4-FFF2-40B4-BE49-F238E27FC236}">
-                <a16:creationId xmlns:a16="http://schemas.microsoft.com/office/drawing/2014/main" id="{DB3347BB-2913-A230-8362-2B778394E7CE}"/>
-              </a:ext>
-            </a:extLst>
-          </p:cNvPr>
-          <p:cNvSpPr>
-            <a:spLocks noGrp="1"/>
-          </p:cNvSpPr>
-          <p:nvPr>
-            <p:ph type="body" sz="quarter" idx="21"/>
-          </p:nvPr>
-        </p:nvSpPr>
-        <p:spPr/>
-        <p:txBody>
-          <a:bodyPr/>
-          <a:lstStyle/>
-          <a:p>
-            <a:pPr lvl="0"/>
-            <a:r>
-              <a:rPr lang="en-US" dirty="0"/>
-              <a:t>Set exponential growth goals</a:t>
-            </a:r>
-          </a:p>
-        </p:txBody>
-      </p:sp>
-      <p:sp>
-        <p:nvSpPr>
-          <p:cNvPr id="138" name="Footer Placeholder 137">
-            <a:extLst>
-              <a:ext uri="{FF2B5EF4-FFF2-40B4-BE49-F238E27FC236}">
-                <a16:creationId xmlns:a16="http://schemas.microsoft.com/office/drawing/2014/main" id="{8BC11123-4B26-8100-E85C-F218651524A5}"/>
-              </a:ext>
-            </a:extLst>
-          </p:cNvPr>
-          <p:cNvSpPr>
-            <a:spLocks noGrp="1"/>
-          </p:cNvSpPr>
-          <p:nvPr>
-            <p:ph type="ftr" sz="quarter" idx="10"/>
-          </p:nvPr>
-        </p:nvSpPr>
-        <p:spPr/>
-        <p:txBody>
-          <a:bodyPr/>
-          <a:lstStyle/>
-          <a:p>
-            <a:r>
-              <a:rPr lang="en-US"/>
-              <a:t>Crypto: investing &amp; trading</a:t>
-            </a:r>
-            <a:endParaRPr lang="en-US" dirty="0"/>
-          </a:p>
-        </p:txBody>
-      </p:sp>
-    </p:spTree>
-    <p:extLst>
-      <p:ext uri="{BB962C8B-B14F-4D97-AF65-F5344CB8AC3E}">
-        <p14:creationId xmlns:p14="http://schemas.microsoft.com/office/powerpoint/2010/main" val="3510130985"/>
-      </p:ext>
-    </p:extLst>
-  </p:cSld>
-  <p:clrMapOvr>
-    <a:masterClrMapping/>
-  </p:clrMapOvr>
-</p:sld>
-</file>
-
-<file path=ppt/slides/slide13.xml><?xml version="1.0" encoding="utf-8"?>
-<p:sld xmlns:a="http://schemas.openxmlformats.org/drawingml/2006/main" xmlns:r="http://schemas.openxmlformats.org/officeDocument/2006/relationships" xmlns:p="http://schemas.openxmlformats.org/presentationml/2006/main">
-  <p:cSld>
-    <p:spTree>
-      <p:nvGrpSpPr>
-        <p:cNvPr id="1" name=""/>
-        <p:cNvGrpSpPr/>
-        <p:nvPr/>
-      </p:nvGrpSpPr>
-      <p:grpSpPr>
-        <a:xfrm>
-          <a:off x="0" y="0"/>
-          <a:ext cx="0" cy="0"/>
-          <a:chOff x="0" y="0"/>
-          <a:chExt cx="0" cy="0"/>
-        </a:xfrm>
-      </p:grpSpPr>
-      <p:sp>
-        <p:nvSpPr>
-          <p:cNvPr id="2" name="Title 1">
-            <a:extLst>
-              <a:ext uri="{FF2B5EF4-FFF2-40B4-BE49-F238E27FC236}">
-                <a16:creationId xmlns:a16="http://schemas.microsoft.com/office/drawing/2014/main" id="{189E73D4-535B-6DCC-2268-43A5E9E12C45}"/>
-              </a:ext>
-            </a:extLst>
-          </p:cNvPr>
-          <p:cNvSpPr>
-            <a:spLocks noGrp="1"/>
-          </p:cNvSpPr>
-          <p:nvPr>
-            <p:ph type="title"/>
-          </p:nvPr>
-        </p:nvSpPr>
-        <p:spPr/>
-        <p:txBody>
-          <a:bodyPr/>
-          <a:lstStyle/>
-          <a:p>
-            <a:r>
-              <a:rPr lang="en-US" dirty="0"/>
-              <a:t>HOW TO GET THERE</a:t>
-            </a:r>
-          </a:p>
-        </p:txBody>
-      </p:sp>
-      <p:sp>
-        <p:nvSpPr>
-          <p:cNvPr id="6" name="Slide Number Placeholder 5">
-            <a:extLst>
-              <a:ext uri="{FF2B5EF4-FFF2-40B4-BE49-F238E27FC236}">
-                <a16:creationId xmlns:a16="http://schemas.microsoft.com/office/drawing/2014/main" id="{6459FCA3-0124-0FA6-220B-D72E8F8034C8}"/>
-              </a:ext>
-            </a:extLst>
-          </p:cNvPr>
-          <p:cNvSpPr>
-            <a:spLocks noGrp="1"/>
-          </p:cNvSpPr>
-          <p:nvPr>
-            <p:ph type="sldNum" sz="quarter" idx="12"/>
-          </p:nvPr>
-        </p:nvSpPr>
-        <p:spPr/>
-        <p:txBody>
-          <a:bodyPr/>
-          <a:lstStyle/>
-          <a:p>
-            <a:fld id="{294A09A9-5501-47C1-A89A-A340965A2BE2}" type="slidenum">
-              <a:rPr lang="en-US" smtClean="0"/>
-              <a:t>13</a:t>
-            </a:fld>
-            <a:endParaRPr lang="en-US" dirty="0"/>
-          </a:p>
-        </p:txBody>
-      </p:sp>
-      <p:sp>
-        <p:nvSpPr>
-          <p:cNvPr id="3" name="Text Placeholder 2">
-            <a:extLst>
-              <a:ext uri="{FF2B5EF4-FFF2-40B4-BE49-F238E27FC236}">
-                <a16:creationId xmlns:a16="http://schemas.microsoft.com/office/drawing/2014/main" id="{5830852F-3FB7-6D2E-F6AC-1F6B9CAD2158}"/>
+                <a16:creationId xmlns:a16="http://schemas.microsoft.com/office/drawing/2014/main" id="{55519D01-29BE-BE76-41C5-9D58AD8119DC}"/>
               </a:ext>
             </a:extLst>
           </p:cNvPr>
@@ -19399,1663 +18747,129 @@
             <p:ph type="body" idx="1"/>
           </p:nvPr>
         </p:nvSpPr>
-        <p:spPr/>
+        <p:spPr>
+          <a:xfrm>
+            <a:off x="4798422" y="3429000"/>
+            <a:ext cx="6843631" cy="3105041"/>
+          </a:xfrm>
+        </p:spPr>
         <p:txBody>
           <a:bodyPr/>
           <a:lstStyle/>
           <a:p>
             <a:r>
-              <a:rPr lang="en-US" dirty="0"/>
-              <a:t>Strategize</a:t>
-            </a:r>
-          </a:p>
-          <a:p>
-            <a:endParaRPr lang="en-US" dirty="0"/>
-          </a:p>
-        </p:txBody>
-      </p:sp>
-      <p:sp>
-        <p:nvSpPr>
-          <p:cNvPr id="10" name="Content Placeholder 9">
-            <a:extLst>
-              <a:ext uri="{FF2B5EF4-FFF2-40B4-BE49-F238E27FC236}">
-                <a16:creationId xmlns:a16="http://schemas.microsoft.com/office/drawing/2014/main" id="{E135D3F1-0C33-3404-5D49-E70C9D100F2A}"/>
-              </a:ext>
-            </a:extLst>
-          </p:cNvPr>
-          <p:cNvSpPr>
-            <a:spLocks noGrp="1"/>
-          </p:cNvSpPr>
-          <p:nvPr>
-            <p:ph sz="half" idx="2"/>
-          </p:nvPr>
-        </p:nvSpPr>
-        <p:spPr/>
-        <p:txBody>
-          <a:bodyPr/>
-          <a:lstStyle/>
-          <a:p>
-            <a:r>
-              <a:rPr lang="en-US" dirty="0"/>
-              <a:t>Do your research and develop a plan with goals</a:t>
-            </a:r>
-          </a:p>
-          <a:p>
-            <a:r>
-              <a:rPr lang="en-US" dirty="0"/>
-              <a:t>Diversify your portfolio through coin ownership​</a:t>
-            </a:r>
-          </a:p>
-          <a:p>
-            <a:r>
-              <a:rPr lang="en-US" dirty="0"/>
-              <a:t>Follow the markets closely​</a:t>
-            </a:r>
-          </a:p>
-          <a:p>
-            <a:endParaRPr lang="en-US" dirty="0"/>
-          </a:p>
-          <a:p>
-            <a:endParaRPr lang="en-US" dirty="0"/>
-          </a:p>
-          <a:p>
-            <a:endParaRPr lang="en-US" dirty="0"/>
-          </a:p>
-        </p:txBody>
-      </p:sp>
-      <p:sp>
-        <p:nvSpPr>
-          <p:cNvPr id="5" name="Text Placeholder 4">
-            <a:extLst>
-              <a:ext uri="{FF2B5EF4-FFF2-40B4-BE49-F238E27FC236}">
-                <a16:creationId xmlns:a16="http://schemas.microsoft.com/office/drawing/2014/main" id="{BE5F7BD8-DA37-58AB-1F45-D0F045DF4B7B}"/>
-              </a:ext>
-            </a:extLst>
-          </p:cNvPr>
-          <p:cNvSpPr>
-            <a:spLocks noGrp="1"/>
-          </p:cNvSpPr>
-          <p:nvPr>
-            <p:ph type="body" sz="quarter" idx="3"/>
-          </p:nvPr>
-        </p:nvSpPr>
-        <p:spPr/>
-        <p:txBody>
-          <a:bodyPr/>
-          <a:lstStyle/>
-          <a:p>
-            <a:r>
-              <a:rPr lang="en-US" dirty="0"/>
-              <a:t>Minimize risk</a:t>
-            </a:r>
-          </a:p>
-        </p:txBody>
-      </p:sp>
-      <p:sp>
-        <p:nvSpPr>
-          <p:cNvPr id="11" name="Content Placeholder 10">
-            <a:extLst>
-              <a:ext uri="{FF2B5EF4-FFF2-40B4-BE49-F238E27FC236}">
-                <a16:creationId xmlns:a16="http://schemas.microsoft.com/office/drawing/2014/main" id="{724F2AAC-B18D-1D49-15F1-2D69101664AA}"/>
-              </a:ext>
-            </a:extLst>
-          </p:cNvPr>
-          <p:cNvSpPr>
-            <a:spLocks noGrp="1"/>
-          </p:cNvSpPr>
-          <p:nvPr>
-            <p:ph sz="quarter" idx="4"/>
-          </p:nvPr>
-        </p:nvSpPr>
-        <p:spPr/>
-        <p:txBody>
-          <a:bodyPr/>
-          <a:lstStyle/>
-          <a:p>
-            <a:r>
-              <a:rPr lang="en-US" dirty="0"/>
-              <a:t>Be cautious of scams and "too good to be true" scenarios</a:t>
-            </a:r>
-          </a:p>
-          <a:p>
-            <a:r>
-              <a:rPr lang="en-US" dirty="0"/>
-              <a:t>Avoid "all-in" strategies</a:t>
-            </a:r>
-          </a:p>
-          <a:p>
-            <a:endParaRPr lang="en-US" dirty="0"/>
-          </a:p>
-          <a:p>
-            <a:endParaRPr lang="en-US" dirty="0"/>
-          </a:p>
-          <a:p>
-            <a:endParaRPr lang="en-US" dirty="0"/>
-          </a:p>
-        </p:txBody>
-      </p:sp>
-      <p:sp>
-        <p:nvSpPr>
-          <p:cNvPr id="12" name="Text Placeholder 11">
-            <a:extLst>
-              <a:ext uri="{FF2B5EF4-FFF2-40B4-BE49-F238E27FC236}">
-                <a16:creationId xmlns:a16="http://schemas.microsoft.com/office/drawing/2014/main" id="{5E68EFF0-69C3-F9AE-1107-E08A22BCF938}"/>
-              </a:ext>
-            </a:extLst>
-          </p:cNvPr>
-          <p:cNvSpPr>
-            <a:spLocks noGrp="1"/>
-          </p:cNvSpPr>
-          <p:nvPr>
-            <p:ph type="body" sz="quarter" idx="13"/>
-          </p:nvPr>
-        </p:nvSpPr>
-        <p:spPr/>
-        <p:txBody>
-          <a:bodyPr/>
-          <a:lstStyle/>
-          <a:p>
-            <a:r>
-              <a:rPr lang="en-US" dirty="0"/>
-              <a:t>Utilize resources</a:t>
-            </a:r>
-          </a:p>
-        </p:txBody>
-      </p:sp>
-      <p:sp>
-        <p:nvSpPr>
-          <p:cNvPr id="13" name="Content Placeholder 12">
-            <a:extLst>
-              <a:ext uri="{FF2B5EF4-FFF2-40B4-BE49-F238E27FC236}">
-                <a16:creationId xmlns:a16="http://schemas.microsoft.com/office/drawing/2014/main" id="{4D6980BD-0225-0DD6-3D62-B0B1E983AB52}"/>
-              </a:ext>
-            </a:extLst>
-          </p:cNvPr>
-          <p:cNvSpPr>
-            <a:spLocks noGrp="1"/>
-          </p:cNvSpPr>
-          <p:nvPr>
-            <p:ph sz="quarter" idx="14"/>
-          </p:nvPr>
-        </p:nvSpPr>
-        <p:spPr>
-          <a:xfrm>
-            <a:off x="7973568" y="2743200"/>
-            <a:ext cx="3068680" cy="2578608"/>
-          </a:xfrm>
-        </p:spPr>
-        <p:txBody>
-          <a:bodyPr/>
-          <a:lstStyle/>
-          <a:p>
-            <a:r>
-              <a:rPr lang="en-US" dirty="0"/>
-              <a:t>Apps and platforms help streamline user experience</a:t>
-            </a:r>
-          </a:p>
-          <a:p>
-            <a:r>
-              <a:rPr lang="en-US" dirty="0"/>
-              <a:t>Seek expert guidance from Krypto Logics team members​</a:t>
-            </a:r>
-          </a:p>
-          <a:p>
-            <a:endParaRPr lang="en-US" dirty="0"/>
-          </a:p>
-          <a:p>
-            <a:endParaRPr lang="en-US" dirty="0"/>
-          </a:p>
-        </p:txBody>
-      </p:sp>
-      <p:sp>
-        <p:nvSpPr>
-          <p:cNvPr id="4" name="Footer Placeholder 3">
-            <a:extLst>
-              <a:ext uri="{FF2B5EF4-FFF2-40B4-BE49-F238E27FC236}">
-                <a16:creationId xmlns:a16="http://schemas.microsoft.com/office/drawing/2014/main" id="{A107ABA7-FC97-4D42-C4BC-897A88CF39AF}"/>
-              </a:ext>
-            </a:extLst>
-          </p:cNvPr>
-          <p:cNvSpPr>
-            <a:spLocks noGrp="1"/>
-          </p:cNvSpPr>
-          <p:nvPr>
-            <p:ph type="ftr" sz="quarter" idx="11"/>
-          </p:nvPr>
-        </p:nvSpPr>
-        <p:spPr/>
-        <p:txBody>
-          <a:bodyPr/>
-          <a:lstStyle/>
-          <a:p>
-            <a:r>
-              <a:rPr lang="en-US"/>
-              <a:t>Crypto: investing &amp; trading</a:t>
-            </a:r>
-            <a:endParaRPr lang="en-US" dirty="0"/>
-          </a:p>
-        </p:txBody>
-      </p:sp>
-    </p:spTree>
-    <p:extLst>
-      <p:ext uri="{BB962C8B-B14F-4D97-AF65-F5344CB8AC3E}">
-        <p14:creationId xmlns:p14="http://schemas.microsoft.com/office/powerpoint/2010/main" val="1877080978"/>
-      </p:ext>
-    </p:extLst>
-  </p:cSld>
-  <p:clrMapOvr>
-    <a:masterClrMapping/>
-  </p:clrMapOvr>
-</p:sld>
-</file>
-
-<file path=ppt/slides/slide14.xml><?xml version="1.0" encoding="utf-8"?>
-<p:sld xmlns:a="http://schemas.openxmlformats.org/drawingml/2006/main" xmlns:r="http://schemas.openxmlformats.org/officeDocument/2006/relationships" xmlns:p="http://schemas.openxmlformats.org/presentationml/2006/main">
-  <p:cSld>
-    <p:spTree>
-      <p:nvGrpSpPr>
-        <p:cNvPr id="1" name=""/>
-        <p:cNvGrpSpPr/>
-        <p:nvPr/>
-      </p:nvGrpSpPr>
-      <p:grpSpPr>
-        <a:xfrm>
-          <a:off x="0" y="0"/>
-          <a:ext cx="0" cy="0"/>
-          <a:chOff x="0" y="0"/>
-          <a:chExt cx="0" cy="0"/>
-        </a:xfrm>
-      </p:grpSpPr>
-      <p:sp>
-        <p:nvSpPr>
-          <p:cNvPr id="33" name="Title 32">
-            <a:extLst>
-              <a:ext uri="{FF2B5EF4-FFF2-40B4-BE49-F238E27FC236}">
-                <a16:creationId xmlns:a16="http://schemas.microsoft.com/office/drawing/2014/main" id="{57144164-5503-9D11-4F68-81F4CD378333}"/>
-              </a:ext>
-            </a:extLst>
-          </p:cNvPr>
-          <p:cNvSpPr>
-            <a:spLocks noGrp="1"/>
-          </p:cNvSpPr>
-          <p:nvPr>
-            <p:ph type="title"/>
-          </p:nvPr>
-        </p:nvSpPr>
-        <p:spPr/>
-        <p:txBody>
-          <a:bodyPr/>
-          <a:lstStyle/>
-          <a:p>
-            <a:r>
-              <a:rPr lang="en-US" dirty="0"/>
-              <a:t>MEET OUR TEAM</a:t>
-            </a:r>
-          </a:p>
-        </p:txBody>
-      </p:sp>
-      <p:sp>
-        <p:nvSpPr>
-          <p:cNvPr id="11" name="Slide Number Placeholder 10">
-            <a:extLst>
-              <a:ext uri="{FF2B5EF4-FFF2-40B4-BE49-F238E27FC236}">
-                <a16:creationId xmlns:a16="http://schemas.microsoft.com/office/drawing/2014/main" id="{9816FD90-6ABD-5EA8-0870-E27733B9F685}"/>
-              </a:ext>
-            </a:extLst>
-          </p:cNvPr>
-          <p:cNvSpPr>
-            <a:spLocks noGrp="1"/>
-          </p:cNvSpPr>
-          <p:nvPr>
-            <p:ph type="sldNum" sz="quarter" idx="11"/>
-          </p:nvPr>
-        </p:nvSpPr>
-        <p:spPr/>
-        <p:txBody>
-          <a:bodyPr/>
-          <a:lstStyle/>
-          <a:p>
-            <a:fld id="{294A09A9-5501-47C1-A89A-A340965A2BE2}" type="slidenum">
-              <a:rPr lang="en-US" smtClean="0"/>
-              <a:pPr/>
-              <a:t>14</a:t>
-            </a:fld>
-            <a:endParaRPr lang="en-US" dirty="0"/>
-          </a:p>
-        </p:txBody>
-      </p:sp>
-      <p:pic>
-        <p:nvPicPr>
-          <p:cNvPr id="16" name="Picture Placeholder 15" descr="Team member head shot&#10;">
-            <a:extLst>
-              <a:ext uri="{FF2B5EF4-FFF2-40B4-BE49-F238E27FC236}">
-                <a16:creationId xmlns:a16="http://schemas.microsoft.com/office/drawing/2014/main" id="{675FEA7C-5201-0219-EAA4-51C8A3B8185E}"/>
-              </a:ext>
-            </a:extLst>
-          </p:cNvPr>
-          <p:cNvPicPr>
-            <a:picLocks noGrp="1" noChangeAspect="1"/>
-          </p:cNvPicPr>
-          <p:nvPr>
-            <p:ph type="pic" sz="quarter" idx="20"/>
-          </p:nvPr>
-        </p:nvPicPr>
-        <p:blipFill rotWithShape="1">
-          <a:blip r:embed="rId2"/>
-          <a:srcRect t="45" b="45"/>
-          <a:stretch/>
-        </p:blipFill>
-        <p:spPr/>
-      </p:pic>
-      <p:sp>
-        <p:nvSpPr>
-          <p:cNvPr id="3" name="Text Placeholder 2">
-            <a:extLst>
-              <a:ext uri="{FF2B5EF4-FFF2-40B4-BE49-F238E27FC236}">
-                <a16:creationId xmlns:a16="http://schemas.microsoft.com/office/drawing/2014/main" id="{CFC225EB-9239-A8F4-48C2-D2E44A245C26}"/>
-              </a:ext>
-            </a:extLst>
-          </p:cNvPr>
-          <p:cNvSpPr>
-            <a:spLocks noGrp="1"/>
-          </p:cNvSpPr>
-          <p:nvPr>
-            <p:ph type="body" sz="quarter" idx="12"/>
-          </p:nvPr>
-        </p:nvSpPr>
-        <p:spPr/>
-        <p:txBody>
-          <a:bodyPr/>
-          <a:lstStyle/>
-          <a:p>
-            <a:r>
-              <a:rPr lang="en-US" dirty="0"/>
-              <a:t>Takuma Hayashi​</a:t>
-            </a:r>
-          </a:p>
-        </p:txBody>
-      </p:sp>
-      <p:sp>
-        <p:nvSpPr>
-          <p:cNvPr id="4" name="Text Placeholder 3">
-            <a:extLst>
-              <a:ext uri="{FF2B5EF4-FFF2-40B4-BE49-F238E27FC236}">
-                <a16:creationId xmlns:a16="http://schemas.microsoft.com/office/drawing/2014/main" id="{BF63BCC4-AF80-8D3B-413B-3F80C74503EE}"/>
-              </a:ext>
-            </a:extLst>
-          </p:cNvPr>
-          <p:cNvSpPr>
-            <a:spLocks noGrp="1"/>
-          </p:cNvSpPr>
-          <p:nvPr>
-            <p:ph type="body" sz="quarter" idx="13"/>
-          </p:nvPr>
-        </p:nvSpPr>
-        <p:spPr/>
-        <p:txBody>
-          <a:bodyPr/>
-          <a:lstStyle/>
-          <a:p>
-            <a:r>
-              <a:rPr lang="en-US" dirty="0"/>
-              <a:t>President</a:t>
-            </a:r>
-          </a:p>
-        </p:txBody>
-      </p:sp>
-      <p:pic>
-        <p:nvPicPr>
-          <p:cNvPr id="17" name="Picture Placeholder 16" descr="Team member head shot&#10;">
-            <a:extLst>
-              <a:ext uri="{FF2B5EF4-FFF2-40B4-BE49-F238E27FC236}">
-                <a16:creationId xmlns:a16="http://schemas.microsoft.com/office/drawing/2014/main" id="{8B1E138F-E5F8-7188-0E7F-C61CC315F3CA}"/>
-              </a:ext>
-            </a:extLst>
-          </p:cNvPr>
-          <p:cNvPicPr>
-            <a:picLocks noGrp="1" noChangeAspect="1"/>
-          </p:cNvPicPr>
-          <p:nvPr>
-            <p:ph type="pic" sz="quarter" idx="21"/>
-          </p:nvPr>
-        </p:nvPicPr>
-        <p:blipFill rotWithShape="1">
-          <a:blip r:embed="rId3"/>
-          <a:srcRect/>
-          <a:stretch/>
-        </p:blipFill>
-        <p:spPr/>
-      </p:pic>
-      <p:sp>
-        <p:nvSpPr>
-          <p:cNvPr id="5" name="Text Placeholder 4">
-            <a:extLst>
-              <a:ext uri="{FF2B5EF4-FFF2-40B4-BE49-F238E27FC236}">
-                <a16:creationId xmlns:a16="http://schemas.microsoft.com/office/drawing/2014/main" id="{664EAAE3-47A6-DF8C-088B-8353E312893A}"/>
-              </a:ext>
-            </a:extLst>
-          </p:cNvPr>
-          <p:cNvSpPr>
-            <a:spLocks noGrp="1"/>
-          </p:cNvSpPr>
-          <p:nvPr>
-            <p:ph type="body" sz="quarter" idx="14"/>
-          </p:nvPr>
-        </p:nvSpPr>
-        <p:spPr/>
-        <p:txBody>
-          <a:bodyPr/>
-          <a:lstStyle/>
-          <a:p>
-            <a:r>
-              <a:rPr lang="en-US" dirty="0"/>
-              <a:t>Mirjam Nilsson​</a:t>
-            </a:r>
-          </a:p>
-        </p:txBody>
-      </p:sp>
-      <p:sp>
-        <p:nvSpPr>
-          <p:cNvPr id="6" name="Text Placeholder 5">
-            <a:extLst>
-              <a:ext uri="{FF2B5EF4-FFF2-40B4-BE49-F238E27FC236}">
-                <a16:creationId xmlns:a16="http://schemas.microsoft.com/office/drawing/2014/main" id="{8E956031-A8E2-FF88-2769-10FEB7B754A7}"/>
-              </a:ext>
-            </a:extLst>
-          </p:cNvPr>
-          <p:cNvSpPr>
-            <a:spLocks noGrp="1"/>
-          </p:cNvSpPr>
-          <p:nvPr>
-            <p:ph type="body" sz="quarter" idx="15"/>
-          </p:nvPr>
-        </p:nvSpPr>
-        <p:spPr/>
-        <p:txBody>
-          <a:bodyPr/>
-          <a:lstStyle/>
-          <a:p>
-            <a:r>
-              <a:rPr lang="en-US" dirty="0"/>
-              <a:t>Chief Executive Officer</a:t>
-            </a:r>
-          </a:p>
-        </p:txBody>
-      </p:sp>
-      <p:pic>
-        <p:nvPicPr>
-          <p:cNvPr id="18" name="Picture Placeholder 17" descr="Team member head shot&#10;">
-            <a:extLst>
-              <a:ext uri="{FF2B5EF4-FFF2-40B4-BE49-F238E27FC236}">
-                <a16:creationId xmlns:a16="http://schemas.microsoft.com/office/drawing/2014/main" id="{F4608F53-148D-4D2F-6672-8A90E230C68A}"/>
-              </a:ext>
-            </a:extLst>
-          </p:cNvPr>
-          <p:cNvPicPr>
-            <a:picLocks noGrp="1" noChangeAspect="1"/>
-          </p:cNvPicPr>
-          <p:nvPr>
-            <p:ph type="pic" sz="quarter" idx="22"/>
-          </p:nvPr>
-        </p:nvPicPr>
-        <p:blipFill rotWithShape="1">
-          <a:blip r:embed="rId4"/>
-          <a:srcRect/>
-          <a:stretch/>
-        </p:blipFill>
-        <p:spPr/>
-      </p:pic>
-      <p:sp>
-        <p:nvSpPr>
-          <p:cNvPr id="7" name="Text Placeholder 6">
-            <a:extLst>
-              <a:ext uri="{FF2B5EF4-FFF2-40B4-BE49-F238E27FC236}">
-                <a16:creationId xmlns:a16="http://schemas.microsoft.com/office/drawing/2014/main" id="{24AD9EB9-CF0D-0D70-D541-05E1A813D00F}"/>
-              </a:ext>
-            </a:extLst>
-          </p:cNvPr>
-          <p:cNvSpPr>
-            <a:spLocks noGrp="1"/>
-          </p:cNvSpPr>
-          <p:nvPr>
-            <p:ph type="body" sz="quarter" idx="16"/>
-          </p:nvPr>
-        </p:nvSpPr>
-        <p:spPr/>
-        <p:txBody>
-          <a:bodyPr/>
-          <a:lstStyle/>
-          <a:p>
-            <a:r>
-              <a:rPr lang="en-US" dirty="0"/>
-              <a:t>Flora Berggren​</a:t>
-            </a:r>
-          </a:p>
-        </p:txBody>
-      </p:sp>
-      <p:sp>
-        <p:nvSpPr>
-          <p:cNvPr id="8" name="Text Placeholder 7">
-            <a:extLst>
-              <a:ext uri="{FF2B5EF4-FFF2-40B4-BE49-F238E27FC236}">
-                <a16:creationId xmlns:a16="http://schemas.microsoft.com/office/drawing/2014/main" id="{869DE758-CE4B-6136-04AE-85B544CA6F5B}"/>
-              </a:ext>
-            </a:extLst>
-          </p:cNvPr>
-          <p:cNvSpPr>
-            <a:spLocks noGrp="1"/>
-          </p:cNvSpPr>
-          <p:nvPr>
-            <p:ph type="body" sz="quarter" idx="17"/>
-          </p:nvPr>
-        </p:nvSpPr>
-        <p:spPr/>
-        <p:txBody>
-          <a:bodyPr/>
-          <a:lstStyle/>
-          <a:p>
-            <a:r>
-              <a:rPr lang="en-US" dirty="0"/>
-              <a:t>Chief Operations Officer</a:t>
-            </a:r>
-          </a:p>
-        </p:txBody>
-      </p:sp>
-      <p:pic>
-        <p:nvPicPr>
-          <p:cNvPr id="19" name="Picture Placeholder 18" descr="Team member head shot&#10;">
-            <a:extLst>
-              <a:ext uri="{FF2B5EF4-FFF2-40B4-BE49-F238E27FC236}">
-                <a16:creationId xmlns:a16="http://schemas.microsoft.com/office/drawing/2014/main" id="{34C21939-A4DB-0F96-83D8-AD8FFB45359F}"/>
-              </a:ext>
-            </a:extLst>
-          </p:cNvPr>
-          <p:cNvPicPr>
-            <a:picLocks noGrp="1" noChangeAspect="1"/>
-          </p:cNvPicPr>
-          <p:nvPr>
-            <p:ph type="pic" sz="quarter" idx="23"/>
-          </p:nvPr>
-        </p:nvPicPr>
-        <p:blipFill rotWithShape="1">
-          <a:blip r:embed="rId5"/>
-          <a:srcRect l="174" r="174"/>
-          <a:stretch/>
-        </p:blipFill>
-        <p:spPr/>
-      </p:pic>
-      <p:sp>
-        <p:nvSpPr>
-          <p:cNvPr id="9" name="Text Placeholder 8">
-            <a:extLst>
-              <a:ext uri="{FF2B5EF4-FFF2-40B4-BE49-F238E27FC236}">
-                <a16:creationId xmlns:a16="http://schemas.microsoft.com/office/drawing/2014/main" id="{22A99FBE-9850-5F5D-04D9-E3A83DEEA928}"/>
-              </a:ext>
-            </a:extLst>
-          </p:cNvPr>
-          <p:cNvSpPr>
-            <a:spLocks noGrp="1"/>
-          </p:cNvSpPr>
-          <p:nvPr>
-            <p:ph type="body" sz="quarter" idx="18"/>
-          </p:nvPr>
-        </p:nvSpPr>
-        <p:spPr/>
-        <p:txBody>
-          <a:bodyPr/>
-          <a:lstStyle/>
-          <a:p>
-            <a:r>
-              <a:rPr lang="en-US" dirty="0"/>
-              <a:t>Rajesh Santoshi​</a:t>
-            </a:r>
-          </a:p>
-        </p:txBody>
-      </p:sp>
-      <p:sp>
-        <p:nvSpPr>
-          <p:cNvPr id="10" name="Text Placeholder 9">
-            <a:extLst>
-              <a:ext uri="{FF2B5EF4-FFF2-40B4-BE49-F238E27FC236}">
-                <a16:creationId xmlns:a16="http://schemas.microsoft.com/office/drawing/2014/main" id="{19AAB49A-6730-B2CF-9537-FF9551D4EB80}"/>
-              </a:ext>
-            </a:extLst>
-          </p:cNvPr>
-          <p:cNvSpPr>
-            <a:spLocks noGrp="1"/>
-          </p:cNvSpPr>
-          <p:nvPr>
-            <p:ph type="body" sz="quarter" idx="19"/>
-          </p:nvPr>
-        </p:nvSpPr>
-        <p:spPr/>
-        <p:txBody>
-          <a:bodyPr/>
-          <a:lstStyle/>
-          <a:p>
-            <a:r>
-              <a:rPr lang="en-US" dirty="0"/>
-              <a:t>VP Marketing</a:t>
-            </a:r>
-          </a:p>
-        </p:txBody>
-      </p:sp>
-      <p:sp>
-        <p:nvSpPr>
-          <p:cNvPr id="2" name="Footer Placeholder 1">
-            <a:extLst>
-              <a:ext uri="{FF2B5EF4-FFF2-40B4-BE49-F238E27FC236}">
-                <a16:creationId xmlns:a16="http://schemas.microsoft.com/office/drawing/2014/main" id="{23DFDBA5-4CFB-88D0-C90E-69D151F5BFCA}"/>
-              </a:ext>
-            </a:extLst>
-          </p:cNvPr>
-          <p:cNvSpPr>
-            <a:spLocks noGrp="1"/>
-          </p:cNvSpPr>
-          <p:nvPr>
-            <p:ph type="ftr" sz="quarter" idx="10"/>
-          </p:nvPr>
-        </p:nvSpPr>
-        <p:spPr/>
-        <p:txBody>
-          <a:bodyPr/>
-          <a:lstStyle/>
-          <a:p>
-            <a:r>
-              <a:rPr lang="en-US"/>
-              <a:t>Crypto: investing &amp; trading</a:t>
-            </a:r>
-            <a:endParaRPr lang="en-US" dirty="0"/>
-          </a:p>
-        </p:txBody>
-      </p:sp>
-    </p:spTree>
-    <p:extLst>
-      <p:ext uri="{BB962C8B-B14F-4D97-AF65-F5344CB8AC3E}">
-        <p14:creationId xmlns:p14="http://schemas.microsoft.com/office/powerpoint/2010/main" val="1579562137"/>
-      </p:ext>
-    </p:extLst>
-  </p:cSld>
-  <p:clrMapOvr>
-    <a:masterClrMapping/>
-  </p:clrMapOvr>
-</p:sld>
-</file>
-
-<file path=ppt/slides/slide15.xml><?xml version="1.0" encoding="utf-8"?>
-<p:sld xmlns:a="http://schemas.openxmlformats.org/drawingml/2006/main" xmlns:r="http://schemas.openxmlformats.org/officeDocument/2006/relationships" xmlns:p="http://schemas.openxmlformats.org/presentationml/2006/main">
-  <p:cSld>
-    <p:spTree>
-      <p:nvGrpSpPr>
-        <p:cNvPr id="1" name=""/>
-        <p:cNvGrpSpPr/>
-        <p:nvPr/>
-      </p:nvGrpSpPr>
-      <p:grpSpPr>
-        <a:xfrm>
-          <a:off x="0" y="0"/>
-          <a:ext cx="0" cy="0"/>
-          <a:chOff x="0" y="0"/>
-          <a:chExt cx="0" cy="0"/>
-        </a:xfrm>
-      </p:grpSpPr>
-      <p:sp>
-        <p:nvSpPr>
-          <p:cNvPr id="33" name="Title 32">
-            <a:extLst>
-              <a:ext uri="{FF2B5EF4-FFF2-40B4-BE49-F238E27FC236}">
-                <a16:creationId xmlns:a16="http://schemas.microsoft.com/office/drawing/2014/main" id="{57144164-5503-9D11-4F68-81F4CD378333}"/>
-              </a:ext>
-            </a:extLst>
-          </p:cNvPr>
-          <p:cNvSpPr>
-            <a:spLocks noGrp="1"/>
-          </p:cNvSpPr>
-          <p:nvPr>
-            <p:ph type="title"/>
-          </p:nvPr>
-        </p:nvSpPr>
-        <p:spPr/>
-        <p:txBody>
-          <a:bodyPr/>
-          <a:lstStyle/>
-          <a:p>
-            <a:r>
-              <a:rPr lang="en-US" dirty="0"/>
-              <a:t>MEET OUR EXTENDED TEAM</a:t>
-            </a:r>
-          </a:p>
-        </p:txBody>
-      </p:sp>
-      <p:sp>
-        <p:nvSpPr>
-          <p:cNvPr id="11" name="Slide Number Placeholder 10">
-            <a:extLst>
-              <a:ext uri="{FF2B5EF4-FFF2-40B4-BE49-F238E27FC236}">
-                <a16:creationId xmlns:a16="http://schemas.microsoft.com/office/drawing/2014/main" id="{F02CA379-5C0D-5E21-B070-E880A01BB9A7}"/>
-              </a:ext>
-            </a:extLst>
-          </p:cNvPr>
-          <p:cNvSpPr>
-            <a:spLocks noGrp="1"/>
-          </p:cNvSpPr>
-          <p:nvPr>
-            <p:ph type="sldNum" sz="quarter" idx="11"/>
-          </p:nvPr>
-        </p:nvSpPr>
-        <p:spPr/>
-        <p:txBody>
-          <a:bodyPr/>
-          <a:lstStyle/>
-          <a:p>
-            <a:fld id="{294A09A9-5501-47C1-A89A-A340965A2BE2}" type="slidenum">
-              <a:rPr lang="en-US" smtClean="0"/>
-              <a:pPr/>
-              <a:t>15</a:t>
-            </a:fld>
-            <a:endParaRPr lang="en-US" dirty="0"/>
-          </a:p>
-        </p:txBody>
-      </p:sp>
-      <p:pic>
-        <p:nvPicPr>
-          <p:cNvPr id="16" name="Picture Placeholder 15" descr="Team member head shot&#10;">
-            <a:extLst>
-              <a:ext uri="{FF2B5EF4-FFF2-40B4-BE49-F238E27FC236}">
-                <a16:creationId xmlns:a16="http://schemas.microsoft.com/office/drawing/2014/main" id="{675FEA7C-5201-0219-EAA4-51C8A3B8185E}"/>
-              </a:ext>
-            </a:extLst>
-          </p:cNvPr>
-          <p:cNvPicPr>
-            <a:picLocks noGrp="1" noChangeAspect="1"/>
-          </p:cNvPicPr>
-          <p:nvPr>
-            <p:ph type="pic" sz="quarter" idx="20"/>
-          </p:nvPr>
-        </p:nvPicPr>
-        <p:blipFill rotWithShape="1">
-          <a:blip r:embed="rId2"/>
-          <a:srcRect/>
-          <a:stretch/>
-        </p:blipFill>
-        <p:spPr/>
-      </p:pic>
-      <p:sp>
-        <p:nvSpPr>
-          <p:cNvPr id="3" name="Text Placeholder 2">
-            <a:extLst>
-              <a:ext uri="{FF2B5EF4-FFF2-40B4-BE49-F238E27FC236}">
-                <a16:creationId xmlns:a16="http://schemas.microsoft.com/office/drawing/2014/main" id="{CFC225EB-9239-A8F4-48C2-D2E44A245C26}"/>
-              </a:ext>
-            </a:extLst>
-          </p:cNvPr>
-          <p:cNvSpPr>
-            <a:spLocks noGrp="1"/>
-          </p:cNvSpPr>
-          <p:nvPr>
-            <p:ph type="body" sz="quarter" idx="12"/>
-          </p:nvPr>
-        </p:nvSpPr>
-        <p:spPr/>
-        <p:txBody>
-          <a:bodyPr/>
-          <a:lstStyle/>
-          <a:p>
-            <a:r>
-              <a:rPr lang="en-US" dirty="0"/>
-              <a:t>Takuma Hayashi​</a:t>
-            </a:r>
-          </a:p>
-        </p:txBody>
-      </p:sp>
-      <p:sp>
-        <p:nvSpPr>
-          <p:cNvPr id="4" name="Text Placeholder 3">
-            <a:extLst>
-              <a:ext uri="{FF2B5EF4-FFF2-40B4-BE49-F238E27FC236}">
-                <a16:creationId xmlns:a16="http://schemas.microsoft.com/office/drawing/2014/main" id="{BF63BCC4-AF80-8D3B-413B-3F80C74503EE}"/>
-              </a:ext>
-            </a:extLst>
-          </p:cNvPr>
-          <p:cNvSpPr>
-            <a:spLocks noGrp="1"/>
-          </p:cNvSpPr>
-          <p:nvPr>
-            <p:ph type="body" sz="quarter" idx="13"/>
-          </p:nvPr>
-        </p:nvSpPr>
-        <p:spPr/>
-        <p:txBody>
-          <a:bodyPr/>
-          <a:lstStyle/>
-          <a:p>
-            <a:r>
-              <a:rPr lang="en-US" dirty="0"/>
-              <a:t>President</a:t>
-            </a:r>
-          </a:p>
-        </p:txBody>
-      </p:sp>
-      <p:pic>
-        <p:nvPicPr>
-          <p:cNvPr id="139" name="Picture Placeholder 138" descr="Team member head shot&#10;">
-            <a:extLst>
-              <a:ext uri="{FF2B5EF4-FFF2-40B4-BE49-F238E27FC236}">
-                <a16:creationId xmlns:a16="http://schemas.microsoft.com/office/drawing/2014/main" id="{40505ADD-6A41-FEA2-952B-68B8652C37DD}"/>
-              </a:ext>
-            </a:extLst>
-          </p:cNvPr>
-          <p:cNvPicPr>
-            <a:picLocks noGrp="1" noChangeAspect="1"/>
-          </p:cNvPicPr>
-          <p:nvPr>
-            <p:ph type="pic" sz="quarter" idx="24"/>
-          </p:nvPr>
-        </p:nvPicPr>
-        <p:blipFill rotWithShape="1">
-          <a:blip r:embed="rId3"/>
-          <a:srcRect/>
-          <a:stretch/>
-        </p:blipFill>
-        <p:spPr/>
-      </p:pic>
-      <p:sp>
-        <p:nvSpPr>
-          <p:cNvPr id="131" name="Text Placeholder 130">
-            <a:extLst>
-              <a:ext uri="{FF2B5EF4-FFF2-40B4-BE49-F238E27FC236}">
-                <a16:creationId xmlns:a16="http://schemas.microsoft.com/office/drawing/2014/main" id="{29B0FDD4-0C9D-9FEE-0CB5-5341E9A67D6A}"/>
-              </a:ext>
-            </a:extLst>
-          </p:cNvPr>
-          <p:cNvSpPr>
-            <a:spLocks noGrp="1"/>
-          </p:cNvSpPr>
-          <p:nvPr>
-            <p:ph type="body" sz="quarter" idx="28"/>
-          </p:nvPr>
-        </p:nvSpPr>
-        <p:spPr/>
-        <p:txBody>
-          <a:bodyPr/>
-          <a:lstStyle/>
-          <a:p>
-            <a:r>
-              <a:rPr lang="en-US" dirty="0"/>
-              <a:t>Graham Barnes</a:t>
-            </a:r>
-          </a:p>
-        </p:txBody>
-      </p:sp>
-      <p:sp>
-        <p:nvSpPr>
-          <p:cNvPr id="132" name="Text Placeholder 131">
-            <a:extLst>
-              <a:ext uri="{FF2B5EF4-FFF2-40B4-BE49-F238E27FC236}">
-                <a16:creationId xmlns:a16="http://schemas.microsoft.com/office/drawing/2014/main" id="{0E6B790C-A9A2-BF33-11DC-2AA2B45ADDDE}"/>
-              </a:ext>
-            </a:extLst>
-          </p:cNvPr>
-          <p:cNvSpPr>
-            <a:spLocks noGrp="1"/>
-          </p:cNvSpPr>
-          <p:nvPr>
-            <p:ph type="body" sz="quarter" idx="29"/>
-          </p:nvPr>
-        </p:nvSpPr>
-        <p:spPr/>
-        <p:txBody>
-          <a:bodyPr/>
-          <a:lstStyle/>
-          <a:p>
-            <a:r>
-              <a:rPr lang="en-US" dirty="0"/>
-              <a:t>VP Product</a:t>
-            </a:r>
-          </a:p>
-        </p:txBody>
-      </p:sp>
-      <p:pic>
-        <p:nvPicPr>
-          <p:cNvPr id="17" name="Picture Placeholder 16" descr="Team member head shot&#10;">
-            <a:extLst>
-              <a:ext uri="{FF2B5EF4-FFF2-40B4-BE49-F238E27FC236}">
-                <a16:creationId xmlns:a16="http://schemas.microsoft.com/office/drawing/2014/main" id="{8B1E138F-E5F8-7188-0E7F-C61CC315F3CA}"/>
-              </a:ext>
-            </a:extLst>
-          </p:cNvPr>
-          <p:cNvPicPr>
-            <a:picLocks noGrp="1" noChangeAspect="1"/>
-          </p:cNvPicPr>
-          <p:nvPr>
-            <p:ph type="pic" sz="quarter" idx="21"/>
-          </p:nvPr>
-        </p:nvPicPr>
-        <p:blipFill rotWithShape="1">
-          <a:blip r:embed="rId4"/>
-          <a:srcRect t="75" b="75"/>
-          <a:stretch/>
-        </p:blipFill>
-        <p:spPr/>
-      </p:pic>
-      <p:sp>
-        <p:nvSpPr>
-          <p:cNvPr id="5" name="Text Placeholder 4">
-            <a:extLst>
-              <a:ext uri="{FF2B5EF4-FFF2-40B4-BE49-F238E27FC236}">
-                <a16:creationId xmlns:a16="http://schemas.microsoft.com/office/drawing/2014/main" id="{664EAAE3-47A6-DF8C-088B-8353E312893A}"/>
-              </a:ext>
-            </a:extLst>
-          </p:cNvPr>
-          <p:cNvSpPr>
-            <a:spLocks noGrp="1"/>
-          </p:cNvSpPr>
-          <p:nvPr>
-            <p:ph type="body" sz="quarter" idx="14"/>
-          </p:nvPr>
-        </p:nvSpPr>
-        <p:spPr/>
-        <p:txBody>
-          <a:bodyPr/>
-          <a:lstStyle/>
-          <a:p>
-            <a:r>
-              <a:rPr lang="en-US" dirty="0"/>
-              <a:t>Mirjam Nilsson​</a:t>
-            </a:r>
-          </a:p>
-        </p:txBody>
-      </p:sp>
-      <p:sp>
-        <p:nvSpPr>
-          <p:cNvPr id="6" name="Text Placeholder 5">
-            <a:extLst>
-              <a:ext uri="{FF2B5EF4-FFF2-40B4-BE49-F238E27FC236}">
-                <a16:creationId xmlns:a16="http://schemas.microsoft.com/office/drawing/2014/main" id="{8E956031-A8E2-FF88-2769-10FEB7B754A7}"/>
-              </a:ext>
-            </a:extLst>
-          </p:cNvPr>
-          <p:cNvSpPr>
-            <a:spLocks noGrp="1"/>
-          </p:cNvSpPr>
-          <p:nvPr>
-            <p:ph type="body" sz="quarter" idx="15"/>
-          </p:nvPr>
-        </p:nvSpPr>
-        <p:spPr/>
-        <p:txBody>
-          <a:bodyPr/>
-          <a:lstStyle/>
-          <a:p>
-            <a:r>
-              <a:rPr lang="en-US" dirty="0"/>
-              <a:t>Chief Executive Officer</a:t>
-            </a:r>
-          </a:p>
-        </p:txBody>
-      </p:sp>
-      <p:pic>
-        <p:nvPicPr>
-          <p:cNvPr id="140" name="Picture Placeholder 139" descr="Team member head shot&#10;">
-            <a:extLst>
-              <a:ext uri="{FF2B5EF4-FFF2-40B4-BE49-F238E27FC236}">
-                <a16:creationId xmlns:a16="http://schemas.microsoft.com/office/drawing/2014/main" id="{DAE46AC2-4E04-644A-503C-188DFB2C3463}"/>
-              </a:ext>
-            </a:extLst>
-          </p:cNvPr>
-          <p:cNvPicPr>
-            <a:picLocks noGrp="1" noChangeAspect="1"/>
-          </p:cNvPicPr>
-          <p:nvPr>
-            <p:ph type="pic" sz="quarter" idx="25"/>
-          </p:nvPr>
-        </p:nvPicPr>
-        <p:blipFill rotWithShape="1">
-          <a:blip r:embed="rId5"/>
-          <a:srcRect t="75" b="75"/>
-          <a:stretch/>
-        </p:blipFill>
-        <p:spPr/>
-      </p:pic>
-      <p:sp>
-        <p:nvSpPr>
-          <p:cNvPr id="133" name="Text Placeholder 132">
-            <a:extLst>
-              <a:ext uri="{FF2B5EF4-FFF2-40B4-BE49-F238E27FC236}">
-                <a16:creationId xmlns:a16="http://schemas.microsoft.com/office/drawing/2014/main" id="{F73428BF-556B-39B3-A2E1-A3479B7A4368}"/>
-              </a:ext>
-            </a:extLst>
-          </p:cNvPr>
-          <p:cNvSpPr>
-            <a:spLocks noGrp="1"/>
-          </p:cNvSpPr>
-          <p:nvPr>
-            <p:ph type="body" sz="quarter" idx="30"/>
-          </p:nvPr>
-        </p:nvSpPr>
-        <p:spPr/>
-        <p:txBody>
-          <a:bodyPr/>
-          <a:lstStyle/>
-          <a:p>
-            <a:r>
-              <a:rPr lang="en-US" dirty="0"/>
-              <a:t>Rowan Murphy</a:t>
-            </a:r>
-          </a:p>
-        </p:txBody>
-      </p:sp>
-      <p:sp>
-        <p:nvSpPr>
-          <p:cNvPr id="134" name="Text Placeholder 133">
-            <a:extLst>
-              <a:ext uri="{FF2B5EF4-FFF2-40B4-BE49-F238E27FC236}">
-                <a16:creationId xmlns:a16="http://schemas.microsoft.com/office/drawing/2014/main" id="{3519B91A-73EE-B2B8-4875-2C6A0113D333}"/>
-              </a:ext>
-            </a:extLst>
-          </p:cNvPr>
-          <p:cNvSpPr>
-            <a:spLocks noGrp="1"/>
-          </p:cNvSpPr>
-          <p:nvPr>
-            <p:ph type="body" sz="quarter" idx="31"/>
-          </p:nvPr>
-        </p:nvSpPr>
-        <p:spPr/>
-        <p:txBody>
-          <a:bodyPr/>
-          <a:lstStyle/>
-          <a:p>
-            <a:r>
-              <a:rPr lang="en-US" dirty="0"/>
-              <a:t>SEO Strategist</a:t>
-            </a:r>
-          </a:p>
-        </p:txBody>
-      </p:sp>
-      <p:pic>
-        <p:nvPicPr>
-          <p:cNvPr id="18" name="Picture Placeholder 17" descr="Team member head shot&#10;">
-            <a:extLst>
-              <a:ext uri="{FF2B5EF4-FFF2-40B4-BE49-F238E27FC236}">
-                <a16:creationId xmlns:a16="http://schemas.microsoft.com/office/drawing/2014/main" id="{F4608F53-148D-4D2F-6672-8A90E230C68A}"/>
-              </a:ext>
-            </a:extLst>
-          </p:cNvPr>
-          <p:cNvPicPr>
-            <a:picLocks noGrp="1" noChangeAspect="1"/>
-          </p:cNvPicPr>
-          <p:nvPr>
-            <p:ph type="pic" sz="quarter" idx="22"/>
-          </p:nvPr>
-        </p:nvPicPr>
-        <p:blipFill rotWithShape="1">
-          <a:blip r:embed="rId6"/>
-          <a:srcRect t="75" b="75"/>
-          <a:stretch/>
-        </p:blipFill>
-        <p:spPr/>
-      </p:pic>
-      <p:sp>
-        <p:nvSpPr>
-          <p:cNvPr id="7" name="Text Placeholder 6">
-            <a:extLst>
-              <a:ext uri="{FF2B5EF4-FFF2-40B4-BE49-F238E27FC236}">
-                <a16:creationId xmlns:a16="http://schemas.microsoft.com/office/drawing/2014/main" id="{24AD9EB9-CF0D-0D70-D541-05E1A813D00F}"/>
-              </a:ext>
-            </a:extLst>
-          </p:cNvPr>
-          <p:cNvSpPr>
-            <a:spLocks noGrp="1"/>
-          </p:cNvSpPr>
-          <p:nvPr>
-            <p:ph type="body" sz="quarter" idx="16"/>
-          </p:nvPr>
-        </p:nvSpPr>
-        <p:spPr/>
-        <p:txBody>
-          <a:bodyPr/>
-          <a:lstStyle/>
-          <a:p>
-            <a:r>
-              <a:rPr lang="en-US" dirty="0"/>
-              <a:t>Flora Berggren​</a:t>
-            </a:r>
-          </a:p>
-        </p:txBody>
-      </p:sp>
-      <p:sp>
-        <p:nvSpPr>
-          <p:cNvPr id="8" name="Text Placeholder 7">
-            <a:extLst>
-              <a:ext uri="{FF2B5EF4-FFF2-40B4-BE49-F238E27FC236}">
-                <a16:creationId xmlns:a16="http://schemas.microsoft.com/office/drawing/2014/main" id="{869DE758-CE4B-6136-04AE-85B544CA6F5B}"/>
-              </a:ext>
-            </a:extLst>
-          </p:cNvPr>
-          <p:cNvSpPr>
-            <a:spLocks noGrp="1"/>
-          </p:cNvSpPr>
-          <p:nvPr>
-            <p:ph type="body" sz="quarter" idx="17"/>
-          </p:nvPr>
-        </p:nvSpPr>
-        <p:spPr/>
-        <p:txBody>
-          <a:bodyPr/>
-          <a:lstStyle/>
-          <a:p>
-            <a:r>
-              <a:rPr lang="en-US" dirty="0"/>
-              <a:t>Chief Operations Officer</a:t>
-            </a:r>
-          </a:p>
-        </p:txBody>
-      </p:sp>
-      <p:pic>
-        <p:nvPicPr>
-          <p:cNvPr id="141" name="Picture Placeholder 140" descr="Team member head shot&#10;">
-            <a:extLst>
-              <a:ext uri="{FF2B5EF4-FFF2-40B4-BE49-F238E27FC236}">
-                <a16:creationId xmlns:a16="http://schemas.microsoft.com/office/drawing/2014/main" id="{105B8828-F685-63DD-6F9F-62F8A8DA6D06}"/>
-              </a:ext>
-            </a:extLst>
-          </p:cNvPr>
-          <p:cNvPicPr>
-            <a:picLocks noGrp="1" noChangeAspect="1"/>
-          </p:cNvPicPr>
-          <p:nvPr>
-            <p:ph type="pic" sz="quarter" idx="26"/>
-          </p:nvPr>
-        </p:nvPicPr>
-        <p:blipFill rotWithShape="1">
-          <a:blip r:embed="rId7"/>
-          <a:srcRect l="291" r="291"/>
-          <a:stretch/>
-        </p:blipFill>
-        <p:spPr/>
-      </p:pic>
-      <p:sp>
-        <p:nvSpPr>
-          <p:cNvPr id="135" name="Text Placeholder 134">
-            <a:extLst>
-              <a:ext uri="{FF2B5EF4-FFF2-40B4-BE49-F238E27FC236}">
-                <a16:creationId xmlns:a16="http://schemas.microsoft.com/office/drawing/2014/main" id="{747BF9B3-DF8F-789C-9AF6-94771E1AF5FE}"/>
-              </a:ext>
-            </a:extLst>
-          </p:cNvPr>
-          <p:cNvSpPr>
-            <a:spLocks noGrp="1"/>
-          </p:cNvSpPr>
-          <p:nvPr>
-            <p:ph type="body" sz="quarter" idx="32"/>
-          </p:nvPr>
-        </p:nvSpPr>
-        <p:spPr/>
-        <p:txBody>
-          <a:bodyPr/>
-          <a:lstStyle/>
-          <a:p>
-            <a:r>
-              <a:rPr lang="en-US" dirty="0"/>
-              <a:t>Elizabeth Moore</a:t>
-            </a:r>
-          </a:p>
-        </p:txBody>
-      </p:sp>
-      <p:sp>
-        <p:nvSpPr>
-          <p:cNvPr id="136" name="Text Placeholder 135">
-            <a:extLst>
-              <a:ext uri="{FF2B5EF4-FFF2-40B4-BE49-F238E27FC236}">
-                <a16:creationId xmlns:a16="http://schemas.microsoft.com/office/drawing/2014/main" id="{A2297428-B6BC-F5B5-C82D-3BC4408EC576}"/>
-              </a:ext>
-            </a:extLst>
-          </p:cNvPr>
-          <p:cNvSpPr>
-            <a:spLocks noGrp="1"/>
-          </p:cNvSpPr>
-          <p:nvPr>
-            <p:ph type="body" sz="quarter" idx="33"/>
-          </p:nvPr>
-        </p:nvSpPr>
-        <p:spPr/>
-        <p:txBody>
-          <a:bodyPr/>
-          <a:lstStyle/>
-          <a:p>
-            <a:r>
-              <a:rPr lang="en-US" dirty="0"/>
-              <a:t>Product Designer</a:t>
-            </a:r>
-          </a:p>
-        </p:txBody>
-      </p:sp>
-      <p:pic>
-        <p:nvPicPr>
-          <p:cNvPr id="19" name="Picture Placeholder 18" descr="Team member head shot&#10;">
-            <a:extLst>
-              <a:ext uri="{FF2B5EF4-FFF2-40B4-BE49-F238E27FC236}">
-                <a16:creationId xmlns:a16="http://schemas.microsoft.com/office/drawing/2014/main" id="{34C21939-A4DB-0F96-83D8-AD8FFB45359F}"/>
-              </a:ext>
-            </a:extLst>
-          </p:cNvPr>
-          <p:cNvPicPr>
-            <a:picLocks noGrp="1" noChangeAspect="1"/>
-          </p:cNvPicPr>
-          <p:nvPr>
-            <p:ph type="pic" sz="quarter" idx="23"/>
-          </p:nvPr>
-        </p:nvPicPr>
-        <p:blipFill rotWithShape="1">
-          <a:blip r:embed="rId8"/>
-          <a:srcRect l="99" r="99"/>
-          <a:stretch/>
-        </p:blipFill>
-        <p:spPr/>
-      </p:pic>
-      <p:sp>
-        <p:nvSpPr>
-          <p:cNvPr id="9" name="Text Placeholder 8">
-            <a:extLst>
-              <a:ext uri="{FF2B5EF4-FFF2-40B4-BE49-F238E27FC236}">
-                <a16:creationId xmlns:a16="http://schemas.microsoft.com/office/drawing/2014/main" id="{22A99FBE-9850-5F5D-04D9-E3A83DEEA928}"/>
-              </a:ext>
-            </a:extLst>
-          </p:cNvPr>
-          <p:cNvSpPr>
-            <a:spLocks noGrp="1"/>
-          </p:cNvSpPr>
-          <p:nvPr>
-            <p:ph type="body" sz="quarter" idx="18"/>
-          </p:nvPr>
-        </p:nvSpPr>
-        <p:spPr/>
-        <p:txBody>
-          <a:bodyPr/>
-          <a:lstStyle/>
-          <a:p>
-            <a:r>
-              <a:rPr lang="en-US" dirty="0"/>
-              <a:t>Rajesh Santoshi​</a:t>
-            </a:r>
-          </a:p>
-        </p:txBody>
-      </p:sp>
-      <p:sp>
-        <p:nvSpPr>
-          <p:cNvPr id="10" name="Text Placeholder 9">
-            <a:extLst>
-              <a:ext uri="{FF2B5EF4-FFF2-40B4-BE49-F238E27FC236}">
-                <a16:creationId xmlns:a16="http://schemas.microsoft.com/office/drawing/2014/main" id="{19AAB49A-6730-B2CF-9537-FF9551D4EB80}"/>
-              </a:ext>
-            </a:extLst>
-          </p:cNvPr>
-          <p:cNvSpPr>
-            <a:spLocks noGrp="1"/>
-          </p:cNvSpPr>
-          <p:nvPr>
-            <p:ph type="body" sz="quarter" idx="19"/>
-          </p:nvPr>
-        </p:nvSpPr>
-        <p:spPr/>
-        <p:txBody>
-          <a:bodyPr/>
-          <a:lstStyle/>
-          <a:p>
-            <a:r>
-              <a:rPr lang="en-US" dirty="0"/>
-              <a:t>VP Marketing</a:t>
-            </a:r>
-          </a:p>
-        </p:txBody>
-      </p:sp>
-      <p:pic>
-        <p:nvPicPr>
-          <p:cNvPr id="142" name="Picture Placeholder 141" descr="Team member head shot&#10;">
-            <a:extLst>
-              <a:ext uri="{FF2B5EF4-FFF2-40B4-BE49-F238E27FC236}">
-                <a16:creationId xmlns:a16="http://schemas.microsoft.com/office/drawing/2014/main" id="{E6A455C2-70F1-6DAE-26E6-C7AAE0CFA814}"/>
-              </a:ext>
-            </a:extLst>
-          </p:cNvPr>
-          <p:cNvPicPr>
-            <a:picLocks noGrp="1" noChangeAspect="1"/>
-          </p:cNvPicPr>
-          <p:nvPr>
-            <p:ph type="pic" sz="quarter" idx="27"/>
-          </p:nvPr>
-        </p:nvPicPr>
-        <p:blipFill rotWithShape="1">
-          <a:blip r:embed="rId9"/>
-          <a:srcRect l="291" r="291"/>
-          <a:stretch/>
-        </p:blipFill>
-        <p:spPr/>
-      </p:pic>
-      <p:sp>
-        <p:nvSpPr>
-          <p:cNvPr id="137" name="Text Placeholder 136">
-            <a:extLst>
-              <a:ext uri="{FF2B5EF4-FFF2-40B4-BE49-F238E27FC236}">
-                <a16:creationId xmlns:a16="http://schemas.microsoft.com/office/drawing/2014/main" id="{651B92A3-1DB6-8A7F-09B7-C7969D53FB3A}"/>
-              </a:ext>
-            </a:extLst>
-          </p:cNvPr>
-          <p:cNvSpPr>
-            <a:spLocks noGrp="1"/>
-          </p:cNvSpPr>
-          <p:nvPr>
-            <p:ph type="body" sz="quarter" idx="34"/>
-          </p:nvPr>
-        </p:nvSpPr>
-        <p:spPr/>
-        <p:txBody>
-          <a:bodyPr/>
-          <a:lstStyle/>
-          <a:p>
-            <a:r>
-              <a:rPr lang="en-US" dirty="0"/>
-              <a:t>Robin Kline</a:t>
-            </a:r>
-          </a:p>
-        </p:txBody>
-      </p:sp>
-      <p:sp>
-        <p:nvSpPr>
-          <p:cNvPr id="138" name="Text Placeholder 137">
-            <a:extLst>
-              <a:ext uri="{FF2B5EF4-FFF2-40B4-BE49-F238E27FC236}">
-                <a16:creationId xmlns:a16="http://schemas.microsoft.com/office/drawing/2014/main" id="{462B07C6-5B4D-AB97-3376-C4F8BFC2C143}"/>
-              </a:ext>
-            </a:extLst>
-          </p:cNvPr>
-          <p:cNvSpPr>
-            <a:spLocks noGrp="1"/>
-          </p:cNvSpPr>
-          <p:nvPr>
-            <p:ph type="body" sz="quarter" idx="35"/>
-          </p:nvPr>
-        </p:nvSpPr>
-        <p:spPr/>
-        <p:txBody>
-          <a:bodyPr/>
-          <a:lstStyle/>
-          <a:p>
-            <a:r>
-              <a:rPr lang="en-US" dirty="0"/>
-              <a:t>Content Developer</a:t>
-            </a:r>
-          </a:p>
-        </p:txBody>
-      </p:sp>
-      <p:sp>
-        <p:nvSpPr>
-          <p:cNvPr id="2" name="Footer Placeholder 1">
-            <a:extLst>
-              <a:ext uri="{FF2B5EF4-FFF2-40B4-BE49-F238E27FC236}">
-                <a16:creationId xmlns:a16="http://schemas.microsoft.com/office/drawing/2014/main" id="{E0C0AB0C-E0B6-7838-D865-2AB638122FD9}"/>
-              </a:ext>
-            </a:extLst>
-          </p:cNvPr>
-          <p:cNvSpPr>
-            <a:spLocks noGrp="1"/>
-          </p:cNvSpPr>
-          <p:nvPr>
-            <p:ph type="ftr" sz="quarter" idx="10"/>
-          </p:nvPr>
-        </p:nvSpPr>
-        <p:spPr/>
-        <p:txBody>
-          <a:bodyPr/>
-          <a:lstStyle/>
-          <a:p>
-            <a:r>
-              <a:rPr lang="en-US"/>
-              <a:t>Crypto: investing &amp; trading</a:t>
-            </a:r>
-            <a:endParaRPr lang="en-US" dirty="0"/>
-          </a:p>
-        </p:txBody>
-      </p:sp>
-    </p:spTree>
-    <p:extLst>
-      <p:ext uri="{BB962C8B-B14F-4D97-AF65-F5344CB8AC3E}">
-        <p14:creationId xmlns:p14="http://schemas.microsoft.com/office/powerpoint/2010/main" val="840605972"/>
-      </p:ext>
-    </p:extLst>
-  </p:cSld>
-  <p:clrMapOvr>
-    <a:masterClrMapping/>
-  </p:clrMapOvr>
-</p:sld>
-</file>
-
-<file path=ppt/slides/slide16.xml><?xml version="1.0" encoding="utf-8"?>
-<p:sld xmlns:a="http://schemas.openxmlformats.org/drawingml/2006/main" xmlns:r="http://schemas.openxmlformats.org/officeDocument/2006/relationships" xmlns:p="http://schemas.openxmlformats.org/presentationml/2006/main">
-  <p:cSld>
-    <p:spTree>
-      <p:nvGrpSpPr>
-        <p:cNvPr id="1" name=""/>
-        <p:cNvGrpSpPr/>
-        <p:nvPr/>
-      </p:nvGrpSpPr>
-      <p:grpSpPr>
-        <a:xfrm>
-          <a:off x="0" y="0"/>
-          <a:ext cx="0" cy="0"/>
-          <a:chOff x="0" y="0"/>
-          <a:chExt cx="0" cy="0"/>
-        </a:xfrm>
-      </p:grpSpPr>
-      <p:sp>
-        <p:nvSpPr>
-          <p:cNvPr id="2" name="Title 1">
-            <a:extLst>
-              <a:ext uri="{FF2B5EF4-FFF2-40B4-BE49-F238E27FC236}">
-                <a16:creationId xmlns:a16="http://schemas.microsoft.com/office/drawing/2014/main" id="{48C5BC92-868A-26B2-CBC0-C9D94E65F1A4}"/>
-              </a:ext>
-            </a:extLst>
-          </p:cNvPr>
-          <p:cNvSpPr>
-            <a:spLocks noGrp="1"/>
-          </p:cNvSpPr>
-          <p:nvPr>
-            <p:ph type="ctrTitle"/>
-          </p:nvPr>
-        </p:nvSpPr>
-        <p:spPr/>
-        <p:txBody>
-          <a:bodyPr/>
-          <a:lstStyle/>
-          <a:p>
-            <a:r>
-              <a:rPr lang="en-US" sz="4000" b="1" spc="600" dirty="0">
-                <a:ln w="28575">
-                  <a:noFill/>
-                  <a:prstDash val="solid"/>
-                </a:ln>
+              <a:rPr lang="en-US" dirty="0">
                 <a:solidFill>
-                  <a:schemeClr val="bg1"/>
+                  <a:schemeClr val="accent2">
+                    <a:lumMod val="60000"/>
+                    <a:lumOff val="40000"/>
+                  </a:schemeClr>
                 </a:solidFill>
-                <a:latin typeface="Tw Cen MT" panose="020B0602020104020603" pitchFamily="34" charset="77"/>
-                <a:ea typeface="Verdana" panose="020B0604030504040204" pitchFamily="34" charset="0"/>
-                <a:cs typeface="Verdana" panose="020B0604030504040204" pitchFamily="34" charset="0"/>
+                <a:latin typeface="Biome Light" panose="020B0303030204020804" pitchFamily="34" charset="0"/>
+                <a:cs typeface="Biome Light" panose="020B0303030204020804" pitchFamily="34" charset="0"/>
               </a:rPr>
-              <a:t>SUMMARY</a:t>
-            </a:r>
-            <a:endParaRPr lang="en-US" dirty="0"/>
-          </a:p>
-        </p:txBody>
-      </p:sp>
-      <p:sp>
-        <p:nvSpPr>
-          <p:cNvPr id="3" name="Subtitle 2">
-            <a:extLst>
-              <a:ext uri="{FF2B5EF4-FFF2-40B4-BE49-F238E27FC236}">
-                <a16:creationId xmlns:a16="http://schemas.microsoft.com/office/drawing/2014/main" id="{6F9C1627-7A56-025E-482D-E2AB014EDF92}"/>
-              </a:ext>
-            </a:extLst>
-          </p:cNvPr>
-          <p:cNvSpPr>
-            <a:spLocks noGrp="1"/>
-          </p:cNvSpPr>
-          <p:nvPr>
-            <p:ph type="subTitle" idx="1"/>
-          </p:nvPr>
-        </p:nvSpPr>
-        <p:spPr/>
-        <p:txBody>
-          <a:bodyPr/>
-          <a:lstStyle/>
-          <a:p>
-            <a:r>
-              <a:rPr lang="en-US" sz="1800" dirty="0">
+              <a:t>Joshlyn Jamerson</a:t>
+            </a:r>
+          </a:p>
+          <a:p>
+            <a:r>
+              <a:rPr lang="en-US" dirty="0">
                 <a:solidFill>
-                  <a:schemeClr val="bg1"/>
+                  <a:schemeClr val="accent2">
+                    <a:lumMod val="60000"/>
+                    <a:lumOff val="40000"/>
+                  </a:schemeClr>
                 </a:solidFill>
-                <a:latin typeface="Segoe UI Light" panose="020B0502040204020203" pitchFamily="34" charset="0"/>
-                <a:ea typeface="+mn-lt"/>
-                <a:cs typeface="Segoe UI Light" panose="020B0502040204020203" pitchFamily="34" charset="0"/>
+                <a:latin typeface="Biome Light" panose="020B0303030204020804" pitchFamily="34" charset="0"/>
+                <a:cs typeface="Biome Light" panose="020B0303030204020804" pitchFamily="34" charset="0"/>
+                <a:hlinkClick r:id="rId3">
+                  <a:extLst>
+                    <a:ext uri="{A12FA001-AC4F-418D-AE19-62706E023703}">
+                      <ahyp:hlinkClr xmlns:ahyp="http://schemas.microsoft.com/office/drawing/2018/hyperlinkcolor" val="tx"/>
+                    </a:ext>
+                  </a:extLst>
+                </a:hlinkClick>
               </a:rPr>
-              <a:t>At Krypto Logics, we believe in giving 110%. By using our next-generation data architecture, we help investors virtually manage their portfolios. We thrive because of our market knowledge and great team. As our CEO says, "Efficiencies will come from proactively transforming how we do business."</a:t>
-            </a:r>
-          </a:p>
-          <a:p>
-            <a:endParaRPr lang="en-US" dirty="0"/>
-          </a:p>
-        </p:txBody>
-      </p:sp>
-    </p:spTree>
-    <p:extLst>
-      <p:ext uri="{BB962C8B-B14F-4D97-AF65-F5344CB8AC3E}">
-        <p14:creationId xmlns:p14="http://schemas.microsoft.com/office/powerpoint/2010/main" val="1958759625"/>
-      </p:ext>
-    </p:extLst>
-  </p:cSld>
-  <p:clrMapOvr>
-    <a:masterClrMapping/>
-  </p:clrMapOvr>
-</p:sld>
-</file>
-
-<file path=ppt/slides/slide17.xml><?xml version="1.0" encoding="utf-8"?>
-<p:sld xmlns:a="http://schemas.openxmlformats.org/drawingml/2006/main" xmlns:r="http://schemas.openxmlformats.org/officeDocument/2006/relationships" xmlns:p="http://schemas.openxmlformats.org/presentationml/2006/main">
-  <p:cSld>
-    <p:spTree>
-      <p:nvGrpSpPr>
-        <p:cNvPr id="1" name=""/>
-        <p:cNvGrpSpPr/>
-        <p:nvPr/>
-      </p:nvGrpSpPr>
-      <p:grpSpPr>
-        <a:xfrm>
-          <a:off x="0" y="0"/>
-          <a:ext cx="0" cy="0"/>
-          <a:chOff x="0" y="0"/>
-          <a:chExt cx="0" cy="0"/>
-        </a:xfrm>
-      </p:grpSpPr>
-      <p:sp>
-        <p:nvSpPr>
-          <p:cNvPr id="2" name="Title 1">
-            <a:extLst>
-              <a:ext uri="{FF2B5EF4-FFF2-40B4-BE49-F238E27FC236}">
-                <a16:creationId xmlns:a16="http://schemas.microsoft.com/office/drawing/2014/main" id="{2C9E1892-81E6-551C-7B5A-DEA68224520B}"/>
-              </a:ext>
-            </a:extLst>
-          </p:cNvPr>
-          <p:cNvSpPr>
-            <a:spLocks noGrp="1"/>
-          </p:cNvSpPr>
-          <p:nvPr>
-            <p:ph type="title"/>
-          </p:nvPr>
-        </p:nvSpPr>
-        <p:spPr/>
-        <p:txBody>
-          <a:bodyPr/>
-          <a:lstStyle/>
-          <a:p>
-            <a:r>
-              <a:rPr lang="en-US" sz="4800" b="1" spc="600" dirty="0">
-                <a:ln w="28575">
-                  <a:noFill/>
-                  <a:prstDash val="solid"/>
-                </a:ln>
+              <a:t>Joshlyn.Jamerson@spaceforce.mil</a:t>
+            </a:r>
+            <a:endParaRPr lang="en-US" dirty="0">
+              <a:solidFill>
+                <a:schemeClr val="accent2">
+                  <a:lumMod val="60000"/>
+                  <a:lumOff val="40000"/>
+                </a:schemeClr>
+              </a:solidFill>
+              <a:latin typeface="Biome Light" panose="020B0303030204020804" pitchFamily="34" charset="0"/>
+              <a:cs typeface="Biome Light" panose="020B0303030204020804" pitchFamily="34" charset="0"/>
+            </a:endParaRPr>
+          </a:p>
+          <a:p>
+            <a:r>
+              <a:rPr lang="en-US" dirty="0">
                 <a:solidFill>
-                  <a:schemeClr val="bg1"/>
+                  <a:schemeClr val="accent2">
+                    <a:lumMod val="60000"/>
+                    <a:lumOff val="40000"/>
+                  </a:schemeClr>
                 </a:solidFill>
-                <a:latin typeface="Tw Cen MT" panose="020B0602020104020603" pitchFamily="34" charset="77"/>
+                <a:latin typeface="Biome Light" panose="020B0303030204020804" pitchFamily="34" charset="0"/>
+                <a:cs typeface="Biome Light" panose="020B0303030204020804" pitchFamily="34" charset="0"/>
               </a:rPr>
-              <a:t>THANK YOU</a:t>
-            </a:r>
-            <a:endParaRPr lang="en-US" dirty="0"/>
-          </a:p>
-        </p:txBody>
-      </p:sp>
-      <p:sp>
-        <p:nvSpPr>
-          <p:cNvPr id="3" name="Text Placeholder 2">
-            <a:extLst>
-              <a:ext uri="{FF2B5EF4-FFF2-40B4-BE49-F238E27FC236}">
-                <a16:creationId xmlns:a16="http://schemas.microsoft.com/office/drawing/2014/main" id="{55519D01-29BE-BE76-41C5-9D58AD8119DC}"/>
-              </a:ext>
-            </a:extLst>
-          </p:cNvPr>
-          <p:cNvSpPr>
-            <a:spLocks noGrp="1"/>
-          </p:cNvSpPr>
-          <p:nvPr>
-            <p:ph type="body" idx="1"/>
-          </p:nvPr>
-        </p:nvSpPr>
-        <p:spPr/>
-        <p:txBody>
-          <a:bodyPr/>
-          <a:lstStyle/>
-          <a:p>
-            <a:pPr algn="l"/>
+              <a:t>Original dataset: </a:t>
+            </a:r>
             <a:r>
               <a:rPr lang="en-US" dirty="0">
-                <a:latin typeface="Segoe UI Light" panose="020B0502040204020203" pitchFamily="34" charset="0"/>
-                <a:cs typeface="Segoe UI Light" panose="020B0502040204020203" pitchFamily="34" charset="0"/>
+                <a:solidFill>
+                  <a:schemeClr val="accent2">
+                    <a:lumMod val="60000"/>
+                    <a:lumOff val="40000"/>
+                  </a:schemeClr>
+                </a:solidFill>
+                <a:latin typeface="Biome Light" panose="020B0303030204020804" pitchFamily="34" charset="0"/>
+                <a:cs typeface="Biome Light" panose="020B0303030204020804" pitchFamily="34" charset="0"/>
+                <a:hlinkClick r:id="rId4">
+                  <a:extLst>
+                    <a:ext uri="{A12FA001-AC4F-418D-AE19-62706E023703}">
+                      <ahyp:hlinkClr xmlns:ahyp="http://schemas.microsoft.com/office/drawing/2018/hyperlinkcolor" val="tx"/>
+                    </a:ext>
+                  </a:extLst>
+                </a:hlinkClick>
               </a:rPr>
-              <a:t>Mirjam Nilsson​</a:t>
-            </a:r>
-          </a:p>
-          <a:p>
-            <a:pPr algn="l"/>
+              <a:t>https://www.kaggle.com/datasets/ucsusa/active-satellites</a:t>
+            </a:r>
+            <a:endParaRPr lang="en-US" dirty="0">
+              <a:solidFill>
+                <a:schemeClr val="accent2">
+                  <a:lumMod val="60000"/>
+                  <a:lumOff val="40000"/>
+                </a:schemeClr>
+              </a:solidFill>
+              <a:latin typeface="Biome Light" panose="020B0303030204020804" pitchFamily="34" charset="0"/>
+              <a:cs typeface="Biome Light" panose="020B0303030204020804" pitchFamily="34" charset="0"/>
+            </a:endParaRPr>
+          </a:p>
+          <a:p>
             <a:r>
               <a:rPr lang="en-US" dirty="0">
-                <a:latin typeface="Segoe UI Light" panose="020B0502040204020203" pitchFamily="34" charset="0"/>
-                <a:cs typeface="Segoe UI Light" panose="020B0502040204020203" pitchFamily="34" charset="0"/>
+                <a:solidFill>
+                  <a:schemeClr val="accent2">
+                    <a:lumMod val="60000"/>
+                    <a:lumOff val="40000"/>
+                  </a:schemeClr>
+                </a:solidFill>
+                <a:latin typeface="Biome Light" panose="020B0303030204020804" pitchFamily="34" charset="0"/>
+                <a:cs typeface="Biome Light" panose="020B0303030204020804" pitchFamily="34" charset="0"/>
               </a:rPr>
-              <a:t>mirjam@greatsiteaddress.com </a:t>
+              <a:t>GitHub Repository: https://github.com/joshlynj/active_satellites</a:t>
             </a:r>
             <a:endParaRPr lang="en-US" dirty="0">
-              <a:latin typeface="Segoe UI Light" panose="020B0502040204020203" pitchFamily="34" charset="0"/>
-              <a:ea typeface="Calibri"/>
-              <a:cs typeface="Segoe UI Light" panose="020B0502040204020203" pitchFamily="34" charset="0"/>
+              <a:solidFill>
+                <a:schemeClr val="accent2">
+                  <a:lumMod val="60000"/>
+                  <a:lumOff val="40000"/>
+                </a:schemeClr>
+              </a:solidFill>
             </a:endParaRPr>
-          </a:p>
-          <a:p>
-            <a:pPr algn="l"/>
-            <a:r>
-              <a:rPr lang="en-US" dirty="0">
-                <a:latin typeface="Segoe UI Light" panose="020B0502040204020203" pitchFamily="34" charset="0"/>
-                <a:cs typeface="Segoe UI Light" panose="020B0502040204020203" pitchFamily="34" charset="0"/>
-              </a:rPr>
-              <a:t>www.greatsiteaddress.com </a:t>
-            </a:r>
-            <a:endParaRPr lang="en-US" dirty="0">
-              <a:latin typeface="Segoe UI Light" panose="020B0502040204020203" pitchFamily="34" charset="0"/>
-              <a:ea typeface="Calibri" panose="020F0502020204030204"/>
-              <a:cs typeface="Segoe UI Light" panose="020B0502040204020203" pitchFamily="34" charset="0"/>
-            </a:endParaRPr>
-          </a:p>
-          <a:p>
-            <a:endParaRPr lang="en-US" dirty="0"/>
           </a:p>
         </p:txBody>
       </p:sp>
@@ -21094,7 +18908,7 @@
           <p:cNvPr id="2" name="Title 1">
             <a:extLst>
               <a:ext uri="{FF2B5EF4-FFF2-40B4-BE49-F238E27FC236}">
-                <a16:creationId xmlns:a16="http://schemas.microsoft.com/office/drawing/2014/main" id="{797310B5-D907-A977-7A9C-69F8BEB7BB3F}"/>
+                <a16:creationId xmlns:a16="http://schemas.microsoft.com/office/drawing/2014/main" id="{C07F7E09-6A9E-9FCC-7867-895F21ABE716}"/>
               </a:ext>
             </a:extLst>
           </p:cNvPr>
@@ -21102,38 +18916,50 @@
             <a:spLocks noGrp="1"/>
           </p:cNvSpPr>
           <p:nvPr>
-            <p:ph type="ctrTitle"/>
+            <p:ph type="title"/>
           </p:nvPr>
         </p:nvSpPr>
-        <p:spPr>
-          <a:xfrm>
-            <a:off x="962297" y="2035936"/>
-            <a:ext cx="10267406" cy="1069848"/>
-          </a:xfrm>
-        </p:spPr>
-        <p:txBody>
-          <a:bodyPr/>
+        <p:spPr/>
+        <p:txBody>
+          <a:bodyPr>
+            <a:normAutofit/>
+          </a:bodyPr>
           <a:lstStyle/>
           <a:p>
             <a:r>
-              <a:rPr lang="en-US" dirty="0">
+              <a:rPr lang="en-US" sz="4000" b="1" spc="600" dirty="0">
+                <a:ln w="28575">
+                  <a:noFill/>
+                  <a:prstDash val="solid"/>
+                </a:ln>
                 <a:solidFill>
-                  <a:schemeClr val="accent4"/>
+                  <a:schemeClr val="accent4">
+                    <a:lumMod val="90000"/>
+                  </a:schemeClr>
                 </a:solidFill>
                 <a:latin typeface="Biome" panose="020B0503030204020804" pitchFamily="34" charset="0"/>
                 <a:cs typeface="Biome" panose="020B0503030204020804" pitchFamily="34" charset="0"/>
               </a:rPr>
-              <a:t>STAKEHOLDER INTEREST</a:t>
-            </a:r>
-          </a:p>
-        </p:txBody>
-      </p:sp>
-      <p:sp>
-        <p:nvSpPr>
-          <p:cNvPr id="3" name="Subtitle 2">
-            <a:extLst>
-              <a:ext uri="{FF2B5EF4-FFF2-40B4-BE49-F238E27FC236}">
-                <a16:creationId xmlns:a16="http://schemas.microsoft.com/office/drawing/2014/main" id="{C05FF0B8-5B51-7376-0271-8D849CA3F8A8}"/>
+              <a:t>AGENDA</a:t>
+            </a:r>
+            <a:endParaRPr lang="en-US" dirty="0">
+              <a:solidFill>
+                <a:schemeClr val="accent4">
+                  <a:lumMod val="90000"/>
+                </a:schemeClr>
+              </a:solidFill>
+              <a:latin typeface="Biome" panose="020B0503030204020804" pitchFamily="34" charset="0"/>
+              <a:cs typeface="Biome" panose="020B0503030204020804" pitchFamily="34" charset="0"/>
+            </a:endParaRPr>
+          </a:p>
+        </p:txBody>
+      </p:sp>
+      <p:sp>
+        <p:nvSpPr>
+          <p:cNvPr id="5" name="Slide Number Placeholder 4">
+            <a:extLst>
+              <a:ext uri="{FF2B5EF4-FFF2-40B4-BE49-F238E27FC236}">
+                <a16:creationId xmlns:a16="http://schemas.microsoft.com/office/drawing/2014/main" id="{9157728F-9EA1-A705-8E4D-B7823E4F4C26}"/>
               </a:ext>
             </a:extLst>
           </p:cNvPr>
@@ -21141,20 +18967,51 @@
             <a:spLocks noGrp="1"/>
           </p:cNvSpPr>
           <p:nvPr>
-            <p:ph type="subTitle" idx="1"/>
+            <p:ph type="sldNum" sz="quarter" idx="11"/>
           </p:nvPr>
         </p:nvSpPr>
-        <p:spPr>
-          <a:xfrm>
-            <a:off x="1302634" y="3603650"/>
-            <a:ext cx="7837714" cy="2840736"/>
-          </a:xfrm>
-        </p:spPr>
+        <p:spPr/>
         <p:txBody>
           <a:bodyPr/>
           <a:lstStyle/>
           <a:p>
+            <a:fld id="{294A09A9-5501-47C1-A89A-A340965A2BE2}" type="slidenum">
+              <a:rPr lang="en-US" smtClean="0"/>
+              <a:pPr/>
+              <a:t>2</a:t>
+            </a:fld>
+            <a:endParaRPr lang="en-US" dirty="0"/>
+          </a:p>
+        </p:txBody>
+      </p:sp>
+      <p:sp>
+        <p:nvSpPr>
+          <p:cNvPr id="3" name="Content Placeholder 2">
+            <a:extLst>
+              <a:ext uri="{FF2B5EF4-FFF2-40B4-BE49-F238E27FC236}">
+                <a16:creationId xmlns:a16="http://schemas.microsoft.com/office/drawing/2014/main" id="{199158D4-7B61-0A48-E33F-792278D05724}"/>
+              </a:ext>
+            </a:extLst>
+          </p:cNvPr>
+          <p:cNvSpPr>
+            <a:spLocks noGrp="1"/>
+          </p:cNvSpPr>
+          <p:nvPr>
+            <p:ph idx="1"/>
+          </p:nvPr>
+        </p:nvSpPr>
+        <p:spPr/>
+        <p:txBody>
+          <a:bodyPr/>
+          <a:lstStyle/>
+          <a:p>
             <a:pPr marL="342900" indent="-342900" algn="l">
+              <a:lnSpc>
+                <a:spcPct val="150000"/>
+              </a:lnSpc>
+              <a:buClr>
+                <a:schemeClr val="accent6"/>
+              </a:buClr>
               <a:buFont typeface="Courier New" panose="02070309020205020404" pitchFamily="49" charset="0"/>
               <a:buChar char="o"/>
             </a:pPr>
@@ -21162,18 +19019,24 @@
               <a:rPr lang="en-US" dirty="0">
                 <a:solidFill>
                   <a:schemeClr val="accent2">
-                    <a:lumMod val="20000"/>
-                    <a:lumOff val="80000"/>
+                    <a:lumMod val="40000"/>
+                    <a:lumOff val="60000"/>
                   </a:schemeClr>
                 </a:solidFill>
                 <a:latin typeface="Biome Light" panose="020B0303030204020804" pitchFamily="34" charset="0"/>
                 <a:cs typeface="Biome Light" panose="020B0303030204020804" pitchFamily="34" charset="0"/>
               </a:rPr>
-              <a:t>Resource Allocation</a:t>
+              <a:t>Stakeholder Interest</a:t>
             </a:r>
           </a:p>
           <a:p>
             <a:pPr marL="342900" indent="-342900" algn="l">
+              <a:lnSpc>
+                <a:spcPct val="150000"/>
+              </a:lnSpc>
+              <a:buClr>
+                <a:schemeClr val="accent6"/>
+              </a:buClr>
               <a:buFont typeface="Courier New" panose="02070309020205020404" pitchFamily="49" charset="0"/>
               <a:buChar char="o"/>
             </a:pPr>
@@ -21181,18 +19044,24 @@
               <a:rPr lang="en-US" dirty="0">
                 <a:solidFill>
                   <a:schemeClr val="accent2">
-                    <a:lumMod val="20000"/>
-                    <a:lumOff val="80000"/>
+                    <a:lumMod val="40000"/>
+                    <a:lumOff val="60000"/>
                   </a:schemeClr>
                 </a:solidFill>
                 <a:latin typeface="Biome Light" panose="020B0303030204020804" pitchFamily="34" charset="0"/>
                 <a:cs typeface="Biome Light" panose="020B0303030204020804" pitchFamily="34" charset="0"/>
               </a:rPr>
-              <a:t>Mission Planning</a:t>
+              <a:t>Database Information</a:t>
             </a:r>
           </a:p>
           <a:p>
             <a:pPr marL="342900" indent="-342900" algn="l">
+              <a:lnSpc>
+                <a:spcPct val="150000"/>
+              </a:lnSpc>
+              <a:buClr>
+                <a:schemeClr val="accent6"/>
+              </a:buClr>
               <a:buFont typeface="Courier New" panose="02070309020205020404" pitchFamily="49" charset="0"/>
               <a:buChar char="o"/>
             </a:pPr>
@@ -21200,18 +19069,24 @@
               <a:rPr lang="en-US" dirty="0">
                 <a:solidFill>
                   <a:schemeClr val="accent2">
-                    <a:lumMod val="20000"/>
-                    <a:lumOff val="80000"/>
+                    <a:lumMod val="40000"/>
+                    <a:lumOff val="60000"/>
                   </a:schemeClr>
                 </a:solidFill>
                 <a:latin typeface="Biome Light" panose="020B0303030204020804" pitchFamily="34" charset="0"/>
                 <a:cs typeface="Biome Light" panose="020B0303030204020804" pitchFamily="34" charset="0"/>
               </a:rPr>
-              <a:t>Operational Continuity</a:t>
+              <a:t>Hypotheses </a:t>
             </a:r>
           </a:p>
           <a:p>
             <a:pPr marL="342900" indent="-342900" algn="l">
+              <a:lnSpc>
+                <a:spcPct val="150000"/>
+              </a:lnSpc>
+              <a:buClr>
+                <a:schemeClr val="accent6"/>
+              </a:buClr>
               <a:buFont typeface="Courier New" panose="02070309020205020404" pitchFamily="49" charset="0"/>
               <a:buChar char="o"/>
             </a:pPr>
@@ -21219,48 +19094,65 @@
               <a:rPr lang="en-US" dirty="0">
                 <a:solidFill>
                   <a:schemeClr val="accent2">
-                    <a:lumMod val="20000"/>
-                    <a:lumOff val="80000"/>
+                    <a:lumMod val="40000"/>
+                    <a:lumOff val="60000"/>
                   </a:schemeClr>
                 </a:solidFill>
                 <a:latin typeface="Biome Light" panose="020B0303030204020804" pitchFamily="34" charset="0"/>
                 <a:cs typeface="Biome Light" panose="020B0303030204020804" pitchFamily="34" charset="0"/>
               </a:rPr>
-              <a:t>Cost Management</a:t>
-            </a:r>
+              <a:t>Regression</a:t>
+            </a:r>
+          </a:p>
+          <a:p>
+            <a:pPr marL="0" indent="0" algn="l">
+              <a:lnSpc>
+                <a:spcPct val="150000"/>
+              </a:lnSpc>
+              <a:buClr>
+                <a:schemeClr val="accent6"/>
+              </a:buClr>
+              <a:buNone/>
+            </a:pPr>
+            <a:endParaRPr lang="en-US" dirty="0">
+              <a:solidFill>
+                <a:schemeClr val="accent2">
+                  <a:lumMod val="40000"/>
+                  <a:lumOff val="60000"/>
+                </a:schemeClr>
+              </a:solidFill>
+              <a:latin typeface="Biome Light" panose="020B0303030204020804" pitchFamily="34" charset="0"/>
+              <a:cs typeface="Biome Light" panose="020B0303030204020804" pitchFamily="34" charset="0"/>
+            </a:endParaRPr>
           </a:p>
           <a:p>
             <a:pPr marL="342900" indent="-342900" algn="l">
+              <a:lnSpc>
+                <a:spcPct val="150000"/>
+              </a:lnSpc>
+              <a:buClr>
+                <a:schemeClr val="accent6"/>
+              </a:buClr>
               <a:buFont typeface="Courier New" panose="02070309020205020404" pitchFamily="49" charset="0"/>
               <a:buChar char="o"/>
             </a:pPr>
-            <a:r>
-              <a:rPr lang="en-US" dirty="0">
-                <a:solidFill>
-                  <a:schemeClr val="accent2">
-                    <a:lumMod val="20000"/>
-                    <a:lumOff val="80000"/>
-                  </a:schemeClr>
-                </a:solidFill>
-                <a:latin typeface="Biome Light" panose="020B0303030204020804" pitchFamily="34" charset="0"/>
-                <a:cs typeface="Biome Light" panose="020B0303030204020804" pitchFamily="34" charset="0"/>
-              </a:rPr>
-              <a:t>Situational Awareness in the Space Domain</a:t>
-            </a:r>
-          </a:p>
-          <a:p>
-            <a:pPr marL="342900" indent="-342900">
-              <a:buFont typeface="Arial" panose="020B0604020202020204" pitchFamily="34" charset="0"/>
-              <a:buChar char="•"/>
-            </a:pPr>
-            <a:endParaRPr lang="en-US" dirty="0"/>
+            <a:endParaRPr lang="en-US" dirty="0">
+              <a:solidFill>
+                <a:schemeClr val="accent2">
+                  <a:lumMod val="40000"/>
+                  <a:lumOff val="60000"/>
+                </a:schemeClr>
+              </a:solidFill>
+              <a:latin typeface="Biome Light" panose="020B0303030204020804" pitchFamily="34" charset="0"/>
+              <a:cs typeface="Biome Light" panose="020B0303030204020804" pitchFamily="34" charset="0"/>
+            </a:endParaRPr>
           </a:p>
         </p:txBody>
       </p:sp>
     </p:spTree>
     <p:extLst>
       <p:ext uri="{BB962C8B-B14F-4D97-AF65-F5344CB8AC3E}">
-        <p14:creationId xmlns:p14="http://schemas.microsoft.com/office/powerpoint/2010/main" val="548476299"/>
+        <p14:creationId xmlns:p14="http://schemas.microsoft.com/office/powerpoint/2010/main" val="3548027083"/>
       </p:ext>
     </p:extLst>
   </p:cSld>
@@ -21292,7 +19184,7 @@
           <p:cNvPr id="2" name="Title 1">
             <a:extLst>
               <a:ext uri="{FF2B5EF4-FFF2-40B4-BE49-F238E27FC236}">
-                <a16:creationId xmlns:a16="http://schemas.microsoft.com/office/drawing/2014/main" id="{C07F7E09-6A9E-9FCC-7867-895F21ABE716}"/>
+                <a16:creationId xmlns:a16="http://schemas.microsoft.com/office/drawing/2014/main" id="{797310B5-D907-A977-7A9C-69F8BEB7BB3F}"/>
               </a:ext>
             </a:extLst>
           </p:cNvPr>
@@ -21300,50 +19192,38 @@
             <a:spLocks noGrp="1"/>
           </p:cNvSpPr>
           <p:nvPr>
-            <p:ph type="title"/>
+            <p:ph type="ctrTitle"/>
           </p:nvPr>
         </p:nvSpPr>
-        <p:spPr/>
-        <p:txBody>
-          <a:bodyPr>
-            <a:normAutofit/>
-          </a:bodyPr>
+        <p:spPr>
+          <a:xfrm>
+            <a:off x="962297" y="2035936"/>
+            <a:ext cx="10267406" cy="1069848"/>
+          </a:xfrm>
+        </p:spPr>
+        <p:txBody>
+          <a:bodyPr/>
           <a:lstStyle/>
           <a:p>
             <a:r>
-              <a:rPr lang="en-US" sz="4000" b="1" spc="600" dirty="0">
-                <a:ln w="28575">
-                  <a:noFill/>
-                  <a:prstDash val="solid"/>
-                </a:ln>
+              <a:rPr lang="en-US" dirty="0">
                 <a:solidFill>
-                  <a:schemeClr val="accent4">
-                    <a:lumMod val="90000"/>
-                  </a:schemeClr>
+                  <a:schemeClr val="accent4"/>
                 </a:solidFill>
                 <a:latin typeface="Biome" panose="020B0503030204020804" pitchFamily="34" charset="0"/>
                 <a:cs typeface="Biome" panose="020B0503030204020804" pitchFamily="34" charset="0"/>
               </a:rPr>
-              <a:t>AGENDA</a:t>
-            </a:r>
-            <a:endParaRPr lang="en-US" dirty="0">
-              <a:solidFill>
-                <a:schemeClr val="accent4">
-                  <a:lumMod val="90000"/>
-                </a:schemeClr>
-              </a:solidFill>
-              <a:latin typeface="Biome" panose="020B0503030204020804" pitchFamily="34" charset="0"/>
-              <a:cs typeface="Biome" panose="020B0503030204020804" pitchFamily="34" charset="0"/>
-            </a:endParaRPr>
-          </a:p>
-        </p:txBody>
-      </p:sp>
-      <p:sp>
-        <p:nvSpPr>
-          <p:cNvPr id="5" name="Slide Number Placeholder 4">
-            <a:extLst>
-              <a:ext uri="{FF2B5EF4-FFF2-40B4-BE49-F238E27FC236}">
-                <a16:creationId xmlns:a16="http://schemas.microsoft.com/office/drawing/2014/main" id="{9157728F-9EA1-A705-8E4D-B7823E4F4C26}"/>
+              <a:t>STAKEHOLDER INTEREST</a:t>
+            </a:r>
+          </a:p>
+        </p:txBody>
+      </p:sp>
+      <p:sp>
+        <p:nvSpPr>
+          <p:cNvPr id="3" name="Subtitle 2">
+            <a:extLst>
+              <a:ext uri="{FF2B5EF4-FFF2-40B4-BE49-F238E27FC236}">
+                <a16:creationId xmlns:a16="http://schemas.microsoft.com/office/drawing/2014/main" id="{C05FF0B8-5B51-7376-0271-8D849CA3F8A8}"/>
               </a:ext>
             </a:extLst>
           </p:cNvPr>
@@ -21351,51 +19231,20 @@
             <a:spLocks noGrp="1"/>
           </p:cNvSpPr>
           <p:nvPr>
-            <p:ph type="sldNum" sz="quarter" idx="11"/>
+            <p:ph type="subTitle" idx="1"/>
           </p:nvPr>
         </p:nvSpPr>
-        <p:spPr/>
+        <p:spPr>
+          <a:xfrm>
+            <a:off x="1302634" y="3603650"/>
+            <a:ext cx="7837714" cy="2840736"/>
+          </a:xfrm>
+        </p:spPr>
         <p:txBody>
           <a:bodyPr/>
           <a:lstStyle/>
           <a:p>
-            <a:fld id="{294A09A9-5501-47C1-A89A-A340965A2BE2}" type="slidenum">
-              <a:rPr lang="en-US" smtClean="0"/>
-              <a:pPr/>
-              <a:t>3</a:t>
-            </a:fld>
-            <a:endParaRPr lang="en-US" dirty="0"/>
-          </a:p>
-        </p:txBody>
-      </p:sp>
-      <p:sp>
-        <p:nvSpPr>
-          <p:cNvPr id="3" name="Content Placeholder 2">
-            <a:extLst>
-              <a:ext uri="{FF2B5EF4-FFF2-40B4-BE49-F238E27FC236}">
-                <a16:creationId xmlns:a16="http://schemas.microsoft.com/office/drawing/2014/main" id="{199158D4-7B61-0A48-E33F-792278D05724}"/>
-              </a:ext>
-            </a:extLst>
-          </p:cNvPr>
-          <p:cNvSpPr>
-            <a:spLocks noGrp="1"/>
-          </p:cNvSpPr>
-          <p:nvPr>
-            <p:ph idx="1"/>
-          </p:nvPr>
-        </p:nvSpPr>
-        <p:spPr/>
-        <p:txBody>
-          <a:bodyPr/>
-          <a:lstStyle/>
-          <a:p>
             <a:pPr marL="342900" indent="-342900" algn="l">
-              <a:lnSpc>
-                <a:spcPct val="150000"/>
-              </a:lnSpc>
-              <a:buClr>
-                <a:schemeClr val="accent6"/>
-              </a:buClr>
               <a:buFont typeface="Courier New" panose="02070309020205020404" pitchFamily="49" charset="0"/>
               <a:buChar char="o"/>
             </a:pPr>
@@ -21403,24 +19252,18 @@
               <a:rPr lang="en-US" dirty="0">
                 <a:solidFill>
                   <a:schemeClr val="accent2">
-                    <a:lumMod val="40000"/>
-                    <a:lumOff val="60000"/>
+                    <a:lumMod val="20000"/>
+                    <a:lumOff val="80000"/>
                   </a:schemeClr>
                 </a:solidFill>
                 <a:latin typeface="Biome Light" panose="020B0303030204020804" pitchFamily="34" charset="0"/>
                 <a:cs typeface="Biome Light" panose="020B0303030204020804" pitchFamily="34" charset="0"/>
               </a:rPr>
-              <a:t>Database Information</a:t>
+              <a:t>Resource Allocation</a:t>
             </a:r>
           </a:p>
           <a:p>
             <a:pPr marL="342900" indent="-342900" algn="l">
-              <a:lnSpc>
-                <a:spcPct val="150000"/>
-              </a:lnSpc>
-              <a:buClr>
-                <a:schemeClr val="accent6"/>
-              </a:buClr>
               <a:buFont typeface="Courier New" panose="02070309020205020404" pitchFamily="49" charset="0"/>
               <a:buChar char="o"/>
             </a:pPr>
@@ -21428,24 +19271,18 @@
               <a:rPr lang="en-US" dirty="0">
                 <a:solidFill>
                   <a:schemeClr val="accent2">
-                    <a:lumMod val="40000"/>
-                    <a:lumOff val="60000"/>
+                    <a:lumMod val="20000"/>
+                    <a:lumOff val="80000"/>
                   </a:schemeClr>
                 </a:solidFill>
                 <a:latin typeface="Biome Light" panose="020B0303030204020804" pitchFamily="34" charset="0"/>
                 <a:cs typeface="Biome Light" panose="020B0303030204020804" pitchFamily="34" charset="0"/>
               </a:rPr>
-              <a:t>Hypothesis</a:t>
+              <a:t>Mission Planning</a:t>
             </a:r>
           </a:p>
           <a:p>
             <a:pPr marL="342900" indent="-342900" algn="l">
-              <a:lnSpc>
-                <a:spcPct val="150000"/>
-              </a:lnSpc>
-              <a:buClr>
-                <a:schemeClr val="accent6"/>
-              </a:buClr>
               <a:buFont typeface="Courier New" panose="02070309020205020404" pitchFamily="49" charset="0"/>
               <a:buChar char="o"/>
             </a:pPr>
@@ -21453,24 +19290,18 @@
               <a:rPr lang="en-US" dirty="0">
                 <a:solidFill>
                   <a:schemeClr val="accent2">
-                    <a:lumMod val="40000"/>
-                    <a:lumOff val="60000"/>
+                    <a:lumMod val="20000"/>
+                    <a:lumOff val="80000"/>
                   </a:schemeClr>
                 </a:solidFill>
                 <a:latin typeface="Biome Light" panose="020B0303030204020804" pitchFamily="34" charset="0"/>
                 <a:cs typeface="Biome Light" panose="020B0303030204020804" pitchFamily="34" charset="0"/>
               </a:rPr>
-              <a:t>Regression</a:t>
+              <a:t>Operational Continuity</a:t>
             </a:r>
           </a:p>
           <a:p>
             <a:pPr marL="342900" indent="-342900" algn="l">
-              <a:lnSpc>
-                <a:spcPct val="150000"/>
-              </a:lnSpc>
-              <a:buClr>
-                <a:schemeClr val="accent6"/>
-              </a:buClr>
               <a:buFont typeface="Courier New" panose="02070309020205020404" pitchFamily="49" charset="0"/>
               <a:buChar char="o"/>
             </a:pPr>
@@ -21478,65 +19309,48 @@
               <a:rPr lang="en-US" dirty="0">
                 <a:solidFill>
                   <a:schemeClr val="accent2">
-                    <a:lumMod val="40000"/>
-                    <a:lumOff val="60000"/>
+                    <a:lumMod val="20000"/>
+                    <a:lumOff val="80000"/>
                   </a:schemeClr>
                 </a:solidFill>
                 <a:latin typeface="Biome Light" panose="020B0303030204020804" pitchFamily="34" charset="0"/>
                 <a:cs typeface="Biome Light" panose="020B0303030204020804" pitchFamily="34" charset="0"/>
               </a:rPr>
-              <a:t>Results</a:t>
-            </a:r>
-          </a:p>
-          <a:p>
-            <a:pPr marL="0" indent="0" algn="l">
-              <a:lnSpc>
-                <a:spcPct val="150000"/>
-              </a:lnSpc>
-              <a:buClr>
-                <a:schemeClr val="accent6"/>
-              </a:buClr>
-              <a:buNone/>
-            </a:pPr>
-            <a:endParaRPr lang="en-US" dirty="0">
-              <a:solidFill>
-                <a:schemeClr val="accent2">
-                  <a:lumMod val="40000"/>
-                  <a:lumOff val="60000"/>
-                </a:schemeClr>
-              </a:solidFill>
-              <a:latin typeface="Biome Light" panose="020B0303030204020804" pitchFamily="34" charset="0"/>
-              <a:cs typeface="Biome Light" panose="020B0303030204020804" pitchFamily="34" charset="0"/>
-            </a:endParaRPr>
+              <a:t>Cost Management</a:t>
+            </a:r>
           </a:p>
           <a:p>
             <a:pPr marL="342900" indent="-342900" algn="l">
-              <a:lnSpc>
-                <a:spcPct val="150000"/>
-              </a:lnSpc>
-              <a:buClr>
-                <a:schemeClr val="accent6"/>
-              </a:buClr>
               <a:buFont typeface="Courier New" panose="02070309020205020404" pitchFamily="49" charset="0"/>
               <a:buChar char="o"/>
             </a:pPr>
-            <a:endParaRPr lang="en-US" dirty="0">
-              <a:solidFill>
-                <a:schemeClr val="accent2">
-                  <a:lumMod val="40000"/>
-                  <a:lumOff val="60000"/>
-                </a:schemeClr>
-              </a:solidFill>
-              <a:latin typeface="Biome Light" panose="020B0303030204020804" pitchFamily="34" charset="0"/>
-              <a:cs typeface="Biome Light" panose="020B0303030204020804" pitchFamily="34" charset="0"/>
-            </a:endParaRPr>
+            <a:r>
+              <a:rPr lang="en-US" dirty="0">
+                <a:solidFill>
+                  <a:schemeClr val="accent2">
+                    <a:lumMod val="20000"/>
+                    <a:lumOff val="80000"/>
+                  </a:schemeClr>
+                </a:solidFill>
+                <a:latin typeface="Biome Light" panose="020B0303030204020804" pitchFamily="34" charset="0"/>
+                <a:cs typeface="Biome Light" panose="020B0303030204020804" pitchFamily="34" charset="0"/>
+              </a:rPr>
+              <a:t>Situational Awareness in the Space Domain</a:t>
+            </a:r>
+          </a:p>
+          <a:p>
+            <a:pPr marL="342900" indent="-342900">
+              <a:buFont typeface="Arial" panose="020B0604020202020204" pitchFamily="34" charset="0"/>
+              <a:buChar char="•"/>
+            </a:pPr>
+            <a:endParaRPr lang="en-US" dirty="0"/>
           </a:p>
         </p:txBody>
       </p:sp>
     </p:spTree>
     <p:extLst>
       <p:ext uri="{BB962C8B-B14F-4D97-AF65-F5344CB8AC3E}">
-        <p14:creationId xmlns:p14="http://schemas.microsoft.com/office/powerpoint/2010/main" val="3548027083"/>
+        <p14:creationId xmlns:p14="http://schemas.microsoft.com/office/powerpoint/2010/main" val="548476299"/>
       </p:ext>
     </p:extLst>
   </p:cSld>
@@ -22008,7 +19822,7 @@
                 <a:latin typeface="Biome" panose="020B0503030204020804" pitchFamily="34" charset="0"/>
                 <a:cs typeface="Biome" panose="020B0503030204020804" pitchFamily="34" charset="0"/>
               </a:rPr>
-              <a:t>HYPOTHESIS</a:t>
+              <a:t>HYPOTHESES</a:t>
             </a:r>
             <a:br>
               <a:rPr lang="en-US" dirty="0"/>
@@ -22237,36 +20051,19 @@
           <a:lstStyle/>
           <a:p>
             <a:r>
-              <a:rPr lang="en-US" sz="4000" b="1" spc="600">
+              <a:rPr lang="en-US" sz="4000" b="1" spc="600" dirty="0">
                 <a:ln w="28575">
                   <a:noFill/>
                   <a:prstDash val="solid"/>
                 </a:ln>
                 <a:solidFill>
-                  <a:schemeClr val="accent2">
-                    <a:lumMod val="60000"/>
-                    <a:lumOff val="40000"/>
-                  </a:schemeClr>
+                  <a:srgbClr val="D6ABD7"/>
                 </a:solidFill>
                 <a:latin typeface="Biome" panose="020B0503030204020804" pitchFamily="34" charset="0"/>
                 <a:cs typeface="Biome" panose="020B0503030204020804" pitchFamily="34" charset="0"/>
               </a:rPr>
-              <a:t>HYPOTHESIS TESTING</a:t>
-            </a:r>
-            <a:endParaRPr lang="en-US" sz="4000" b="1" spc="600" dirty="0">
-              <a:ln w="28575">
-                <a:noFill/>
-                <a:prstDash val="solid"/>
-              </a:ln>
-              <a:solidFill>
-                <a:schemeClr val="accent2">
-                  <a:lumMod val="60000"/>
-                  <a:lumOff val="40000"/>
-                </a:schemeClr>
-              </a:solidFill>
-              <a:latin typeface="Biome" panose="020B0503030204020804" pitchFamily="34" charset="0"/>
-              <a:cs typeface="Biome" panose="020B0503030204020804" pitchFamily="34" charset="0"/>
-            </a:endParaRPr>
+              <a:t>HYPOTHESES TESTING</a:t>
+            </a:r>
           </a:p>
         </p:txBody>
       </p:sp>
@@ -22625,10 +20422,10 @@
       </p:grpSpPr>
       <p:sp>
         <p:nvSpPr>
-          <p:cNvPr id="5" name="Slide Number Placeholder 4">
-            <a:extLst>
-              <a:ext uri="{FF2B5EF4-FFF2-40B4-BE49-F238E27FC236}">
-                <a16:creationId xmlns:a16="http://schemas.microsoft.com/office/drawing/2014/main" id="{F79CF1F9-4847-1440-0352-6D1284A48D05}"/>
+          <p:cNvPr id="2" name="Title 1">
+            <a:extLst>
+              <a:ext uri="{FF2B5EF4-FFF2-40B4-BE49-F238E27FC236}">
+                <a16:creationId xmlns:a16="http://schemas.microsoft.com/office/drawing/2014/main" id="{D04F090D-C862-CF85-1001-A82E54365597}"/>
               </a:ext>
             </a:extLst>
           </p:cNvPr>
@@ -22636,29 +20433,44 @@
             <a:spLocks noGrp="1"/>
           </p:cNvSpPr>
           <p:nvPr>
-            <p:ph type="sldNum" sz="quarter" idx="11"/>
+            <p:ph type="ctrTitle"/>
           </p:nvPr>
         </p:nvSpPr>
-        <p:spPr/>
+        <p:spPr>
+          <a:xfrm>
+            <a:off x="809897" y="1255383"/>
+            <a:ext cx="10067109" cy="809391"/>
+          </a:xfrm>
+        </p:spPr>
         <p:txBody>
           <a:bodyPr/>
           <a:lstStyle/>
           <a:p>
-            <a:fld id="{294A09A9-5501-47C1-A89A-A340965A2BE2}" type="slidenum">
-              <a:rPr lang="en-US" smtClean="0"/>
-              <a:pPr/>
-              <a:t>9</a:t>
-            </a:fld>
+            <a:r>
+              <a:rPr lang="en-US" dirty="0">
+                <a:solidFill>
+                  <a:schemeClr val="accent4">
+                    <a:lumMod val="90000"/>
+                  </a:schemeClr>
+                </a:solidFill>
+                <a:latin typeface="Biome" panose="020B0503030204020804" pitchFamily="34" charset="0"/>
+                <a:cs typeface="Biome" panose="020B0503030204020804" pitchFamily="34" charset="0"/>
+              </a:rPr>
+              <a:t>Linear regression model</a:t>
+            </a:r>
+            <a:br>
+              <a:rPr lang="en-US" dirty="0"/>
+            </a:br>
             <a:endParaRPr lang="en-US" dirty="0"/>
           </a:p>
         </p:txBody>
       </p:sp>
       <p:sp>
         <p:nvSpPr>
-          <p:cNvPr id="3" name="Footer Placeholder 2">
-            <a:extLst>
-              <a:ext uri="{FF2B5EF4-FFF2-40B4-BE49-F238E27FC236}">
-                <a16:creationId xmlns:a16="http://schemas.microsoft.com/office/drawing/2014/main" id="{D534491D-AF3A-C879-49E6-F11A17AC3008}"/>
+          <p:cNvPr id="3" name="Subtitle 2">
+            <a:extLst>
+              <a:ext uri="{FF2B5EF4-FFF2-40B4-BE49-F238E27FC236}">
+                <a16:creationId xmlns:a16="http://schemas.microsoft.com/office/drawing/2014/main" id="{4CE82C04-6445-9E02-B0E8-8D809278C37D}"/>
               </a:ext>
             </a:extLst>
           </p:cNvPr>
@@ -22666,51 +20478,143 @@
             <a:spLocks noGrp="1"/>
           </p:cNvSpPr>
           <p:nvPr>
-            <p:ph type="ftr" sz="quarter" idx="10"/>
+            <p:ph type="subTitle" idx="1"/>
           </p:nvPr>
         </p:nvSpPr>
-        <p:spPr/>
+        <p:spPr>
+          <a:xfrm>
+            <a:off x="1371600" y="2354136"/>
+            <a:ext cx="9947787" cy="3567341"/>
+          </a:xfrm>
+        </p:spPr>
         <p:txBody>
           <a:bodyPr/>
           <a:lstStyle/>
           <a:p>
-            <a:r>
-              <a:rPr lang="en-US"/>
-              <a:t>Crypto: investing &amp; trading</a:t>
-            </a:r>
-            <a:endParaRPr lang="en-US" dirty="0"/>
-          </a:p>
-        </p:txBody>
-      </p:sp>
-      <p:sp>
-        <p:nvSpPr>
-          <p:cNvPr id="11" name="Content Placeholder 10">
-            <a:extLst>
-              <a:ext uri="{FF2B5EF4-FFF2-40B4-BE49-F238E27FC236}">
-                <a16:creationId xmlns:a16="http://schemas.microsoft.com/office/drawing/2014/main" id="{BF799DA0-272B-EE91-33A9-50D95274F6A9}"/>
-              </a:ext>
-            </a:extLst>
-          </p:cNvPr>
-          <p:cNvSpPr>
-            <a:spLocks noGrp="1"/>
-          </p:cNvSpPr>
-          <p:nvPr>
-            <p:ph idx="1"/>
-          </p:nvPr>
-        </p:nvSpPr>
-        <p:spPr/>
-        <p:txBody>
-          <a:bodyPr/>
-          <a:lstStyle/>
-          <a:p>
-            <a:endParaRPr lang="en-US"/>
+            <a:pPr marL="342900" indent="-342900" algn="l">
+              <a:buFont typeface="Courier New" panose="02070309020205020404" pitchFamily="49" charset="0"/>
+              <a:buChar char="o"/>
+            </a:pPr>
+            <a:r>
+              <a:rPr lang="en-US" dirty="0">
+                <a:solidFill>
+                  <a:schemeClr val="accent2">
+                    <a:lumMod val="40000"/>
+                    <a:lumOff val="60000"/>
+                  </a:schemeClr>
+                </a:solidFill>
+                <a:latin typeface="Consolas" panose="020B0609020204030204" pitchFamily="49" charset="0"/>
+              </a:rPr>
+              <a:t>P</a:t>
+            </a:r>
+            <a:r>
+              <a:rPr lang="en-US" sz="2000" b="0" dirty="0">
+                <a:solidFill>
+                  <a:schemeClr val="accent2">
+                    <a:lumMod val="40000"/>
+                    <a:lumOff val="60000"/>
+                  </a:schemeClr>
+                </a:solidFill>
+                <a:effectLst/>
+                <a:latin typeface="Consolas" panose="020B0609020204030204" pitchFamily="49" charset="0"/>
+              </a:rPr>
+              <a:t>erigee (Kilometers) </a:t>
+            </a:r>
+          </a:p>
+          <a:p>
+            <a:pPr marL="342900" indent="-342900" algn="l">
+              <a:buFont typeface="Courier New" panose="02070309020205020404" pitchFamily="49" charset="0"/>
+              <a:buChar char="o"/>
+            </a:pPr>
+            <a:r>
+              <a:rPr lang="en-US" sz="2000" b="0" dirty="0">
+                <a:solidFill>
+                  <a:schemeClr val="accent2">
+                    <a:lumMod val="40000"/>
+                    <a:lumOff val="60000"/>
+                  </a:schemeClr>
+                </a:solidFill>
+                <a:effectLst/>
+                <a:latin typeface="Consolas" panose="020B0609020204030204" pitchFamily="49" charset="0"/>
+              </a:rPr>
+              <a:t>Apogee (Kilometers)</a:t>
+            </a:r>
+            <a:endParaRPr lang="en-US" dirty="0">
+              <a:solidFill>
+                <a:schemeClr val="accent2">
+                  <a:lumMod val="40000"/>
+                  <a:lumOff val="60000"/>
+                </a:schemeClr>
+              </a:solidFill>
+              <a:latin typeface="Consolas" panose="020B0609020204030204" pitchFamily="49" charset="0"/>
+            </a:endParaRPr>
+          </a:p>
+          <a:p>
+            <a:pPr marL="342900" indent="-342900" algn="l">
+              <a:buFont typeface="Courier New" panose="02070309020205020404" pitchFamily="49" charset="0"/>
+              <a:buChar char="o"/>
+            </a:pPr>
+            <a:r>
+              <a:rPr lang="en-US" sz="2000" b="0" dirty="0">
+                <a:solidFill>
+                  <a:schemeClr val="accent2">
+                    <a:lumMod val="40000"/>
+                    <a:lumOff val="60000"/>
+                  </a:schemeClr>
+                </a:solidFill>
+                <a:effectLst/>
+                <a:latin typeface="Consolas" panose="020B0609020204030204" pitchFamily="49" charset="0"/>
+              </a:rPr>
+              <a:t>Launch Mass (Kilograms)</a:t>
+            </a:r>
+            <a:endParaRPr lang="en-US" dirty="0">
+              <a:solidFill>
+                <a:schemeClr val="accent2">
+                  <a:lumMod val="40000"/>
+                  <a:lumOff val="60000"/>
+                </a:schemeClr>
+              </a:solidFill>
+              <a:latin typeface="Consolas" panose="020B0609020204030204" pitchFamily="49" charset="0"/>
+            </a:endParaRPr>
+          </a:p>
+          <a:p>
+            <a:pPr marL="342900" indent="-342900" algn="l">
+              <a:buFont typeface="Courier New" panose="02070309020205020404" pitchFamily="49" charset="0"/>
+              <a:buChar char="o"/>
+            </a:pPr>
+            <a:r>
+              <a:rPr lang="en-US" sz="2000" b="0" dirty="0">
+                <a:solidFill>
+                  <a:schemeClr val="accent2">
+                    <a:lumMod val="40000"/>
+                    <a:lumOff val="60000"/>
+                  </a:schemeClr>
+                </a:solidFill>
+                <a:effectLst/>
+                <a:latin typeface="Consolas" panose="020B0609020204030204" pitchFamily="49" charset="0"/>
+              </a:rPr>
+              <a:t>Inclination (Degrees)</a:t>
+            </a:r>
+          </a:p>
+          <a:p>
+            <a:pPr marL="342900" indent="-342900" algn="l">
+              <a:buFont typeface="Courier New" panose="02070309020205020404" pitchFamily="49" charset="0"/>
+              <a:buChar char="o"/>
+            </a:pPr>
+            <a:endParaRPr lang="en-US" sz="2400" dirty="0">
+              <a:solidFill>
+                <a:schemeClr val="accent4"/>
+              </a:solidFill>
+              <a:latin typeface="Biome" panose="020B0503030204020804" pitchFamily="34" charset="0"/>
+              <a:cs typeface="Biome" panose="020B0503030204020804" pitchFamily="34" charset="0"/>
+            </a:endParaRPr>
           </a:p>
         </p:txBody>
       </p:sp>
     </p:spTree>
     <p:extLst>
       <p:ext uri="{BB962C8B-B14F-4D97-AF65-F5344CB8AC3E}">
-        <p14:creationId xmlns:p14="http://schemas.microsoft.com/office/powerpoint/2010/main" val="1208724409"/>
+        <p14:creationId xmlns:p14="http://schemas.microsoft.com/office/powerpoint/2010/main" val="3708778362"/>
       </p:ext>
     </p:extLst>
   </p:cSld>
@@ -23237,15 +21141,6 @@
 </file>
 
 <file path=customXml/item2.xml><?xml version="1.0" encoding="utf-8"?>
-<?mso-contentType ?>
-<FormTemplates xmlns="http://schemas.microsoft.com/sharepoint/v3/contenttype/forms">
-  <Display>DocumentLibraryForm</Display>
-  <Edit>DocumentLibraryForm</Edit>
-  <New>DocumentLibraryForm</New>
-</FormTemplates>
-</file>
-
-<file path=customXml/item3.xml><?xml version="1.0" encoding="utf-8"?>
 <ct:contentTypeSchema xmlns:ct="http://schemas.microsoft.com/office/2006/metadata/contentType" xmlns:ma="http://schemas.microsoft.com/office/2006/metadata/properties/metaAttributes" ct:_="" ma:_="" ma:contentTypeName="Document" ma:contentTypeID="0x01010079F111ED35F8CC479449609E8A0923A6" ma:contentTypeVersion="25" ma:contentTypeDescription="Create a new document." ma:contentTypeScope="" ma:versionID="e02306daf00165b375dc6a58966960be">
   <xsd:schema xmlns:xsd="http://www.w3.org/2001/XMLSchema" xmlns:xs="http://www.w3.org/2001/XMLSchema" xmlns:p="http://schemas.microsoft.com/office/2006/metadata/properties" xmlns:ns1="http://schemas.microsoft.com/sharepoint/v3" xmlns:ns2="71af3243-3dd4-4a8d-8c0d-dd76da1f02a5" xmlns:ns3="16c05727-aa75-4e4a-9b5f-8a80a1165891" xmlns:ns4="230e9df3-be65-4c73-a93b-d1236ebd677e" targetNamespace="http://schemas.microsoft.com/office/2006/metadata/properties" ma:root="true" ma:fieldsID="df88fb76bf5f555224557953949c1ec9" ns1:_="" ns2:_="" ns3:_="" ns4:_="">
     <xsd:import namespace="http://schemas.microsoft.com/sharepoint/v3"/>
@@ -23539,6 +21434,15 @@
 </ct:contentTypeSchema>
 </file>
 
+<file path=customXml/item3.xml><?xml version="1.0" encoding="utf-8"?>
+<?mso-contentType ?>
+<FormTemplates xmlns="http://schemas.microsoft.com/sharepoint/v3/contenttype/forms">
+  <Display>DocumentLibraryForm</Display>
+  <Edit>DocumentLibraryForm</Edit>
+  <New>DocumentLibraryForm</New>
+</FormTemplates>
+</file>
+
 <file path=customXml/itemProps1.xml><?xml version="1.0" encoding="utf-8"?>
 <ds:datastoreItem xmlns:ds="http://schemas.openxmlformats.org/officeDocument/2006/customXml" ds:itemID="{F8B8ECF1-2A9D-464C-AFE8-2B3295D0BF97}">
   <ds:schemaRefs>
@@ -23552,14 +21456,6 @@
 </file>
 
 <file path=customXml/itemProps2.xml><?xml version="1.0" encoding="utf-8"?>
-<ds:datastoreItem xmlns:ds="http://schemas.openxmlformats.org/officeDocument/2006/customXml" ds:itemID="{4F1F1912-3146-44AF-A389-9E8B77BB3688}">
-  <ds:schemaRefs>
-    <ds:schemaRef ds:uri="http://schemas.microsoft.com/sharepoint/v3/contenttype/forms"/>
-  </ds:schemaRefs>
-</ds:datastoreItem>
-</file>
-
-<file path=customXml/itemProps3.xml><?xml version="1.0" encoding="utf-8"?>
 <ds:datastoreItem xmlns:ds="http://schemas.openxmlformats.org/officeDocument/2006/customXml" ds:itemID="{176493A3-2B83-4E58-86AD-56A2F2A20F12}">
   <ds:schemaRefs>
     <ds:schemaRef ds:uri="http://schemas.microsoft.com/office/2006/metadata/contentType"/>
@@ -23580,6 +21476,14 @@
 </ds:datastoreItem>
 </file>
 
+<file path=customXml/itemProps3.xml><?xml version="1.0" encoding="utf-8"?>
+<ds:datastoreItem xmlns:ds="http://schemas.openxmlformats.org/officeDocument/2006/customXml" ds:itemID="{4F1F1912-3146-44AF-A389-9E8B77BB3688}">
+  <ds:schemaRefs>
+    <ds:schemaRef ds:uri="http://schemas.microsoft.com/sharepoint/v3/contenttype/forms"/>
+  </ds:schemaRefs>
+</ds:datastoreItem>
+</file>
+
 <file path=docMetadata/LabelInfo.xml><?xml version="1.0" encoding="utf-8"?>
 <clbl:labelList xmlns:clbl="http://schemas.microsoft.com/office/2020/mipLabelMetadata"/>
 </file>
</xml_diff>

<commit_message>
actually finished the first draft of the ppt
</commit_message>
<xml_diff>
--- a/ppt/SATELLITE LIFE EXPECTANCY.pptx
+++ b/ppt/SATELLITE LIFE EXPECTANCY.pptx
@@ -626,17 +626,20 @@
                 <a:effectLst/>
                 <a:latin typeface="Söhne"/>
               </a:rPr>
-              <a:t>The regression analysis conducted on the dataset provides valuable insights into the relationship between satellite characteristics and their expected lifetimes.</a:t>
-            </a:r>
-          </a:p>
-          <a:p>
-            <a:endParaRPr lang="en-US" b="0" i="0" dirty="0">
-              <a:solidFill>
-                <a:srgbClr val="BDB7AF"/>
-              </a:solidFill>
-              <a:effectLst/>
-              <a:latin typeface="Söhne"/>
-            </a:endParaRPr>
+              <a:t>The regression analysis conducted on the dataset provides valuable insights into the relationship and their expected lifetimes.</a:t>
+            </a:r>
+          </a:p>
+          <a:p>
+            <a:r>
+              <a:rPr lang="en-US" b="0" i="0" dirty="0">
+                <a:solidFill>
+                  <a:srgbClr val="BDB7AF"/>
+                </a:solidFill>
+                <a:effectLst/>
+                <a:latin typeface="Söhne"/>
+              </a:rPr>
+              <a:t>between satellite characteristics </a:t>
+            </a:r>
           </a:p>
           <a:p>
             <a:r>
@@ -754,6 +757,81 @@
           <a:bodyPr/>
           <a:lstStyle/>
           <a:p>
+            <a:r>
+              <a:rPr lang="en-US" b="0" i="0" dirty="0">
+                <a:solidFill>
+                  <a:srgbClr val="BDB7AF"/>
+                </a:solidFill>
+                <a:effectLst/>
+                <a:latin typeface="Söhne"/>
+              </a:rPr>
+              <a:t>This graph is showing the comparison between the actual expected lifetimes of satellites and the predicted expected lifetimes generated by the inferential linear </a:t>
+            </a:r>
+            <a:r>
+              <a:rPr lang="en-US" b="0" i="0" dirty="0" err="1">
+                <a:solidFill>
+                  <a:srgbClr val="BDB7AF"/>
+                </a:solidFill>
+                <a:effectLst/>
+                <a:latin typeface="Söhne"/>
+              </a:rPr>
+              <a:t>regr</a:t>
+            </a:r>
+            <a:endParaRPr lang="en-US" b="0" i="0" dirty="0">
+              <a:solidFill>
+                <a:srgbClr val="BDB7AF"/>
+              </a:solidFill>
+              <a:effectLst/>
+              <a:latin typeface="Söhne"/>
+            </a:endParaRPr>
+          </a:p>
+          <a:p>
+            <a:r>
+              <a:rPr lang="en-US" b="0" i="0" dirty="0">
+                <a:solidFill>
+                  <a:srgbClr val="BDB7AF"/>
+                </a:solidFill>
+                <a:effectLst/>
+                <a:latin typeface="Söhne"/>
+              </a:rPr>
+              <a:t>Each point on the graph represents an individual satellite observation. </a:t>
+            </a:r>
+          </a:p>
+          <a:p>
+            <a:r>
+              <a:rPr lang="en-US" b="0" i="0" dirty="0">
+                <a:solidFill>
+                  <a:srgbClr val="BDB7AF"/>
+                </a:solidFill>
+                <a:effectLst/>
+                <a:latin typeface="Söhne"/>
+              </a:rPr>
+              <a:t>The x-axis represents the actual expected lifetime of the satellites (in years), while the y-axis represents the predicted expected lifetime (also in years) generated by the regression model. </a:t>
+            </a:r>
+          </a:p>
+          <a:p>
+            <a:r>
+              <a:rPr lang="en-US" b="0" i="0" dirty="0">
+                <a:solidFill>
+                  <a:srgbClr val="BDB7AF"/>
+                </a:solidFill>
+                <a:effectLst/>
+                <a:latin typeface="Söhne"/>
+              </a:rPr>
+              <a:t>The purple dots scattered across the graph represent the predicted values, showing how well the model's predictions align with the actual data.</a:t>
+            </a:r>
+          </a:p>
+          <a:p>
+            <a:r>
+              <a:rPr lang="en-US" b="0" i="0" dirty="0">
+                <a:solidFill>
+                  <a:srgbClr val="BDB7AF"/>
+                </a:solidFill>
+                <a:effectLst/>
+                <a:latin typeface="Söhne"/>
+              </a:rPr>
+              <a:t>The dashed blue line represents the ideal scenario where the predicted values perfectly match the actual values. </a:t>
+            </a:r>
             <a:endParaRPr lang="en-US" dirty="0"/>
           </a:p>
         </p:txBody>
@@ -1775,7 +1853,10 @@
             </a:endParaRPr>
           </a:p>
           <a:p>
-            <a:endParaRPr lang="en-US" dirty="0"/>
+            <a:r>
+              <a:rPr lang="en-US" dirty="0"/>
+              <a:t>I chose to use perigee and apogee instead of the orbits as these are numerical values instead of categorical. This provided my model with higher accuracy. </a:t>
+            </a:r>
           </a:p>
         </p:txBody>
       </p:sp>
@@ -20438,7 +20519,7 @@
         </p:nvSpPr>
         <p:spPr>
           <a:xfrm>
-            <a:off x="809897" y="1255383"/>
+            <a:off x="836022" y="1255383"/>
             <a:ext cx="10067109" cy="809391"/>
           </a:xfrm>
         </p:spPr>
@@ -20503,7 +20584,8 @@
                     <a:lumOff val="60000"/>
                   </a:schemeClr>
                 </a:solidFill>
-                <a:latin typeface="Consolas" panose="020B0609020204030204" pitchFamily="49" charset="0"/>
+                <a:latin typeface="Biome Light" panose="020B0303030204020804" pitchFamily="34" charset="0"/>
+                <a:cs typeface="Biome Light" panose="020B0303030204020804" pitchFamily="34" charset="0"/>
               </a:rPr>
               <a:t>P</a:t>
             </a:r>
@@ -20516,7 +20598,8 @@
                   </a:schemeClr>
                 </a:solidFill>
                 <a:effectLst/>
-                <a:latin typeface="Consolas" panose="020B0609020204030204" pitchFamily="49" charset="0"/>
+                <a:latin typeface="Biome Light" panose="020B0303030204020804" pitchFamily="34" charset="0"/>
+                <a:cs typeface="Biome Light" panose="020B0303030204020804" pitchFamily="34" charset="0"/>
               </a:rPr>
               <a:t>erigee (Kilometers) </a:t>
             </a:r>
@@ -20535,7 +20618,8 @@
                   </a:schemeClr>
                 </a:solidFill>
                 <a:effectLst/>
-                <a:latin typeface="Consolas" panose="020B0609020204030204" pitchFamily="49" charset="0"/>
+                <a:latin typeface="Biome Light" panose="020B0303030204020804" pitchFamily="34" charset="0"/>
+                <a:cs typeface="Biome Light" panose="020B0303030204020804" pitchFamily="34" charset="0"/>
               </a:rPr>
               <a:t>Apogee (Kilometers)</a:t>
             </a:r>
@@ -20546,7 +20630,8 @@
                   <a:lumOff val="60000"/>
                 </a:schemeClr>
               </a:solidFill>
-              <a:latin typeface="Consolas" panose="020B0609020204030204" pitchFamily="49" charset="0"/>
+              <a:latin typeface="Biome Light" panose="020B0303030204020804" pitchFamily="34" charset="0"/>
+              <a:cs typeface="Biome Light" panose="020B0303030204020804" pitchFamily="34" charset="0"/>
             </a:endParaRPr>
           </a:p>
           <a:p>
@@ -20563,7 +20648,8 @@
                   </a:schemeClr>
                 </a:solidFill>
                 <a:effectLst/>
-                <a:latin typeface="Consolas" panose="020B0609020204030204" pitchFamily="49" charset="0"/>
+                <a:latin typeface="Biome Light" panose="020B0303030204020804" pitchFamily="34" charset="0"/>
+                <a:cs typeface="Biome Light" panose="020B0303030204020804" pitchFamily="34" charset="0"/>
               </a:rPr>
               <a:t>Launch Mass (Kilograms)</a:t>
             </a:r>
@@ -20574,7 +20660,8 @@
                   <a:lumOff val="60000"/>
                 </a:schemeClr>
               </a:solidFill>
-              <a:latin typeface="Consolas" panose="020B0609020204030204" pitchFamily="49" charset="0"/>
+              <a:latin typeface="Biome Light" panose="020B0303030204020804" pitchFamily="34" charset="0"/>
+              <a:cs typeface="Biome Light" panose="020B0303030204020804" pitchFamily="34" charset="0"/>
             </a:endParaRPr>
           </a:p>
           <a:p>
@@ -20591,7 +20678,8 @@
                   </a:schemeClr>
                 </a:solidFill>
                 <a:effectLst/>
-                <a:latin typeface="Consolas" panose="020B0609020204030204" pitchFamily="49" charset="0"/>
+                <a:latin typeface="Biome Light" panose="020B0303030204020804" pitchFamily="34" charset="0"/>
+                <a:cs typeface="Biome Light" panose="020B0303030204020804" pitchFamily="34" charset="0"/>
               </a:rPr>
               <a:t>Inclination (Degrees)</a:t>
             </a:r>

</xml_diff>

<commit_message>
updated first draft of ppt
</commit_message>
<xml_diff>
--- a/ppt/SATELLITE LIFE EXPECTANCY.pptx
+++ b/ppt/SATELLITE LIFE EXPECTANCY.pptx
@@ -1657,7 +1657,27 @@
                 <a:effectLst/>
                 <a:latin typeface="Söhne"/>
               </a:rPr>
-              <a:t>I also used a Tukey HSD after completing the ANOVA test which shows the specific comparison between each group. It shows the mean difference in years </a:t>
+              <a:t>I also used a Tukey HSD after completing the ANOVA test which shows the specific comparison between each group. </a:t>
+            </a:r>
+            <a:r>
+              <a:rPr lang="en-US" b="0" i="0" dirty="0">
+                <a:solidFill>
+                  <a:srgbClr val="D2CEC8"/>
+                </a:solidFill>
+                <a:effectLst/>
+                <a:latin typeface="-apple-system"/>
+              </a:rPr>
+              <a:t>It shows the mean difference in years. </a:t>
+            </a:r>
+            <a:r>
+              <a:rPr lang="en-US" b="0" i="0">
+                <a:solidFill>
+                  <a:srgbClr val="D2CEC8"/>
+                </a:solidFill>
+                <a:effectLst/>
+                <a:latin typeface="-apple-system"/>
+              </a:rPr>
+              <a:t>It also shows that in each scenario we can reject the null hypothesis.</a:t>
             </a:r>
             <a:endParaRPr lang="en-US" dirty="0"/>
           </a:p>
@@ -21209,23 +21229,12 @@
 </file>
 
 <file path=customXml/item1.xml><?xml version="1.0" encoding="utf-8"?>
-<p:properties xmlns:p="http://schemas.microsoft.com/office/2006/metadata/properties" xmlns:xsi="http://www.w3.org/2001/XMLSchema-instance" xmlns:pc="http://schemas.microsoft.com/office/infopath/2007/PartnerControls">
-  <documentManagement>
-    <_ip_UnifiedCompliancePolicyUIAction xmlns="http://schemas.microsoft.com/sharepoint/v3" xsi:nil="true"/>
-    <Image xmlns="71af3243-3dd4-4a8d-8c0d-dd76da1f02a5">
-      <Url xsi:nil="true"/>
-      <Description xsi:nil="true"/>
-    </Image>
-    <Status xmlns="71af3243-3dd4-4a8d-8c0d-dd76da1f02a5">Not started</Status>
-    <Background xmlns="71af3243-3dd4-4a8d-8c0d-dd76da1f02a5">false</Background>
-    <_ip_UnifiedCompliancePolicyProperties xmlns="http://schemas.microsoft.com/sharepoint/v3" xsi:nil="true"/>
-    <ImageTagsTaxHTField xmlns="71af3243-3dd4-4a8d-8c0d-dd76da1f02a5">
-      <Terms xmlns="http://schemas.microsoft.com/office/infopath/2007/PartnerControls"/>
-    </ImageTagsTaxHTField>
-    <TaxCatchAll xmlns="230e9df3-be65-4c73-a93b-d1236ebd677e" xsi:nil="true"/>
-    <MediaServiceKeyPoints xmlns="71af3243-3dd4-4a8d-8c0d-dd76da1f02a5" xsi:nil="true"/>
-  </documentManagement>
-</p:properties>
+<?mso-contentType ?>
+<FormTemplates xmlns="http://schemas.microsoft.com/sharepoint/v3/contenttype/forms">
+  <Display>DocumentLibraryForm</Display>
+  <Edit>DocumentLibraryForm</Edit>
+  <New>DocumentLibraryForm</New>
+</FormTemplates>
 </file>
 
 <file path=customXml/item2.xml><?xml version="1.0" encoding="utf-8"?>
@@ -21523,22 +21532,29 @@
 </file>
 
 <file path=customXml/item3.xml><?xml version="1.0" encoding="utf-8"?>
-<?mso-contentType ?>
-<FormTemplates xmlns="http://schemas.microsoft.com/sharepoint/v3/contenttype/forms">
-  <Display>DocumentLibraryForm</Display>
-  <Edit>DocumentLibraryForm</Edit>
-  <New>DocumentLibraryForm</New>
-</FormTemplates>
+<p:properties xmlns:p="http://schemas.microsoft.com/office/2006/metadata/properties" xmlns:xsi="http://www.w3.org/2001/XMLSchema-instance" xmlns:pc="http://schemas.microsoft.com/office/infopath/2007/PartnerControls">
+  <documentManagement>
+    <_ip_UnifiedCompliancePolicyUIAction xmlns="http://schemas.microsoft.com/sharepoint/v3" xsi:nil="true"/>
+    <Image xmlns="71af3243-3dd4-4a8d-8c0d-dd76da1f02a5">
+      <Url xsi:nil="true"/>
+      <Description xsi:nil="true"/>
+    </Image>
+    <Status xmlns="71af3243-3dd4-4a8d-8c0d-dd76da1f02a5">Not started</Status>
+    <Background xmlns="71af3243-3dd4-4a8d-8c0d-dd76da1f02a5">false</Background>
+    <_ip_UnifiedCompliancePolicyProperties xmlns="http://schemas.microsoft.com/sharepoint/v3" xsi:nil="true"/>
+    <ImageTagsTaxHTField xmlns="71af3243-3dd4-4a8d-8c0d-dd76da1f02a5">
+      <Terms xmlns="http://schemas.microsoft.com/office/infopath/2007/PartnerControls"/>
+    </ImageTagsTaxHTField>
+    <TaxCatchAll xmlns="230e9df3-be65-4c73-a93b-d1236ebd677e" xsi:nil="true"/>
+    <MediaServiceKeyPoints xmlns="71af3243-3dd4-4a8d-8c0d-dd76da1f02a5" xsi:nil="true"/>
+  </documentManagement>
+</p:properties>
 </file>
 
 <file path=customXml/itemProps1.xml><?xml version="1.0" encoding="utf-8"?>
-<ds:datastoreItem xmlns:ds="http://schemas.openxmlformats.org/officeDocument/2006/customXml" ds:itemID="{F8B8ECF1-2A9D-464C-AFE8-2B3295D0BF97}">
+<ds:datastoreItem xmlns:ds="http://schemas.openxmlformats.org/officeDocument/2006/customXml" ds:itemID="{4F1F1912-3146-44AF-A389-9E8B77BB3688}">
   <ds:schemaRefs>
-    <ds:schemaRef ds:uri="http://schemas.microsoft.com/office/2006/metadata/properties"/>
-    <ds:schemaRef ds:uri="http://schemas.microsoft.com/office/infopath/2007/PartnerControls"/>
-    <ds:schemaRef ds:uri="http://schemas.microsoft.com/sharepoint/v3"/>
-    <ds:schemaRef ds:uri="71af3243-3dd4-4a8d-8c0d-dd76da1f02a5"/>
-    <ds:schemaRef ds:uri="230e9df3-be65-4c73-a93b-d1236ebd677e"/>
+    <ds:schemaRef ds:uri="http://schemas.microsoft.com/sharepoint/v3/contenttype/forms"/>
   </ds:schemaRefs>
 </ds:datastoreItem>
 </file>
@@ -21565,9 +21581,13 @@
 </file>
 
 <file path=customXml/itemProps3.xml><?xml version="1.0" encoding="utf-8"?>
-<ds:datastoreItem xmlns:ds="http://schemas.openxmlformats.org/officeDocument/2006/customXml" ds:itemID="{4F1F1912-3146-44AF-A389-9E8B77BB3688}">
+<ds:datastoreItem xmlns:ds="http://schemas.openxmlformats.org/officeDocument/2006/customXml" ds:itemID="{F8B8ECF1-2A9D-464C-AFE8-2B3295D0BF97}">
   <ds:schemaRefs>
-    <ds:schemaRef ds:uri="http://schemas.microsoft.com/sharepoint/v3/contenttype/forms"/>
+    <ds:schemaRef ds:uri="http://schemas.microsoft.com/office/2006/metadata/properties"/>
+    <ds:schemaRef ds:uri="http://schemas.microsoft.com/office/infopath/2007/PartnerControls"/>
+    <ds:schemaRef ds:uri="http://schemas.microsoft.com/sharepoint/v3"/>
+    <ds:schemaRef ds:uri="71af3243-3dd4-4a8d-8c0d-dd76da1f02a5"/>
+    <ds:schemaRef ds:uri="230e9df3-be65-4c73-a93b-d1236ebd677e"/>
   </ds:schemaRefs>
 </ds:datastoreItem>
 </file>

</xml_diff>

<commit_message>
corrected ppt based on feedback
</commit_message>
<xml_diff>
--- a/ppt/SATELLITE LIFE EXPECTANCY.pptx
+++ b/ppt/SATELLITE LIFE EXPECTANCY.pptx
@@ -5,7 +5,7 @@
     <p:sldMasterId id="2147483648" r:id="rId4"/>
   </p:sldMasterIdLst>
   <p:notesMasterIdLst>
-    <p:notesMasterId r:id="rId17"/>
+    <p:notesMasterId r:id="rId18"/>
   </p:notesMasterIdLst>
   <p:sldIdLst>
     <p:sldId id="530" r:id="rId5"/>
@@ -17,9 +17,10 @@
     <p:sldId id="535" r:id="rId11"/>
     <p:sldId id="533" r:id="rId12"/>
     <p:sldId id="551" r:id="rId13"/>
-    <p:sldId id="549" r:id="rId14"/>
-    <p:sldId id="548" r:id="rId15"/>
-    <p:sldId id="544" r:id="rId16"/>
+    <p:sldId id="548" r:id="rId14"/>
+    <p:sldId id="544" r:id="rId15"/>
+    <p:sldId id="549" r:id="rId16"/>
+    <p:sldId id="552" r:id="rId17"/>
   </p:sldIdLst>
   <p:sldSz cx="12192000" cy="6858000"/>
   <p:notesSz cx="6858000" cy="9144000"/>
@@ -220,7 +221,7 @@
           <a:p>
             <a:fld id="{3F00BCFC-AFFD-334C-A183-6116BAFDF92B}" type="datetimeFigureOut">
               <a:rPr lang="en-US" smtClean="0"/>
-              <a:t>8/7/2023</a:t>
+              <a:t>8/8/2023</a:t>
             </a:fld>
             <a:endParaRPr lang="en-US" dirty="0"/>
           </a:p>
@@ -533,7 +534,7 @@
           <a:p>
             <a:r>
               <a:rPr lang="en-US" dirty="0"/>
-              <a:t>Good afternoon, my name is Joshlyn Jamerson and today I’m going to tell you all about satellite life expectancy.  </a:t>
+              <a:t>Good afternoon, my name is Joshlyn Jamerson and this presentation is about satellite life expectancy.  </a:t>
             </a:r>
           </a:p>
         </p:txBody>
@@ -626,7 +627,7 @@
                 <a:effectLst/>
                 <a:latin typeface="Söhne"/>
               </a:rPr>
-              <a:t>The regression analysis conducted on the dataset provides valuable insights into the relationship and their expected lifetimes.</a:t>
+              <a:t>This graph is showing the comparison between the actual expected lifetimes of satellites and the predicted expected lifetimes generated by the inferential linear regression. </a:t>
             </a:r>
           </a:p>
           <a:p>
@@ -638,7 +639,7 @@
                 <a:effectLst/>
                 <a:latin typeface="Söhne"/>
               </a:rPr>
-              <a:t>between satellite characteristics </a:t>
+              <a:t>Each point on the graph represents an individual satellite observation. </a:t>
             </a:r>
           </a:p>
           <a:p>
@@ -650,17 +651,8 @@
                 <a:effectLst/>
                 <a:latin typeface="Söhne"/>
               </a:rPr>
-              <a:t>The model, based on the Ordinary Least Squares (OLS) method, demonstrates a reasonable fit to the data with an R-squared value of 0.604, indicating that approximately 60.4% of the variance in the expected lifetime of satellites is explained by the chosen predictor variables.</a:t>
-            </a:r>
-          </a:p>
-          <a:p>
-            <a:endParaRPr lang="en-US" b="0" i="0" dirty="0">
-              <a:solidFill>
-                <a:srgbClr val="BDB7AF"/>
-              </a:solidFill>
-              <a:effectLst/>
-              <a:latin typeface="Söhne"/>
-            </a:endParaRPr>
+              <a:t>The x-axis represents the actual expected lifetime of the satellites (in years), while the y-axis represents the predicted expected lifetime (also in years) generated by the regression model. </a:t>
+            </a:r>
           </a:p>
           <a:p>
             <a:r>
@@ -671,7 +663,19 @@
                 <a:effectLst/>
                 <a:latin typeface="Söhne"/>
               </a:rPr>
-              <a:t>The F-statistic of 361.3 and associated low probability value (p-value) affirm the overall significance of the regression, implying that the model as a whole is meaningful. </a:t>
+              <a:t>The purple dots scattered across the graph represent the predicted values, showing how well the model's predictions align with the actual data.</a:t>
+            </a:r>
+          </a:p>
+          <a:p>
+            <a:r>
+              <a:rPr lang="en-US" b="0" i="0" dirty="0">
+                <a:solidFill>
+                  <a:srgbClr val="BDB7AF"/>
+                </a:solidFill>
+                <a:effectLst/>
+                <a:latin typeface="Söhne"/>
+              </a:rPr>
+              <a:t>The dashed blue line represents the ideal scenario where the predicted values perfectly match the actual values. </a:t>
             </a:r>
             <a:endParaRPr lang="en-US" dirty="0"/>
           </a:p>
@@ -703,7 +707,7 @@
     </p:spTree>
     <p:extLst>
       <p:ext uri="{BB962C8B-B14F-4D97-AF65-F5344CB8AC3E}">
-        <p14:creationId xmlns:p14="http://schemas.microsoft.com/office/powerpoint/2010/main" val="2380422706"/>
+        <p14:creationId xmlns:p14="http://schemas.microsoft.com/office/powerpoint/2010/main" val="1410361982"/>
       </p:ext>
     </p:extLst>
   </p:cSld>
@@ -758,81 +762,21 @@
           <a:lstStyle/>
           <a:p>
             <a:r>
-              <a:rPr lang="en-US" b="0" i="0" dirty="0">
-                <a:solidFill>
-                  <a:srgbClr val="BDB7AF"/>
-                </a:solidFill>
-                <a:effectLst/>
-                <a:latin typeface="Söhne"/>
-              </a:rPr>
-              <a:t>This graph is showing the comparison between the actual expected lifetimes of satellites and the predicted expected lifetimes generated by the inferential linear </a:t>
-            </a:r>
-            <a:r>
-              <a:rPr lang="en-US" b="0" i="0" dirty="0" err="1">
-                <a:solidFill>
-                  <a:srgbClr val="BDB7AF"/>
-                </a:solidFill>
-                <a:effectLst/>
-                <a:latin typeface="Söhne"/>
-              </a:rPr>
-              <a:t>regr</a:t>
-            </a:r>
-            <a:endParaRPr lang="en-US" b="0" i="0" dirty="0">
-              <a:solidFill>
-                <a:srgbClr val="BDB7AF"/>
-              </a:solidFill>
-              <a:effectLst/>
-              <a:latin typeface="Söhne"/>
-            </a:endParaRPr>
-          </a:p>
-          <a:p>
-            <a:r>
-              <a:rPr lang="en-US" b="0" i="0" dirty="0">
-                <a:solidFill>
-                  <a:srgbClr val="BDB7AF"/>
-                </a:solidFill>
-                <a:effectLst/>
-                <a:latin typeface="Söhne"/>
-              </a:rPr>
-              <a:t>Each point on the graph represents an individual satellite observation. </a:t>
-            </a:r>
-          </a:p>
-          <a:p>
-            <a:r>
-              <a:rPr lang="en-US" b="0" i="0" dirty="0">
-                <a:solidFill>
-                  <a:srgbClr val="BDB7AF"/>
-                </a:solidFill>
-                <a:effectLst/>
-                <a:latin typeface="Söhne"/>
-              </a:rPr>
-              <a:t>The x-axis represents the actual expected lifetime of the satellites (in years), while the y-axis represents the predicted expected lifetime (also in years) generated by the regression model. </a:t>
-            </a:r>
-          </a:p>
-          <a:p>
-            <a:r>
-              <a:rPr lang="en-US" b="0" i="0" dirty="0">
-                <a:solidFill>
-                  <a:srgbClr val="BDB7AF"/>
-                </a:solidFill>
-                <a:effectLst/>
-                <a:latin typeface="Söhne"/>
-              </a:rPr>
-              <a:t>The purple dots scattered across the graph represent the predicted values, showing how well the model's predictions align with the actual data.</a:t>
-            </a:r>
-          </a:p>
-          <a:p>
-            <a:r>
-              <a:rPr lang="en-US" b="0" i="0" dirty="0">
-                <a:solidFill>
-                  <a:srgbClr val="BDB7AF"/>
-                </a:solidFill>
-                <a:effectLst/>
-                <a:latin typeface="Söhne"/>
-              </a:rPr>
-              <a:t>The dashed blue line represents the ideal scenario where the predicted values perfectly match the actual values. </a:t>
-            </a:r>
-            <a:endParaRPr lang="en-US" dirty="0"/>
+              <a:rPr lang="en-US" dirty="0"/>
+              <a:t>Here’s my contact information.</a:t>
+            </a:r>
+          </a:p>
+          <a:p>
+            <a:r>
+              <a:rPr lang="en-US" dirty="0"/>
+              <a:t>Thank you all for your time.</a:t>
+            </a:r>
+          </a:p>
+          <a:p>
+            <a:r>
+              <a:rPr lang="en-US" dirty="0"/>
+              <a:t>Are there any questions? </a:t>
+            </a:r>
           </a:p>
         </p:txBody>
       </p:sp>
@@ -862,7 +806,7 @@
     </p:spTree>
     <p:extLst>
       <p:ext uri="{BB962C8B-B14F-4D97-AF65-F5344CB8AC3E}">
-        <p14:creationId xmlns:p14="http://schemas.microsoft.com/office/powerpoint/2010/main" val="1410361982"/>
+        <p14:creationId xmlns:p14="http://schemas.microsoft.com/office/powerpoint/2010/main" val="3631132548"/>
       </p:ext>
     </p:extLst>
   </p:cSld>
@@ -916,6 +860,61 @@
           <a:bodyPr/>
           <a:lstStyle/>
           <a:p>
+            <a:r>
+              <a:rPr lang="en-US" b="0" i="0" dirty="0">
+                <a:solidFill>
+                  <a:srgbClr val="BDB7AF"/>
+                </a:solidFill>
+                <a:effectLst/>
+                <a:latin typeface="Söhne"/>
+              </a:rPr>
+              <a:t>The regression analysis conducted on the dataset provides valuable insights into the relationship and their expected lifetimes.</a:t>
+            </a:r>
+          </a:p>
+          <a:p>
+            <a:r>
+              <a:rPr lang="en-US" b="0" i="0" dirty="0">
+                <a:solidFill>
+                  <a:srgbClr val="BDB7AF"/>
+                </a:solidFill>
+                <a:effectLst/>
+                <a:latin typeface="Söhne"/>
+              </a:rPr>
+              <a:t>between satellite characteristics </a:t>
+            </a:r>
+          </a:p>
+          <a:p>
+            <a:r>
+              <a:rPr lang="en-US" b="0" i="0" dirty="0">
+                <a:solidFill>
+                  <a:srgbClr val="BDB7AF"/>
+                </a:solidFill>
+                <a:effectLst/>
+                <a:latin typeface="Söhne"/>
+              </a:rPr>
+              <a:t>The model, based on the Ordinary Least Squares (OLS) method, demonstrates a reasonable fit to the data with an R-squared value of 0.604, indicating that approximately 60.4% of the variance in the expected lifetime of satellites is explained by the chosen predictor variables.</a:t>
+            </a:r>
+          </a:p>
+          <a:p>
+            <a:endParaRPr lang="en-US" b="0" i="0" dirty="0">
+              <a:solidFill>
+                <a:srgbClr val="BDB7AF"/>
+              </a:solidFill>
+              <a:effectLst/>
+              <a:latin typeface="Söhne"/>
+            </a:endParaRPr>
+          </a:p>
+          <a:p>
+            <a:r>
+              <a:rPr lang="en-US" b="0" i="0" dirty="0">
+                <a:solidFill>
+                  <a:srgbClr val="BDB7AF"/>
+                </a:solidFill>
+                <a:effectLst/>
+                <a:latin typeface="Söhne"/>
+              </a:rPr>
+              <a:t>The F-statistic of 361.3 and associated low probability value (p-value) affirm the overall significance of the regression, implying that the model as a whole is meaningful. </a:t>
+            </a:r>
             <a:endParaRPr lang="en-US" dirty="0"/>
           </a:p>
         </p:txBody>
@@ -946,7 +945,126 @@
     </p:spTree>
     <p:extLst>
       <p:ext uri="{BB962C8B-B14F-4D97-AF65-F5344CB8AC3E}">
-        <p14:creationId xmlns:p14="http://schemas.microsoft.com/office/powerpoint/2010/main" val="3631132548"/>
+        <p14:creationId xmlns:p14="http://schemas.microsoft.com/office/powerpoint/2010/main" val="2380422706"/>
+      </p:ext>
+    </p:extLst>
+  </p:cSld>
+  <p:clrMapOvr>
+    <a:masterClrMapping/>
+  </p:clrMapOvr>
+</p:notes>
+</file>
+
+<file path=ppt/notesSlides/notesSlide13.xml><?xml version="1.0" encoding="utf-8"?>
+<p:notes xmlns:a="http://schemas.openxmlformats.org/drawingml/2006/main" xmlns:r="http://schemas.openxmlformats.org/officeDocument/2006/relationships" xmlns:p="http://schemas.openxmlformats.org/presentationml/2006/main">
+  <p:cSld>
+    <p:spTree>
+      <p:nvGrpSpPr>
+        <p:cNvPr id="1" name=""/>
+        <p:cNvGrpSpPr/>
+        <p:nvPr/>
+      </p:nvGrpSpPr>
+      <p:grpSpPr>
+        <a:xfrm>
+          <a:off x="0" y="0"/>
+          <a:ext cx="0" cy="0"/>
+          <a:chOff x="0" y="0"/>
+          <a:chExt cx="0" cy="0"/>
+        </a:xfrm>
+      </p:grpSpPr>
+      <p:sp>
+        <p:nvSpPr>
+          <p:cNvPr id="2" name="Slide Image Placeholder 1"/>
+          <p:cNvSpPr>
+            <a:spLocks noGrp="1" noRot="1" noChangeAspect="1"/>
+          </p:cNvSpPr>
+          <p:nvPr>
+            <p:ph type="sldImg"/>
+          </p:nvPr>
+        </p:nvSpPr>
+        <p:spPr/>
+      </p:sp>
+      <p:sp>
+        <p:nvSpPr>
+          <p:cNvPr id="3" name="Notes Placeholder 2"/>
+          <p:cNvSpPr>
+            <a:spLocks noGrp="1"/>
+          </p:cNvSpPr>
+          <p:nvPr>
+            <p:ph type="body" idx="1"/>
+          </p:nvPr>
+        </p:nvSpPr>
+        <p:spPr/>
+        <p:txBody>
+          <a:bodyPr/>
+          <a:lstStyle/>
+          <a:p>
+            <a:pPr algn="l"/>
+            <a:r>
+              <a:rPr lang="en-US" dirty="0"/>
+              <a:t>In addition to the hypotheses, I wanted to see if these features had an effect on a satellite’s expected lifetime. </a:t>
+            </a:r>
+            <a:endParaRPr lang="en-US" sz="1200" dirty="0">
+              <a:solidFill>
+                <a:schemeClr val="accent2">
+                  <a:lumMod val="60000"/>
+                  <a:lumOff val="40000"/>
+                </a:schemeClr>
+              </a:solidFill>
+              <a:latin typeface="Biome Light" panose="020B0303030204020804" pitchFamily="34" charset="0"/>
+              <a:cs typeface="Biome Light" panose="020B0303030204020804" pitchFamily="34" charset="0"/>
+            </a:endParaRPr>
+          </a:p>
+          <a:p>
+            <a:r>
+              <a:rPr lang="en-US" dirty="0"/>
+              <a:t>I chose to use perigee and apogee instead of the orbits as these are numerical values instead of categorical. This provided my model with higher accuracy. </a:t>
+            </a:r>
+          </a:p>
+          <a:p>
+            <a:r>
+              <a:rPr lang="en-US" b="0" i="0" dirty="0">
+                <a:solidFill>
+                  <a:srgbClr val="BDB7AF"/>
+                </a:solidFill>
+                <a:effectLst/>
+                <a:latin typeface="Söhne"/>
+              </a:rPr>
+              <a:t>The model, based on the Ordinary Least Squares (OLS) method, demonstrates a reasonable fit to the data with an R-squared value of 0.604, indicating that approximately 60.4% of the variance in the expected lifetime of satellites is explained the chose features</a:t>
+            </a:r>
+          </a:p>
+          <a:p>
+            <a:endParaRPr lang="en-US" dirty="0"/>
+          </a:p>
+        </p:txBody>
+      </p:sp>
+      <p:sp>
+        <p:nvSpPr>
+          <p:cNvPr id="4" name="Slide Number Placeholder 3"/>
+          <p:cNvSpPr>
+            <a:spLocks noGrp="1"/>
+          </p:cNvSpPr>
+          <p:nvPr>
+            <p:ph type="sldNum" sz="quarter" idx="5"/>
+          </p:nvPr>
+        </p:nvSpPr>
+        <p:spPr/>
+        <p:txBody>
+          <a:bodyPr/>
+          <a:lstStyle/>
+          <a:p>
+            <a:fld id="{23C058E0-0852-DB43-83D6-BD76659FF1D8}" type="slidenum">
+              <a:rPr lang="en-US" smtClean="0"/>
+              <a:t>13</a:t>
+            </a:fld>
+            <a:endParaRPr lang="en-US" dirty="0"/>
+          </a:p>
+        </p:txBody>
+      </p:sp>
+    </p:spTree>
+    <p:extLst>
+      <p:ext uri="{BB962C8B-B14F-4D97-AF65-F5344CB8AC3E}">
+        <p14:creationId xmlns:p14="http://schemas.microsoft.com/office/powerpoint/2010/main" val="3247244731"/>
       </p:ext>
     </p:extLst>
   </p:cSld>
@@ -1134,19 +1252,7 @@
                 <a:effectLst/>
                 <a:latin typeface="Söhne"/>
               </a:rPr>
-              <a:t>Understanding the factors that affect satellite lifetimes, such as orbit type, can help the military allocate resources effectively by choosing the most suitable orbits for different types of missions. </a:t>
-            </a:r>
-          </a:p>
-          <a:p>
-            <a:r>
-              <a:rPr lang="en-US" b="0" i="0" dirty="0">
-                <a:solidFill>
-                  <a:srgbClr val="BDB7AF"/>
-                </a:solidFill>
-                <a:effectLst/>
-                <a:latin typeface="Söhne"/>
-              </a:rPr>
-              <a:t>Satellites play a crucial role in maintaining situational awareness, command and control, and communication during various operations. Knowing which orbits provide longer lifetimes can contribute to more reliable and sustained operations.</a:t>
+              <a:t>Satellites play a crucial role in maintaining situational awareness, command and control, and communication during various operations. Knowing which attributes provide longer lifetimes can contribute to more reliable and sustained operations.</a:t>
             </a:r>
           </a:p>
           <a:p>
@@ -1363,7 +1469,7 @@
           <a:p>
             <a:r>
               <a:rPr lang="en-US" dirty="0"/>
-              <a:t>I also had to create dummy variables for class of orbit as it was one categorical column. Creating the dummy variables allowed me to make comparisons between how the different orbits behaved. </a:t>
+              <a:t>I also had to transform the categorical columns to numerical values which allowed me to make comparisons between how the different orbits behaved. </a:t>
             </a:r>
           </a:p>
           <a:p>
@@ -1667,17 +1773,7 @@
                 <a:effectLst/>
                 <a:latin typeface="-apple-system"/>
               </a:rPr>
-              <a:t>It shows the mean difference in years. </a:t>
-            </a:r>
-            <a:r>
-              <a:rPr lang="en-US" b="0" i="0">
-                <a:solidFill>
-                  <a:srgbClr val="D2CEC8"/>
-                </a:solidFill>
-                <a:effectLst/>
-                <a:latin typeface="-apple-system"/>
-              </a:rPr>
-              <a:t>It also shows that in each scenario we can reject the null hypothesis.</a:t>
+              <a:t>It shows the mean difference in years. It also shows that in each scenario we can reject the null hypothesis.</a:t>
             </a:r>
             <a:endParaRPr lang="en-US" dirty="0"/>
           </a:p>
@@ -1876,6 +1972,18 @@
             <a:r>
               <a:rPr lang="en-US" dirty="0"/>
               <a:t>I chose to use perigee and apogee instead of the orbits as these are numerical values instead of categorical. This provided my model with higher accuracy. </a:t>
+            </a:r>
+          </a:p>
+          <a:p>
+            <a:r>
+              <a:rPr lang="en-US" b="0" i="0" dirty="0">
+                <a:solidFill>
+                  <a:srgbClr val="BDB7AF"/>
+                </a:solidFill>
+                <a:effectLst/>
+                <a:latin typeface="Söhne"/>
+              </a:rPr>
+              <a:t>The model, based on the Ordinary Least Squares (OLS) method, demonstrates a reasonable fit to the data with an R-squared value of 0.604. This means that about 60.4% of the variance in the expected lifetime of satellites is explained the chose features</a:t>
             </a:r>
           </a:p>
         </p:txBody>
@@ -18629,6 +18737,321 @@
           <a:chExt cx="0" cy="0"/>
         </a:xfrm>
       </p:grpSpPr>
+      <p:sp>
+        <p:nvSpPr>
+          <p:cNvPr id="2" name="Title 1">
+            <a:extLst>
+              <a:ext uri="{FF2B5EF4-FFF2-40B4-BE49-F238E27FC236}">
+                <a16:creationId xmlns:a16="http://schemas.microsoft.com/office/drawing/2014/main" id="{D04F090D-C862-CF85-1001-A82E54365597}"/>
+              </a:ext>
+            </a:extLst>
+          </p:cNvPr>
+          <p:cNvSpPr>
+            <a:spLocks noGrp="1"/>
+          </p:cNvSpPr>
+          <p:nvPr>
+            <p:ph type="ctrTitle"/>
+          </p:nvPr>
+        </p:nvSpPr>
+        <p:spPr>
+          <a:xfrm>
+            <a:off x="2214372" y="1255383"/>
+            <a:ext cx="7763256" cy="809391"/>
+          </a:xfrm>
+        </p:spPr>
+        <p:txBody>
+          <a:bodyPr/>
+          <a:lstStyle/>
+          <a:p>
+            <a:br>
+              <a:rPr lang="en-US" dirty="0"/>
+            </a:br>
+            <a:endParaRPr lang="en-US" dirty="0"/>
+          </a:p>
+        </p:txBody>
+      </p:sp>
+      <p:pic>
+        <p:nvPicPr>
+          <p:cNvPr id="5" name="Picture 4">
+            <a:extLst>
+              <a:ext uri="{FF2B5EF4-FFF2-40B4-BE49-F238E27FC236}">
+                <a16:creationId xmlns:a16="http://schemas.microsoft.com/office/drawing/2014/main" id="{0F95D50F-614E-E0A2-1134-9CEE60328ED0}"/>
+              </a:ext>
+            </a:extLst>
+          </p:cNvPr>
+          <p:cNvPicPr>
+            <a:picLocks noChangeAspect="1"/>
+          </p:cNvPicPr>
+          <p:nvPr/>
+        </p:nvPicPr>
+        <p:blipFill>
+          <a:blip r:embed="rId3"/>
+          <a:stretch>
+            <a:fillRect/>
+          </a:stretch>
+        </p:blipFill>
+        <p:spPr>
+          <a:xfrm>
+            <a:off x="1175067" y="72895"/>
+            <a:ext cx="9649687" cy="6712209"/>
+          </a:xfrm>
+          <a:prstGeom prst="rect">
+            <a:avLst/>
+          </a:prstGeom>
+        </p:spPr>
+      </p:pic>
+    </p:spTree>
+    <p:extLst>
+      <p:ext uri="{BB962C8B-B14F-4D97-AF65-F5344CB8AC3E}">
+        <p14:creationId xmlns:p14="http://schemas.microsoft.com/office/powerpoint/2010/main" val="3257756880"/>
+      </p:ext>
+    </p:extLst>
+  </p:cSld>
+  <p:clrMapOvr>
+    <a:masterClrMapping/>
+  </p:clrMapOvr>
+</p:sld>
+</file>
+
+<file path=ppt/slides/slide11.xml><?xml version="1.0" encoding="utf-8"?>
+<p:sld xmlns:a="http://schemas.openxmlformats.org/drawingml/2006/main" xmlns:r="http://schemas.openxmlformats.org/officeDocument/2006/relationships" xmlns:p="http://schemas.openxmlformats.org/presentationml/2006/main">
+  <p:cSld>
+    <p:spTree>
+      <p:nvGrpSpPr>
+        <p:cNvPr id="1" name=""/>
+        <p:cNvGrpSpPr/>
+        <p:nvPr/>
+      </p:nvGrpSpPr>
+      <p:grpSpPr>
+        <a:xfrm>
+          <a:off x="0" y="0"/>
+          <a:ext cx="0" cy="0"/>
+          <a:chOff x="0" y="0"/>
+          <a:chExt cx="0" cy="0"/>
+        </a:xfrm>
+      </p:grpSpPr>
+      <p:sp>
+        <p:nvSpPr>
+          <p:cNvPr id="2" name="Title 1">
+            <a:extLst>
+              <a:ext uri="{FF2B5EF4-FFF2-40B4-BE49-F238E27FC236}">
+                <a16:creationId xmlns:a16="http://schemas.microsoft.com/office/drawing/2014/main" id="{2C9E1892-81E6-551C-7B5A-DEA68224520B}"/>
+              </a:ext>
+            </a:extLst>
+          </p:cNvPr>
+          <p:cNvSpPr>
+            <a:spLocks noGrp="1"/>
+          </p:cNvSpPr>
+          <p:nvPr>
+            <p:ph type="title"/>
+          </p:nvPr>
+        </p:nvSpPr>
+        <p:spPr>
+          <a:xfrm>
+            <a:off x="5129349" y="1856232"/>
+            <a:ext cx="6181779" cy="1069848"/>
+          </a:xfrm>
+        </p:spPr>
+        <p:txBody>
+          <a:bodyPr/>
+          <a:lstStyle/>
+          <a:p>
+            <a:r>
+              <a:rPr lang="en-US" dirty="0">
+                <a:ln w="28575">
+                  <a:noFill/>
+                  <a:prstDash val="solid"/>
+                </a:ln>
+                <a:solidFill>
+                  <a:schemeClr val="accent4"/>
+                </a:solidFill>
+                <a:latin typeface="Biome" panose="020B0503030204020804" pitchFamily="34" charset="0"/>
+                <a:cs typeface="Biome" panose="020B0503030204020804" pitchFamily="34" charset="0"/>
+              </a:rPr>
+              <a:t>CONTACT INFO</a:t>
+            </a:r>
+            <a:endParaRPr lang="en-US" dirty="0">
+              <a:solidFill>
+                <a:schemeClr val="accent4"/>
+              </a:solidFill>
+              <a:latin typeface="Biome" panose="020B0503030204020804" pitchFamily="34" charset="0"/>
+              <a:cs typeface="Biome" panose="020B0503030204020804" pitchFamily="34" charset="0"/>
+            </a:endParaRPr>
+          </a:p>
+        </p:txBody>
+      </p:sp>
+      <p:sp>
+        <p:nvSpPr>
+          <p:cNvPr id="3" name="Text Placeholder 2">
+            <a:extLst>
+              <a:ext uri="{FF2B5EF4-FFF2-40B4-BE49-F238E27FC236}">
+                <a16:creationId xmlns:a16="http://schemas.microsoft.com/office/drawing/2014/main" id="{55519D01-29BE-BE76-41C5-9D58AD8119DC}"/>
+              </a:ext>
+            </a:extLst>
+          </p:cNvPr>
+          <p:cNvSpPr>
+            <a:spLocks noGrp="1"/>
+          </p:cNvSpPr>
+          <p:nvPr>
+            <p:ph type="body" idx="1"/>
+          </p:nvPr>
+        </p:nvSpPr>
+        <p:spPr>
+          <a:xfrm>
+            <a:off x="4798422" y="3429000"/>
+            <a:ext cx="6843631" cy="3105041"/>
+          </a:xfrm>
+        </p:spPr>
+        <p:txBody>
+          <a:bodyPr/>
+          <a:lstStyle/>
+          <a:p>
+            <a:r>
+              <a:rPr lang="en-US" dirty="0">
+                <a:solidFill>
+                  <a:schemeClr val="accent2">
+                    <a:lumMod val="60000"/>
+                    <a:lumOff val="40000"/>
+                  </a:schemeClr>
+                </a:solidFill>
+                <a:latin typeface="Biome Light" panose="020B0303030204020804" pitchFamily="34" charset="0"/>
+                <a:cs typeface="Biome Light" panose="020B0303030204020804" pitchFamily="34" charset="0"/>
+              </a:rPr>
+              <a:t>Joshlyn Jamerson</a:t>
+            </a:r>
+          </a:p>
+          <a:p>
+            <a:r>
+              <a:rPr lang="en-US" dirty="0">
+                <a:solidFill>
+                  <a:schemeClr val="accent2">
+                    <a:lumMod val="60000"/>
+                    <a:lumOff val="40000"/>
+                  </a:schemeClr>
+                </a:solidFill>
+                <a:latin typeface="Biome Light" panose="020B0303030204020804" pitchFamily="34" charset="0"/>
+                <a:cs typeface="Biome Light" panose="020B0303030204020804" pitchFamily="34" charset="0"/>
+                <a:hlinkClick r:id="rId3">
+                  <a:extLst>
+                    <a:ext uri="{A12FA001-AC4F-418D-AE19-62706E023703}">
+                      <ahyp:hlinkClr xmlns:ahyp="http://schemas.microsoft.com/office/drawing/2018/hyperlinkcolor" val="tx"/>
+                    </a:ext>
+                  </a:extLst>
+                </a:hlinkClick>
+              </a:rPr>
+              <a:t>Joshlyn.Jamerson@spaceforce.mil</a:t>
+            </a:r>
+            <a:endParaRPr lang="en-US" dirty="0">
+              <a:solidFill>
+                <a:schemeClr val="accent2">
+                  <a:lumMod val="60000"/>
+                  <a:lumOff val="40000"/>
+                </a:schemeClr>
+              </a:solidFill>
+              <a:latin typeface="Biome Light" panose="020B0303030204020804" pitchFamily="34" charset="0"/>
+              <a:cs typeface="Biome Light" panose="020B0303030204020804" pitchFamily="34" charset="0"/>
+            </a:endParaRPr>
+          </a:p>
+          <a:p>
+            <a:r>
+              <a:rPr lang="en-US" dirty="0">
+                <a:solidFill>
+                  <a:schemeClr val="accent2">
+                    <a:lumMod val="60000"/>
+                    <a:lumOff val="40000"/>
+                  </a:schemeClr>
+                </a:solidFill>
+                <a:latin typeface="Biome Light" panose="020B0303030204020804" pitchFamily="34" charset="0"/>
+                <a:cs typeface="Biome Light" panose="020B0303030204020804" pitchFamily="34" charset="0"/>
+              </a:rPr>
+              <a:t>Original dataset: </a:t>
+            </a:r>
+            <a:r>
+              <a:rPr lang="en-US" dirty="0">
+                <a:solidFill>
+                  <a:schemeClr val="accent2">
+                    <a:lumMod val="60000"/>
+                    <a:lumOff val="40000"/>
+                  </a:schemeClr>
+                </a:solidFill>
+                <a:latin typeface="Biome Light" panose="020B0303030204020804" pitchFamily="34" charset="0"/>
+                <a:cs typeface="Biome Light" panose="020B0303030204020804" pitchFamily="34" charset="0"/>
+                <a:hlinkClick r:id="rId4">
+                  <a:extLst>
+                    <a:ext uri="{A12FA001-AC4F-418D-AE19-62706E023703}">
+                      <ahyp:hlinkClr xmlns:ahyp="http://schemas.microsoft.com/office/drawing/2018/hyperlinkcolor" val="tx"/>
+                    </a:ext>
+                  </a:extLst>
+                </a:hlinkClick>
+              </a:rPr>
+              <a:t>https://www.kaggle.com/datasets/ucsusa/active-satellites</a:t>
+            </a:r>
+            <a:endParaRPr lang="en-US" dirty="0">
+              <a:solidFill>
+                <a:schemeClr val="accent2">
+                  <a:lumMod val="60000"/>
+                  <a:lumOff val="40000"/>
+                </a:schemeClr>
+              </a:solidFill>
+              <a:latin typeface="Biome Light" panose="020B0303030204020804" pitchFamily="34" charset="0"/>
+              <a:cs typeface="Biome Light" panose="020B0303030204020804" pitchFamily="34" charset="0"/>
+            </a:endParaRPr>
+          </a:p>
+          <a:p>
+            <a:r>
+              <a:rPr lang="en-US" dirty="0">
+                <a:solidFill>
+                  <a:schemeClr val="accent2">
+                    <a:lumMod val="60000"/>
+                    <a:lumOff val="40000"/>
+                  </a:schemeClr>
+                </a:solidFill>
+                <a:latin typeface="Biome Light" panose="020B0303030204020804" pitchFamily="34" charset="0"/>
+                <a:cs typeface="Biome Light" panose="020B0303030204020804" pitchFamily="34" charset="0"/>
+              </a:rPr>
+              <a:t>GitHub Repository: https://github.com/joshlynj/active_satellites</a:t>
+            </a:r>
+            <a:endParaRPr lang="en-US" dirty="0">
+              <a:solidFill>
+                <a:schemeClr val="accent2">
+                  <a:lumMod val="60000"/>
+                  <a:lumOff val="40000"/>
+                </a:schemeClr>
+              </a:solidFill>
+            </a:endParaRPr>
+          </a:p>
+        </p:txBody>
+      </p:sp>
+    </p:spTree>
+    <p:extLst>
+      <p:ext uri="{BB962C8B-B14F-4D97-AF65-F5344CB8AC3E}">
+        <p14:creationId xmlns:p14="http://schemas.microsoft.com/office/powerpoint/2010/main" val="1877701230"/>
+      </p:ext>
+    </p:extLst>
+  </p:cSld>
+  <p:clrMapOvr>
+    <a:masterClrMapping/>
+  </p:clrMapOvr>
+</p:sld>
+</file>
+
+<file path=ppt/slides/slide12.xml><?xml version="1.0" encoding="utf-8"?>
+<p:sld xmlns:a="http://schemas.openxmlformats.org/drawingml/2006/main" xmlns:r="http://schemas.openxmlformats.org/officeDocument/2006/relationships" xmlns:p="http://schemas.openxmlformats.org/presentationml/2006/main" show="0">
+  <p:cSld>
+    <p:spTree>
+      <p:nvGrpSpPr>
+        <p:cNvPr id="1" name=""/>
+        <p:cNvGrpSpPr/>
+        <p:nvPr/>
+      </p:nvGrpSpPr>
+      <p:grpSpPr>
+        <a:xfrm>
+          <a:off x="0" y="0"/>
+          <a:ext cx="0" cy="0"/>
+          <a:chOff x="0" y="0"/>
+          <a:chExt cx="0" cy="0"/>
+        </a:xfrm>
+      </p:grpSpPr>
       <p:pic>
         <p:nvPicPr>
           <p:cNvPr id="25" name="Picture 24">
@@ -18672,8 +19095,8 @@
 </p:sld>
 </file>
 
-<file path=ppt/slides/slide11.xml><?xml version="1.0" encoding="utf-8"?>
-<p:sld xmlns:a="http://schemas.openxmlformats.org/drawingml/2006/main" xmlns:r="http://schemas.openxmlformats.org/officeDocument/2006/relationships" xmlns:p="http://schemas.openxmlformats.org/presentationml/2006/main">
+<file path=ppt/slides/slide13.xml><?xml version="1.0" encoding="utf-8"?>
+<p:sld xmlns:a="http://schemas.openxmlformats.org/drawingml/2006/main" xmlns:r="http://schemas.openxmlformats.org/officeDocument/2006/relationships" xmlns:p="http://schemas.openxmlformats.org/presentationml/2006/main" show="0">
   <p:cSld>
     <p:spTree>
       <p:nvGrpSpPr>
@@ -18691,10 +19114,10 @@
       </p:grpSpPr>
       <p:sp>
         <p:nvSpPr>
-          <p:cNvPr id="2" name="Title 1">
-            <a:extLst>
-              <a:ext uri="{FF2B5EF4-FFF2-40B4-BE49-F238E27FC236}">
-                <a16:creationId xmlns:a16="http://schemas.microsoft.com/office/drawing/2014/main" id="{D04F090D-C862-CF85-1001-A82E54365597}"/>
+          <p:cNvPr id="2" name="Text Placeholder 1">
+            <a:extLst>
+              <a:ext uri="{FF2B5EF4-FFF2-40B4-BE49-F238E27FC236}">
+                <a16:creationId xmlns:a16="http://schemas.microsoft.com/office/drawing/2014/main" id="{6BCD4E3A-FBD0-683B-2AC8-6F5EBA435716}"/>
               </a:ext>
             </a:extLst>
           </p:cNvPr>
@@ -18702,92 +19125,39 @@
             <a:spLocks noGrp="1"/>
           </p:cNvSpPr>
           <p:nvPr>
-            <p:ph type="ctrTitle"/>
+            <p:ph type="body" sz="quarter" idx="21"/>
           </p:nvPr>
         </p:nvSpPr>
         <p:spPr>
           <a:xfrm>
-            <a:off x="2214372" y="1255383"/>
-            <a:ext cx="7763256" cy="809391"/>
+            <a:off x="8175522" y="3236978"/>
+            <a:ext cx="3454315" cy="1895461"/>
           </a:xfrm>
         </p:spPr>
         <p:txBody>
           <a:bodyPr/>
           <a:lstStyle/>
           <a:p>
-            <a:br>
-              <a:rPr lang="en-US" dirty="0"/>
-            </a:br>
-            <a:endParaRPr lang="en-US" dirty="0"/>
-          </a:p>
-        </p:txBody>
-      </p:sp>
-      <p:pic>
-        <p:nvPicPr>
-          <p:cNvPr id="5" name="Picture 4">
-            <a:extLst>
-              <a:ext uri="{FF2B5EF4-FFF2-40B4-BE49-F238E27FC236}">
-                <a16:creationId xmlns:a16="http://schemas.microsoft.com/office/drawing/2014/main" id="{0F95D50F-614E-E0A2-1134-9CEE60328ED0}"/>
-              </a:ext>
-            </a:extLst>
-          </p:cNvPr>
-          <p:cNvPicPr>
-            <a:picLocks noChangeAspect="1"/>
-          </p:cNvPicPr>
-          <p:nvPr/>
-        </p:nvPicPr>
-        <p:blipFill>
-          <a:blip r:embed="rId3"/>
-          <a:stretch>
-            <a:fillRect/>
-          </a:stretch>
-        </p:blipFill>
-        <p:spPr>
-          <a:xfrm>
-            <a:off x="1175067" y="72895"/>
-            <a:ext cx="9649687" cy="6712209"/>
-          </a:xfrm>
-          <a:prstGeom prst="rect">
-            <a:avLst/>
-          </a:prstGeom>
-        </p:spPr>
-      </p:pic>
-    </p:spTree>
-    <p:extLst>
-      <p:ext uri="{BB962C8B-B14F-4D97-AF65-F5344CB8AC3E}">
-        <p14:creationId xmlns:p14="http://schemas.microsoft.com/office/powerpoint/2010/main" val="3257756880"/>
-      </p:ext>
-    </p:extLst>
-  </p:cSld>
-  <p:clrMapOvr>
-    <a:masterClrMapping/>
-  </p:clrMapOvr>
-</p:sld>
-</file>
-
-<file path=ppt/slides/slide12.xml><?xml version="1.0" encoding="utf-8"?>
-<p:sld xmlns:a="http://schemas.openxmlformats.org/drawingml/2006/main" xmlns:r="http://schemas.openxmlformats.org/officeDocument/2006/relationships" xmlns:p="http://schemas.openxmlformats.org/presentationml/2006/main">
-  <p:cSld>
-    <p:spTree>
-      <p:nvGrpSpPr>
-        <p:cNvPr id="1" name=""/>
-        <p:cNvGrpSpPr/>
-        <p:nvPr/>
-      </p:nvGrpSpPr>
-      <p:grpSpPr>
-        <a:xfrm>
-          <a:off x="0" y="0"/>
-          <a:ext cx="0" cy="0"/>
-          <a:chOff x="0" y="0"/>
-          <a:chExt cx="0" cy="0"/>
-        </a:xfrm>
-      </p:grpSpPr>
-      <p:sp>
-        <p:nvSpPr>
-          <p:cNvPr id="2" name="Title 1">
-            <a:extLst>
-              <a:ext uri="{FF2B5EF4-FFF2-40B4-BE49-F238E27FC236}">
-                <a16:creationId xmlns:a16="http://schemas.microsoft.com/office/drawing/2014/main" id="{2C9E1892-81E6-551C-7B5A-DEA68224520B}"/>
+            <a:pPr marL="285750" indent="-285750">
+              <a:buFont typeface="Courier New" panose="02070309020205020404" pitchFamily="49" charset="0"/>
+              <a:buChar char="o"/>
+            </a:pPr>
+            <a:r>
+              <a:rPr lang="en-US" sz="2000" dirty="0">
+                <a:latin typeface="Biome Light" panose="020B0303030204020804" pitchFamily="34" charset="0"/>
+                <a:cs typeface="Biome Light" panose="020B0303030204020804" pitchFamily="34" charset="0"/>
+              </a:rPr>
+              <a:t>R-Squared Value: 0.604 </a:t>
+            </a:r>
+          </a:p>
+        </p:txBody>
+      </p:sp>
+      <p:sp>
+        <p:nvSpPr>
+          <p:cNvPr id="3" name="Title 2">
+            <a:extLst>
+              <a:ext uri="{FF2B5EF4-FFF2-40B4-BE49-F238E27FC236}">
+                <a16:creationId xmlns:a16="http://schemas.microsoft.com/office/drawing/2014/main" id="{39599DA0-DE16-146F-C972-4DF60046DAEA}"/>
               </a:ext>
             </a:extLst>
           </p:cNvPr>
@@ -18800,8 +19170,8 @@
         </p:nvSpPr>
         <p:spPr>
           <a:xfrm>
-            <a:off x="5129349" y="1856232"/>
-            <a:ext cx="6181779" cy="1069848"/>
+            <a:off x="1655064" y="832104"/>
+            <a:ext cx="9686446" cy="1069848"/>
           </a:xfrm>
         </p:spPr>
         <p:txBody>
@@ -18810,34 +19180,26 @@
           <a:p>
             <a:r>
               <a:rPr lang="en-US" dirty="0">
-                <a:ln w="28575">
-                  <a:noFill/>
-                  <a:prstDash val="solid"/>
-                </a:ln>
                 <a:solidFill>
-                  <a:schemeClr val="accent4"/>
+                  <a:schemeClr val="accent4">
+                    <a:lumMod val="90000"/>
+                  </a:schemeClr>
                 </a:solidFill>
                 <a:latin typeface="Biome" panose="020B0503030204020804" pitchFamily="34" charset="0"/>
                 <a:cs typeface="Biome" panose="020B0503030204020804" pitchFamily="34" charset="0"/>
               </a:rPr>
-              <a:t>CONTACT INFO</a:t>
-            </a:r>
-            <a:endParaRPr lang="en-US" dirty="0">
-              <a:solidFill>
-                <a:schemeClr val="accent4"/>
-              </a:solidFill>
-              <a:latin typeface="Biome" panose="020B0503030204020804" pitchFamily="34" charset="0"/>
-              <a:cs typeface="Biome" panose="020B0503030204020804" pitchFamily="34" charset="0"/>
-            </a:endParaRPr>
-          </a:p>
-        </p:txBody>
-      </p:sp>
-      <p:sp>
-        <p:nvSpPr>
-          <p:cNvPr id="3" name="Text Placeholder 2">
-            <a:extLst>
-              <a:ext uri="{FF2B5EF4-FFF2-40B4-BE49-F238E27FC236}">
-                <a16:creationId xmlns:a16="http://schemas.microsoft.com/office/drawing/2014/main" id="{55519D01-29BE-BE76-41C5-9D58AD8119DC}"/>
+              <a:t>Linear regression model</a:t>
+            </a:r>
+            <a:endParaRPr lang="en-US" dirty="0"/>
+          </a:p>
+        </p:txBody>
+      </p:sp>
+      <p:sp>
+        <p:nvSpPr>
+          <p:cNvPr id="4" name="Text Placeholder 3">
+            <a:extLst>
+              <a:ext uri="{FF2B5EF4-FFF2-40B4-BE49-F238E27FC236}">
+                <a16:creationId xmlns:a16="http://schemas.microsoft.com/office/drawing/2014/main" id="{F5295476-18D6-062F-8BF1-2CBCA433DEE7}"/>
               </a:ext>
             </a:extLst>
           </p:cNvPr>
@@ -18845,59 +19207,124 @@
             <a:spLocks noGrp="1"/>
           </p:cNvSpPr>
           <p:nvPr>
-            <p:ph type="body" idx="1"/>
+            <p:ph type="body" sz="quarter" idx="12"/>
           </p:nvPr>
         </p:nvSpPr>
         <p:spPr>
           <a:xfrm>
-            <a:off x="4798422" y="3429000"/>
-            <a:ext cx="6843631" cy="3105041"/>
+            <a:off x="522432" y="2484374"/>
+            <a:ext cx="4149611" cy="702770"/>
+          </a:xfrm>
+          <a:solidFill>
+            <a:srgbClr val="D6ABD7"/>
+          </a:solidFill>
+          <a:ln>
+            <a:solidFill>
+              <a:schemeClr val="accent6"/>
+            </a:solidFill>
+          </a:ln>
+        </p:spPr>
+        <p:txBody>
+          <a:bodyPr/>
+          <a:lstStyle/>
+          <a:p>
+            <a:r>
+              <a:rPr lang="en-US" dirty="0">
+                <a:solidFill>
+                  <a:schemeClr val="accent4">
+                    <a:lumMod val="25000"/>
+                  </a:schemeClr>
+                </a:solidFill>
+                <a:latin typeface="Biome" panose="020B0503030204020804" pitchFamily="34" charset="0"/>
+                <a:cs typeface="Biome" panose="020B0503030204020804" pitchFamily="34" charset="0"/>
+              </a:rPr>
+              <a:t>Features of Interest</a:t>
+            </a:r>
+          </a:p>
+        </p:txBody>
+      </p:sp>
+      <p:sp>
+        <p:nvSpPr>
+          <p:cNvPr id="5" name="Text Placeholder 4">
+            <a:extLst>
+              <a:ext uri="{FF2B5EF4-FFF2-40B4-BE49-F238E27FC236}">
+                <a16:creationId xmlns:a16="http://schemas.microsoft.com/office/drawing/2014/main" id="{B56E6102-24D1-E18D-149D-028C51110473}"/>
+              </a:ext>
+            </a:extLst>
+          </p:cNvPr>
+          <p:cNvSpPr>
+            <a:spLocks noGrp="1"/>
+          </p:cNvSpPr>
+          <p:nvPr>
+            <p:ph type="body" sz="quarter" idx="13"/>
+          </p:nvPr>
+        </p:nvSpPr>
+        <p:spPr>
+          <a:xfrm>
+            <a:off x="522431" y="3236978"/>
+            <a:ext cx="4149611" cy="1895462"/>
           </a:xfrm>
         </p:spPr>
         <p:txBody>
           <a:bodyPr/>
           <a:lstStyle/>
           <a:p>
-            <a:r>
-              <a:rPr lang="en-US" dirty="0">
+            <a:pPr marL="342900" indent="-342900" algn="l">
+              <a:buFont typeface="Courier New" panose="02070309020205020404" pitchFamily="49" charset="0"/>
+              <a:buChar char="o"/>
+            </a:pPr>
+            <a:r>
+              <a:rPr lang="en-US" sz="2000" dirty="0">
                 <a:solidFill>
                   <a:schemeClr val="accent2">
-                    <a:lumMod val="60000"/>
-                    <a:lumOff val="40000"/>
+                    <a:lumMod val="40000"/>
+                    <a:lumOff val="60000"/>
                   </a:schemeClr>
                 </a:solidFill>
                 <a:latin typeface="Biome Light" panose="020B0303030204020804" pitchFamily="34" charset="0"/>
                 <a:cs typeface="Biome Light" panose="020B0303030204020804" pitchFamily="34" charset="0"/>
               </a:rPr>
-              <a:t>Joshlyn Jamerson</a:t>
-            </a:r>
-          </a:p>
-          <a:p>
-            <a:r>
-              <a:rPr lang="en-US" dirty="0">
+              <a:t>P</a:t>
+            </a:r>
+            <a:r>
+              <a:rPr lang="en-US" sz="2000" b="0" dirty="0">
                 <a:solidFill>
                   <a:schemeClr val="accent2">
-                    <a:lumMod val="60000"/>
-                    <a:lumOff val="40000"/>
+                    <a:lumMod val="40000"/>
+                    <a:lumOff val="60000"/>
                   </a:schemeClr>
                 </a:solidFill>
+                <a:effectLst/>
                 <a:latin typeface="Biome Light" panose="020B0303030204020804" pitchFamily="34" charset="0"/>
                 <a:cs typeface="Biome Light" panose="020B0303030204020804" pitchFamily="34" charset="0"/>
-                <a:hlinkClick r:id="rId3">
-                  <a:extLst>
-                    <a:ext uri="{A12FA001-AC4F-418D-AE19-62706E023703}">
-                      <ahyp:hlinkClr xmlns:ahyp="http://schemas.microsoft.com/office/drawing/2018/hyperlinkcolor" val="tx"/>
-                    </a:ext>
-                  </a:extLst>
-                </a:hlinkClick>
               </a:rPr>
-              <a:t>Joshlyn.Jamerson@spaceforce.mil</a:t>
-            </a:r>
-            <a:endParaRPr lang="en-US" dirty="0">
+              <a:t>erigee (Kilometers) </a:t>
+            </a:r>
+          </a:p>
+          <a:p>
+            <a:pPr marL="342900" indent="-342900" algn="l">
+              <a:buFont typeface="Courier New" panose="02070309020205020404" pitchFamily="49" charset="0"/>
+              <a:buChar char="o"/>
+            </a:pPr>
+            <a:r>
+              <a:rPr lang="en-US" sz="2000" b="0" dirty="0">
+                <a:solidFill>
+                  <a:schemeClr val="accent2">
+                    <a:lumMod val="40000"/>
+                    <a:lumOff val="60000"/>
+                  </a:schemeClr>
+                </a:solidFill>
+                <a:effectLst/>
+                <a:latin typeface="Biome Light" panose="020B0303030204020804" pitchFamily="34" charset="0"/>
+                <a:cs typeface="Biome Light" panose="020B0303030204020804" pitchFamily="34" charset="0"/>
+              </a:rPr>
+              <a:t>Apogee (Kilometers)</a:t>
+            </a:r>
+            <a:endParaRPr lang="en-US" sz="2000" dirty="0">
               <a:solidFill>
                 <a:schemeClr val="accent2">
-                  <a:lumMod val="60000"/>
-                  <a:lumOff val="40000"/>
+                  <a:lumMod val="40000"/>
+                  <a:lumOff val="60000"/>
                 </a:schemeClr>
               </a:solidFill>
               <a:latin typeface="Biome Light" panose="020B0303030204020804" pitchFamily="34" charset="0"/>
@@ -18905,79 +19332,277 @@
             </a:endParaRPr>
           </a:p>
           <a:p>
-            <a:r>
-              <a:rPr lang="en-US" dirty="0">
+            <a:pPr marL="342900" indent="-342900" algn="l">
+              <a:buFont typeface="Courier New" panose="02070309020205020404" pitchFamily="49" charset="0"/>
+              <a:buChar char="o"/>
+            </a:pPr>
+            <a:r>
+              <a:rPr lang="en-US" sz="2000" b="0" dirty="0">
                 <a:solidFill>
                   <a:schemeClr val="accent2">
-                    <a:lumMod val="60000"/>
-                    <a:lumOff val="40000"/>
+                    <a:lumMod val="40000"/>
+                    <a:lumOff val="60000"/>
+                  </a:schemeClr>
+                </a:solidFill>
+                <a:effectLst/>
+                <a:latin typeface="Biome Light" panose="020B0303030204020804" pitchFamily="34" charset="0"/>
+                <a:cs typeface="Biome Light" panose="020B0303030204020804" pitchFamily="34" charset="0"/>
+              </a:rPr>
+              <a:t>Launch Mass (Kilograms)</a:t>
+            </a:r>
+            <a:endParaRPr lang="en-US" sz="2000" dirty="0">
+              <a:solidFill>
+                <a:schemeClr val="accent2">
+                  <a:lumMod val="40000"/>
+                  <a:lumOff val="60000"/>
+                </a:schemeClr>
+              </a:solidFill>
+              <a:latin typeface="Biome Light" panose="020B0303030204020804" pitchFamily="34" charset="0"/>
+              <a:cs typeface="Biome Light" panose="020B0303030204020804" pitchFamily="34" charset="0"/>
+            </a:endParaRPr>
+          </a:p>
+          <a:p>
+            <a:pPr marL="342900" indent="-342900" algn="l">
+              <a:buFont typeface="Courier New" panose="02070309020205020404" pitchFamily="49" charset="0"/>
+              <a:buChar char="o"/>
+            </a:pPr>
+            <a:r>
+              <a:rPr lang="en-US" sz="2000" b="0" dirty="0">
+                <a:solidFill>
+                  <a:schemeClr val="accent2">
+                    <a:lumMod val="40000"/>
+                    <a:lumOff val="60000"/>
+                  </a:schemeClr>
+                </a:solidFill>
+                <a:effectLst/>
+                <a:latin typeface="Biome Light" panose="020B0303030204020804" pitchFamily="34" charset="0"/>
+                <a:cs typeface="Biome Light" panose="020B0303030204020804" pitchFamily="34" charset="0"/>
+              </a:rPr>
+              <a:t>Inclination (Degrees)</a:t>
+            </a:r>
+          </a:p>
+          <a:p>
+            <a:pPr marL="342900" indent="-342900">
+              <a:buFont typeface="Courier New" panose="02070309020205020404" pitchFamily="49" charset="0"/>
+              <a:buChar char="o"/>
+            </a:pPr>
+            <a:r>
+              <a:rPr lang="en-US" sz="2000" dirty="0">
+                <a:solidFill>
+                  <a:schemeClr val="accent1">
+                    <a:lumMod val="40000"/>
+                    <a:lumOff val="60000"/>
                   </a:schemeClr>
                 </a:solidFill>
                 <a:latin typeface="Biome Light" panose="020B0303030204020804" pitchFamily="34" charset="0"/>
                 <a:cs typeface="Biome Light" panose="020B0303030204020804" pitchFamily="34" charset="0"/>
               </a:rPr>
-              <a:t>Original dataset: </a:t>
-            </a:r>
-            <a:r>
-              <a:rPr lang="en-US" dirty="0">
-                <a:solidFill>
-                  <a:schemeClr val="accent2">
-                    <a:lumMod val="60000"/>
-                    <a:lumOff val="40000"/>
-                  </a:schemeClr>
-                </a:solidFill>
-                <a:latin typeface="Biome Light" panose="020B0303030204020804" pitchFamily="34" charset="0"/>
-                <a:cs typeface="Biome Light" panose="020B0303030204020804" pitchFamily="34" charset="0"/>
-                <a:hlinkClick r:id="rId4">
-                  <a:extLst>
-                    <a:ext uri="{A12FA001-AC4F-418D-AE19-62706E023703}">
-                      <ahyp:hlinkClr xmlns:ahyp="http://schemas.microsoft.com/office/drawing/2018/hyperlinkcolor" val="tx"/>
-                    </a:ext>
-                  </a:extLst>
-                </a:hlinkClick>
-              </a:rPr>
-              <a:t>https://www.kaggle.com/datasets/ucsusa/active-satellites</a:t>
-            </a:r>
-            <a:endParaRPr lang="en-US" dirty="0">
+              <a:t>Expected Lifetime (Years)</a:t>
+            </a:r>
+          </a:p>
+          <a:p>
+            <a:pPr marL="342900" indent="-342900" algn="l">
+              <a:buFont typeface="Courier New" panose="02070309020205020404" pitchFamily="49" charset="0"/>
+              <a:buChar char="o"/>
+            </a:pPr>
+            <a:endParaRPr lang="en-US" sz="2000" b="0" dirty="0">
               <a:solidFill>
                 <a:schemeClr val="accent2">
-                  <a:lumMod val="60000"/>
-                  <a:lumOff val="40000"/>
+                  <a:lumMod val="40000"/>
+                  <a:lumOff val="60000"/>
                 </a:schemeClr>
               </a:solidFill>
+              <a:effectLst/>
               <a:latin typeface="Biome Light" panose="020B0303030204020804" pitchFamily="34" charset="0"/>
               <a:cs typeface="Biome Light" panose="020B0303030204020804" pitchFamily="34" charset="0"/>
             </a:endParaRPr>
           </a:p>
           <a:p>
+            <a:pPr marL="342900" indent="-342900" algn="l">
+              <a:buFont typeface="Courier New" panose="02070309020205020404" pitchFamily="49" charset="0"/>
+              <a:buChar char="o"/>
+            </a:pPr>
+            <a:endParaRPr lang="en-US" sz="2000" b="0" dirty="0">
+              <a:solidFill>
+                <a:schemeClr val="accent2">
+                  <a:lumMod val="40000"/>
+                  <a:lumOff val="60000"/>
+                </a:schemeClr>
+              </a:solidFill>
+              <a:effectLst/>
+              <a:latin typeface="Biome Light" panose="020B0303030204020804" pitchFamily="34" charset="0"/>
+              <a:cs typeface="Biome Light" panose="020B0303030204020804" pitchFamily="34" charset="0"/>
+            </a:endParaRPr>
+          </a:p>
+          <a:p>
+            <a:pPr marL="342900" indent="-342900" algn="l">
+              <a:buFont typeface="Courier New" panose="02070309020205020404" pitchFamily="49" charset="0"/>
+              <a:buChar char="o"/>
+            </a:pPr>
+            <a:endParaRPr lang="en-US" sz="2000" b="0" dirty="0">
+              <a:solidFill>
+                <a:schemeClr val="accent2">
+                  <a:lumMod val="40000"/>
+                  <a:lumOff val="60000"/>
+                </a:schemeClr>
+              </a:solidFill>
+              <a:effectLst/>
+              <a:latin typeface="Biome Light" panose="020B0303030204020804" pitchFamily="34" charset="0"/>
+              <a:cs typeface="Biome Light" panose="020B0303030204020804" pitchFamily="34" charset="0"/>
+            </a:endParaRPr>
+          </a:p>
+          <a:p>
+            <a:endParaRPr lang="en-US" dirty="0"/>
+          </a:p>
+        </p:txBody>
+      </p:sp>
+      <p:sp>
+        <p:nvSpPr>
+          <p:cNvPr id="8" name="Text Placeholder 7">
+            <a:extLst>
+              <a:ext uri="{FF2B5EF4-FFF2-40B4-BE49-F238E27FC236}">
+                <a16:creationId xmlns:a16="http://schemas.microsoft.com/office/drawing/2014/main" id="{AC5B7E8A-7DDB-D545-5D6B-2A359A54BBF6}"/>
+              </a:ext>
+            </a:extLst>
+          </p:cNvPr>
+          <p:cNvSpPr>
+            <a:spLocks noGrp="1"/>
+          </p:cNvSpPr>
+          <p:nvPr>
+            <p:ph type="body" sz="quarter" idx="16"/>
+          </p:nvPr>
+        </p:nvSpPr>
+        <p:spPr>
+          <a:xfrm>
+            <a:off x="4782658" y="2483056"/>
+            <a:ext cx="3282250" cy="704088"/>
+          </a:xfrm>
+          <a:ln>
+            <a:solidFill>
+              <a:schemeClr val="accent4">
+                <a:lumMod val="90000"/>
+              </a:schemeClr>
+            </a:solidFill>
+          </a:ln>
+        </p:spPr>
+        <p:txBody>
+          <a:bodyPr/>
+          <a:lstStyle/>
+          <a:p>
             <a:r>
               <a:rPr lang="en-US" dirty="0">
                 <a:solidFill>
-                  <a:schemeClr val="accent2">
-                    <a:lumMod val="60000"/>
-                    <a:lumOff val="40000"/>
+                  <a:schemeClr val="accent4">
+                    <a:lumMod val="25000"/>
                   </a:schemeClr>
                 </a:solidFill>
+                <a:latin typeface="Biome" panose="020B0503030204020804" pitchFamily="34" charset="0"/>
+                <a:cs typeface="Biome" panose="020B0503030204020804" pitchFamily="34" charset="0"/>
+              </a:rPr>
+              <a:t>Model</a:t>
+            </a:r>
+          </a:p>
+        </p:txBody>
+      </p:sp>
+      <p:sp>
+        <p:nvSpPr>
+          <p:cNvPr id="9" name="Text Placeholder 8">
+            <a:extLst>
+              <a:ext uri="{FF2B5EF4-FFF2-40B4-BE49-F238E27FC236}">
+                <a16:creationId xmlns:a16="http://schemas.microsoft.com/office/drawing/2014/main" id="{043243A8-4920-3879-5B21-761387CC570D}"/>
+              </a:ext>
+            </a:extLst>
+          </p:cNvPr>
+          <p:cNvSpPr>
+            <a:spLocks noGrp="1"/>
+          </p:cNvSpPr>
+          <p:nvPr>
+            <p:ph type="body" sz="quarter" idx="17"/>
+          </p:nvPr>
+        </p:nvSpPr>
+        <p:spPr>
+          <a:xfrm>
+            <a:off x="4782658" y="3236977"/>
+            <a:ext cx="3282250" cy="1895462"/>
+          </a:xfrm>
+        </p:spPr>
+        <p:txBody>
+          <a:bodyPr/>
+          <a:lstStyle/>
+          <a:p>
+            <a:pPr marL="285750" indent="-285750">
+              <a:buFont typeface="Courier New" panose="02070309020205020404" pitchFamily="49" charset="0"/>
+              <a:buChar char="o"/>
+            </a:pPr>
+            <a:r>
+              <a:rPr lang="en-US" sz="2000" dirty="0">
                 <a:latin typeface="Biome Light" panose="020B0303030204020804" pitchFamily="34" charset="0"/>
                 <a:cs typeface="Biome Light" panose="020B0303030204020804" pitchFamily="34" charset="0"/>
               </a:rPr>
-              <a:t>GitHub Repository: https://github.com/joshlynj/active_satellites</a:t>
-            </a:r>
-            <a:endParaRPr lang="en-US" dirty="0">
-              <a:solidFill>
-                <a:schemeClr val="accent2">
-                  <a:lumMod val="60000"/>
-                  <a:lumOff val="40000"/>
-                </a:schemeClr>
-              </a:solidFill>
-            </a:endParaRPr>
+              <a:t>Ordinary Least Squares</a:t>
+            </a:r>
+          </a:p>
+        </p:txBody>
+      </p:sp>
+      <p:sp>
+        <p:nvSpPr>
+          <p:cNvPr id="12" name="Text Placeholder 11">
+            <a:extLst>
+              <a:ext uri="{FF2B5EF4-FFF2-40B4-BE49-F238E27FC236}">
+                <a16:creationId xmlns:a16="http://schemas.microsoft.com/office/drawing/2014/main" id="{2444497D-2D21-32FE-4B1A-15066CA13EA1}"/>
+              </a:ext>
+            </a:extLst>
+          </p:cNvPr>
+          <p:cNvSpPr>
+            <a:spLocks noGrp="1"/>
+          </p:cNvSpPr>
+          <p:nvPr>
+            <p:ph type="body" sz="quarter" idx="20"/>
+          </p:nvPr>
+        </p:nvSpPr>
+        <p:spPr>
+          <a:xfrm>
+            <a:off x="8175523" y="2484375"/>
+            <a:ext cx="3454314" cy="702769"/>
+          </a:xfrm>
+          <a:solidFill>
+            <a:schemeClr val="accent2">
+              <a:lumMod val="40000"/>
+              <a:lumOff val="60000"/>
+            </a:schemeClr>
+          </a:solidFill>
+          <a:ln>
+            <a:solidFill>
+              <a:schemeClr val="tx2">
+                <a:lumMod val="40000"/>
+                <a:lumOff val="60000"/>
+              </a:schemeClr>
+            </a:solidFill>
+          </a:ln>
+        </p:spPr>
+        <p:txBody>
+          <a:bodyPr/>
+          <a:lstStyle/>
+          <a:p>
+            <a:r>
+              <a:rPr lang="en-US" dirty="0">
+                <a:solidFill>
+                  <a:schemeClr val="accent4">
+                    <a:lumMod val="25000"/>
+                  </a:schemeClr>
+                </a:solidFill>
+                <a:latin typeface="Biome" panose="020B0503030204020804" pitchFamily="34" charset="0"/>
+                <a:cs typeface="Biome" panose="020B0503030204020804" pitchFamily="34" charset="0"/>
+              </a:rPr>
+              <a:t>Results</a:t>
+            </a:r>
           </a:p>
         </p:txBody>
       </p:sp>
     </p:spTree>
     <p:extLst>
       <p:ext uri="{BB962C8B-B14F-4D97-AF65-F5344CB8AC3E}">
-        <p14:creationId xmlns:p14="http://schemas.microsoft.com/office/powerpoint/2010/main" val="1877701230"/>
+        <p14:creationId xmlns:p14="http://schemas.microsoft.com/office/powerpoint/2010/main" val="4217237232"/>
       </p:ext>
     </p:extLst>
   </p:cSld>
@@ -19379,25 +20004,6 @@
                 <a:latin typeface="Biome Light" panose="020B0303030204020804" pitchFamily="34" charset="0"/>
                 <a:cs typeface="Biome Light" panose="020B0303030204020804" pitchFamily="34" charset="0"/>
               </a:rPr>
-              <a:t>Mission Planning</a:t>
-            </a:r>
-          </a:p>
-          <a:p>
-            <a:pPr marL="342900" indent="-342900" algn="l">
-              <a:buFont typeface="Courier New" panose="02070309020205020404" pitchFamily="49" charset="0"/>
-              <a:buChar char="o"/>
-            </a:pPr>
-            <a:r>
-              <a:rPr lang="en-US" dirty="0">
-                <a:solidFill>
-                  <a:schemeClr val="accent2">
-                    <a:lumMod val="20000"/>
-                    <a:lumOff val="80000"/>
-                  </a:schemeClr>
-                </a:solidFill>
-                <a:latin typeface="Biome Light" panose="020B0303030204020804" pitchFamily="34" charset="0"/>
-                <a:cs typeface="Biome Light" panose="020B0303030204020804" pitchFamily="34" charset="0"/>
-              </a:rPr>
               <a:t>Operational Continuity</a:t>
             </a:r>
           </a:p>
@@ -19514,35 +20120,6 @@
       </p:sp>
       <p:sp>
         <p:nvSpPr>
-          <p:cNvPr id="8" name="Slide Number Placeholder 7">
-            <a:extLst>
-              <a:ext uri="{FF2B5EF4-FFF2-40B4-BE49-F238E27FC236}">
-                <a16:creationId xmlns:a16="http://schemas.microsoft.com/office/drawing/2014/main" id="{85577A64-4E94-69E1-3180-1E014BD06B3C}"/>
-              </a:ext>
-            </a:extLst>
-          </p:cNvPr>
-          <p:cNvSpPr>
-            <a:spLocks noGrp="1"/>
-          </p:cNvSpPr>
-          <p:nvPr>
-            <p:ph type="sldNum" sz="quarter" idx="12"/>
-          </p:nvPr>
-        </p:nvSpPr>
-        <p:spPr/>
-        <p:txBody>
-          <a:bodyPr/>
-          <a:lstStyle/>
-          <a:p>
-            <a:fld id="{294A09A9-5501-47C1-A89A-A340965A2BE2}" type="slidenum">
-              <a:rPr lang="en-US" smtClean="0"/>
-              <a:t>4</a:t>
-            </a:fld>
-            <a:endParaRPr lang="en-US" dirty="0"/>
-          </a:p>
-        </p:txBody>
-      </p:sp>
-      <p:sp>
-        <p:nvSpPr>
           <p:cNvPr id="4" name="Content Placeholder 3">
             <a:extLst>
               <a:ext uri="{FF2B5EF4-FFF2-40B4-BE49-F238E27FC236}">
@@ -19788,7 +20365,7 @@
                 <a:latin typeface="Biome Light" panose="020B0303030204020804" pitchFamily="34" charset="0"/>
                 <a:cs typeface="Biome Light" panose="020B0303030204020804" pitchFamily="34" charset="0"/>
               </a:rPr>
-              <a:t>Created Dummy Variables for Class of Orbit</a:t>
+              <a:t>Transformed Categorical Columns</a:t>
             </a:r>
           </a:p>
           <a:p>
@@ -19810,7 +20387,7 @@
                 <a:latin typeface="Biome Light" panose="020B0303030204020804" pitchFamily="34" charset="0"/>
                 <a:cs typeface="Biome Light" panose="020B0303030204020804" pitchFamily="34" charset="0"/>
               </a:rPr>
-              <a:t>Deleted Null values </a:t>
+              <a:t>Deleted null values </a:t>
             </a:r>
           </a:p>
           <a:p>
@@ -20566,159 +21143,186 @@
           </a:p>
         </p:txBody>
       </p:sp>
-      <p:sp>
-        <p:nvSpPr>
-          <p:cNvPr id="3" name="Subtitle 2">
-            <a:extLst>
-              <a:ext uri="{FF2B5EF4-FFF2-40B4-BE49-F238E27FC236}">
-                <a16:creationId xmlns:a16="http://schemas.microsoft.com/office/drawing/2014/main" id="{4CE82C04-6445-9E02-B0E8-8D809278C37D}"/>
-              </a:ext>
-            </a:extLst>
-          </p:cNvPr>
-          <p:cNvSpPr>
-            <a:spLocks noGrp="1"/>
-          </p:cNvSpPr>
-          <p:nvPr>
-            <p:ph type="subTitle" idx="1"/>
-          </p:nvPr>
-        </p:nvSpPr>
+      <p:pic>
+        <p:nvPicPr>
+          <p:cNvPr id="20" name="Picture 19">
+            <a:extLst>
+              <a:ext uri="{FF2B5EF4-FFF2-40B4-BE49-F238E27FC236}">
+                <a16:creationId xmlns:a16="http://schemas.microsoft.com/office/drawing/2014/main" id="{B2F72079-863F-92E7-B0BB-F13FD02BA30E}"/>
+              </a:ext>
+            </a:extLst>
+          </p:cNvPr>
+          <p:cNvPicPr>
+            <a:picLocks noChangeAspect="1"/>
+          </p:cNvPicPr>
+          <p:nvPr/>
+        </p:nvPicPr>
+        <p:blipFill>
+          <a:blip r:embed="rId3"/>
+          <a:stretch>
+            <a:fillRect/>
+          </a:stretch>
+        </p:blipFill>
         <p:spPr>
           <a:xfrm>
-            <a:off x="1371600" y="2354136"/>
-            <a:ext cx="9947787" cy="3567341"/>
+            <a:off x="425852" y="3069070"/>
+            <a:ext cx="4157832" cy="1908213"/>
           </a:xfrm>
+          <a:prstGeom prst="rect">
+            <a:avLst/>
+          </a:prstGeom>
         </p:spPr>
-        <p:txBody>
-          <a:bodyPr/>
-          <a:lstStyle/>
-          <a:p>
-            <a:pPr marL="342900" indent="-342900" algn="l">
-              <a:buFont typeface="Courier New" panose="02070309020205020404" pitchFamily="49" charset="0"/>
-              <a:buChar char="o"/>
-            </a:pPr>
-            <a:r>
-              <a:rPr lang="en-US" dirty="0">
-                <a:solidFill>
-                  <a:schemeClr val="accent2">
-                    <a:lumMod val="40000"/>
-                    <a:lumOff val="60000"/>
-                  </a:schemeClr>
-                </a:solidFill>
-                <a:latin typeface="Biome Light" panose="020B0303030204020804" pitchFamily="34" charset="0"/>
-                <a:cs typeface="Biome Light" panose="020B0303030204020804" pitchFamily="34" charset="0"/>
-              </a:rPr>
-              <a:t>P</a:t>
-            </a:r>
-            <a:r>
-              <a:rPr lang="en-US" sz="2000" b="0" dirty="0">
-                <a:solidFill>
-                  <a:schemeClr val="accent2">
-                    <a:lumMod val="40000"/>
-                    <a:lumOff val="60000"/>
-                  </a:schemeClr>
-                </a:solidFill>
-                <a:effectLst/>
-                <a:latin typeface="Biome Light" panose="020B0303030204020804" pitchFamily="34" charset="0"/>
-                <a:cs typeface="Biome Light" panose="020B0303030204020804" pitchFamily="34" charset="0"/>
-              </a:rPr>
-              <a:t>erigee (Kilometers) </a:t>
-            </a:r>
-          </a:p>
-          <a:p>
-            <a:pPr marL="342900" indent="-342900" algn="l">
-              <a:buFont typeface="Courier New" panose="02070309020205020404" pitchFamily="49" charset="0"/>
-              <a:buChar char="o"/>
-            </a:pPr>
-            <a:r>
-              <a:rPr lang="en-US" sz="2000" b="0" dirty="0">
-                <a:solidFill>
-                  <a:schemeClr val="accent2">
-                    <a:lumMod val="40000"/>
-                    <a:lumOff val="60000"/>
-                  </a:schemeClr>
-                </a:solidFill>
-                <a:effectLst/>
-                <a:latin typeface="Biome Light" panose="020B0303030204020804" pitchFamily="34" charset="0"/>
-                <a:cs typeface="Biome Light" panose="020B0303030204020804" pitchFamily="34" charset="0"/>
-              </a:rPr>
-              <a:t>Apogee (Kilometers)</a:t>
-            </a:r>
-            <a:endParaRPr lang="en-US" dirty="0">
-              <a:solidFill>
-                <a:schemeClr val="accent2">
-                  <a:lumMod val="40000"/>
-                  <a:lumOff val="60000"/>
-                </a:schemeClr>
-              </a:solidFill>
-              <a:latin typeface="Biome Light" panose="020B0303030204020804" pitchFamily="34" charset="0"/>
-              <a:cs typeface="Biome Light" panose="020B0303030204020804" pitchFamily="34" charset="0"/>
-            </a:endParaRPr>
-          </a:p>
-          <a:p>
-            <a:pPr marL="342900" indent="-342900" algn="l">
-              <a:buFont typeface="Courier New" panose="02070309020205020404" pitchFamily="49" charset="0"/>
-              <a:buChar char="o"/>
-            </a:pPr>
-            <a:r>
-              <a:rPr lang="en-US" sz="2000" b="0" dirty="0">
-                <a:solidFill>
-                  <a:schemeClr val="accent2">
-                    <a:lumMod val="40000"/>
-                    <a:lumOff val="60000"/>
-                  </a:schemeClr>
-                </a:solidFill>
-                <a:effectLst/>
-                <a:latin typeface="Biome Light" panose="020B0303030204020804" pitchFamily="34" charset="0"/>
-                <a:cs typeface="Biome Light" panose="020B0303030204020804" pitchFamily="34" charset="0"/>
-              </a:rPr>
-              <a:t>Launch Mass (Kilograms)</a:t>
-            </a:r>
-            <a:endParaRPr lang="en-US" dirty="0">
-              <a:solidFill>
-                <a:schemeClr val="accent2">
-                  <a:lumMod val="40000"/>
-                  <a:lumOff val="60000"/>
-                </a:schemeClr>
-              </a:solidFill>
-              <a:latin typeface="Biome Light" panose="020B0303030204020804" pitchFamily="34" charset="0"/>
-              <a:cs typeface="Biome Light" panose="020B0303030204020804" pitchFamily="34" charset="0"/>
-            </a:endParaRPr>
-          </a:p>
-          <a:p>
-            <a:pPr marL="342900" indent="-342900" algn="l">
-              <a:buFont typeface="Courier New" panose="02070309020205020404" pitchFamily="49" charset="0"/>
-              <a:buChar char="o"/>
-            </a:pPr>
-            <a:r>
-              <a:rPr lang="en-US" sz="2000" b="0" dirty="0">
-                <a:solidFill>
-                  <a:schemeClr val="accent2">
-                    <a:lumMod val="40000"/>
-                    <a:lumOff val="60000"/>
-                  </a:schemeClr>
-                </a:solidFill>
-                <a:effectLst/>
-                <a:latin typeface="Biome Light" panose="020B0303030204020804" pitchFamily="34" charset="0"/>
-                <a:cs typeface="Biome Light" panose="020B0303030204020804" pitchFamily="34" charset="0"/>
-              </a:rPr>
-              <a:t>Inclination (Degrees)</a:t>
-            </a:r>
-          </a:p>
-          <a:p>
-            <a:pPr marL="342900" indent="-342900" algn="l">
-              <a:buFont typeface="Courier New" panose="02070309020205020404" pitchFamily="49" charset="0"/>
-              <a:buChar char="o"/>
-            </a:pPr>
-            <a:endParaRPr lang="en-US" sz="2400" dirty="0">
-              <a:solidFill>
-                <a:schemeClr val="accent4"/>
-              </a:solidFill>
-              <a:latin typeface="Biome" panose="020B0503030204020804" pitchFamily="34" charset="0"/>
-              <a:cs typeface="Biome" panose="020B0503030204020804" pitchFamily="34" charset="0"/>
-            </a:endParaRPr>
-          </a:p>
-        </p:txBody>
-      </p:sp>
+      </p:pic>
+      <p:pic>
+        <p:nvPicPr>
+          <p:cNvPr id="26" name="Picture 25">
+            <a:extLst>
+              <a:ext uri="{FF2B5EF4-FFF2-40B4-BE49-F238E27FC236}">
+                <a16:creationId xmlns:a16="http://schemas.microsoft.com/office/drawing/2014/main" id="{09085A2E-FBE6-5413-B569-CD07627A33B9}"/>
+              </a:ext>
+            </a:extLst>
+          </p:cNvPr>
+          <p:cNvPicPr>
+            <a:picLocks noChangeAspect="1"/>
+          </p:cNvPicPr>
+          <p:nvPr/>
+        </p:nvPicPr>
+        <p:blipFill>
+          <a:blip r:embed="rId4"/>
+          <a:stretch>
+            <a:fillRect/>
+          </a:stretch>
+        </p:blipFill>
+        <p:spPr>
+          <a:xfrm>
+            <a:off x="4641665" y="3069071"/>
+            <a:ext cx="3292125" cy="1908213"/>
+          </a:xfrm>
+          <a:prstGeom prst="rect">
+            <a:avLst/>
+          </a:prstGeom>
+        </p:spPr>
+      </p:pic>
+      <p:pic>
+        <p:nvPicPr>
+          <p:cNvPr id="30" name="Picture 29">
+            <a:extLst>
+              <a:ext uri="{FF2B5EF4-FFF2-40B4-BE49-F238E27FC236}">
+                <a16:creationId xmlns:a16="http://schemas.microsoft.com/office/drawing/2014/main" id="{49E2B224-0BA0-D0A5-2979-6DABF8DBB57A}"/>
+              </a:ext>
+            </a:extLst>
+          </p:cNvPr>
+          <p:cNvPicPr>
+            <a:picLocks noChangeAspect="1"/>
+          </p:cNvPicPr>
+          <p:nvPr/>
+        </p:nvPicPr>
+        <p:blipFill>
+          <a:blip r:embed="rId5"/>
+          <a:stretch>
+            <a:fillRect/>
+          </a:stretch>
+        </p:blipFill>
+        <p:spPr>
+          <a:xfrm>
+            <a:off x="7983560" y="3069069"/>
+            <a:ext cx="3468925" cy="1908213"/>
+          </a:xfrm>
+          <a:prstGeom prst="rect">
+            <a:avLst/>
+          </a:prstGeom>
+        </p:spPr>
+      </p:pic>
+      <p:pic>
+        <p:nvPicPr>
+          <p:cNvPr id="32" name="Picture 31">
+            <a:extLst>
+              <a:ext uri="{FF2B5EF4-FFF2-40B4-BE49-F238E27FC236}">
+                <a16:creationId xmlns:a16="http://schemas.microsoft.com/office/drawing/2014/main" id="{D466A03B-8D78-E209-E204-9784A52CDCF8}"/>
+              </a:ext>
+            </a:extLst>
+          </p:cNvPr>
+          <p:cNvPicPr>
+            <a:picLocks noChangeAspect="1"/>
+          </p:cNvPicPr>
+          <p:nvPr/>
+        </p:nvPicPr>
+        <p:blipFill>
+          <a:blip r:embed="rId6"/>
+          <a:stretch>
+            <a:fillRect/>
+          </a:stretch>
+        </p:blipFill>
+        <p:spPr>
+          <a:xfrm>
+            <a:off x="425852" y="2288917"/>
+            <a:ext cx="4157832" cy="725487"/>
+          </a:xfrm>
+          <a:prstGeom prst="rect">
+            <a:avLst/>
+          </a:prstGeom>
+        </p:spPr>
+      </p:pic>
+      <p:pic>
+        <p:nvPicPr>
+          <p:cNvPr id="34" name="Picture 33">
+            <a:extLst>
+              <a:ext uri="{FF2B5EF4-FFF2-40B4-BE49-F238E27FC236}">
+                <a16:creationId xmlns:a16="http://schemas.microsoft.com/office/drawing/2014/main" id="{83B04FD0-AD21-5E4C-6E37-D3F642AFC458}"/>
+              </a:ext>
+            </a:extLst>
+          </p:cNvPr>
+          <p:cNvPicPr>
+            <a:picLocks noChangeAspect="1"/>
+          </p:cNvPicPr>
+          <p:nvPr/>
+        </p:nvPicPr>
+        <p:blipFill>
+          <a:blip r:embed="rId7"/>
+          <a:stretch>
+            <a:fillRect/>
+          </a:stretch>
+        </p:blipFill>
+        <p:spPr>
+          <a:xfrm>
+            <a:off x="4641664" y="2282821"/>
+            <a:ext cx="3292125" cy="731583"/>
+          </a:xfrm>
+          <a:prstGeom prst="rect">
+            <a:avLst/>
+          </a:prstGeom>
+        </p:spPr>
+      </p:pic>
+      <p:pic>
+        <p:nvPicPr>
+          <p:cNvPr id="36" name="Picture 35">
+            <a:extLst>
+              <a:ext uri="{FF2B5EF4-FFF2-40B4-BE49-F238E27FC236}">
+                <a16:creationId xmlns:a16="http://schemas.microsoft.com/office/drawing/2014/main" id="{FC551A93-E01F-E095-093D-116C3CA99797}"/>
+              </a:ext>
+            </a:extLst>
+          </p:cNvPr>
+          <p:cNvPicPr>
+            <a:picLocks noChangeAspect="1"/>
+          </p:cNvPicPr>
+          <p:nvPr/>
+        </p:nvPicPr>
+        <p:blipFill>
+          <a:blip r:embed="rId8"/>
+          <a:stretch>
+            <a:fillRect/>
+          </a:stretch>
+        </p:blipFill>
+        <p:spPr>
+          <a:xfrm>
+            <a:off x="7991769" y="2282821"/>
+            <a:ext cx="3468925" cy="725487"/>
+          </a:xfrm>
+          <a:prstGeom prst="rect">
+            <a:avLst/>
+          </a:prstGeom>
+        </p:spPr>
+      </p:pic>
     </p:spTree>
     <p:extLst>
       <p:ext uri="{BB962C8B-B14F-4D97-AF65-F5344CB8AC3E}">
@@ -21229,12 +21833,23 @@
 </file>
 
 <file path=customXml/item1.xml><?xml version="1.0" encoding="utf-8"?>
-<?mso-contentType ?>
-<FormTemplates xmlns="http://schemas.microsoft.com/sharepoint/v3/contenttype/forms">
-  <Display>DocumentLibraryForm</Display>
-  <Edit>DocumentLibraryForm</Edit>
-  <New>DocumentLibraryForm</New>
-</FormTemplates>
+<p:properties xmlns:p="http://schemas.microsoft.com/office/2006/metadata/properties" xmlns:xsi="http://www.w3.org/2001/XMLSchema-instance" xmlns:pc="http://schemas.microsoft.com/office/infopath/2007/PartnerControls">
+  <documentManagement>
+    <_ip_UnifiedCompliancePolicyUIAction xmlns="http://schemas.microsoft.com/sharepoint/v3" xsi:nil="true"/>
+    <Image xmlns="71af3243-3dd4-4a8d-8c0d-dd76da1f02a5">
+      <Url xsi:nil="true"/>
+      <Description xsi:nil="true"/>
+    </Image>
+    <Status xmlns="71af3243-3dd4-4a8d-8c0d-dd76da1f02a5">Not started</Status>
+    <Background xmlns="71af3243-3dd4-4a8d-8c0d-dd76da1f02a5">false</Background>
+    <_ip_UnifiedCompliancePolicyProperties xmlns="http://schemas.microsoft.com/sharepoint/v3" xsi:nil="true"/>
+    <ImageTagsTaxHTField xmlns="71af3243-3dd4-4a8d-8c0d-dd76da1f02a5">
+      <Terms xmlns="http://schemas.microsoft.com/office/infopath/2007/PartnerControls"/>
+    </ImageTagsTaxHTField>
+    <TaxCatchAll xmlns="230e9df3-be65-4c73-a93b-d1236ebd677e" xsi:nil="true"/>
+    <MediaServiceKeyPoints xmlns="71af3243-3dd4-4a8d-8c0d-dd76da1f02a5" xsi:nil="true"/>
+  </documentManagement>
+</p:properties>
 </file>
 
 <file path=customXml/item2.xml><?xml version="1.0" encoding="utf-8"?>
@@ -21532,29 +22147,22 @@
 </file>
 
 <file path=customXml/item3.xml><?xml version="1.0" encoding="utf-8"?>
-<p:properties xmlns:p="http://schemas.microsoft.com/office/2006/metadata/properties" xmlns:xsi="http://www.w3.org/2001/XMLSchema-instance" xmlns:pc="http://schemas.microsoft.com/office/infopath/2007/PartnerControls">
-  <documentManagement>
-    <_ip_UnifiedCompliancePolicyUIAction xmlns="http://schemas.microsoft.com/sharepoint/v3" xsi:nil="true"/>
-    <Image xmlns="71af3243-3dd4-4a8d-8c0d-dd76da1f02a5">
-      <Url xsi:nil="true"/>
-      <Description xsi:nil="true"/>
-    </Image>
-    <Status xmlns="71af3243-3dd4-4a8d-8c0d-dd76da1f02a5">Not started</Status>
-    <Background xmlns="71af3243-3dd4-4a8d-8c0d-dd76da1f02a5">false</Background>
-    <_ip_UnifiedCompliancePolicyProperties xmlns="http://schemas.microsoft.com/sharepoint/v3" xsi:nil="true"/>
-    <ImageTagsTaxHTField xmlns="71af3243-3dd4-4a8d-8c0d-dd76da1f02a5">
-      <Terms xmlns="http://schemas.microsoft.com/office/infopath/2007/PartnerControls"/>
-    </ImageTagsTaxHTField>
-    <TaxCatchAll xmlns="230e9df3-be65-4c73-a93b-d1236ebd677e" xsi:nil="true"/>
-    <MediaServiceKeyPoints xmlns="71af3243-3dd4-4a8d-8c0d-dd76da1f02a5" xsi:nil="true"/>
-  </documentManagement>
-</p:properties>
+<?mso-contentType ?>
+<FormTemplates xmlns="http://schemas.microsoft.com/sharepoint/v3/contenttype/forms">
+  <Display>DocumentLibraryForm</Display>
+  <Edit>DocumentLibraryForm</Edit>
+  <New>DocumentLibraryForm</New>
+</FormTemplates>
 </file>
 
 <file path=customXml/itemProps1.xml><?xml version="1.0" encoding="utf-8"?>
-<ds:datastoreItem xmlns:ds="http://schemas.openxmlformats.org/officeDocument/2006/customXml" ds:itemID="{4F1F1912-3146-44AF-A389-9E8B77BB3688}">
+<ds:datastoreItem xmlns:ds="http://schemas.openxmlformats.org/officeDocument/2006/customXml" ds:itemID="{F8B8ECF1-2A9D-464C-AFE8-2B3295D0BF97}">
   <ds:schemaRefs>
-    <ds:schemaRef ds:uri="http://schemas.microsoft.com/sharepoint/v3/contenttype/forms"/>
+    <ds:schemaRef ds:uri="http://schemas.microsoft.com/office/2006/metadata/properties"/>
+    <ds:schemaRef ds:uri="http://schemas.microsoft.com/office/infopath/2007/PartnerControls"/>
+    <ds:schemaRef ds:uri="http://schemas.microsoft.com/sharepoint/v3"/>
+    <ds:schemaRef ds:uri="71af3243-3dd4-4a8d-8c0d-dd76da1f02a5"/>
+    <ds:schemaRef ds:uri="230e9df3-be65-4c73-a93b-d1236ebd677e"/>
   </ds:schemaRefs>
 </ds:datastoreItem>
 </file>
@@ -21581,13 +22189,9 @@
 </file>
 
 <file path=customXml/itemProps3.xml><?xml version="1.0" encoding="utf-8"?>
-<ds:datastoreItem xmlns:ds="http://schemas.openxmlformats.org/officeDocument/2006/customXml" ds:itemID="{F8B8ECF1-2A9D-464C-AFE8-2B3295D0BF97}">
+<ds:datastoreItem xmlns:ds="http://schemas.openxmlformats.org/officeDocument/2006/customXml" ds:itemID="{4F1F1912-3146-44AF-A389-9E8B77BB3688}">
   <ds:schemaRefs>
-    <ds:schemaRef ds:uri="http://schemas.microsoft.com/office/2006/metadata/properties"/>
-    <ds:schemaRef ds:uri="http://schemas.microsoft.com/office/infopath/2007/PartnerControls"/>
-    <ds:schemaRef ds:uri="http://schemas.microsoft.com/sharepoint/v3"/>
-    <ds:schemaRef ds:uri="71af3243-3dd4-4a8d-8c0d-dd76da1f02a5"/>
-    <ds:schemaRef ds:uri="230e9df3-be65-4c73-a93b-d1236ebd677e"/>
+    <ds:schemaRef ds:uri="http://schemas.microsoft.com/sharepoint/v3/contenttype/forms"/>
   </ds:schemaRefs>
 </ds:datastoreItem>
 </file>

</xml_diff>

<commit_message>
updated some information on the ppt
</commit_message>
<xml_diff>
--- a/ppt/SATELLITE LIFE EXPECTANCY.pptx
+++ b/ppt/SATELLITE LIFE EXPECTANCY.pptx
@@ -221,7 +221,7 @@
           <a:p>
             <a:fld id="{3F00BCFC-AFFD-334C-A183-6116BAFDF92B}" type="datetimeFigureOut">
               <a:rPr lang="en-US" smtClean="0"/>
-              <a:t>8/8/2023</a:t>
+              <a:t>8/9/2023</a:t>
             </a:fld>
             <a:endParaRPr lang="en-US" dirty="0"/>
           </a:p>
@@ -663,7 +663,7 @@
                 <a:effectLst/>
                 <a:latin typeface="Söhne"/>
               </a:rPr>
-              <a:t>The purple dots scattered across the graph represent the predicted values, showing how well the model's predictions align with the actual data.</a:t>
+              <a:t>The purple dots scattered across the graph represent the predicted values.</a:t>
             </a:r>
           </a:p>
           <a:p>
@@ -677,6 +677,37 @@
               </a:rPr>
               <a:t>The dashed blue line represents the ideal scenario where the predicted values perfectly match the actual values. </a:t>
             </a:r>
+          </a:p>
+          <a:p>
+            <a:pPr marL="0" marR="0" lvl="0" indent="0" algn="l" defTabSz="914400" rtl="0" eaLnBrk="1" fontAlgn="auto" latinLnBrk="0" hangingPunct="1">
+              <a:lnSpc>
+                <a:spcPct val="100000"/>
+              </a:lnSpc>
+              <a:spcBef>
+                <a:spcPts val="0"/>
+              </a:spcBef>
+              <a:spcAft>
+                <a:spcPts val="0"/>
+              </a:spcAft>
+              <a:buClrTx/>
+              <a:buSzTx/>
+              <a:buFontTx/>
+              <a:buNone/>
+              <a:tabLst/>
+              <a:defRPr/>
+            </a:pPr>
+            <a:r>
+              <a:rPr lang="en-US" b="0" i="0" dirty="0">
+                <a:solidFill>
+                  <a:srgbClr val="BDB7AF"/>
+                </a:solidFill>
+                <a:effectLst/>
+                <a:latin typeface="Söhne"/>
+              </a:rPr>
+              <a:t>This shows how well the model's predictions align with the actual data.</a:t>
+            </a:r>
+          </a:p>
+          <a:p>
             <a:endParaRPr lang="en-US" dirty="0"/>
           </a:p>
         </p:txBody>
@@ -1702,6 +1733,19 @@
         <p:txBody>
           <a:bodyPr/>
           <a:lstStyle/>
+          <a:p>
+            <a:r>
+              <a:rPr lang="en-US" b="0" i="0" dirty="0">
+                <a:solidFill>
+                  <a:srgbClr val="BDB7AF"/>
+                </a:solidFill>
+                <a:effectLst/>
+                <a:latin typeface="Söhne"/>
+              </a:rPr>
+              <a:t>An ANOVA test shows if there are statistically significant differences in means among three or more groups.</a:t>
+            </a:r>
+            <a:endParaRPr lang="en-US" dirty="0"/>
+          </a:p>
           <a:p>
             <a:r>
               <a:rPr lang="en-US" dirty="0"/>
@@ -21833,23 +21877,12 @@
 </file>
 
 <file path=customXml/item1.xml><?xml version="1.0" encoding="utf-8"?>
-<p:properties xmlns:p="http://schemas.microsoft.com/office/2006/metadata/properties" xmlns:xsi="http://www.w3.org/2001/XMLSchema-instance" xmlns:pc="http://schemas.microsoft.com/office/infopath/2007/PartnerControls">
-  <documentManagement>
-    <_ip_UnifiedCompliancePolicyUIAction xmlns="http://schemas.microsoft.com/sharepoint/v3" xsi:nil="true"/>
-    <Image xmlns="71af3243-3dd4-4a8d-8c0d-dd76da1f02a5">
-      <Url xsi:nil="true"/>
-      <Description xsi:nil="true"/>
-    </Image>
-    <Status xmlns="71af3243-3dd4-4a8d-8c0d-dd76da1f02a5">Not started</Status>
-    <Background xmlns="71af3243-3dd4-4a8d-8c0d-dd76da1f02a5">false</Background>
-    <_ip_UnifiedCompliancePolicyProperties xmlns="http://schemas.microsoft.com/sharepoint/v3" xsi:nil="true"/>
-    <ImageTagsTaxHTField xmlns="71af3243-3dd4-4a8d-8c0d-dd76da1f02a5">
-      <Terms xmlns="http://schemas.microsoft.com/office/infopath/2007/PartnerControls"/>
-    </ImageTagsTaxHTField>
-    <TaxCatchAll xmlns="230e9df3-be65-4c73-a93b-d1236ebd677e" xsi:nil="true"/>
-    <MediaServiceKeyPoints xmlns="71af3243-3dd4-4a8d-8c0d-dd76da1f02a5" xsi:nil="true"/>
-  </documentManagement>
-</p:properties>
+<?mso-contentType ?>
+<FormTemplates xmlns="http://schemas.microsoft.com/sharepoint/v3/contenttype/forms">
+  <Display>DocumentLibraryForm</Display>
+  <Edit>DocumentLibraryForm</Edit>
+  <New>DocumentLibraryForm</New>
+</FormTemplates>
 </file>
 
 <file path=customXml/item2.xml><?xml version="1.0" encoding="utf-8"?>
@@ -22147,22 +22180,29 @@
 </file>
 
 <file path=customXml/item3.xml><?xml version="1.0" encoding="utf-8"?>
-<?mso-contentType ?>
-<FormTemplates xmlns="http://schemas.microsoft.com/sharepoint/v3/contenttype/forms">
-  <Display>DocumentLibraryForm</Display>
-  <Edit>DocumentLibraryForm</Edit>
-  <New>DocumentLibraryForm</New>
-</FormTemplates>
+<p:properties xmlns:p="http://schemas.microsoft.com/office/2006/metadata/properties" xmlns:xsi="http://www.w3.org/2001/XMLSchema-instance" xmlns:pc="http://schemas.microsoft.com/office/infopath/2007/PartnerControls">
+  <documentManagement>
+    <_ip_UnifiedCompliancePolicyUIAction xmlns="http://schemas.microsoft.com/sharepoint/v3" xsi:nil="true"/>
+    <Image xmlns="71af3243-3dd4-4a8d-8c0d-dd76da1f02a5">
+      <Url xsi:nil="true"/>
+      <Description xsi:nil="true"/>
+    </Image>
+    <Status xmlns="71af3243-3dd4-4a8d-8c0d-dd76da1f02a5">Not started</Status>
+    <Background xmlns="71af3243-3dd4-4a8d-8c0d-dd76da1f02a5">false</Background>
+    <_ip_UnifiedCompliancePolicyProperties xmlns="http://schemas.microsoft.com/sharepoint/v3" xsi:nil="true"/>
+    <ImageTagsTaxHTField xmlns="71af3243-3dd4-4a8d-8c0d-dd76da1f02a5">
+      <Terms xmlns="http://schemas.microsoft.com/office/infopath/2007/PartnerControls"/>
+    </ImageTagsTaxHTField>
+    <TaxCatchAll xmlns="230e9df3-be65-4c73-a93b-d1236ebd677e" xsi:nil="true"/>
+    <MediaServiceKeyPoints xmlns="71af3243-3dd4-4a8d-8c0d-dd76da1f02a5" xsi:nil="true"/>
+  </documentManagement>
+</p:properties>
 </file>
 
 <file path=customXml/itemProps1.xml><?xml version="1.0" encoding="utf-8"?>
-<ds:datastoreItem xmlns:ds="http://schemas.openxmlformats.org/officeDocument/2006/customXml" ds:itemID="{F8B8ECF1-2A9D-464C-AFE8-2B3295D0BF97}">
+<ds:datastoreItem xmlns:ds="http://schemas.openxmlformats.org/officeDocument/2006/customXml" ds:itemID="{4F1F1912-3146-44AF-A389-9E8B77BB3688}">
   <ds:schemaRefs>
-    <ds:schemaRef ds:uri="http://schemas.microsoft.com/office/2006/metadata/properties"/>
-    <ds:schemaRef ds:uri="http://schemas.microsoft.com/office/infopath/2007/PartnerControls"/>
-    <ds:schemaRef ds:uri="http://schemas.microsoft.com/sharepoint/v3"/>
-    <ds:schemaRef ds:uri="71af3243-3dd4-4a8d-8c0d-dd76da1f02a5"/>
-    <ds:schemaRef ds:uri="230e9df3-be65-4c73-a93b-d1236ebd677e"/>
+    <ds:schemaRef ds:uri="http://schemas.microsoft.com/sharepoint/v3/contenttype/forms"/>
   </ds:schemaRefs>
 </ds:datastoreItem>
 </file>
@@ -22189,9 +22229,13 @@
 </file>
 
 <file path=customXml/itemProps3.xml><?xml version="1.0" encoding="utf-8"?>
-<ds:datastoreItem xmlns:ds="http://schemas.openxmlformats.org/officeDocument/2006/customXml" ds:itemID="{4F1F1912-3146-44AF-A389-9E8B77BB3688}">
+<ds:datastoreItem xmlns:ds="http://schemas.openxmlformats.org/officeDocument/2006/customXml" ds:itemID="{F8B8ECF1-2A9D-464C-AFE8-2B3295D0BF97}">
   <ds:schemaRefs>
-    <ds:schemaRef ds:uri="http://schemas.microsoft.com/sharepoint/v3/contenttype/forms"/>
+    <ds:schemaRef ds:uri="http://schemas.microsoft.com/office/2006/metadata/properties"/>
+    <ds:schemaRef ds:uri="http://schemas.microsoft.com/office/infopath/2007/PartnerControls"/>
+    <ds:schemaRef ds:uri="http://schemas.microsoft.com/sharepoint/v3"/>
+    <ds:schemaRef ds:uri="71af3243-3dd4-4a8d-8c0d-dd76da1f02a5"/>
+    <ds:schemaRef ds:uri="230e9df3-be65-4c73-a93b-d1236ebd677e"/>
   </ds:schemaRefs>
 </ds:datastoreItem>
 </file>

</xml_diff>

<commit_message>
made changes to the ppt
</commit_message>
<xml_diff>
--- a/ppt/SATELLITE LIFE EXPECTANCY.pptx
+++ b/ppt/SATELLITE LIFE EXPECTANCY.pptx
@@ -12,8 +12,8 @@
     <p:sldId id="531" r:id="rId6"/>
     <p:sldId id="534" r:id="rId7"/>
     <p:sldId id="538" r:id="rId8"/>
-    <p:sldId id="547" r:id="rId9"/>
-    <p:sldId id="537" r:id="rId10"/>
+    <p:sldId id="537" r:id="rId9"/>
+    <p:sldId id="553" r:id="rId10"/>
     <p:sldId id="535" r:id="rId11"/>
     <p:sldId id="533" r:id="rId12"/>
     <p:sldId id="551" r:id="rId13"/>
@@ -1540,7 +1540,7 @@
     </p:spTree>
     <p:extLst>
       <p:ext uri="{BB962C8B-B14F-4D97-AF65-F5344CB8AC3E}">
-        <p14:creationId xmlns:p14="http://schemas.microsoft.com/office/powerpoint/2010/main" val="1671355077"/>
+        <p14:creationId xmlns:p14="http://schemas.microsoft.com/office/powerpoint/2010/main" val="213021678"/>
       </p:ext>
     </p:extLst>
   </p:cSld>
@@ -1594,26 +1594,6 @@
           <a:bodyPr/>
           <a:lstStyle/>
           <a:p>
-            <a:pPr algn="l"/>
-            <a:r>
-              <a:rPr lang="en-US" dirty="0"/>
-              <a:t>My null hypothesis is that </a:t>
-            </a:r>
-            <a:r>
-              <a:rPr lang="en-US" sz="1200" dirty="0">
-                <a:solidFill>
-                  <a:schemeClr val="accent2">
-                    <a:lumMod val="60000"/>
-                    <a:lumOff val="40000"/>
-                  </a:schemeClr>
-                </a:solidFill>
-                <a:latin typeface="Biome Light" panose="020B0303030204020804" pitchFamily="34" charset="0"/>
-                <a:cs typeface="Biome Light" panose="020B0303030204020804" pitchFamily="34" charset="0"/>
-              </a:rPr>
-              <a:t>Satellites in GEO will have a similar life expectancy compared to those in other orbits</a:t>
-            </a:r>
-          </a:p>
-          <a:p>
             <a:pPr marL="0" marR="0" lvl="0" indent="0" algn="l" defTabSz="914400" rtl="0" eaLnBrk="1" fontAlgn="auto" latinLnBrk="0" hangingPunct="1">
               <a:lnSpc>
                 <a:spcPct val="100000"/>
@@ -1633,21 +1613,21 @@
             </a:pPr>
             <a:r>
               <a:rPr lang="en-US" dirty="0"/>
-              <a:t>My Alternative hypothesis is that </a:t>
-            </a:r>
-            <a:r>
-              <a:rPr lang="en-US" sz="1200" dirty="0">
-                <a:solidFill>
-                  <a:schemeClr val="accent2">
-                    <a:lumMod val="60000"/>
-                    <a:lumOff val="40000"/>
-                  </a:schemeClr>
-                </a:solidFill>
-                <a:latin typeface="Biome Light" panose="020B0303030204020804" pitchFamily="34" charset="0"/>
-                <a:cs typeface="Biome Light" panose="020B0303030204020804" pitchFamily="34" charset="0"/>
-              </a:rPr>
-              <a:t>Satellites in GEO will have a longer life expectancy compared to those in other orbits</a:t>
-            </a:r>
+              <a:t>My hypothesis is that satellites in GEO will have a longer life expectancy compared to those in other orbits. </a:t>
+            </a:r>
+            <a:endParaRPr lang="en-US" sz="1200" dirty="0">
+              <a:solidFill>
+                <a:schemeClr val="accent2">
+                  <a:lumMod val="60000"/>
+                  <a:lumOff val="40000"/>
+                </a:schemeClr>
+              </a:solidFill>
+              <a:latin typeface="Biome Light" panose="020B0303030204020804" pitchFamily="34" charset="0"/>
+              <a:cs typeface="Biome Light" panose="020B0303030204020804" pitchFamily="34" charset="0"/>
+            </a:endParaRPr>
+          </a:p>
+          <a:p>
+            <a:endParaRPr lang="en-US" dirty="0"/>
           </a:p>
           <a:p>
             <a:endParaRPr lang="en-US" dirty="0"/>
@@ -1680,7 +1660,7 @@
     </p:spTree>
     <p:extLst>
       <p:ext uri="{BB962C8B-B14F-4D97-AF65-F5344CB8AC3E}">
-        <p14:creationId xmlns:p14="http://schemas.microsoft.com/office/powerpoint/2010/main" val="213021678"/>
+        <p14:creationId xmlns:p14="http://schemas.microsoft.com/office/powerpoint/2010/main" val="1035795642"/>
       </p:ext>
     </p:extLst>
   </p:cSld>
@@ -1783,7 +1763,7 @@
                 <a:effectLst/>
                 <a:latin typeface="Söhne"/>
               </a:rPr>
-              <a:t>In this test, I set my significance level to 0.05 which means that if the p-value is greater than 0.05 then we do not have enough evidence to reject the null hypothesis.</a:t>
+              <a:t>In this test, I set my significance level to 0.05 which means that if the p-value is greater than 0.05 then we do not have enough evidence to prove my hypothesis to be correct.</a:t>
             </a:r>
           </a:p>
           <a:p>
@@ -1795,7 +1775,7 @@
                 <a:effectLst/>
                 <a:latin typeface="Söhne"/>
               </a:rPr>
-              <a:t>In this case, our P value is significantly smaller than 0.05 which means that we can reject the null hypothesis, proving that satellites in GEO have a longer life expectancy than those in other orbits. </a:t>
+              <a:t>In this case, our P value is significantly smaller than 0.05 which means that this my hypothesis is correct, proving that satellites in GEO have a longer life expectancy than those in other orbits. </a:t>
             </a:r>
           </a:p>
           <a:p>
@@ -2001,6 +1981,57 @@
               <a:rPr lang="en-US" dirty="0"/>
               <a:t>In addition to the hypotheses, I wanted to see if these features had an effect on a satellite’s expected lifetime. </a:t>
             </a:r>
+          </a:p>
+          <a:p>
+            <a:pPr algn="l"/>
+            <a:r>
+              <a:rPr lang="en-US" sz="1200" dirty="0">
+                <a:solidFill>
+                  <a:schemeClr val="accent2">
+                    <a:lumMod val="60000"/>
+                    <a:lumOff val="40000"/>
+                  </a:schemeClr>
+                </a:solidFill>
+                <a:latin typeface="Biome Light" panose="020B0303030204020804" pitchFamily="34" charset="0"/>
+                <a:cs typeface="Biome Light" panose="020B0303030204020804" pitchFamily="34" charset="0"/>
+              </a:rPr>
+              <a:t>Perigee is location when the satellite is closest to the Earth.</a:t>
+            </a:r>
+          </a:p>
+          <a:p>
+            <a:pPr algn="l"/>
+            <a:r>
+              <a:rPr lang="en-US" sz="1200" dirty="0">
+                <a:solidFill>
+                  <a:schemeClr val="accent2">
+                    <a:lumMod val="60000"/>
+                    <a:lumOff val="40000"/>
+                  </a:schemeClr>
+                </a:solidFill>
+                <a:latin typeface="Biome Light" panose="020B0303030204020804" pitchFamily="34" charset="0"/>
+                <a:cs typeface="Biome Light" panose="020B0303030204020804" pitchFamily="34" charset="0"/>
+              </a:rPr>
+              <a:t>Apogee is the location when the satellite is farthest from the Earth.</a:t>
+            </a:r>
+          </a:p>
+          <a:p>
+            <a:pPr algn="l"/>
+            <a:r>
+              <a:rPr lang="en-US" sz="1200" dirty="0">
+                <a:solidFill>
+                  <a:schemeClr val="accent2">
+                    <a:lumMod val="60000"/>
+                    <a:lumOff val="40000"/>
+                  </a:schemeClr>
+                </a:solidFill>
+                <a:latin typeface="Biome Light" panose="020B0303030204020804" pitchFamily="34" charset="0"/>
+                <a:cs typeface="Biome Light" panose="020B0303030204020804" pitchFamily="34" charset="0"/>
+              </a:rPr>
+              <a:t>Inclination refers to the title of the satellite. </a:t>
+            </a:r>
+          </a:p>
+          <a:p>
+            <a:pPr algn="l"/>
             <a:endParaRPr lang="en-US" sz="1200" dirty="0">
               <a:solidFill>
                 <a:schemeClr val="accent2">
@@ -2027,7 +2058,19 @@
                 <a:effectLst/>
                 <a:latin typeface="Söhne"/>
               </a:rPr>
-              <a:t>The model, based on the Ordinary Least Squares (OLS) method, demonstrates a reasonable fit to the data with an R-squared value of 0.604. This means that about 60.4% of the variance in the expected lifetime of satellites is explained the chose features</a:t>
+              <a:t>The model, based on the Ordinary Least Squares (OLS) method which is a linear regression technique used to estimate the parameters of a linear model by minimizing the sum of squared differences between the observed and predicted values..</a:t>
+            </a:r>
+          </a:p>
+          <a:p>
+            <a:r>
+              <a:rPr lang="en-US" b="0" i="0" dirty="0">
+                <a:solidFill>
+                  <a:srgbClr val="BDB7AF"/>
+                </a:solidFill>
+                <a:effectLst/>
+                <a:latin typeface="Söhne"/>
+              </a:rPr>
+              <a:t>The results of this demonstrates a reasonable fit to the data with an R-squared value of 0.604. This means that about 60.4% of the variance in the expected lifetime of satellites is explained the chose features</a:t>
             </a:r>
           </a:p>
         </p:txBody>
@@ -19080,7 +19123,7 @@
 </file>
 
 <file path=ppt/slides/slide12.xml><?xml version="1.0" encoding="utf-8"?>
-<p:sld xmlns:a="http://schemas.openxmlformats.org/drawingml/2006/main" xmlns:r="http://schemas.openxmlformats.org/officeDocument/2006/relationships" xmlns:p="http://schemas.openxmlformats.org/presentationml/2006/main" show="0">
+<p:sld xmlns:a="http://schemas.openxmlformats.org/drawingml/2006/main" xmlns:r="http://schemas.openxmlformats.org/officeDocument/2006/relationships" xmlns:p="http://schemas.openxmlformats.org/presentationml/2006/main">
   <p:cSld>
     <p:spTree>
       <p:nvGrpSpPr>
@@ -20314,7 +20357,7 @@
           <p:cNvPr id="2" name="Title 1">
             <a:extLst>
               <a:ext uri="{FF2B5EF4-FFF2-40B4-BE49-F238E27FC236}">
-                <a16:creationId xmlns:a16="http://schemas.microsoft.com/office/drawing/2014/main" id="{F41F0E99-07CC-9576-AFD7-C52151AD0EA3}"/>
+                <a16:creationId xmlns:a16="http://schemas.microsoft.com/office/drawing/2014/main" id="{D04F090D-C862-CF85-1001-A82E54365597}"/>
               </a:ext>
             </a:extLst>
           </p:cNvPr>
@@ -20325,7 +20368,12 @@
             <p:ph type="ctrTitle"/>
           </p:nvPr>
         </p:nvSpPr>
-        <p:spPr/>
+        <p:spPr>
+          <a:xfrm>
+            <a:off x="2214372" y="1255383"/>
+            <a:ext cx="7763256" cy="809391"/>
+          </a:xfrm>
+        </p:spPr>
         <p:txBody>
           <a:bodyPr/>
           <a:lstStyle/>
@@ -20333,13 +20381,17 @@
             <a:r>
               <a:rPr lang="en-US" dirty="0">
                 <a:solidFill>
-                  <a:srgbClr val="D6ABD7"/>
+                  <a:schemeClr val="accent3"/>
                 </a:solidFill>
                 <a:latin typeface="Biome" panose="020B0503030204020804" pitchFamily="34" charset="0"/>
                 <a:cs typeface="Biome" panose="020B0503030204020804" pitchFamily="34" charset="0"/>
               </a:rPr>
-              <a:t>Data wrangling</a:t>
-            </a:r>
+              <a:t>DATA WRANGLING</a:t>
+            </a:r>
+            <a:br>
+              <a:rPr lang="en-US" dirty="0"/>
+            </a:br>
+            <a:endParaRPr lang="en-US" dirty="0"/>
           </a:p>
         </p:txBody>
       </p:sp>
@@ -20348,7 +20400,7 @@
           <p:cNvPr id="3" name="Subtitle 2">
             <a:extLst>
               <a:ext uri="{FF2B5EF4-FFF2-40B4-BE49-F238E27FC236}">
-                <a16:creationId xmlns:a16="http://schemas.microsoft.com/office/drawing/2014/main" id="{5A82A8B0-333F-633E-3FA7-D38DBFB10971}"/>
+                <a16:creationId xmlns:a16="http://schemas.microsoft.com/office/drawing/2014/main" id="{4CE82C04-6445-9E02-B0E8-8D809278C37D}"/>
               </a:ext>
             </a:extLst>
           </p:cNvPr>
@@ -20361,15 +20413,15 @@
         </p:nvSpPr>
         <p:spPr>
           <a:xfrm>
-            <a:off x="2228088" y="3685032"/>
-            <a:ext cx="7735824" cy="2243820"/>
+            <a:off x="1371600" y="2354137"/>
+            <a:ext cx="9947787" cy="2670710"/>
           </a:xfrm>
         </p:spPr>
         <p:txBody>
           <a:bodyPr/>
           <a:lstStyle/>
           <a:p>
-            <a:pPr marL="285750" indent="-285750" algn="l">
+            <a:pPr marL="342900" indent="-342900" algn="l">
               <a:buClr>
                 <a:schemeClr val="accent4"/>
               </a:buClr>
@@ -20391,7 +20443,7 @@
             </a:r>
           </a:p>
           <a:p>
-            <a:pPr marL="285750" indent="-285750" algn="l">
+            <a:pPr marL="342900" indent="-342900" algn="l">
               <a:buClr>
                 <a:schemeClr val="accent4"/>
               </a:buClr>
@@ -20413,7 +20465,7 @@
             </a:r>
           </a:p>
           <a:p>
-            <a:pPr marL="285750" indent="-285750" algn="l">
+            <a:pPr marL="342900" indent="-342900" algn="l">
               <a:buClr>
                 <a:schemeClr val="accent4"/>
               </a:buClr>
@@ -20435,7 +20487,7 @@
             </a:r>
           </a:p>
           <a:p>
-            <a:pPr marL="742950" lvl="1" indent="-285750" algn="l">
+            <a:pPr marL="800100" lvl="1" indent="-342900" algn="l">
               <a:buClr>
                 <a:schemeClr val="accent4"/>
               </a:buClr>
@@ -20443,7 +20495,7 @@
               <a:buChar char="o"/>
             </a:pPr>
             <a:r>
-              <a:rPr lang="en-US" sz="2800" dirty="0">
+              <a:rPr lang="en-US" sz="2400" dirty="0">
                 <a:solidFill>
                   <a:schemeClr val="accent1">
                     <a:lumMod val="40000"/>
@@ -20457,7 +20509,7 @@
             </a:r>
           </a:p>
           <a:p>
-            <a:pPr marL="742950" lvl="1" indent="-285750" algn="l">
+            <a:pPr marL="800100" lvl="1" indent="-342900" algn="l">
               <a:buClr>
                 <a:schemeClr val="accent4"/>
               </a:buClr>
@@ -20478,12 +20530,22 @@
               <a:t>Launch Mass (Kilograms)</a:t>
             </a:r>
           </a:p>
+          <a:p>
+            <a:pPr algn="l"/>
+            <a:endParaRPr lang="en-US" sz="2400" dirty="0">
+              <a:solidFill>
+                <a:schemeClr val="accent4"/>
+              </a:solidFill>
+              <a:latin typeface="Biome" panose="020B0503030204020804" pitchFamily="34" charset="0"/>
+              <a:cs typeface="Biome" panose="020B0503030204020804" pitchFamily="34" charset="0"/>
+            </a:endParaRPr>
+          </a:p>
         </p:txBody>
       </p:sp>
     </p:spTree>
     <p:extLst>
       <p:ext uri="{BB962C8B-B14F-4D97-AF65-F5344CB8AC3E}">
-        <p14:creationId xmlns:p14="http://schemas.microsoft.com/office/powerpoint/2010/main" val="2424422923"/>
+        <p14:creationId xmlns:p14="http://schemas.microsoft.com/office/powerpoint/2010/main" val="1213210011"/>
       </p:ext>
     </p:extLst>
   </p:cSld>
@@ -20515,7 +20577,7 @@
           <p:cNvPr id="2" name="Title 1">
             <a:extLst>
               <a:ext uri="{FF2B5EF4-FFF2-40B4-BE49-F238E27FC236}">
-                <a16:creationId xmlns:a16="http://schemas.microsoft.com/office/drawing/2014/main" id="{D04F090D-C862-CF85-1001-A82E54365597}"/>
+                <a16:creationId xmlns:a16="http://schemas.microsoft.com/office/drawing/2014/main" id="{F41F0E99-07CC-9576-AFD7-C52151AD0EA3}"/>
               </a:ext>
             </a:extLst>
           </p:cNvPr>
@@ -20526,12 +20588,7 @@
             <p:ph type="ctrTitle"/>
           </p:nvPr>
         </p:nvSpPr>
-        <p:spPr>
-          <a:xfrm>
-            <a:off x="2214372" y="1255383"/>
-            <a:ext cx="7763256" cy="809391"/>
-          </a:xfrm>
-        </p:spPr>
+        <p:spPr/>
         <p:txBody>
           <a:bodyPr/>
           <a:lstStyle/>
@@ -20539,17 +20596,13 @@
             <a:r>
               <a:rPr lang="en-US" dirty="0">
                 <a:solidFill>
-                  <a:schemeClr val="accent3"/>
+                  <a:srgbClr val="D6ABD7"/>
                 </a:solidFill>
                 <a:latin typeface="Biome" panose="020B0503030204020804" pitchFamily="34" charset="0"/>
                 <a:cs typeface="Biome" panose="020B0503030204020804" pitchFamily="34" charset="0"/>
               </a:rPr>
-              <a:t>HYPOTHESES</a:t>
-            </a:r>
-            <a:br>
-              <a:rPr lang="en-US" dirty="0"/>
-            </a:br>
-            <a:endParaRPr lang="en-US" dirty="0"/>
+              <a:t>HYPOTHESIS</a:t>
+            </a:r>
           </a:p>
         </p:txBody>
       </p:sp>
@@ -20558,7 +20611,7 @@
           <p:cNvPr id="3" name="Subtitle 2">
             <a:extLst>
               <a:ext uri="{FF2B5EF4-FFF2-40B4-BE49-F238E27FC236}">
-                <a16:creationId xmlns:a16="http://schemas.microsoft.com/office/drawing/2014/main" id="{4CE82C04-6445-9E02-B0E8-8D809278C37D}"/>
+                <a16:creationId xmlns:a16="http://schemas.microsoft.com/office/drawing/2014/main" id="{5A82A8B0-333F-633E-3FA7-D38DBFB10971}"/>
               </a:ext>
             </a:extLst>
           </p:cNvPr>
@@ -20571,68 +20624,14 @@
         </p:nvSpPr>
         <p:spPr>
           <a:xfrm>
-            <a:off x="1371600" y="2354136"/>
-            <a:ext cx="9947787" cy="3567341"/>
+            <a:off x="2228088" y="3685032"/>
+            <a:ext cx="7735824" cy="2243820"/>
           </a:xfrm>
         </p:spPr>
         <p:txBody>
           <a:bodyPr/>
           <a:lstStyle/>
           <a:p>
-            <a:pPr algn="l"/>
-            <a:endParaRPr lang="en-US" sz="2400" dirty="0">
-              <a:solidFill>
-                <a:schemeClr val="accent4"/>
-              </a:solidFill>
-              <a:latin typeface="Biome" panose="020B0503030204020804" pitchFamily="34" charset="0"/>
-              <a:cs typeface="Biome" panose="020B0503030204020804" pitchFamily="34" charset="0"/>
-            </a:endParaRPr>
-          </a:p>
-          <a:p>
-            <a:pPr algn="l"/>
-            <a:r>
-              <a:rPr lang="en-US" sz="3600" b="0" i="0" dirty="0">
-                <a:solidFill>
-                  <a:schemeClr val="accent4"/>
-                </a:solidFill>
-                <a:effectLst/>
-                <a:latin typeface="Biome" panose="020B0503030204020804" pitchFamily="34" charset="0"/>
-                <a:cs typeface="Biome" panose="020B0503030204020804" pitchFamily="34" charset="0"/>
-              </a:rPr>
-              <a:t>H</a:t>
-            </a:r>
-            <a:r>
-              <a:rPr lang="en-US" sz="3600" b="0" i="0" baseline="-25000" dirty="0">
-                <a:solidFill>
-                  <a:schemeClr val="accent4"/>
-                </a:solidFill>
-                <a:effectLst/>
-                <a:latin typeface="Biome" panose="020B0503030204020804" pitchFamily="34" charset="0"/>
-                <a:cs typeface="Biome" panose="020B0503030204020804" pitchFamily="34" charset="0"/>
-              </a:rPr>
-              <a:t>0</a:t>
-            </a:r>
-            <a:r>
-              <a:rPr lang="en-US" sz="2400" b="0" i="0" baseline="-25000" dirty="0">
-                <a:solidFill>
-                  <a:schemeClr val="accent4"/>
-                </a:solidFill>
-                <a:effectLst/>
-                <a:latin typeface="Biome" panose="020B0503030204020804" pitchFamily="34" charset="0"/>
-                <a:cs typeface="Biome" panose="020B0503030204020804" pitchFamily="34" charset="0"/>
-              </a:rPr>
-              <a:t> </a:t>
-            </a:r>
-            <a:r>
-              <a:rPr lang="en-US" sz="2400" dirty="0">
-                <a:solidFill>
-                  <a:schemeClr val="accent4"/>
-                </a:solidFill>
-                <a:latin typeface="Biome" panose="020B0503030204020804" pitchFamily="34" charset="0"/>
-                <a:cs typeface="Biome" panose="020B0503030204020804" pitchFamily="34" charset="0"/>
-              </a:rPr>
-              <a:t>: </a:t>
-            </a:r>
             <a:r>
               <a:rPr lang="en-US" sz="2400" dirty="0">
                 <a:solidFill>
@@ -20644,82 +20643,15 @@
                 <a:latin typeface="Biome Light" panose="020B0303030204020804" pitchFamily="34" charset="0"/>
                 <a:cs typeface="Biome Light" panose="020B0303030204020804" pitchFamily="34" charset="0"/>
               </a:rPr>
-              <a:t>Satellites in GEO will have a similar life expectancy 	compared to those in other orbits</a:t>
-            </a:r>
-          </a:p>
-          <a:p>
-            <a:pPr algn="l"/>
-            <a:endParaRPr lang="en-US" sz="2400" dirty="0">
-              <a:solidFill>
-                <a:schemeClr val="accent4"/>
-              </a:solidFill>
-              <a:latin typeface="Biome Light" panose="020B0303030204020804" pitchFamily="34" charset="0"/>
-              <a:cs typeface="Biome Light" panose="020B0303030204020804" pitchFamily="34" charset="0"/>
-            </a:endParaRPr>
-          </a:p>
-          <a:p>
-            <a:pPr algn="l"/>
-            <a:r>
-              <a:rPr lang="en-US" sz="3600" b="0" i="0" dirty="0">
-                <a:solidFill>
-                  <a:schemeClr val="accent4"/>
-                </a:solidFill>
-                <a:effectLst/>
-                <a:latin typeface="Biome" panose="020B0503030204020804" pitchFamily="34" charset="0"/>
-                <a:cs typeface="Biome" panose="020B0503030204020804" pitchFamily="34" charset="0"/>
-              </a:rPr>
-              <a:t>H</a:t>
-            </a:r>
-            <a:r>
-              <a:rPr lang="en-US" sz="3600" baseline="-25000" dirty="0">
-                <a:solidFill>
-                  <a:schemeClr val="accent4"/>
-                </a:solidFill>
-                <a:latin typeface="Biome" panose="020B0503030204020804" pitchFamily="34" charset="0"/>
-                <a:cs typeface="Biome" panose="020B0503030204020804" pitchFamily="34" charset="0"/>
-              </a:rPr>
-              <a:t>1 </a:t>
-            </a:r>
-            <a:r>
-              <a:rPr lang="en-US" sz="2400" dirty="0">
-                <a:solidFill>
-                  <a:schemeClr val="accent4"/>
-                </a:solidFill>
-                <a:latin typeface="Biome" panose="020B0503030204020804" pitchFamily="34" charset="0"/>
-                <a:cs typeface="Biome" panose="020B0503030204020804" pitchFamily="34" charset="0"/>
-              </a:rPr>
-              <a:t>: </a:t>
-            </a:r>
-            <a:r>
-              <a:rPr lang="en-US" sz="2400" dirty="0">
-                <a:solidFill>
-                  <a:schemeClr val="accent2">
-                    <a:lumMod val="60000"/>
-                    <a:lumOff val="40000"/>
-                  </a:schemeClr>
-                </a:solidFill>
-                <a:latin typeface="Biome Light" panose="020B0303030204020804" pitchFamily="34" charset="0"/>
-                <a:cs typeface="Biome Light" panose="020B0303030204020804" pitchFamily="34" charset="0"/>
-              </a:rPr>
-              <a:t>Satellites in GEO will have a longer life expectancy 	compared to those in other orbits</a:t>
-            </a:r>
-          </a:p>
-          <a:p>
-            <a:pPr algn="l"/>
-            <a:endParaRPr lang="en-US" sz="2400" dirty="0">
-              <a:solidFill>
-                <a:schemeClr val="accent4"/>
-              </a:solidFill>
-              <a:latin typeface="Biome" panose="020B0503030204020804" pitchFamily="34" charset="0"/>
-              <a:cs typeface="Biome" panose="020B0503030204020804" pitchFamily="34" charset="0"/>
-            </a:endParaRPr>
+              <a:t>Satellites in GEO will have a longer life expectancy compared to those in other orbits</a:t>
+            </a:r>
           </a:p>
         </p:txBody>
       </p:sp>
     </p:spTree>
     <p:extLst>
       <p:ext uri="{BB962C8B-B14F-4D97-AF65-F5344CB8AC3E}">
-        <p14:creationId xmlns:p14="http://schemas.microsoft.com/office/powerpoint/2010/main" val="1213210011"/>
+        <p14:creationId xmlns:p14="http://schemas.microsoft.com/office/powerpoint/2010/main" val="935851799"/>
       </p:ext>
     </p:extLst>
   </p:cSld>
@@ -20784,7 +20716,7 @@
                 <a:latin typeface="Biome" panose="020B0503030204020804" pitchFamily="34" charset="0"/>
                 <a:cs typeface="Biome" panose="020B0503030204020804" pitchFamily="34" charset="0"/>
               </a:rPr>
-              <a:t>HYPOTHESES TESTING</a:t>
+              <a:t>HYPOTHESIS TESTING</a:t>
             </a:r>
           </a:p>
         </p:txBody>
@@ -20807,7 +20739,7 @@
         </p:nvSpPr>
         <p:spPr>
           <a:xfrm>
-            <a:off x="850392" y="1916239"/>
+            <a:off x="850392" y="1655064"/>
             <a:ext cx="10332720" cy="3547872"/>
           </a:xfrm>
         </p:spPr>
@@ -20877,7 +20809,7 @@
                 <a:latin typeface="Biome Light" panose="020B0303030204020804" pitchFamily="34" charset="0"/>
                 <a:cs typeface="Biome Light" panose="020B0303030204020804" pitchFamily="34" charset="0"/>
               </a:rPr>
-              <a:t>Reject Null Hypothesis</a:t>
+              <a:t>Hypothesis is Correct</a:t>
             </a:r>
           </a:p>
           <a:p>
@@ -20918,26 +20850,6 @@
                 <a:cs typeface="Biome Light" panose="020B0303030204020804" pitchFamily="34" charset="0"/>
               </a:rPr>
               <a:t>High Test Statistic</a:t>
-            </a:r>
-          </a:p>
-          <a:p>
-            <a:pPr marL="285750" indent="-285750">
-              <a:buClr>
-                <a:srgbClr val="D6ABD7"/>
-              </a:buClr>
-            </a:pPr>
-            <a:r>
-              <a:rPr lang="en-US" dirty="0">
-                <a:solidFill>
-                  <a:schemeClr val="accent2">
-                    <a:lumMod val="60000"/>
-                    <a:lumOff val="40000"/>
-                  </a:schemeClr>
-                </a:solidFill>
-                <a:latin typeface="Biome Light" panose="020B0303030204020804" pitchFamily="34" charset="0"/>
-                <a:cs typeface="Biome Light" panose="020B0303030204020804" pitchFamily="34" charset="0"/>
-              </a:rPr>
-              <a:t>Tukey HSD</a:t>
             </a:r>
           </a:p>
           <a:p>
@@ -20967,7 +20879,7 @@
         </p:blipFill>
         <p:spPr>
           <a:xfrm>
-            <a:off x="5338353" y="3063574"/>
+            <a:off x="5381896" y="3289997"/>
             <a:ext cx="6637625" cy="3449132"/>
           </a:xfrm>
           <a:prstGeom prst="rect">
@@ -21877,12 +21789,23 @@
 </file>
 
 <file path=customXml/item1.xml><?xml version="1.0" encoding="utf-8"?>
-<?mso-contentType ?>
-<FormTemplates xmlns="http://schemas.microsoft.com/sharepoint/v3/contenttype/forms">
-  <Display>DocumentLibraryForm</Display>
-  <Edit>DocumentLibraryForm</Edit>
-  <New>DocumentLibraryForm</New>
-</FormTemplates>
+<p:properties xmlns:p="http://schemas.microsoft.com/office/2006/metadata/properties" xmlns:xsi="http://www.w3.org/2001/XMLSchema-instance" xmlns:pc="http://schemas.microsoft.com/office/infopath/2007/PartnerControls">
+  <documentManagement>
+    <_ip_UnifiedCompliancePolicyUIAction xmlns="http://schemas.microsoft.com/sharepoint/v3" xsi:nil="true"/>
+    <Image xmlns="71af3243-3dd4-4a8d-8c0d-dd76da1f02a5">
+      <Url xsi:nil="true"/>
+      <Description xsi:nil="true"/>
+    </Image>
+    <Status xmlns="71af3243-3dd4-4a8d-8c0d-dd76da1f02a5">Not started</Status>
+    <Background xmlns="71af3243-3dd4-4a8d-8c0d-dd76da1f02a5">false</Background>
+    <_ip_UnifiedCompliancePolicyProperties xmlns="http://schemas.microsoft.com/sharepoint/v3" xsi:nil="true"/>
+    <ImageTagsTaxHTField xmlns="71af3243-3dd4-4a8d-8c0d-dd76da1f02a5">
+      <Terms xmlns="http://schemas.microsoft.com/office/infopath/2007/PartnerControls"/>
+    </ImageTagsTaxHTField>
+    <TaxCatchAll xmlns="230e9df3-be65-4c73-a93b-d1236ebd677e" xsi:nil="true"/>
+    <MediaServiceKeyPoints xmlns="71af3243-3dd4-4a8d-8c0d-dd76da1f02a5" xsi:nil="true"/>
+  </documentManagement>
+</p:properties>
 </file>
 
 <file path=customXml/item2.xml><?xml version="1.0" encoding="utf-8"?>
@@ -22180,29 +22103,22 @@
 </file>
 
 <file path=customXml/item3.xml><?xml version="1.0" encoding="utf-8"?>
-<p:properties xmlns:p="http://schemas.microsoft.com/office/2006/metadata/properties" xmlns:xsi="http://www.w3.org/2001/XMLSchema-instance" xmlns:pc="http://schemas.microsoft.com/office/infopath/2007/PartnerControls">
-  <documentManagement>
-    <_ip_UnifiedCompliancePolicyUIAction xmlns="http://schemas.microsoft.com/sharepoint/v3" xsi:nil="true"/>
-    <Image xmlns="71af3243-3dd4-4a8d-8c0d-dd76da1f02a5">
-      <Url xsi:nil="true"/>
-      <Description xsi:nil="true"/>
-    </Image>
-    <Status xmlns="71af3243-3dd4-4a8d-8c0d-dd76da1f02a5">Not started</Status>
-    <Background xmlns="71af3243-3dd4-4a8d-8c0d-dd76da1f02a5">false</Background>
-    <_ip_UnifiedCompliancePolicyProperties xmlns="http://schemas.microsoft.com/sharepoint/v3" xsi:nil="true"/>
-    <ImageTagsTaxHTField xmlns="71af3243-3dd4-4a8d-8c0d-dd76da1f02a5">
-      <Terms xmlns="http://schemas.microsoft.com/office/infopath/2007/PartnerControls"/>
-    </ImageTagsTaxHTField>
-    <TaxCatchAll xmlns="230e9df3-be65-4c73-a93b-d1236ebd677e" xsi:nil="true"/>
-    <MediaServiceKeyPoints xmlns="71af3243-3dd4-4a8d-8c0d-dd76da1f02a5" xsi:nil="true"/>
-  </documentManagement>
-</p:properties>
+<?mso-contentType ?>
+<FormTemplates xmlns="http://schemas.microsoft.com/sharepoint/v3/contenttype/forms">
+  <Display>DocumentLibraryForm</Display>
+  <Edit>DocumentLibraryForm</Edit>
+  <New>DocumentLibraryForm</New>
+</FormTemplates>
 </file>
 
 <file path=customXml/itemProps1.xml><?xml version="1.0" encoding="utf-8"?>
-<ds:datastoreItem xmlns:ds="http://schemas.openxmlformats.org/officeDocument/2006/customXml" ds:itemID="{4F1F1912-3146-44AF-A389-9E8B77BB3688}">
+<ds:datastoreItem xmlns:ds="http://schemas.openxmlformats.org/officeDocument/2006/customXml" ds:itemID="{F8B8ECF1-2A9D-464C-AFE8-2B3295D0BF97}">
   <ds:schemaRefs>
-    <ds:schemaRef ds:uri="http://schemas.microsoft.com/sharepoint/v3/contenttype/forms"/>
+    <ds:schemaRef ds:uri="http://schemas.microsoft.com/office/2006/metadata/properties"/>
+    <ds:schemaRef ds:uri="http://schemas.microsoft.com/office/infopath/2007/PartnerControls"/>
+    <ds:schemaRef ds:uri="http://schemas.microsoft.com/sharepoint/v3"/>
+    <ds:schemaRef ds:uri="71af3243-3dd4-4a8d-8c0d-dd76da1f02a5"/>
+    <ds:schemaRef ds:uri="230e9df3-be65-4c73-a93b-d1236ebd677e"/>
   </ds:schemaRefs>
 </ds:datastoreItem>
 </file>
@@ -22229,13 +22145,9 @@
 </file>
 
 <file path=customXml/itemProps3.xml><?xml version="1.0" encoding="utf-8"?>
-<ds:datastoreItem xmlns:ds="http://schemas.openxmlformats.org/officeDocument/2006/customXml" ds:itemID="{F8B8ECF1-2A9D-464C-AFE8-2B3295D0BF97}">
+<ds:datastoreItem xmlns:ds="http://schemas.openxmlformats.org/officeDocument/2006/customXml" ds:itemID="{4F1F1912-3146-44AF-A389-9E8B77BB3688}">
   <ds:schemaRefs>
-    <ds:schemaRef ds:uri="http://schemas.microsoft.com/office/2006/metadata/properties"/>
-    <ds:schemaRef ds:uri="http://schemas.microsoft.com/office/infopath/2007/PartnerControls"/>
-    <ds:schemaRef ds:uri="http://schemas.microsoft.com/sharepoint/v3"/>
-    <ds:schemaRef ds:uri="71af3243-3dd4-4a8d-8c0d-dd76da1f02a5"/>
-    <ds:schemaRef ds:uri="230e9df3-be65-4c73-a93b-d1236ebd677e"/>
+    <ds:schemaRef ds:uri="http://schemas.microsoft.com/sharepoint/v3/contenttype/forms"/>
   </ds:schemaRefs>
 </ds:datastoreItem>
 </file>

</xml_diff>